<commit_message>
thesis presentation / finished chapter 3
</commit_message>
<xml_diff>
--- a/thesis/kepler-sieve-slides.pptx
+++ b/thesis/kepler-sieve-slides.pptx
@@ -24,10 +24,18 @@
     <p:sldId id="279" r:id="rId18"/>
     <p:sldId id="280" r:id="rId19"/>
     <p:sldId id="271" r:id="rId20"/>
-    <p:sldId id="262" r:id="rId21"/>
-    <p:sldId id="268" r:id="rId22"/>
-    <p:sldId id="260" r:id="rId23"/>
-    <p:sldId id="257" r:id="rId24"/>
+    <p:sldId id="281" r:id="rId21"/>
+    <p:sldId id="282" r:id="rId22"/>
+    <p:sldId id="283" r:id="rId23"/>
+    <p:sldId id="284" r:id="rId24"/>
+    <p:sldId id="285" r:id="rId25"/>
+    <p:sldId id="286" r:id="rId26"/>
+    <p:sldId id="287" r:id="rId27"/>
+    <p:sldId id="288" r:id="rId28"/>
+    <p:sldId id="262" r:id="rId29"/>
+    <p:sldId id="268" r:id="rId30"/>
+    <p:sldId id="260" r:id="rId31"/>
+    <p:sldId id="257" r:id="rId32"/>
   </p:sldIdLst>
   <p:sldSz cx="12192000" cy="6858000"/>
   <p:notesSz cx="6858000" cy="9144000"/>
@@ -5610,13 +5618,8 @@
           <a:p>
             <a:r>
               <a:rPr lang="en-US" dirty="0"/>
-              <a:t>RMS error: </a:t>
-            </a:r>
-            <a:r>
-              <a:rPr lang="en-US"/>
-              <a:t>0.873 arc seconds!</a:t>
-            </a:r>
-            <a:endParaRPr lang="en-US" dirty="0"/>
+              <a:t>RMS error: 0.873 arc seconds!</a:t>
+            </a:r>
           </a:p>
         </p:txBody>
       </p:sp>
@@ -5832,7 +5835,7 @@
           <p:cNvPr id="2" name="Title 1">
             <a:extLst>
               <a:ext uri="{FF2B5EF4-FFF2-40B4-BE49-F238E27FC236}">
-                <a16:creationId xmlns:a16="http://schemas.microsoft.com/office/drawing/2014/main" id="{6A94D88C-A974-4E67-89D9-53DEAA96FC71}"/>
+                <a16:creationId xmlns:a16="http://schemas.microsoft.com/office/drawing/2014/main" id="{2D0996E9-99B2-4922-8E98-07C341CDE22B}"/>
               </a:ext>
             </a:extLst>
           </p:cNvPr>
@@ -5845,47 +5848,180 @@
         </p:nvSpPr>
         <p:spPr/>
         <p:txBody>
-          <a:bodyPr>
-            <a:normAutofit/>
+          <a:bodyPr/>
+          <a:lstStyle/>
+          <a:p>
+            <a:r>
+              <a:rPr lang="en-US" dirty="0"/>
+              <a:t>EDA of ZTF Detections</a:t>
+            </a:r>
+          </a:p>
+        </p:txBody>
+      </p:sp>
+      <p:pic>
+        <p:nvPicPr>
+          <p:cNvPr id="5" name="Content Placeholder 4" descr="A screenshot of a cell phone&#10;&#10;Description automatically generated">
+            <a:extLst>
+              <a:ext uri="{FF2B5EF4-FFF2-40B4-BE49-F238E27FC236}">
+                <a16:creationId xmlns:a16="http://schemas.microsoft.com/office/drawing/2014/main" id="{8FD74D46-554E-46D0-A271-315842A91856}"/>
+              </a:ext>
+            </a:extLst>
+          </p:cNvPr>
+          <p:cNvPicPr>
+            <a:picLocks noGrp="1" noChangeAspect="1"/>
+          </p:cNvPicPr>
+          <p:nvPr>
+            <p:ph idx="1"/>
+          </p:nvPr>
+        </p:nvPicPr>
+        <p:blipFill>
+          <a:blip r:embed="rId2">
+            <a:extLst>
+              <a:ext uri="{28A0092B-C50C-407E-A947-70E740481C1C}">
+                <a14:useLocalDpi xmlns:a14="http://schemas.microsoft.com/office/drawing/2010/main" val="0"/>
+              </a:ext>
+            </a:extLst>
+          </a:blip>
+          <a:stretch>
+            <a:fillRect/>
+          </a:stretch>
+        </p:blipFill>
+        <p:spPr>
+          <a:xfrm>
+            <a:off x="613391" y="1423081"/>
+            <a:ext cx="5330583" cy="3291794"/>
+          </a:xfrm>
+        </p:spPr>
+      </p:pic>
+      <p:pic>
+        <p:nvPicPr>
+          <p:cNvPr id="7" name="Picture 6" descr="A screenshot of a cell phone&#10;&#10;Description automatically generated">
+            <a:extLst>
+              <a:ext uri="{FF2B5EF4-FFF2-40B4-BE49-F238E27FC236}">
+                <a16:creationId xmlns:a16="http://schemas.microsoft.com/office/drawing/2014/main" id="{B4B3EE0D-F4E7-41B7-B013-42B002E2D081}"/>
+              </a:ext>
+            </a:extLst>
+          </p:cNvPr>
+          <p:cNvPicPr>
+            <a:picLocks noChangeAspect="1"/>
+          </p:cNvPicPr>
+          <p:nvPr/>
+        </p:nvPicPr>
+        <p:blipFill>
+          <a:blip r:embed="rId3">
+            <a:extLst>
+              <a:ext uri="{28A0092B-C50C-407E-A947-70E740481C1C}">
+                <a14:useLocalDpi xmlns:a14="http://schemas.microsoft.com/office/drawing/2010/main" val="0"/>
+              </a:ext>
+            </a:extLst>
+          </a:blip>
+          <a:stretch>
+            <a:fillRect/>
+          </a:stretch>
+        </p:blipFill>
+        <p:spPr>
+          <a:xfrm>
+            <a:off x="6154994" y="1392692"/>
+            <a:ext cx="5236000" cy="3343275"/>
+          </a:xfrm>
+          <a:prstGeom prst="rect">
+            <a:avLst/>
+          </a:prstGeom>
+        </p:spPr>
+      </p:pic>
+      <p:sp>
+        <p:nvSpPr>
+          <p:cNvPr id="8" name="TextBox 7">
+            <a:extLst>
+              <a:ext uri="{FF2B5EF4-FFF2-40B4-BE49-F238E27FC236}">
+                <a16:creationId xmlns:a16="http://schemas.microsoft.com/office/drawing/2014/main" id="{5A6A56F2-1A3D-4B77-969C-5AB54751FC2A}"/>
+              </a:ext>
+            </a:extLst>
+          </p:cNvPr>
+          <p:cNvSpPr txBox="1"/>
+          <p:nvPr/>
+        </p:nvSpPr>
+        <p:spPr>
+          <a:xfrm>
+            <a:off x="898071" y="4918982"/>
+            <a:ext cx="10515600" cy="1754326"/>
+          </a:xfrm>
+          <a:prstGeom prst="rect">
+            <a:avLst/>
+          </a:prstGeom>
+          <a:noFill/>
+        </p:spPr>
+        <p:txBody>
+          <a:bodyPr wrap="square" rtlCol="0">
+            <a:spAutoFit/>
           </a:bodyPr>
           <a:lstStyle/>
           <a:p>
-            <a:r>
-              <a:rPr lang="en-US" sz="5200" dirty="0"/>
-              <a:t>Asteroid Search Using Orbital Elements</a:t>
-            </a:r>
-          </a:p>
-        </p:txBody>
-      </p:sp>
-      <p:sp>
-        <p:nvSpPr>
-          <p:cNvPr id="3" name="Text Placeholder 2">
-            <a:extLst>
-              <a:ext uri="{FF2B5EF4-FFF2-40B4-BE49-F238E27FC236}">
-                <a16:creationId xmlns:a16="http://schemas.microsoft.com/office/drawing/2014/main" id="{5C8581F0-497B-4867-9CB1-3D6A5C04EF6A}"/>
-              </a:ext>
-            </a:extLst>
-          </p:cNvPr>
-          <p:cNvSpPr>
-            <a:spLocks noGrp="1"/>
-          </p:cNvSpPr>
-          <p:nvPr>
-            <p:ph type="body" idx="1"/>
-          </p:nvPr>
-        </p:nvSpPr>
-        <p:spPr/>
-        <p:txBody>
-          <a:bodyPr/>
-          <a:lstStyle/>
-          <a:p>
-            <a:endParaRPr lang="en-US" dirty="0"/>
+            <a:pPr marL="285750" indent="-285750">
+              <a:buFont typeface="Arial" panose="020B0604020202020204" pitchFamily="34" charset="0"/>
+              <a:buChar char="•"/>
+            </a:pPr>
+            <a:r>
+              <a:rPr lang="en-US" dirty="0"/>
+              <a:t>ZTF: Zwicky Transient Facility; survey of northern sky at Palomar Mountain by Cal Tech</a:t>
+            </a:r>
+          </a:p>
+          <a:p>
+            <a:pPr marL="285750" indent="-285750">
+              <a:buFont typeface="Arial" panose="020B0604020202020204" pitchFamily="34" charset="0"/>
+              <a:buChar char="•"/>
+            </a:pPr>
+            <a:r>
+              <a:rPr lang="en-US" dirty="0"/>
+              <a:t>Fast, deep survey: 3750 square degrees / hour to depth of 20.5 mag</a:t>
+            </a:r>
+          </a:p>
+          <a:p>
+            <a:pPr marL="285750" indent="-285750">
+              <a:buFont typeface="Arial" panose="020B0604020202020204" pitchFamily="34" charset="0"/>
+              <a:buChar char="•"/>
+            </a:pPr>
+            <a:r>
+              <a:rPr lang="en-US" dirty="0"/>
+              <a:t>First light in 2017, but asteroid detections ramp up in July 2019; 7 months of data</a:t>
+            </a:r>
+          </a:p>
+          <a:p>
+            <a:pPr marL="285750" indent="-285750">
+              <a:buFont typeface="Arial" panose="020B0604020202020204" pitchFamily="34" charset="0"/>
+              <a:buChar char="•"/>
+            </a:pPr>
+            <a:r>
+              <a:rPr lang="en-US" dirty="0"/>
+              <a:t>Enriched with machine learning pipeline that filters probable asteroid detections</a:t>
+            </a:r>
+          </a:p>
+          <a:p>
+            <a:pPr marL="285750" indent="-285750">
+              <a:buFont typeface="Arial" panose="020B0604020202020204" pitchFamily="34" charset="0"/>
+              <a:buChar char="•"/>
+            </a:pPr>
+            <a:r>
+              <a:rPr lang="en-US" dirty="0"/>
+              <a:t>5.69 million possible asteroid detections</a:t>
+            </a:r>
+          </a:p>
+          <a:p>
+            <a:pPr marL="285750" indent="-285750">
+              <a:buFont typeface="Arial" panose="020B0604020202020204" pitchFamily="34" charset="0"/>
+              <a:buChar char="•"/>
+            </a:pPr>
+            <a:r>
+              <a:rPr lang="en-US" dirty="0"/>
+              <a:t>Data includes: MJD, RA, DEC, MAG</a:t>
+            </a:r>
           </a:p>
         </p:txBody>
       </p:sp>
     </p:spTree>
     <p:extLst>
       <p:ext uri="{BB962C8B-B14F-4D97-AF65-F5344CB8AC3E}">
-        <p14:creationId xmlns:p14="http://schemas.microsoft.com/office/powerpoint/2010/main" val="524410934"/>
+        <p14:creationId xmlns:p14="http://schemas.microsoft.com/office/powerpoint/2010/main" val="3880609035"/>
       </p:ext>
     </p:extLst>
   </p:cSld>
@@ -5917,7 +6053,7 @@
           <p:cNvPr id="2" name="Title 1">
             <a:extLst>
               <a:ext uri="{FF2B5EF4-FFF2-40B4-BE49-F238E27FC236}">
-                <a16:creationId xmlns:a16="http://schemas.microsoft.com/office/drawing/2014/main" id="{AE0C7375-4CE6-4B17-8327-4F7F546C873A}"/>
+                <a16:creationId xmlns:a16="http://schemas.microsoft.com/office/drawing/2014/main" id="{7579B5B3-D325-4276-82C3-B5799092AEA2}"/>
               </a:ext>
             </a:extLst>
           </p:cNvPr>
@@ -5933,39 +6069,200 @@
           <a:bodyPr/>
           <a:lstStyle/>
           <a:p>
-            <a:endParaRPr lang="en-US"/>
-          </a:p>
-        </p:txBody>
-      </p:sp>
-      <p:sp>
-        <p:nvSpPr>
-          <p:cNvPr id="3" name="Content Placeholder 2">
-            <a:extLst>
-              <a:ext uri="{FF2B5EF4-FFF2-40B4-BE49-F238E27FC236}">
-                <a16:creationId xmlns:a16="http://schemas.microsoft.com/office/drawing/2014/main" id="{E876F66D-B10E-47C6-B508-793B7A75D976}"/>
-              </a:ext>
-            </a:extLst>
-          </p:cNvPr>
-          <p:cNvSpPr>
-            <a:spLocks noGrp="1"/>
-          </p:cNvSpPr>
+            <a:r>
+              <a:rPr lang="en-US" dirty="0"/>
+              <a:t>Converting Cartesian to Angular Distance</a:t>
+            </a:r>
+          </a:p>
+        </p:txBody>
+      </p:sp>
+      <p:pic>
+        <p:nvPicPr>
+          <p:cNvPr id="5" name="Content Placeholder 4" descr="A picture containing umbrella&#10;&#10;Description automatically generated">
+            <a:extLst>
+              <a:ext uri="{FF2B5EF4-FFF2-40B4-BE49-F238E27FC236}">
+                <a16:creationId xmlns:a16="http://schemas.microsoft.com/office/drawing/2014/main" id="{B0204E2F-698F-4BBC-AA2E-5E05E5A78057}"/>
+              </a:ext>
+            </a:extLst>
+          </p:cNvPr>
+          <p:cNvPicPr>
+            <a:picLocks noGrp="1" noChangeAspect="1"/>
+          </p:cNvPicPr>
           <p:nvPr>
             <p:ph idx="1"/>
           </p:nvPr>
-        </p:nvSpPr>
-        <p:spPr/>
-        <p:txBody>
-          <a:bodyPr/>
-          <a:lstStyle/>
-          <a:p>
-            <a:endParaRPr lang="en-US"/>
-          </a:p>
-        </p:txBody>
-      </p:sp>
+        </p:nvPicPr>
+        <p:blipFill>
+          <a:blip r:embed="rId3">
+            <a:extLst>
+              <a:ext uri="{28A0092B-C50C-407E-A947-70E740481C1C}">
+                <a14:useLocalDpi xmlns:a14="http://schemas.microsoft.com/office/drawing/2010/main" val="0"/>
+              </a:ext>
+            </a:extLst>
+          </a:blip>
+          <a:stretch>
+            <a:fillRect/>
+          </a:stretch>
+        </p:blipFill>
+        <p:spPr>
+          <a:xfrm>
+            <a:off x="7866861" y="1433740"/>
+            <a:ext cx="2932556" cy="4351338"/>
+          </a:xfrm>
+        </p:spPr>
+      </p:pic>
+      <p:sp>
+        <p:nvSpPr>
+          <p:cNvPr id="6" name="TextBox 5">
+            <a:extLst>
+              <a:ext uri="{FF2B5EF4-FFF2-40B4-BE49-F238E27FC236}">
+                <a16:creationId xmlns:a16="http://schemas.microsoft.com/office/drawing/2014/main" id="{1F38801B-0CC8-4E02-A3E2-D92741FB23B6}"/>
+              </a:ext>
+            </a:extLst>
+          </p:cNvPr>
+          <p:cNvSpPr txBox="1"/>
+          <p:nvPr/>
+        </p:nvSpPr>
+        <p:spPr>
+          <a:xfrm>
+            <a:off x="1008289" y="1665513"/>
+            <a:ext cx="6906986" cy="1200329"/>
+          </a:xfrm>
+          <a:prstGeom prst="rect">
+            <a:avLst/>
+          </a:prstGeom>
+          <a:noFill/>
+        </p:spPr>
+        <p:txBody>
+          <a:bodyPr wrap="square" rtlCol="0">
+            <a:spAutoFit/>
+          </a:bodyPr>
+          <a:lstStyle/>
+          <a:p>
+            <a:pPr marL="285750" indent="-285750">
+              <a:buFont typeface="Arial" panose="020B0604020202020204" pitchFamily="34" charset="0"/>
+              <a:buChar char="•"/>
+            </a:pPr>
+            <a:r>
+              <a:rPr lang="en-US" dirty="0"/>
+              <a:t>How far apart are two directions in the sky?</a:t>
+            </a:r>
+          </a:p>
+          <a:p>
+            <a:pPr marL="285750" indent="-285750">
+              <a:buFont typeface="Arial" panose="020B0604020202020204" pitchFamily="34" charset="0"/>
+              <a:buChar char="•"/>
+            </a:pPr>
+            <a:r>
+              <a:rPr lang="en-US" dirty="0"/>
+              <a:t>Convert RA/Dec to directions u</a:t>
+            </a:r>
+            <a:r>
+              <a:rPr lang="en-US" baseline="-25000" dirty="0"/>
+              <a:t>1</a:t>
+            </a:r>
+            <a:r>
+              <a:rPr lang="en-US" dirty="0"/>
+              <a:t> and u</a:t>
+            </a:r>
+            <a:r>
+              <a:rPr lang="en-US" baseline="-25000" dirty="0"/>
+              <a:t>2</a:t>
+            </a:r>
+            <a:r>
+              <a:rPr lang="en-US" dirty="0"/>
+              <a:t> in the BME</a:t>
+            </a:r>
+          </a:p>
+          <a:p>
+            <a:pPr marL="285750" indent="-285750">
+              <a:buFont typeface="Arial" panose="020B0604020202020204" pitchFamily="34" charset="0"/>
+              <a:buChar char="•"/>
+            </a:pPr>
+            <a:r>
+              <a:rPr lang="en-US" dirty="0"/>
+              <a:t>Compute Cartesian distance s between u</a:t>
+            </a:r>
+            <a:r>
+              <a:rPr lang="en-US" baseline="-25000" dirty="0"/>
+              <a:t>1</a:t>
+            </a:r>
+            <a:r>
+              <a:rPr lang="en-US" dirty="0"/>
+              <a:t> and u</a:t>
+            </a:r>
+            <a:r>
+              <a:rPr lang="en-US" baseline="-25000" dirty="0"/>
+              <a:t>2</a:t>
+            </a:r>
+          </a:p>
+          <a:p>
+            <a:pPr marL="285750" indent="-285750">
+              <a:buFont typeface="Arial" panose="020B0604020202020204" pitchFamily="34" charset="0"/>
+              <a:buChar char="•"/>
+            </a:pPr>
+            <a:r>
+              <a:rPr lang="en-US" dirty="0"/>
+              <a:t>Angular distance </a:t>
+            </a:r>
+            <a:r>
+              <a:rPr lang="el-GR" dirty="0">
+                <a:latin typeface="Times New Roman" panose="02020603050405020304" pitchFamily="18" charset="0"/>
+                <a:cs typeface="Times New Roman" panose="02020603050405020304" pitchFamily="18" charset="0"/>
+              </a:rPr>
+              <a:t>θ</a:t>
+            </a:r>
+            <a:r>
+              <a:rPr lang="en-US" dirty="0"/>
+              <a:t> is geodesic (great circle distance)</a:t>
+            </a:r>
+          </a:p>
+        </p:txBody>
+      </p:sp>
+      <p:pic>
+        <p:nvPicPr>
+          <p:cNvPr id="8" name="Picture 7">
+            <a:extLst>
+              <a:ext uri="{FF2B5EF4-FFF2-40B4-BE49-F238E27FC236}">
+                <a16:creationId xmlns:a16="http://schemas.microsoft.com/office/drawing/2014/main" id="{BAD12986-A405-40F0-803C-2509585A3CE8}"/>
+              </a:ext>
+            </a:extLst>
+          </p:cNvPr>
+          <p:cNvPicPr>
+            <a:picLocks noChangeAspect="1"/>
+          </p:cNvPicPr>
+          <p:nvPr>
+            <p:custDataLst>
+              <p:tags r:id="rId1"/>
+            </p:custDataLst>
+          </p:nvPr>
+        </p:nvPicPr>
+        <p:blipFill>
+          <a:blip r:embed="rId4">
+            <a:extLst>
+              <a:ext uri="{28A0092B-C50C-407E-A947-70E740481C1C}">
+                <a14:useLocalDpi xmlns:a14="http://schemas.microsoft.com/office/drawing/2010/main" val="0"/>
+              </a:ext>
+            </a:extLst>
+          </a:blip>
+          <a:stretch>
+            <a:fillRect/>
+          </a:stretch>
+        </p:blipFill>
+        <p:spPr>
+          <a:xfrm>
+            <a:off x="1527294" y="3023280"/>
+            <a:ext cx="4481621" cy="715153"/>
+          </a:xfrm>
+          <a:prstGeom prst="rect">
+            <a:avLst/>
+          </a:prstGeom>
+        </p:spPr>
+      </p:pic>
     </p:spTree>
     <p:extLst>
       <p:ext uri="{BB962C8B-B14F-4D97-AF65-F5344CB8AC3E}">
-        <p14:creationId xmlns:p14="http://schemas.microsoft.com/office/powerpoint/2010/main" val="3737257400"/>
+        <p14:creationId xmlns:p14="http://schemas.microsoft.com/office/powerpoint/2010/main" val="2721185592"/>
       </p:ext>
     </p:extLst>
   </p:cSld>
@@ -5997,7 +6294,7 @@
           <p:cNvPr id="2" name="Title 1">
             <a:extLst>
               <a:ext uri="{FF2B5EF4-FFF2-40B4-BE49-F238E27FC236}">
-                <a16:creationId xmlns:a16="http://schemas.microsoft.com/office/drawing/2014/main" id="{6A94D88C-A974-4E67-89D9-53DEAA96FC71}"/>
+                <a16:creationId xmlns:a16="http://schemas.microsoft.com/office/drawing/2014/main" id="{6A139263-E116-4924-B776-987F6965BF48}"/>
               </a:ext>
             </a:extLst>
           </p:cNvPr>
@@ -6010,32 +6307,30 @@
         </p:nvSpPr>
         <p:spPr/>
         <p:txBody>
-          <a:bodyPr>
-            <a:normAutofit/>
-          </a:bodyPr>
-          <a:lstStyle/>
-          <a:p>
-            <a:r>
-              <a:rPr lang="en-US" sz="5600" dirty="0"/>
-              <a:t>Asteroid Search Results</a:t>
-            </a:r>
-          </a:p>
-        </p:txBody>
-      </p:sp>
-      <p:sp>
-        <p:nvSpPr>
-          <p:cNvPr id="3" name="Text Placeholder 2">
-            <a:extLst>
-              <a:ext uri="{FF2B5EF4-FFF2-40B4-BE49-F238E27FC236}">
-                <a16:creationId xmlns:a16="http://schemas.microsoft.com/office/drawing/2014/main" id="{5C8581F0-497B-4867-9CB1-3D6A5C04EF6A}"/>
-              </a:ext>
-            </a:extLst>
-          </p:cNvPr>
-          <p:cNvSpPr>
-            <a:spLocks noGrp="1"/>
-          </p:cNvSpPr>
-          <p:nvPr>
-            <p:ph type="body" idx="1"/>
+          <a:bodyPr/>
+          <a:lstStyle/>
+          <a:p>
+            <a:r>
+              <a:rPr lang="en-US" dirty="0"/>
+              <a:t>Nearest Asteroid to Each ZTF Detection</a:t>
+            </a:r>
+          </a:p>
+        </p:txBody>
+      </p:sp>
+      <p:sp>
+        <p:nvSpPr>
+          <p:cNvPr id="3" name="Content Placeholder 2">
+            <a:extLst>
+              <a:ext uri="{FF2B5EF4-FFF2-40B4-BE49-F238E27FC236}">
+                <a16:creationId xmlns:a16="http://schemas.microsoft.com/office/drawing/2014/main" id="{0A78FC10-51AE-4D78-885A-1E08B65E1A13}"/>
+              </a:ext>
+            </a:extLst>
+          </p:cNvPr>
+          <p:cNvSpPr>
+            <a:spLocks noGrp="1"/>
+          </p:cNvSpPr>
+          <p:nvPr>
+            <p:ph idx="1"/>
           </p:nvPr>
         </p:nvSpPr>
         <p:spPr/>
@@ -6043,14 +6338,114 @@
           <a:bodyPr/>
           <a:lstStyle/>
           <a:p>
-            <a:endParaRPr lang="en-US"/>
+            <a:r>
+              <a:rPr lang="en-US" dirty="0"/>
+              <a:t>Compute direction </a:t>
+            </a:r>
+            <a:r>
+              <a:rPr lang="en-US" dirty="0" err="1"/>
+              <a:t>u</a:t>
+            </a:r>
+            <a:r>
+              <a:rPr lang="en-US" baseline="-25000" dirty="0" err="1"/>
+              <a:t>ztf</a:t>
+            </a:r>
+            <a:r>
+              <a:rPr lang="en-US" dirty="0"/>
+              <a:t> = (</a:t>
+            </a:r>
+            <a:r>
+              <a:rPr lang="en-US" dirty="0" err="1"/>
+              <a:t>u</a:t>
+            </a:r>
+            <a:r>
+              <a:rPr lang="en-US" baseline="-25000" dirty="0" err="1"/>
+              <a:t>x</a:t>
+            </a:r>
+            <a:r>
+              <a:rPr lang="en-US" dirty="0"/>
+              <a:t>, </a:t>
+            </a:r>
+            <a:r>
+              <a:rPr lang="en-US" dirty="0" err="1"/>
+              <a:t>u</a:t>
+            </a:r>
+            <a:r>
+              <a:rPr lang="en-US" baseline="-25000" dirty="0" err="1"/>
+              <a:t>y</a:t>
+            </a:r>
+            <a:r>
+              <a:rPr lang="en-US" dirty="0"/>
+              <a:t>, </a:t>
+            </a:r>
+            <a:r>
+              <a:rPr lang="en-US" dirty="0" err="1"/>
+              <a:t>u</a:t>
+            </a:r>
+            <a:r>
+              <a:rPr lang="en-US" baseline="-25000" dirty="0" err="1"/>
+              <a:t>z</a:t>
+            </a:r>
+            <a:r>
+              <a:rPr lang="en-US" dirty="0"/>
+              <a:t>) from RA/Dec for each detection</a:t>
+            </a:r>
+          </a:p>
+          <a:p>
+            <a:r>
+              <a:rPr lang="en-US" dirty="0"/>
+              <a:t>Compute direction </a:t>
+            </a:r>
+            <a:r>
+              <a:rPr lang="en-US" dirty="0" err="1"/>
+              <a:t>u</a:t>
+            </a:r>
+            <a:r>
+              <a:rPr lang="en-US" baseline="-25000" dirty="0" err="1"/>
+              <a:t>ast</a:t>
+            </a:r>
+            <a:r>
+              <a:rPr lang="en-US" dirty="0"/>
+              <a:t> for every asteroid in the catalogue</a:t>
+            </a:r>
+          </a:p>
+          <a:p>
+            <a:r>
+              <a:rPr lang="en-US" dirty="0"/>
+              <a:t>5.7E6 detections x 7.3E5 asteroids = 4.2E12 (4.2 trillion) interactions</a:t>
+            </a:r>
+          </a:p>
+          <a:p>
+            <a:pPr lvl="1"/>
+            <a:r>
+              <a:rPr lang="en-US" dirty="0"/>
+              <a:t>Too big for naïve brute force attack</a:t>
+            </a:r>
+          </a:p>
+          <a:p>
+            <a:r>
+              <a:rPr lang="en-US" dirty="0"/>
+              <a:t>“Only” 97,111 different MJDs with ZTF detections</a:t>
+            </a:r>
+          </a:p>
+          <a:p>
+            <a:r>
+              <a:rPr lang="en-US" dirty="0"/>
+              <a:t>Work in chunks of 1000 asteroids at a time, find nearest to each ZTF</a:t>
+            </a:r>
+          </a:p>
+          <a:p>
+            <a:r>
+              <a:rPr lang="en-US" dirty="0"/>
+              <a:t>Then perform reduction operation to find globally nearest asteroid</a:t>
+            </a:r>
           </a:p>
         </p:txBody>
       </p:sp>
     </p:spTree>
     <p:extLst>
       <p:ext uri="{BB962C8B-B14F-4D97-AF65-F5344CB8AC3E}">
-        <p14:creationId xmlns:p14="http://schemas.microsoft.com/office/powerpoint/2010/main" val="1163642287"/>
+        <p14:creationId xmlns:p14="http://schemas.microsoft.com/office/powerpoint/2010/main" val="4185766797"/>
       </p:ext>
     </p:extLst>
   </p:cSld>
@@ -6082,7 +6477,7 @@
           <p:cNvPr id="2" name="Title 1">
             <a:extLst>
               <a:ext uri="{FF2B5EF4-FFF2-40B4-BE49-F238E27FC236}">
-                <a16:creationId xmlns:a16="http://schemas.microsoft.com/office/drawing/2014/main" id="{3E26F76F-90C6-4718-820D-94CFA898DA3E}"/>
+                <a16:creationId xmlns:a16="http://schemas.microsoft.com/office/drawing/2014/main" id="{F450E70B-7A1E-470E-B5AB-475CF64F821B}"/>
               </a:ext>
             </a:extLst>
           </p:cNvPr>
@@ -6095,42 +6490,1329 @@
         </p:nvSpPr>
         <p:spPr/>
         <p:txBody>
-          <a:bodyPr/>
-          <a:lstStyle/>
-          <a:p>
-            <a:endParaRPr lang="en-US"/>
-          </a:p>
-        </p:txBody>
-      </p:sp>
-      <p:sp>
-        <p:nvSpPr>
-          <p:cNvPr id="3" name="Content Placeholder 2">
-            <a:extLst>
-              <a:ext uri="{FF2B5EF4-FFF2-40B4-BE49-F238E27FC236}">
-                <a16:creationId xmlns:a16="http://schemas.microsoft.com/office/drawing/2014/main" id="{D3D1E12F-B6D1-4F78-A0C2-2F18DF210B68}"/>
-              </a:ext>
-            </a:extLst>
-          </p:cNvPr>
-          <p:cNvSpPr>
-            <a:spLocks noGrp="1"/>
-          </p:cNvSpPr>
+          <a:bodyPr>
+            <a:normAutofit/>
+          </a:bodyPr>
+          <a:lstStyle/>
+          <a:p>
+            <a:r>
+              <a:rPr lang="en-US" sz="4000" dirty="0"/>
+              <a:t>Nearest Asteroid: 65.7% Within 2.0 Arc Seconds!</a:t>
+            </a:r>
+          </a:p>
+        </p:txBody>
+      </p:sp>
+      <p:pic>
+        <p:nvPicPr>
+          <p:cNvPr id="5" name="Content Placeholder 4" descr="A screenshot of a cell phone&#10;&#10;Description automatically generated">
+            <a:extLst>
+              <a:ext uri="{FF2B5EF4-FFF2-40B4-BE49-F238E27FC236}">
+                <a16:creationId xmlns:a16="http://schemas.microsoft.com/office/drawing/2014/main" id="{7B676291-FDF8-43BC-9483-6C479C4BFE88}"/>
+              </a:ext>
+            </a:extLst>
+          </p:cNvPr>
+          <p:cNvPicPr>
+            <a:picLocks noGrp="1" noChangeAspect="1"/>
+          </p:cNvPicPr>
           <p:nvPr>
             <p:ph idx="1"/>
           </p:nvPr>
-        </p:nvSpPr>
-        <p:spPr/>
-        <p:txBody>
-          <a:bodyPr/>
-          <a:lstStyle/>
-          <a:p>
-            <a:endParaRPr lang="en-US"/>
-          </a:p>
-        </p:txBody>
-      </p:sp>
+        </p:nvPicPr>
+        <p:blipFill>
+          <a:blip r:embed="rId2">
+            <a:extLst>
+              <a:ext uri="{28A0092B-C50C-407E-A947-70E740481C1C}">
+                <a14:useLocalDpi xmlns:a14="http://schemas.microsoft.com/office/drawing/2010/main" val="0"/>
+              </a:ext>
+            </a:extLst>
+          </a:blip>
+          <a:stretch>
+            <a:fillRect/>
+          </a:stretch>
+        </p:blipFill>
+        <p:spPr>
+          <a:xfrm>
+            <a:off x="1391432" y="1484994"/>
+            <a:ext cx="8286912" cy="5168899"/>
+          </a:xfrm>
+        </p:spPr>
+      </p:pic>
     </p:spTree>
     <p:extLst>
       <p:ext uri="{BB962C8B-B14F-4D97-AF65-F5344CB8AC3E}">
-        <p14:creationId xmlns:p14="http://schemas.microsoft.com/office/powerpoint/2010/main" val="3305066290"/>
+        <p14:creationId xmlns:p14="http://schemas.microsoft.com/office/powerpoint/2010/main" val="3374857624"/>
+      </p:ext>
+    </p:extLst>
+  </p:cSld>
+  <p:clrMapOvr>
+    <a:masterClrMapping/>
+  </p:clrMapOvr>
+</p:sld>
+</file>
+
+<file path=ppt/slides/slide24.xml><?xml version="1.0" encoding="utf-8"?>
+<p:sld xmlns:a="http://schemas.openxmlformats.org/drawingml/2006/main" xmlns:r="http://schemas.openxmlformats.org/officeDocument/2006/relationships" xmlns:p="http://schemas.openxmlformats.org/presentationml/2006/main">
+  <p:cSld>
+    <p:spTree>
+      <p:nvGrpSpPr>
+        <p:cNvPr id="1" name=""/>
+        <p:cNvGrpSpPr/>
+        <p:nvPr/>
+      </p:nvGrpSpPr>
+      <p:grpSpPr>
+        <a:xfrm>
+          <a:off x="0" y="0"/>
+          <a:ext cx="0" cy="0"/>
+          <a:chOff x="0" y="0"/>
+          <a:chExt cx="0" cy="0"/>
+        </a:xfrm>
+      </p:grpSpPr>
+      <p:sp>
+        <p:nvSpPr>
+          <p:cNvPr id="2" name="Title 1">
+            <a:extLst>
+              <a:ext uri="{FF2B5EF4-FFF2-40B4-BE49-F238E27FC236}">
+                <a16:creationId xmlns:a16="http://schemas.microsoft.com/office/drawing/2014/main" id="{5546BFA7-71F8-47C1-A2C1-99BA0D30EADD}"/>
+              </a:ext>
+            </a:extLst>
+          </p:cNvPr>
+          <p:cNvSpPr>
+            <a:spLocks noGrp="1"/>
+          </p:cNvSpPr>
+          <p:nvPr>
+            <p:ph type="title"/>
+          </p:nvPr>
+        </p:nvSpPr>
+        <p:spPr/>
+        <p:txBody>
+          <a:bodyPr/>
+          <a:lstStyle/>
+          <a:p>
+            <a:r>
+              <a:rPr lang="en-US" dirty="0"/>
+              <a:t>Statistical Distribution of Distance on Sphere</a:t>
+            </a:r>
+          </a:p>
+        </p:txBody>
+      </p:sp>
+      <p:sp>
+        <p:nvSpPr>
+          <p:cNvPr id="3" name="Content Placeholder 2">
+            <a:extLst>
+              <a:ext uri="{FF2B5EF4-FFF2-40B4-BE49-F238E27FC236}">
+                <a16:creationId xmlns:a16="http://schemas.microsoft.com/office/drawing/2014/main" id="{ECC6798E-F0D7-4BD0-B970-484D98600C2F}"/>
+              </a:ext>
+            </a:extLst>
+          </p:cNvPr>
+          <p:cNvSpPr>
+            <a:spLocks noGrp="1"/>
+          </p:cNvSpPr>
+          <p:nvPr>
+            <p:ph idx="1"/>
+          </p:nvPr>
+        </p:nvSpPr>
+        <p:spPr>
+          <a:xfrm>
+            <a:off x="838201" y="1348014"/>
+            <a:ext cx="8179254" cy="4995636"/>
+          </a:xfrm>
+        </p:spPr>
+        <p:txBody>
+          <a:bodyPr>
+            <a:normAutofit/>
+          </a:bodyPr>
+          <a:lstStyle/>
+          <a:p>
+            <a:r>
+              <a:rPr lang="en-US" dirty="0"/>
+              <a:t>What is the statistical distribution of s if we guessed directions uniformly at random?</a:t>
+            </a:r>
+          </a:p>
+          <a:p>
+            <a:endParaRPr lang="en-US" dirty="0"/>
+          </a:p>
+          <a:p>
+            <a:r>
+              <a:rPr lang="en-US" dirty="0"/>
+              <a:t>This is useful parameterization because…</a:t>
+            </a:r>
+          </a:p>
+          <a:p>
+            <a:r>
+              <a:rPr lang="en-US" dirty="0"/>
+              <a:t>“Orange Slicing Theorem” for solid angle measure:</a:t>
+            </a:r>
+          </a:p>
+          <a:p>
+            <a:endParaRPr lang="en-US" dirty="0"/>
+          </a:p>
+          <a:p>
+            <a:r>
+              <a:rPr lang="en-US" dirty="0"/>
+              <a:t>Think of Z and S as random variables:</a:t>
+            </a:r>
+          </a:p>
+          <a:p>
+            <a:endParaRPr lang="en-US" dirty="0"/>
+          </a:p>
+          <a:p>
+            <a:r>
+              <a:rPr lang="en-US" dirty="0"/>
+              <a:t>Conditional on a max (threshold) distance </a:t>
+            </a:r>
+            <a:r>
+              <a:rPr lang="el-GR" dirty="0"/>
+              <a:t>τ</a:t>
+            </a:r>
+            <a:endParaRPr lang="en-US" dirty="0"/>
+          </a:p>
+          <a:p>
+            <a:endParaRPr lang="en-US" dirty="0"/>
+          </a:p>
+        </p:txBody>
+      </p:sp>
+      <p:pic>
+        <p:nvPicPr>
+          <p:cNvPr id="7" name="Picture 6" descr="A picture containing skiing, photo, man, different&#10;&#10;Description automatically generated">
+            <a:extLst>
+              <a:ext uri="{FF2B5EF4-FFF2-40B4-BE49-F238E27FC236}">
+                <a16:creationId xmlns:a16="http://schemas.microsoft.com/office/drawing/2014/main" id="{3AFDF090-B536-4076-8A8D-F5F13CFCB099}"/>
+              </a:ext>
+            </a:extLst>
+          </p:cNvPr>
+          <p:cNvPicPr>
+            <a:picLocks noChangeAspect="1"/>
+          </p:cNvPicPr>
+          <p:nvPr/>
+        </p:nvPicPr>
+        <p:blipFill>
+          <a:blip r:embed="rId8">
+            <a:extLst>
+              <a:ext uri="{28A0092B-C50C-407E-A947-70E740481C1C}">
+                <a14:useLocalDpi xmlns:a14="http://schemas.microsoft.com/office/drawing/2010/main" val="0"/>
+              </a:ext>
+            </a:extLst>
+          </a:blip>
+          <a:stretch>
+            <a:fillRect/>
+          </a:stretch>
+        </p:blipFill>
+        <p:spPr>
+          <a:xfrm>
+            <a:off x="8944495" y="1382713"/>
+            <a:ext cx="2373828" cy="5110162"/>
+          </a:xfrm>
+          <a:prstGeom prst="rect">
+            <a:avLst/>
+          </a:prstGeom>
+        </p:spPr>
+      </p:pic>
+      <p:pic>
+        <p:nvPicPr>
+          <p:cNvPr id="9" name="Picture 8">
+            <a:extLst>
+              <a:ext uri="{FF2B5EF4-FFF2-40B4-BE49-F238E27FC236}">
+                <a16:creationId xmlns:a16="http://schemas.microsoft.com/office/drawing/2014/main" id="{DEFEC7F8-69CA-4E2F-9437-6A4D94AF4C5A}"/>
+              </a:ext>
+            </a:extLst>
+          </p:cNvPr>
+          <p:cNvPicPr>
+            <a:picLocks noChangeAspect="1"/>
+          </p:cNvPicPr>
+          <p:nvPr>
+            <p:custDataLst>
+              <p:tags r:id="rId1"/>
+            </p:custDataLst>
+          </p:nvPr>
+        </p:nvPicPr>
+        <p:blipFill>
+          <a:blip r:embed="rId9">
+            <a:extLst>
+              <a:ext uri="{28A0092B-C50C-407E-A947-70E740481C1C}">
+                <a14:useLocalDpi xmlns:a14="http://schemas.microsoft.com/office/drawing/2010/main" val="0"/>
+              </a:ext>
+            </a:extLst>
+          </a:blip>
+          <a:stretch>
+            <a:fillRect/>
+          </a:stretch>
+        </p:blipFill>
+        <p:spPr>
+          <a:xfrm>
+            <a:off x="1809297" y="2200276"/>
+            <a:ext cx="2825354" cy="505392"/>
+          </a:xfrm>
+          <a:prstGeom prst="rect">
+            <a:avLst/>
+          </a:prstGeom>
+        </p:spPr>
+      </p:pic>
+      <p:pic>
+        <p:nvPicPr>
+          <p:cNvPr id="12" name="Picture 11">
+            <a:extLst>
+              <a:ext uri="{FF2B5EF4-FFF2-40B4-BE49-F238E27FC236}">
+                <a16:creationId xmlns:a16="http://schemas.microsoft.com/office/drawing/2014/main" id="{2D3A519E-70C0-47DE-B662-97F7EE3F0D86}"/>
+              </a:ext>
+            </a:extLst>
+          </p:cNvPr>
+          <p:cNvPicPr>
+            <a:picLocks noChangeAspect="1"/>
+          </p:cNvPicPr>
+          <p:nvPr>
+            <p:custDataLst>
+              <p:tags r:id="rId2"/>
+            </p:custDataLst>
+          </p:nvPr>
+        </p:nvPicPr>
+        <p:blipFill>
+          <a:blip r:embed="rId10">
+            <a:extLst>
+              <a:ext uri="{28A0092B-C50C-407E-A947-70E740481C1C}">
+                <a14:useLocalDpi xmlns:a14="http://schemas.microsoft.com/office/drawing/2010/main" val="0"/>
+              </a:ext>
+            </a:extLst>
+          </a:blip>
+          <a:stretch>
+            <a:fillRect/>
+          </a:stretch>
+        </p:blipFill>
+        <p:spPr>
+          <a:xfrm>
+            <a:off x="5474947" y="2161796"/>
+            <a:ext cx="2753213" cy="578329"/>
+          </a:xfrm>
+          <a:prstGeom prst="rect">
+            <a:avLst/>
+          </a:prstGeom>
+        </p:spPr>
+      </p:pic>
+      <p:pic>
+        <p:nvPicPr>
+          <p:cNvPr id="15" name="Picture 14">
+            <a:extLst>
+              <a:ext uri="{FF2B5EF4-FFF2-40B4-BE49-F238E27FC236}">
+                <a16:creationId xmlns:a16="http://schemas.microsoft.com/office/drawing/2014/main" id="{86FAB9D3-9413-439D-932D-AFE1E0428C07}"/>
+              </a:ext>
+            </a:extLst>
+          </p:cNvPr>
+          <p:cNvPicPr>
+            <a:picLocks noChangeAspect="1"/>
+          </p:cNvPicPr>
+          <p:nvPr>
+            <p:custDataLst>
+              <p:tags r:id="rId3"/>
+            </p:custDataLst>
+          </p:nvPr>
+        </p:nvPicPr>
+        <p:blipFill>
+          <a:blip r:embed="rId11">
+            <a:extLst>
+              <a:ext uri="{28A0092B-C50C-407E-A947-70E740481C1C}">
+                <a14:useLocalDpi xmlns:a14="http://schemas.microsoft.com/office/drawing/2010/main" val="0"/>
+              </a:ext>
+            </a:extLst>
+          </a:blip>
+          <a:stretch>
+            <a:fillRect/>
+          </a:stretch>
+        </p:blipFill>
+        <p:spPr>
+          <a:xfrm>
+            <a:off x="2772960" y="3765539"/>
+            <a:ext cx="3366599" cy="568630"/>
+          </a:xfrm>
+          <a:prstGeom prst="rect">
+            <a:avLst/>
+          </a:prstGeom>
+        </p:spPr>
+      </p:pic>
+      <p:pic>
+        <p:nvPicPr>
+          <p:cNvPr id="18" name="Picture 17">
+            <a:extLst>
+              <a:ext uri="{FF2B5EF4-FFF2-40B4-BE49-F238E27FC236}">
+                <a16:creationId xmlns:a16="http://schemas.microsoft.com/office/drawing/2014/main" id="{95D31D6B-B999-439F-A4F0-598D71127800}"/>
+              </a:ext>
+            </a:extLst>
+          </p:cNvPr>
+          <p:cNvPicPr>
+            <a:picLocks noChangeAspect="1"/>
+          </p:cNvPicPr>
+          <p:nvPr>
+            <p:custDataLst>
+              <p:tags r:id="rId4"/>
+            </p:custDataLst>
+          </p:nvPr>
+        </p:nvPicPr>
+        <p:blipFill>
+          <a:blip r:embed="rId12">
+            <a:extLst>
+              <a:ext uri="{28A0092B-C50C-407E-A947-70E740481C1C}">
+                <a14:useLocalDpi xmlns:a14="http://schemas.microsoft.com/office/drawing/2010/main" val="0"/>
+              </a:ext>
+            </a:extLst>
+          </a:blip>
+          <a:stretch>
+            <a:fillRect/>
+          </a:stretch>
+        </p:blipFill>
+        <p:spPr>
+          <a:xfrm>
+            <a:off x="959140" y="5804959"/>
+            <a:ext cx="5384286" cy="625614"/>
+          </a:xfrm>
+          <a:prstGeom prst="rect">
+            <a:avLst/>
+          </a:prstGeom>
+        </p:spPr>
+      </p:pic>
+      <p:pic>
+        <p:nvPicPr>
+          <p:cNvPr id="24" name="Picture 23">
+            <a:extLst>
+              <a:ext uri="{FF2B5EF4-FFF2-40B4-BE49-F238E27FC236}">
+                <a16:creationId xmlns:a16="http://schemas.microsoft.com/office/drawing/2014/main" id="{1508AA19-E594-4714-954A-D17D49150399}"/>
+              </a:ext>
+            </a:extLst>
+          </p:cNvPr>
+          <p:cNvPicPr>
+            <a:picLocks noChangeAspect="1"/>
+          </p:cNvPicPr>
+          <p:nvPr>
+            <p:custDataLst>
+              <p:tags r:id="rId5"/>
+            </p:custDataLst>
+          </p:nvPr>
+        </p:nvPicPr>
+        <p:blipFill>
+          <a:blip r:embed="rId13">
+            <a:extLst>
+              <a:ext uri="{28A0092B-C50C-407E-A947-70E740481C1C}">
+                <a14:useLocalDpi xmlns:a14="http://schemas.microsoft.com/office/drawing/2010/main" val="0"/>
+              </a:ext>
+            </a:extLst>
+          </a:blip>
+          <a:stretch>
+            <a:fillRect/>
+          </a:stretch>
+        </p:blipFill>
+        <p:spPr>
+          <a:xfrm>
+            <a:off x="934339" y="4755522"/>
+            <a:ext cx="3767005" cy="549076"/>
+          </a:xfrm>
+          <a:prstGeom prst="rect">
+            <a:avLst/>
+          </a:prstGeom>
+        </p:spPr>
+      </p:pic>
+      <p:pic>
+        <p:nvPicPr>
+          <p:cNvPr id="27" name="Picture 26">
+            <a:extLst>
+              <a:ext uri="{FF2B5EF4-FFF2-40B4-BE49-F238E27FC236}">
+                <a16:creationId xmlns:a16="http://schemas.microsoft.com/office/drawing/2014/main" id="{8AE2A1BC-2EE6-4BA5-A6BE-96033ABCEE4E}"/>
+              </a:ext>
+            </a:extLst>
+          </p:cNvPr>
+          <p:cNvPicPr>
+            <a:picLocks noChangeAspect="1"/>
+          </p:cNvPicPr>
+          <p:nvPr>
+            <p:custDataLst>
+              <p:tags r:id="rId6"/>
+            </p:custDataLst>
+          </p:nvPr>
+        </p:nvPicPr>
+        <p:blipFill>
+          <a:blip r:embed="rId14">
+            <a:extLst>
+              <a:ext uri="{28A0092B-C50C-407E-A947-70E740481C1C}">
+                <a14:useLocalDpi xmlns:a14="http://schemas.microsoft.com/office/drawing/2010/main" val="0"/>
+              </a:ext>
+            </a:extLst>
+          </a:blip>
+          <a:stretch>
+            <a:fillRect/>
+          </a:stretch>
+        </p:blipFill>
+        <p:spPr>
+          <a:xfrm>
+            <a:off x="5193920" y="4717253"/>
+            <a:ext cx="3544046" cy="625613"/>
+          </a:xfrm>
+          <a:prstGeom prst="rect">
+            <a:avLst/>
+          </a:prstGeom>
+        </p:spPr>
+      </p:pic>
+    </p:spTree>
+    <p:extLst>
+      <p:ext uri="{BB962C8B-B14F-4D97-AF65-F5344CB8AC3E}">
+        <p14:creationId xmlns:p14="http://schemas.microsoft.com/office/powerpoint/2010/main" val="414236153"/>
+      </p:ext>
+    </p:extLst>
+  </p:cSld>
+  <p:clrMapOvr>
+    <a:masterClrMapping/>
+  </p:clrMapOvr>
+</p:sld>
+</file>
+
+<file path=ppt/slides/slide25.xml><?xml version="1.0" encoding="utf-8"?>
+<p:sld xmlns:a="http://schemas.openxmlformats.org/drawingml/2006/main" xmlns:r="http://schemas.openxmlformats.org/officeDocument/2006/relationships" xmlns:p="http://schemas.openxmlformats.org/presentationml/2006/main">
+  <p:cSld>
+    <p:spTree>
+      <p:nvGrpSpPr>
+        <p:cNvPr id="1" name=""/>
+        <p:cNvGrpSpPr/>
+        <p:nvPr/>
+      </p:nvGrpSpPr>
+      <p:grpSpPr>
+        <a:xfrm>
+          <a:off x="0" y="0"/>
+          <a:ext cx="0" cy="0"/>
+          <a:chOff x="0" y="0"/>
+          <a:chExt cx="0" cy="0"/>
+        </a:xfrm>
+      </p:grpSpPr>
+      <p:sp>
+        <p:nvSpPr>
+          <p:cNvPr id="2" name="Title 1">
+            <a:extLst>
+              <a:ext uri="{FF2B5EF4-FFF2-40B4-BE49-F238E27FC236}">
+                <a16:creationId xmlns:a16="http://schemas.microsoft.com/office/drawing/2014/main" id="{16D32F8E-446F-4501-873E-7B5A5A719AFD}"/>
+              </a:ext>
+            </a:extLst>
+          </p:cNvPr>
+          <p:cNvSpPr>
+            <a:spLocks noGrp="1"/>
+          </p:cNvSpPr>
+          <p:nvPr>
+            <p:ph type="title"/>
+          </p:nvPr>
+        </p:nvSpPr>
+        <p:spPr/>
+        <p:txBody>
+          <a:bodyPr/>
+          <a:lstStyle/>
+          <a:p>
+            <a:r>
+              <a:rPr lang="en-US" dirty="0"/>
+              <a:t>Distribution of Nearest Asteroid Distance</a:t>
+            </a:r>
+          </a:p>
+        </p:txBody>
+      </p:sp>
+      <p:sp>
+        <p:nvSpPr>
+          <p:cNvPr id="3" name="Content Placeholder 2">
+            <a:extLst>
+              <a:ext uri="{FF2B5EF4-FFF2-40B4-BE49-F238E27FC236}">
+                <a16:creationId xmlns:a16="http://schemas.microsoft.com/office/drawing/2014/main" id="{5533B978-6E76-42BF-8F5C-01F0ECA83F6E}"/>
+              </a:ext>
+            </a:extLst>
+          </p:cNvPr>
+          <p:cNvSpPr>
+            <a:spLocks noGrp="1"/>
+          </p:cNvSpPr>
+          <p:nvPr>
+            <p:ph idx="1"/>
+          </p:nvPr>
+        </p:nvSpPr>
+        <p:spPr>
+          <a:xfrm>
+            <a:off x="838200" y="1470477"/>
+            <a:ext cx="10515600" cy="4697641"/>
+          </a:xfrm>
+        </p:spPr>
+        <p:txBody>
+          <a:bodyPr>
+            <a:normAutofit fontScale="85000" lnSpcReduction="20000"/>
+          </a:bodyPr>
+          <a:lstStyle/>
+          <a:p>
+            <a:r>
+              <a:rPr lang="en-US" sz="2600" dirty="0"/>
+              <a:t>Set a threshold distance </a:t>
+            </a:r>
+            <a:r>
+              <a:rPr lang="el-GR" sz="2600" dirty="0"/>
+              <a:t>τ</a:t>
+            </a:r>
+            <a:r>
+              <a:rPr lang="en-US" sz="2600" dirty="0"/>
+              <a:t> and define relative distance V</a:t>
+            </a:r>
+          </a:p>
+          <a:p>
+            <a:endParaRPr lang="en-US" dirty="0"/>
+          </a:p>
+          <a:p>
+            <a:endParaRPr lang="en-US" dirty="0"/>
+          </a:p>
+          <a:p>
+            <a:r>
+              <a:rPr lang="en-US" sz="2600" dirty="0"/>
+              <a:t>We have n = 733,489 guesses and are picking closest</a:t>
+            </a:r>
+          </a:p>
+          <a:p>
+            <a:endParaRPr lang="en-US" dirty="0"/>
+          </a:p>
+          <a:p>
+            <a:endParaRPr lang="en-US" dirty="0"/>
+          </a:p>
+          <a:p>
+            <a:r>
+              <a:rPr lang="en-US" dirty="0"/>
+              <a:t>Stat 110: The minimum of n </a:t>
+            </a:r>
+            <a:r>
+              <a:rPr lang="en-US" dirty="0" err="1"/>
+              <a:t>i.i.d</a:t>
+            </a:r>
+            <a:r>
+              <a:rPr lang="en-US" dirty="0"/>
+              <a:t>. uniforms has a Beta distribution</a:t>
+            </a:r>
+          </a:p>
+          <a:p>
+            <a:endParaRPr lang="en-US" dirty="0"/>
+          </a:p>
+          <a:p>
+            <a:endParaRPr lang="en-US" dirty="0"/>
+          </a:p>
+          <a:p>
+            <a:r>
+              <a:rPr lang="en-US" dirty="0"/>
+              <a:t>How many hits at 2.0 arc seconds would we get by luck?</a:t>
+            </a:r>
+          </a:p>
+          <a:p>
+            <a:r>
+              <a:rPr lang="en-US" dirty="0"/>
+              <a:t>Only 98. But we got 3.75 million of them!</a:t>
+            </a:r>
+          </a:p>
+          <a:p>
+            <a:r>
+              <a:rPr lang="en-US" dirty="0"/>
+              <a:t>Conclusion: This whole apparatus works to a tolerance of 2.0 arc seconds</a:t>
+            </a:r>
+          </a:p>
+          <a:p>
+            <a:endParaRPr lang="en-US" dirty="0"/>
+          </a:p>
+          <a:p>
+            <a:endParaRPr lang="en-US" dirty="0"/>
+          </a:p>
+        </p:txBody>
+      </p:sp>
+      <p:pic>
+        <p:nvPicPr>
+          <p:cNvPr id="6" name="Picture 5">
+            <a:extLst>
+              <a:ext uri="{FF2B5EF4-FFF2-40B4-BE49-F238E27FC236}">
+                <a16:creationId xmlns:a16="http://schemas.microsoft.com/office/drawing/2014/main" id="{50758E5F-67CA-4971-9CFF-3F725198E718}"/>
+              </a:ext>
+            </a:extLst>
+          </p:cNvPr>
+          <p:cNvPicPr>
+            <a:picLocks noChangeAspect="1"/>
+          </p:cNvPicPr>
+          <p:nvPr>
+            <p:custDataLst>
+              <p:tags r:id="rId1"/>
+            </p:custDataLst>
+          </p:nvPr>
+        </p:nvPicPr>
+        <p:blipFill>
+          <a:blip r:embed="rId6">
+            <a:extLst>
+              <a:ext uri="{28A0092B-C50C-407E-A947-70E740481C1C}">
+                <a14:useLocalDpi xmlns:a14="http://schemas.microsoft.com/office/drawing/2010/main" val="0"/>
+              </a:ext>
+            </a:extLst>
+          </a:blip>
+          <a:stretch>
+            <a:fillRect/>
+          </a:stretch>
+        </p:blipFill>
+        <p:spPr>
+          <a:xfrm>
+            <a:off x="1938174" y="1907215"/>
+            <a:ext cx="2482787" cy="575540"/>
+          </a:xfrm>
+          <a:prstGeom prst="rect">
+            <a:avLst/>
+          </a:prstGeom>
+        </p:spPr>
+      </p:pic>
+      <p:pic>
+        <p:nvPicPr>
+          <p:cNvPr id="9" name="Picture 8">
+            <a:extLst>
+              <a:ext uri="{FF2B5EF4-FFF2-40B4-BE49-F238E27FC236}">
+                <a16:creationId xmlns:a16="http://schemas.microsoft.com/office/drawing/2014/main" id="{E4E0CAC8-80BB-4C74-9278-E0AB0EC884D3}"/>
+              </a:ext>
+            </a:extLst>
+          </p:cNvPr>
+          <p:cNvPicPr>
+            <a:picLocks noChangeAspect="1"/>
+          </p:cNvPicPr>
+          <p:nvPr>
+            <p:custDataLst>
+              <p:tags r:id="rId2"/>
+            </p:custDataLst>
+          </p:nvPr>
+        </p:nvPicPr>
+        <p:blipFill>
+          <a:blip r:embed="rId7">
+            <a:extLst>
+              <a:ext uri="{28A0092B-C50C-407E-A947-70E740481C1C}">
+                <a14:useLocalDpi xmlns:a14="http://schemas.microsoft.com/office/drawing/2010/main" val="0"/>
+              </a:ext>
+            </a:extLst>
+          </a:blip>
+          <a:stretch>
+            <a:fillRect/>
+          </a:stretch>
+        </p:blipFill>
+        <p:spPr>
+          <a:xfrm>
+            <a:off x="5389627" y="1988759"/>
+            <a:ext cx="3162462" cy="515617"/>
+          </a:xfrm>
+          <a:prstGeom prst="rect">
+            <a:avLst/>
+          </a:prstGeom>
+        </p:spPr>
+      </p:pic>
+      <p:pic>
+        <p:nvPicPr>
+          <p:cNvPr id="14" name="Picture 13">
+            <a:extLst>
+              <a:ext uri="{FF2B5EF4-FFF2-40B4-BE49-F238E27FC236}">
+                <a16:creationId xmlns:a16="http://schemas.microsoft.com/office/drawing/2014/main" id="{8AA3A57D-8E87-4831-BE16-424CB8E29300}"/>
+              </a:ext>
+            </a:extLst>
+          </p:cNvPr>
+          <p:cNvPicPr>
+            <a:picLocks noChangeAspect="1"/>
+          </p:cNvPicPr>
+          <p:nvPr>
+            <p:custDataLst>
+              <p:tags r:id="rId3"/>
+            </p:custDataLst>
+          </p:nvPr>
+        </p:nvPicPr>
+        <p:blipFill>
+          <a:blip r:embed="rId8">
+            <a:extLst>
+              <a:ext uri="{28A0092B-C50C-407E-A947-70E740481C1C}">
+                <a14:useLocalDpi xmlns:a14="http://schemas.microsoft.com/office/drawing/2010/main" val="0"/>
+              </a:ext>
+            </a:extLst>
+          </a:blip>
+          <a:stretch>
+            <a:fillRect/>
+          </a:stretch>
+        </p:blipFill>
+        <p:spPr>
+          <a:xfrm>
+            <a:off x="2680445" y="2961091"/>
+            <a:ext cx="4769466" cy="608926"/>
+          </a:xfrm>
+          <a:prstGeom prst="rect">
+            <a:avLst/>
+          </a:prstGeom>
+        </p:spPr>
+      </p:pic>
+      <p:pic>
+        <p:nvPicPr>
+          <p:cNvPr id="17" name="Picture 16">
+            <a:extLst>
+              <a:ext uri="{FF2B5EF4-FFF2-40B4-BE49-F238E27FC236}">
+                <a16:creationId xmlns:a16="http://schemas.microsoft.com/office/drawing/2014/main" id="{D09B1DFF-000B-4BF7-B824-5FBDC1D1C5C9}"/>
+              </a:ext>
+            </a:extLst>
+          </p:cNvPr>
+          <p:cNvPicPr>
+            <a:picLocks noChangeAspect="1"/>
+          </p:cNvPicPr>
+          <p:nvPr>
+            <p:custDataLst>
+              <p:tags r:id="rId4"/>
+            </p:custDataLst>
+          </p:nvPr>
+        </p:nvPicPr>
+        <p:blipFill>
+          <a:blip r:embed="rId9">
+            <a:extLst>
+              <a:ext uri="{28A0092B-C50C-407E-A947-70E740481C1C}">
+                <a14:useLocalDpi xmlns:a14="http://schemas.microsoft.com/office/drawing/2010/main" val="0"/>
+              </a:ext>
+            </a:extLst>
+          </a:blip>
+          <a:stretch>
+            <a:fillRect/>
+          </a:stretch>
+        </p:blipFill>
+        <p:spPr>
+          <a:xfrm>
+            <a:off x="3126763" y="4145712"/>
+            <a:ext cx="3898348" cy="589583"/>
+          </a:xfrm>
+          <a:prstGeom prst="rect">
+            <a:avLst/>
+          </a:prstGeom>
+        </p:spPr>
+      </p:pic>
+    </p:spTree>
+    <p:extLst>
+      <p:ext uri="{BB962C8B-B14F-4D97-AF65-F5344CB8AC3E}">
+        <p14:creationId xmlns:p14="http://schemas.microsoft.com/office/powerpoint/2010/main" val="2942119644"/>
+      </p:ext>
+    </p:extLst>
+  </p:cSld>
+  <p:clrMapOvr>
+    <a:masterClrMapping/>
+  </p:clrMapOvr>
+</p:sld>
+</file>
+
+<file path=ppt/slides/slide26.xml><?xml version="1.0" encoding="utf-8"?>
+<p:sld xmlns:a="http://schemas.openxmlformats.org/drawingml/2006/main" xmlns:r="http://schemas.openxmlformats.org/officeDocument/2006/relationships" xmlns:p="http://schemas.openxmlformats.org/presentationml/2006/main">
+  <p:cSld>
+    <p:spTree>
+      <p:nvGrpSpPr>
+        <p:cNvPr id="1" name=""/>
+        <p:cNvGrpSpPr/>
+        <p:nvPr/>
+      </p:nvGrpSpPr>
+      <p:grpSpPr>
+        <a:xfrm>
+          <a:off x="0" y="0"/>
+          <a:ext cx="0" cy="0"/>
+          <a:chOff x="0" y="0"/>
+          <a:chExt cx="0" cy="0"/>
+        </a:xfrm>
+      </p:grpSpPr>
+      <p:sp>
+        <p:nvSpPr>
+          <p:cNvPr id="2" name="Title 1">
+            <a:extLst>
+              <a:ext uri="{FF2B5EF4-FFF2-40B4-BE49-F238E27FC236}">
+                <a16:creationId xmlns:a16="http://schemas.microsoft.com/office/drawing/2014/main" id="{59ABCEF1-E4AF-4026-99FD-854515B1B3BD}"/>
+              </a:ext>
+            </a:extLst>
+          </p:cNvPr>
+          <p:cNvSpPr>
+            <a:spLocks noGrp="1"/>
+          </p:cNvSpPr>
+          <p:nvPr>
+            <p:ph type="title"/>
+          </p:nvPr>
+        </p:nvSpPr>
+        <p:spPr/>
+        <p:txBody>
+          <a:bodyPr/>
+          <a:lstStyle/>
+          <a:p>
+            <a:r>
+              <a:rPr lang="en-US" dirty="0"/>
+              <a:t>Density of Distance to Nearest Asteroid</a:t>
+            </a:r>
+          </a:p>
+        </p:txBody>
+      </p:sp>
+      <p:pic>
+        <p:nvPicPr>
+          <p:cNvPr id="5" name="Content Placeholder 4" descr="A screenshot of a cell phone&#10;&#10;Description automatically generated">
+            <a:extLst>
+              <a:ext uri="{FF2B5EF4-FFF2-40B4-BE49-F238E27FC236}">
+                <a16:creationId xmlns:a16="http://schemas.microsoft.com/office/drawing/2014/main" id="{8E11A70D-F3DF-4820-87A1-CBC08D9BF106}"/>
+              </a:ext>
+            </a:extLst>
+          </p:cNvPr>
+          <p:cNvPicPr>
+            <a:picLocks noGrp="1" noChangeAspect="1"/>
+          </p:cNvPicPr>
+          <p:nvPr>
+            <p:ph idx="1"/>
+          </p:nvPr>
+        </p:nvPicPr>
+        <p:blipFill>
+          <a:blip r:embed="rId2">
+            <a:extLst>
+              <a:ext uri="{28A0092B-C50C-407E-A947-70E740481C1C}">
+                <a14:useLocalDpi xmlns:a14="http://schemas.microsoft.com/office/drawing/2010/main" val="0"/>
+              </a:ext>
+            </a:extLst>
+          </a:blip>
+          <a:stretch>
+            <a:fillRect/>
+          </a:stretch>
+        </p:blipFill>
+        <p:spPr>
+          <a:xfrm>
+            <a:off x="838200" y="1735818"/>
+            <a:ext cx="5135389" cy="3309710"/>
+          </a:xfrm>
+        </p:spPr>
+      </p:pic>
+      <p:pic>
+        <p:nvPicPr>
+          <p:cNvPr id="7" name="Picture 6" descr="A close up of a mans face&#10;&#10;Description automatically generated">
+            <a:extLst>
+              <a:ext uri="{FF2B5EF4-FFF2-40B4-BE49-F238E27FC236}">
+                <a16:creationId xmlns:a16="http://schemas.microsoft.com/office/drawing/2014/main" id="{433D01EF-8FCA-4DE0-AA8A-D2479C336A49}"/>
+              </a:ext>
+            </a:extLst>
+          </p:cNvPr>
+          <p:cNvPicPr>
+            <a:picLocks noChangeAspect="1"/>
+          </p:cNvPicPr>
+          <p:nvPr/>
+        </p:nvPicPr>
+        <p:blipFill>
+          <a:blip r:embed="rId3">
+            <a:extLst>
+              <a:ext uri="{28A0092B-C50C-407E-A947-70E740481C1C}">
+                <a14:useLocalDpi xmlns:a14="http://schemas.microsoft.com/office/drawing/2010/main" val="0"/>
+              </a:ext>
+            </a:extLst>
+          </a:blip>
+          <a:stretch>
+            <a:fillRect/>
+          </a:stretch>
+        </p:blipFill>
+        <p:spPr>
+          <a:xfrm>
+            <a:off x="6047587" y="1774145"/>
+            <a:ext cx="5306213" cy="3309710"/>
+          </a:xfrm>
+          <a:prstGeom prst="rect">
+            <a:avLst/>
+          </a:prstGeom>
+        </p:spPr>
+      </p:pic>
+      <p:sp>
+        <p:nvSpPr>
+          <p:cNvPr id="8" name="TextBox 7">
+            <a:extLst>
+              <a:ext uri="{FF2B5EF4-FFF2-40B4-BE49-F238E27FC236}">
+                <a16:creationId xmlns:a16="http://schemas.microsoft.com/office/drawing/2014/main" id="{E3886696-581B-4CC7-BCC8-87BA3C833363}"/>
+              </a:ext>
+            </a:extLst>
+          </p:cNvPr>
+          <p:cNvSpPr txBox="1"/>
+          <p:nvPr/>
+        </p:nvSpPr>
+        <p:spPr>
+          <a:xfrm>
+            <a:off x="885825" y="5343525"/>
+            <a:ext cx="10467975" cy="1200329"/>
+          </a:xfrm>
+          <a:prstGeom prst="rect">
+            <a:avLst/>
+          </a:prstGeom>
+          <a:noFill/>
+        </p:spPr>
+        <p:txBody>
+          <a:bodyPr wrap="square" rtlCol="0">
+            <a:spAutoFit/>
+          </a:bodyPr>
+          <a:lstStyle/>
+          <a:p>
+            <a:pPr marL="285750" indent="-285750">
+              <a:buFont typeface="Arial" panose="020B0604020202020204" pitchFamily="34" charset="0"/>
+              <a:buChar char="•"/>
+            </a:pPr>
+            <a:r>
+              <a:rPr lang="en-US" dirty="0"/>
+              <a:t>Plot absolute density in hits per square degree</a:t>
+            </a:r>
+          </a:p>
+          <a:p>
+            <a:pPr marL="285750" indent="-285750">
+              <a:buFont typeface="Arial" panose="020B0604020202020204" pitchFamily="34" charset="0"/>
+              <a:buChar char="•"/>
+            </a:pPr>
+            <a:r>
+              <a:rPr lang="en-US" dirty="0"/>
+              <a:t>Plot relative density: absolute density over beta distribution PDF</a:t>
+            </a:r>
+          </a:p>
+          <a:p>
+            <a:pPr marL="285750" indent="-285750">
+              <a:buFont typeface="Arial" panose="020B0604020202020204" pitchFamily="34" charset="0"/>
+              <a:buChar char="•"/>
+            </a:pPr>
+            <a:r>
+              <a:rPr lang="en-US" dirty="0"/>
+              <a:t>Both plots on log scale</a:t>
+            </a:r>
+          </a:p>
+          <a:p>
+            <a:pPr marL="285750" indent="-285750">
+              <a:buFont typeface="Arial" panose="020B0604020202020204" pitchFamily="34" charset="0"/>
+              <a:buChar char="•"/>
+            </a:pPr>
+            <a:r>
+              <a:rPr lang="en-US" dirty="0"/>
+              <a:t>Right tail seems to have an exponential decay pattern</a:t>
+            </a:r>
+          </a:p>
+        </p:txBody>
+      </p:sp>
+    </p:spTree>
+    <p:extLst>
+      <p:ext uri="{BB962C8B-B14F-4D97-AF65-F5344CB8AC3E}">
+        <p14:creationId xmlns:p14="http://schemas.microsoft.com/office/powerpoint/2010/main" val="4013523820"/>
+      </p:ext>
+    </p:extLst>
+  </p:cSld>
+  <p:clrMapOvr>
+    <a:masterClrMapping/>
+  </p:clrMapOvr>
+</p:sld>
+</file>
+
+<file path=ppt/slides/slide27.xml><?xml version="1.0" encoding="utf-8"?>
+<p:sld xmlns:a="http://schemas.openxmlformats.org/drawingml/2006/main" xmlns:r="http://schemas.openxmlformats.org/officeDocument/2006/relationships" xmlns:p="http://schemas.openxmlformats.org/presentationml/2006/main">
+  <p:cSld>
+    <p:spTree>
+      <p:nvGrpSpPr>
+        <p:cNvPr id="1" name=""/>
+        <p:cNvGrpSpPr/>
+        <p:nvPr/>
+      </p:nvGrpSpPr>
+      <p:grpSpPr>
+        <a:xfrm>
+          <a:off x="0" y="0"/>
+          <a:ext cx="0" cy="0"/>
+          <a:chOff x="0" y="0"/>
+          <a:chExt cx="0" cy="0"/>
+        </a:xfrm>
+      </p:grpSpPr>
+      <p:sp>
+        <p:nvSpPr>
+          <p:cNvPr id="2" name="Title 1">
+            <a:extLst>
+              <a:ext uri="{FF2B5EF4-FFF2-40B4-BE49-F238E27FC236}">
+                <a16:creationId xmlns:a16="http://schemas.microsoft.com/office/drawing/2014/main" id="{A283E464-1C64-46D9-9DAA-BB9D40038F05}"/>
+              </a:ext>
+            </a:extLst>
+          </p:cNvPr>
+          <p:cNvSpPr>
+            <a:spLocks noGrp="1"/>
+          </p:cNvSpPr>
+          <p:nvPr>
+            <p:ph type="title"/>
+          </p:nvPr>
+        </p:nvSpPr>
+        <p:spPr/>
+        <p:txBody>
+          <a:bodyPr/>
+          <a:lstStyle/>
+          <a:p>
+            <a:r>
+              <a:rPr lang="en-US"/>
+              <a:t>Cumulative Distribution </a:t>
+            </a:r>
+            <a:r>
+              <a:rPr lang="en-US" dirty="0"/>
+              <a:t>of Hits per Asteroid</a:t>
+            </a:r>
+          </a:p>
+        </p:txBody>
+      </p:sp>
+      <p:pic>
+        <p:nvPicPr>
+          <p:cNvPr id="5" name="Content Placeholder 4" descr="A screenshot of a cell phone&#10;&#10;Description automatically generated">
+            <a:extLst>
+              <a:ext uri="{FF2B5EF4-FFF2-40B4-BE49-F238E27FC236}">
+                <a16:creationId xmlns:a16="http://schemas.microsoft.com/office/drawing/2014/main" id="{9C797ED8-D7F2-4DC0-876F-DA68224624C9}"/>
+              </a:ext>
+            </a:extLst>
+          </p:cNvPr>
+          <p:cNvPicPr>
+            <a:picLocks noGrp="1" noChangeAspect="1"/>
+          </p:cNvPicPr>
+          <p:nvPr>
+            <p:ph idx="1"/>
+          </p:nvPr>
+        </p:nvPicPr>
+        <p:blipFill>
+          <a:blip r:embed="rId2">
+            <a:extLst>
+              <a:ext uri="{28A0092B-C50C-407E-A947-70E740481C1C}">
+                <a14:useLocalDpi xmlns:a14="http://schemas.microsoft.com/office/drawing/2010/main" val="0"/>
+              </a:ext>
+            </a:extLst>
+          </a:blip>
+          <a:stretch>
+            <a:fillRect/>
+          </a:stretch>
+        </p:blipFill>
+        <p:spPr>
+          <a:xfrm>
+            <a:off x="983217" y="1690688"/>
+            <a:ext cx="6976177" cy="4351338"/>
+          </a:xfrm>
+        </p:spPr>
+      </p:pic>
+      <p:sp>
+        <p:nvSpPr>
+          <p:cNvPr id="6" name="TextBox 5">
+            <a:extLst>
+              <a:ext uri="{FF2B5EF4-FFF2-40B4-BE49-F238E27FC236}">
+                <a16:creationId xmlns:a16="http://schemas.microsoft.com/office/drawing/2014/main" id="{7E5804D4-C803-439C-933F-07017C8FBDA7}"/>
+              </a:ext>
+            </a:extLst>
+          </p:cNvPr>
+          <p:cNvSpPr txBox="1"/>
+          <p:nvPr/>
+        </p:nvSpPr>
+        <p:spPr>
+          <a:xfrm>
+            <a:off x="8184696" y="1877786"/>
+            <a:ext cx="3612697" cy="2031325"/>
+          </a:xfrm>
+          <a:prstGeom prst="rect">
+            <a:avLst/>
+          </a:prstGeom>
+          <a:noFill/>
+        </p:spPr>
+        <p:txBody>
+          <a:bodyPr wrap="square" rtlCol="0">
+            <a:spAutoFit/>
+          </a:bodyPr>
+          <a:lstStyle/>
+          <a:p>
+            <a:pPr marL="285750" indent="-285750">
+              <a:buFont typeface="Arial" panose="020B0604020202020204" pitchFamily="34" charset="0"/>
+              <a:buChar char="•"/>
+            </a:pPr>
+            <a:r>
+              <a:rPr lang="en-US" dirty="0"/>
+              <a:t>Count hits at 2.0 arc seconds</a:t>
+            </a:r>
+          </a:p>
+          <a:p>
+            <a:pPr marL="285750" indent="-285750">
+              <a:buFont typeface="Arial" panose="020B0604020202020204" pitchFamily="34" charset="0"/>
+              <a:buChar char="•"/>
+            </a:pPr>
+            <a:r>
+              <a:rPr lang="en-US" dirty="0"/>
+              <a:t>How many asteroids have at least</a:t>
+            </a:r>
+          </a:p>
+          <a:p>
+            <a:pPr marL="742950" lvl="1" indent="-285750">
+              <a:buFont typeface="Arial" panose="020B0604020202020204" pitchFamily="34" charset="0"/>
+              <a:buChar char="•"/>
+            </a:pPr>
+            <a:r>
+              <a:rPr lang="en-US" dirty="0"/>
+              <a:t>20 hits? 63,746</a:t>
+            </a:r>
+          </a:p>
+          <a:p>
+            <a:pPr marL="742950" lvl="1" indent="-285750">
+              <a:buFont typeface="Arial" panose="020B0604020202020204" pitchFamily="34" charset="0"/>
+              <a:buChar char="•"/>
+            </a:pPr>
+            <a:r>
+              <a:rPr lang="en-US" dirty="0"/>
+              <a:t>10 hits? 100,508</a:t>
+            </a:r>
+          </a:p>
+          <a:p>
+            <a:pPr marL="285750" indent="-285750">
+              <a:buFont typeface="Arial" panose="020B0604020202020204" pitchFamily="34" charset="0"/>
+              <a:buChar char="•"/>
+            </a:pPr>
+            <a:r>
+              <a:rPr lang="en-US" dirty="0"/>
+              <a:t>We have a sporting chance to rebuild 13.6% of the catalogue if we require 10 or more hits</a:t>
+            </a:r>
+          </a:p>
+        </p:txBody>
+      </p:sp>
+    </p:spTree>
+    <p:extLst>
+      <p:ext uri="{BB962C8B-B14F-4D97-AF65-F5344CB8AC3E}">
+        <p14:creationId xmlns:p14="http://schemas.microsoft.com/office/powerpoint/2010/main" val="1928376062"/>
+      </p:ext>
+    </p:extLst>
+  </p:cSld>
+  <p:clrMapOvr>
+    <a:masterClrMapping/>
+  </p:clrMapOvr>
+</p:sld>
+</file>
+
+<file path=ppt/slides/slide28.xml><?xml version="1.0" encoding="utf-8"?>
+<p:sld xmlns:a="http://schemas.openxmlformats.org/drawingml/2006/main" xmlns:r="http://schemas.openxmlformats.org/officeDocument/2006/relationships" xmlns:p="http://schemas.openxmlformats.org/presentationml/2006/main">
+  <p:cSld>
+    <p:spTree>
+      <p:nvGrpSpPr>
+        <p:cNvPr id="1" name=""/>
+        <p:cNvGrpSpPr/>
+        <p:nvPr/>
+      </p:nvGrpSpPr>
+      <p:grpSpPr>
+        <a:xfrm>
+          <a:off x="0" y="0"/>
+          <a:ext cx="0" cy="0"/>
+          <a:chOff x="0" y="0"/>
+          <a:chExt cx="0" cy="0"/>
+        </a:xfrm>
+      </p:grpSpPr>
+      <p:sp>
+        <p:nvSpPr>
+          <p:cNvPr id="2" name="Title 1">
+            <a:extLst>
+              <a:ext uri="{FF2B5EF4-FFF2-40B4-BE49-F238E27FC236}">
+                <a16:creationId xmlns:a16="http://schemas.microsoft.com/office/drawing/2014/main" id="{6A94D88C-A974-4E67-89D9-53DEAA96FC71}"/>
+              </a:ext>
+            </a:extLst>
+          </p:cNvPr>
+          <p:cNvSpPr>
+            <a:spLocks noGrp="1"/>
+          </p:cNvSpPr>
+          <p:nvPr>
+            <p:ph type="title"/>
+          </p:nvPr>
+        </p:nvSpPr>
+        <p:spPr/>
+        <p:txBody>
+          <a:bodyPr>
+            <a:normAutofit/>
+          </a:bodyPr>
+          <a:lstStyle/>
+          <a:p>
+            <a:r>
+              <a:rPr lang="en-US" sz="5200" dirty="0"/>
+              <a:t>Asteroid Search Using Orbital Elements</a:t>
+            </a:r>
+          </a:p>
+        </p:txBody>
+      </p:sp>
+      <p:sp>
+        <p:nvSpPr>
+          <p:cNvPr id="3" name="Text Placeholder 2">
+            <a:extLst>
+              <a:ext uri="{FF2B5EF4-FFF2-40B4-BE49-F238E27FC236}">
+                <a16:creationId xmlns:a16="http://schemas.microsoft.com/office/drawing/2014/main" id="{5C8581F0-497B-4867-9CB1-3D6A5C04EF6A}"/>
+              </a:ext>
+            </a:extLst>
+          </p:cNvPr>
+          <p:cNvSpPr>
+            <a:spLocks noGrp="1"/>
+          </p:cNvSpPr>
+          <p:nvPr>
+            <p:ph type="body" idx="1"/>
+          </p:nvPr>
+        </p:nvSpPr>
+        <p:spPr/>
+        <p:txBody>
+          <a:bodyPr/>
+          <a:lstStyle/>
+          <a:p>
+            <a:endParaRPr lang="en-US" dirty="0"/>
+          </a:p>
+        </p:txBody>
+      </p:sp>
+    </p:spTree>
+    <p:extLst>
+      <p:ext uri="{BB962C8B-B14F-4D97-AF65-F5344CB8AC3E}">
+        <p14:creationId xmlns:p14="http://schemas.microsoft.com/office/powerpoint/2010/main" val="524410934"/>
+      </p:ext>
+    </p:extLst>
+  </p:cSld>
+  <p:clrMapOvr>
+    <a:masterClrMapping/>
+  </p:clrMapOvr>
+</p:sld>
+</file>
+
+<file path=ppt/slides/slide29.xml><?xml version="1.0" encoding="utf-8"?>
+<p:sld xmlns:a="http://schemas.openxmlformats.org/drawingml/2006/main" xmlns:r="http://schemas.openxmlformats.org/officeDocument/2006/relationships" xmlns:p="http://schemas.openxmlformats.org/presentationml/2006/main">
+  <p:cSld>
+    <p:spTree>
+      <p:nvGrpSpPr>
+        <p:cNvPr id="1" name=""/>
+        <p:cNvGrpSpPr/>
+        <p:nvPr/>
+      </p:nvGrpSpPr>
+      <p:grpSpPr>
+        <a:xfrm>
+          <a:off x="0" y="0"/>
+          <a:ext cx="0" cy="0"/>
+          <a:chOff x="0" y="0"/>
+          <a:chExt cx="0" cy="0"/>
+        </a:xfrm>
+      </p:grpSpPr>
+      <p:sp>
+        <p:nvSpPr>
+          <p:cNvPr id="2" name="Title 1">
+            <a:extLst>
+              <a:ext uri="{FF2B5EF4-FFF2-40B4-BE49-F238E27FC236}">
+                <a16:creationId xmlns:a16="http://schemas.microsoft.com/office/drawing/2014/main" id="{AE0C7375-4CE6-4B17-8327-4F7F546C873A}"/>
+              </a:ext>
+            </a:extLst>
+          </p:cNvPr>
+          <p:cNvSpPr>
+            <a:spLocks noGrp="1"/>
+          </p:cNvSpPr>
+          <p:nvPr>
+            <p:ph type="title"/>
+          </p:nvPr>
+        </p:nvSpPr>
+        <p:spPr/>
+        <p:txBody>
+          <a:bodyPr/>
+          <a:lstStyle/>
+          <a:p>
+            <a:endParaRPr lang="en-US"/>
+          </a:p>
+        </p:txBody>
+      </p:sp>
+      <p:sp>
+        <p:nvSpPr>
+          <p:cNvPr id="3" name="Content Placeholder 2">
+            <a:extLst>
+              <a:ext uri="{FF2B5EF4-FFF2-40B4-BE49-F238E27FC236}">
+                <a16:creationId xmlns:a16="http://schemas.microsoft.com/office/drawing/2014/main" id="{E876F66D-B10E-47C6-B508-793B7A75D976}"/>
+              </a:ext>
+            </a:extLst>
+          </p:cNvPr>
+          <p:cNvSpPr>
+            <a:spLocks noGrp="1"/>
+          </p:cNvSpPr>
+          <p:nvPr>
+            <p:ph idx="1"/>
+          </p:nvPr>
+        </p:nvSpPr>
+        <p:spPr/>
+        <p:txBody>
+          <a:bodyPr/>
+          <a:lstStyle/>
+          <a:p>
+            <a:endParaRPr lang="en-US"/>
+          </a:p>
+        </p:txBody>
+      </p:sp>
+    </p:spTree>
+    <p:extLst>
+      <p:ext uri="{BB962C8B-B14F-4D97-AF65-F5344CB8AC3E}">
+        <p14:creationId xmlns:p14="http://schemas.microsoft.com/office/powerpoint/2010/main" val="3737257400"/>
       </p:ext>
     </p:extLst>
   </p:cSld>
@@ -6214,6 +7896,171 @@
     <p:extLst>
       <p:ext uri="{BB962C8B-B14F-4D97-AF65-F5344CB8AC3E}">
         <p14:creationId xmlns:p14="http://schemas.microsoft.com/office/powerpoint/2010/main" val="843685844"/>
+      </p:ext>
+    </p:extLst>
+  </p:cSld>
+  <p:clrMapOvr>
+    <a:masterClrMapping/>
+  </p:clrMapOvr>
+</p:sld>
+</file>
+
+<file path=ppt/slides/slide30.xml><?xml version="1.0" encoding="utf-8"?>
+<p:sld xmlns:a="http://schemas.openxmlformats.org/drawingml/2006/main" xmlns:r="http://schemas.openxmlformats.org/officeDocument/2006/relationships" xmlns:p="http://schemas.openxmlformats.org/presentationml/2006/main">
+  <p:cSld>
+    <p:spTree>
+      <p:nvGrpSpPr>
+        <p:cNvPr id="1" name=""/>
+        <p:cNvGrpSpPr/>
+        <p:nvPr/>
+      </p:nvGrpSpPr>
+      <p:grpSpPr>
+        <a:xfrm>
+          <a:off x="0" y="0"/>
+          <a:ext cx="0" cy="0"/>
+          <a:chOff x="0" y="0"/>
+          <a:chExt cx="0" cy="0"/>
+        </a:xfrm>
+      </p:grpSpPr>
+      <p:sp>
+        <p:nvSpPr>
+          <p:cNvPr id="2" name="Title 1">
+            <a:extLst>
+              <a:ext uri="{FF2B5EF4-FFF2-40B4-BE49-F238E27FC236}">
+                <a16:creationId xmlns:a16="http://schemas.microsoft.com/office/drawing/2014/main" id="{6A94D88C-A974-4E67-89D9-53DEAA96FC71}"/>
+              </a:ext>
+            </a:extLst>
+          </p:cNvPr>
+          <p:cNvSpPr>
+            <a:spLocks noGrp="1"/>
+          </p:cNvSpPr>
+          <p:nvPr>
+            <p:ph type="title"/>
+          </p:nvPr>
+        </p:nvSpPr>
+        <p:spPr/>
+        <p:txBody>
+          <a:bodyPr>
+            <a:normAutofit/>
+          </a:bodyPr>
+          <a:lstStyle/>
+          <a:p>
+            <a:r>
+              <a:rPr lang="en-US" sz="5600" dirty="0"/>
+              <a:t>Asteroid Search Results</a:t>
+            </a:r>
+          </a:p>
+        </p:txBody>
+      </p:sp>
+      <p:sp>
+        <p:nvSpPr>
+          <p:cNvPr id="3" name="Text Placeholder 2">
+            <a:extLst>
+              <a:ext uri="{FF2B5EF4-FFF2-40B4-BE49-F238E27FC236}">
+                <a16:creationId xmlns:a16="http://schemas.microsoft.com/office/drawing/2014/main" id="{5C8581F0-497B-4867-9CB1-3D6A5C04EF6A}"/>
+              </a:ext>
+            </a:extLst>
+          </p:cNvPr>
+          <p:cNvSpPr>
+            <a:spLocks noGrp="1"/>
+          </p:cNvSpPr>
+          <p:nvPr>
+            <p:ph type="body" idx="1"/>
+          </p:nvPr>
+        </p:nvSpPr>
+        <p:spPr/>
+        <p:txBody>
+          <a:bodyPr/>
+          <a:lstStyle/>
+          <a:p>
+            <a:endParaRPr lang="en-US"/>
+          </a:p>
+        </p:txBody>
+      </p:sp>
+    </p:spTree>
+    <p:extLst>
+      <p:ext uri="{BB962C8B-B14F-4D97-AF65-F5344CB8AC3E}">
+        <p14:creationId xmlns:p14="http://schemas.microsoft.com/office/powerpoint/2010/main" val="1163642287"/>
+      </p:ext>
+    </p:extLst>
+  </p:cSld>
+  <p:clrMapOvr>
+    <a:masterClrMapping/>
+  </p:clrMapOvr>
+</p:sld>
+</file>
+
+<file path=ppt/slides/slide31.xml><?xml version="1.0" encoding="utf-8"?>
+<p:sld xmlns:a="http://schemas.openxmlformats.org/drawingml/2006/main" xmlns:r="http://schemas.openxmlformats.org/officeDocument/2006/relationships" xmlns:p="http://schemas.openxmlformats.org/presentationml/2006/main">
+  <p:cSld>
+    <p:spTree>
+      <p:nvGrpSpPr>
+        <p:cNvPr id="1" name=""/>
+        <p:cNvGrpSpPr/>
+        <p:nvPr/>
+      </p:nvGrpSpPr>
+      <p:grpSpPr>
+        <a:xfrm>
+          <a:off x="0" y="0"/>
+          <a:ext cx="0" cy="0"/>
+          <a:chOff x="0" y="0"/>
+          <a:chExt cx="0" cy="0"/>
+        </a:xfrm>
+      </p:grpSpPr>
+      <p:sp>
+        <p:nvSpPr>
+          <p:cNvPr id="2" name="Title 1">
+            <a:extLst>
+              <a:ext uri="{FF2B5EF4-FFF2-40B4-BE49-F238E27FC236}">
+                <a16:creationId xmlns:a16="http://schemas.microsoft.com/office/drawing/2014/main" id="{3E26F76F-90C6-4718-820D-94CFA898DA3E}"/>
+              </a:ext>
+            </a:extLst>
+          </p:cNvPr>
+          <p:cNvSpPr>
+            <a:spLocks noGrp="1"/>
+          </p:cNvSpPr>
+          <p:nvPr>
+            <p:ph type="title"/>
+          </p:nvPr>
+        </p:nvSpPr>
+        <p:spPr/>
+        <p:txBody>
+          <a:bodyPr/>
+          <a:lstStyle/>
+          <a:p>
+            <a:endParaRPr lang="en-US"/>
+          </a:p>
+        </p:txBody>
+      </p:sp>
+      <p:sp>
+        <p:nvSpPr>
+          <p:cNvPr id="3" name="Content Placeholder 2">
+            <a:extLst>
+              <a:ext uri="{FF2B5EF4-FFF2-40B4-BE49-F238E27FC236}">
+                <a16:creationId xmlns:a16="http://schemas.microsoft.com/office/drawing/2014/main" id="{D3D1E12F-B6D1-4F78-A0C2-2F18DF210B68}"/>
+              </a:ext>
+            </a:extLst>
+          </p:cNvPr>
+          <p:cNvSpPr>
+            <a:spLocks noGrp="1"/>
+          </p:cNvSpPr>
+          <p:nvPr>
+            <p:ph idx="1"/>
+          </p:nvPr>
+        </p:nvSpPr>
+        <p:spPr/>
+        <p:txBody>
+          <a:bodyPr/>
+          <a:lstStyle/>
+          <a:p>
+            <a:endParaRPr lang="en-US"/>
+          </a:p>
+        </p:txBody>
+      </p:sp>
+    </p:spTree>
+    <p:extLst>
+      <p:ext uri="{BB962C8B-B14F-4D97-AF65-F5344CB8AC3E}">
+        <p14:creationId xmlns:p14="http://schemas.microsoft.com/office/powerpoint/2010/main" val="3305066290"/>
       </p:ext>
     </p:extLst>
   </p:cSld>
@@ -7249,6 +9096,120 @@
   <p:tag name="LATEXADDIN" val="\documentclass{article}&#10;\usepackage{amsmath}&#10;\pagestyle{empty}&#10;\begin{document}&#10;&#10;$$r(\theta) = \frac{a \cdot (1-e^2)}{1 - e \cdot \cos(\theta - \theta_0)} $$&#10;&#10;&#10;\end{document}"/>
   <p:tag name="IGUANATEXSIZE" val="20"/>
   <p:tag name="IGUANATEXCURSOR" val="104"/>
+  <p:tag name="TRANSPARENCY" val="True"/>
+  <p:tag name="FILENAME" val=""/>
+  <p:tag name="LATEXENGINEID" val="0"/>
+  <p:tag name="TEMPFOLDER" val="c:\temp\"/>
+  <p:tag name="LATEXFORMHEIGHT" val="312"/>
+  <p:tag name="LATEXFORMWIDTH" val="384"/>
+  <p:tag name="LATEXFORMWRAP" val="True"/>
+  <p:tag name="BITMAPVECTOR" val="0"/>
+</p:tagLst>
+</file>
+
+<file path=ppt/tags/tag10.xml><?xml version="1.0" encoding="utf-8"?>
+<p:tagLst xmlns:a="http://schemas.openxmlformats.org/drawingml/2006/main" xmlns:r="http://schemas.openxmlformats.org/officeDocument/2006/relationships" xmlns:p="http://schemas.openxmlformats.org/presentationml/2006/main">
+  <p:tag name="OUTPUTDPI" val="1200"/>
+  <p:tag name="ORIGINALHEIGHT" val="123.7346"/>
+  <p:tag name="ORIGINALWIDTH" val="848.8939"/>
+  <p:tag name="LATEXADDIN" val="\documentclass{article}&#10;\usepackage{amsmath}&#10;\pagestyle{empty}&#10;\begin{document}&#10;&#10;$$ Z \sim \textrm{Unif}(-1, 1) $$&#10;&#10;\end{document}"/>
+  <p:tag name="IGUANATEXSIZE" val="28"/>
+  <p:tag name="IGUANATEXCURSOR" val="114"/>
+  <p:tag name="TRANSPARENCY" val="True"/>
+  <p:tag name="FILENAME" val=""/>
+  <p:tag name="LATEXENGINEID" val="0"/>
+  <p:tag name="TEMPFOLDER" val="c:\temp\"/>
+  <p:tag name="LATEXFORMHEIGHT" val="312"/>
+  <p:tag name="LATEXFORMWIDTH" val="384"/>
+  <p:tag name="LATEXFORMWRAP" val="True"/>
+  <p:tag name="BITMAPVECTOR" val="0"/>
+</p:tagLst>
+</file>
+
+<file path=ppt/tags/tag11.xml><?xml version="1.0" encoding="utf-8"?>
+<p:tagLst xmlns:a="http://schemas.openxmlformats.org/drawingml/2006/main" xmlns:r="http://schemas.openxmlformats.org/officeDocument/2006/relationships" xmlns:p="http://schemas.openxmlformats.org/presentationml/2006/main">
+  <p:tag name="OUTPUTDPI" val="1200"/>
+  <p:tag name="ORIGINALHEIGHT" val="140.9824"/>
+  <p:tag name="ORIGINALWIDTH" val="798.6501"/>
+  <p:tag name="LATEXADDIN" val="\documentclass{article}&#10;\usepackage{amsmath}&#10;\pagestyle{empty}&#10;\begin{document}&#10;&#10;$$ S^2 \sim \textrm{Unif}(0, 4) $$&#10;&#10;\end{document}"/>
+  <p:tag name="IGUANATEXSIZE" val="28"/>
+  <p:tag name="IGUANATEXCURSOR" val="111"/>
+  <p:tag name="TRANSPARENCY" val="True"/>
+  <p:tag name="FILENAME" val=""/>
+  <p:tag name="LATEXENGINEID" val="0"/>
+  <p:tag name="TEMPFOLDER" val="c:\temp\"/>
+  <p:tag name="LATEXFORMHEIGHT" val="312"/>
+  <p:tag name="LATEXFORMWIDTH" val="384"/>
+  <p:tag name="LATEXFORMWRAP" val="True"/>
+  <p:tag name="BITMAPVECTOR" val="0"/>
+</p:tagLst>
+</file>
+
+<file path=ppt/tags/tag12.xml><?xml version="1.0" encoding="utf-8"?>
+<p:tagLst xmlns:a="http://schemas.openxmlformats.org/drawingml/2006/main" xmlns:r="http://schemas.openxmlformats.org/officeDocument/2006/relationships" xmlns:p="http://schemas.openxmlformats.org/presentationml/2006/main">
+  <p:tag name="OUTPUTDPI" val="1200"/>
+  <p:tag name="ORIGINALHEIGHT" val="140.9824"/>
+  <p:tag name="ORIGINALWIDTH" val="608.174"/>
+  <p:tag name="LATEXADDIN" val="\documentclass{article}&#10;\usepackage{amsmath}&#10;\pagestyle{empty}&#10;\begin{document}&#10;&#10;$$ V = (S/\tau)^2$$&#10;&#10;\end{document}"/>
+  <p:tag name="IGUANATEXSIZE" val="28"/>
+  <p:tag name="IGUANATEXCURSOR" val="100"/>
+  <p:tag name="TRANSPARENCY" val="True"/>
+  <p:tag name="FILENAME" val=""/>
+  <p:tag name="LATEXENGINEID" val="0"/>
+  <p:tag name="TEMPFOLDER" val="c:\temp\"/>
+  <p:tag name="LATEXFORMHEIGHT" val="312"/>
+  <p:tag name="LATEXFORMWIDTH" val="384"/>
+  <p:tag name="LATEXFORMWRAP" val="True"/>
+  <p:tag name="BITMAPVECTOR" val="0"/>
+</p:tagLst>
+</file>
+
+<file path=ppt/tags/tag13.xml><?xml version="1.0" encoding="utf-8"?>
+<p:tagLst xmlns:a="http://schemas.openxmlformats.org/drawingml/2006/main" xmlns:r="http://schemas.openxmlformats.org/officeDocument/2006/relationships" xmlns:p="http://schemas.openxmlformats.org/presentationml/2006/main">
+  <p:tag name="OUTPUTDPI" val="1200"/>
+  <p:tag name="ORIGINALHEIGHT" val="123.7346"/>
+  <p:tag name="ORIGINALWIDTH" val="758.9051"/>
+  <p:tag name="LATEXADDIN" val="\documentclass{article}&#10;\usepackage{amsmath}&#10;\pagestyle{empty}&#10;\begin{document}&#10;&#10;$$ V \sim \textrm{Unif}(0, 1)$$&#10;&#10;\end{document}"/>
+  <p:tag name="IGUANATEXSIZE" val="28"/>
+  <p:tag name="IGUANATEXCURSOR" val="110"/>
+  <p:tag name="TRANSPARENCY" val="True"/>
+  <p:tag name="FILENAME" val=""/>
+  <p:tag name="LATEXENGINEID" val="0"/>
+  <p:tag name="TEMPFOLDER" val="c:\temp\"/>
+  <p:tag name="LATEXFORMHEIGHT" val="312"/>
+  <p:tag name="LATEXFORMWIDTH" val="384"/>
+  <p:tag name="LATEXFORMWRAP" val="True"/>
+  <p:tag name="BITMAPVECTOR" val="0"/>
+</p:tagLst>
+</file>
+
+<file path=ppt/tags/tag14.xml><?xml version="1.0" encoding="utf-8"?>
+<p:tagLst xmlns:a="http://schemas.openxmlformats.org/drawingml/2006/main" xmlns:r="http://schemas.openxmlformats.org/officeDocument/2006/relationships" xmlns:p="http://schemas.openxmlformats.org/presentationml/2006/main">
+  <p:tag name="OUTPUTDPI" val="1200"/>
+  <p:tag name="ORIGINALHEIGHT" val="161.2298"/>
+  <p:tag name="ORIGINALWIDTH" val="1262.842"/>
+  <p:tag name="LATEXADDIN" val="\documentclass{article}&#10;\usepackage{amsmath}&#10;\pagestyle{empty}&#10;\begin{document}&#10;&#10;$$ V_1, \ldots V_n \overset{i.i.d.}{\sim} \textrm{Unif}(0, 1)$$&#10;&#10;\end{document}"/>
+  <p:tag name="IGUANATEXSIZE" val="28"/>
+  <p:tag name="IGUANATEXCURSOR" val="115"/>
+  <p:tag name="TRANSPARENCY" val="True"/>
+  <p:tag name="FILENAME" val=""/>
+  <p:tag name="LATEXENGINEID" val="0"/>
+  <p:tag name="TEMPFOLDER" val="c:\temp\"/>
+  <p:tag name="LATEXFORMHEIGHT" val="312"/>
+  <p:tag name="LATEXFORMWIDTH" val="384"/>
+  <p:tag name="LATEXFORMWRAP" val="True"/>
+  <p:tag name="BITMAPVECTOR" val="0"/>
+</p:tagLst>
+</file>
+
+<file path=ppt/tags/tag15.xml><?xml version="1.0" encoding="utf-8"?>
+<p:tagLst xmlns:a="http://schemas.openxmlformats.org/drawingml/2006/main" xmlns:r="http://schemas.openxmlformats.org/officeDocument/2006/relationships" xmlns:p="http://schemas.openxmlformats.org/presentationml/2006/main">
+  <p:tag name="OUTPUTDPI" val="1200"/>
+  <p:tag name="ORIGINALHEIGHT" val="137.2328"/>
+  <p:tag name="ORIGINALWIDTH" val="907.3865"/>
+  <p:tag name="LATEXADDIN" val="\documentclass{article}&#10;\usepackage{amsmath}&#10;\pagestyle{empty}&#10;\begin{document}&#10;&#10;$$ U_{(1)}\sim \textrm{Beta}(1, n)$$&#10;&#10;\end{document}"/>
+  <p:tag name="IGUANATEXSIZE" val="28"/>
+  <p:tag name="IGUANATEXCURSOR" val="114"/>
   <p:tag name="TRANSPARENCY" val="True"/>
   <p:tag name="FILENAME" val=""/>
   <p:tag name="LATEXENGINEID" val="0"/>
@@ -7312,6 +9273,101 @@
   <p:tag name="TEMPFOLDER" val="c:\temp\"/>
   <p:tag name="LATEXFORMHEIGHT" val="469.5"/>
   <p:tag name="LATEXFORMWIDTH" val="722.5"/>
+  <p:tag name="LATEXFORMWRAP" val="True"/>
+  <p:tag name="BITMAPVECTOR" val="0"/>
+</p:tagLst>
+</file>
+
+<file path=ppt/tags/tag5.xml><?xml version="1.0" encoding="utf-8"?>
+<p:tagLst xmlns:a="http://schemas.openxmlformats.org/drawingml/2006/main" xmlns:r="http://schemas.openxmlformats.org/officeDocument/2006/relationships" xmlns:p="http://schemas.openxmlformats.org/presentationml/2006/main">
+  <p:tag name="OUTPUTDPI" val="1200"/>
+  <p:tag name="ORIGINALHEIGHT" val="123.7346"/>
+  <p:tag name="ORIGINALWIDTH" val="775.4031"/>
+  <p:tag name="LATEXADDIN" val="\documentclass{article}&#10;\usepackage{amsmath}&#10;\pagestyle{empty}&#10;\begin{document}&#10;&#10;$$\sin(\theta/2) = s / 2$$&#10;&#10;&#10;\end{document}"/>
+  <p:tag name="IGUANATEXSIZE" val="20"/>
+  <p:tag name="IGUANATEXCURSOR" val="97"/>
+  <p:tag name="TRANSPARENCY" val="True"/>
+  <p:tag name="FILENAME" val=""/>
+  <p:tag name="LATEXENGINEID" val="0"/>
+  <p:tag name="TEMPFOLDER" val="c:\temp\"/>
+  <p:tag name="LATEXFORMHEIGHT" val="312"/>
+  <p:tag name="LATEXFORMWIDTH" val="384"/>
+  <p:tag name="LATEXFORMWRAP" val="True"/>
+  <p:tag name="BITMAPVECTOR" val="0"/>
+</p:tagLst>
+</file>
+
+<file path=ppt/tags/tag6.xml><?xml version="1.0" encoding="utf-8"?>
+<p:tagLst xmlns:a="http://schemas.openxmlformats.org/drawingml/2006/main" xmlns:r="http://schemas.openxmlformats.org/officeDocument/2006/relationships" xmlns:p="http://schemas.openxmlformats.org/presentationml/2006/main">
+  <p:tag name="OUTPUTDPI" val="1200"/>
+  <p:tag name="ORIGINALHEIGHT" val="140.9824"/>
+  <p:tag name="ORIGINALWIDTH" val="788.1515"/>
+  <p:tag name="LATEXADDIN" val="\documentclass{article}&#10;\usepackage{amsmath}&#10;\pagestyle{empty}&#10;\begin{document}&#10;&#10;$$s^2 = 2 \cdot (1-z)$$&#10;&#10;\end{document}"/>
+  <p:tag name="IGUANATEXSIZE" val="28"/>
+  <p:tag name="IGUANATEXCURSOR" val="105"/>
+  <p:tag name="TRANSPARENCY" val="True"/>
+  <p:tag name="FILENAME" val=""/>
+  <p:tag name="LATEXENGINEID" val="0"/>
+  <p:tag name="TEMPFOLDER" val="c:\temp\"/>
+  <p:tag name="LATEXFORMHEIGHT" val="312"/>
+  <p:tag name="LATEXFORMWIDTH" val="384"/>
+  <p:tag name="LATEXFORMWRAP" val="True"/>
+  <p:tag name="BITMAPVECTOR" val="0"/>
+</p:tagLst>
+</file>
+
+<file path=ppt/tags/tag7.xml><?xml version="1.0" encoding="utf-8"?>
+<p:tagLst xmlns:a="http://schemas.openxmlformats.org/drawingml/2006/main" xmlns:r="http://schemas.openxmlformats.org/officeDocument/2006/relationships" xmlns:p="http://schemas.openxmlformats.org/presentationml/2006/main">
+  <p:tag name="OUTPUTDPI" val="1200"/>
+  <p:tag name="ORIGINALHEIGHT" val="140.9824"/>
+  <p:tag name="ORIGINALWIDTH" val="671.1661"/>
+  <p:tag name="LATEXADDIN" val="\documentclass{article}&#10;\usepackage{amsmath}&#10;\pagestyle{empty}&#10;\begin{document}&#10;&#10;$$z = 1 - s^2 / 2$$&#10;&#10;\end{document}"/>
+  <p:tag name="IGUANATEXSIZE" val="28"/>
+  <p:tag name="IGUANATEXCURSOR" val="89"/>
+  <p:tag name="TRANSPARENCY" val="True"/>
+  <p:tag name="FILENAME" val=""/>
+  <p:tag name="LATEXENGINEID" val="0"/>
+  <p:tag name="TEMPFOLDER" val="c:\temp\"/>
+  <p:tag name="LATEXFORMHEIGHT" val="312"/>
+  <p:tag name="LATEXFORMWIDTH" val="384"/>
+  <p:tag name="LATEXFORMWRAP" val="True"/>
+  <p:tag name="BITMAPVECTOR" val="0"/>
+</p:tagLst>
+</file>
+
+<file path=ppt/tags/tag8.xml><?xml version="1.0" encoding="utf-8"?>
+<p:tagLst xmlns:a="http://schemas.openxmlformats.org/drawingml/2006/main" xmlns:r="http://schemas.openxmlformats.org/officeDocument/2006/relationships" xmlns:p="http://schemas.openxmlformats.org/presentationml/2006/main">
+  <p:tag name="OUTPUTDPI" val="1200"/>
+  <p:tag name="ORIGINALHEIGHT" val="113.2358"/>
+  <p:tag name="ORIGINALWIDTH" val="670.4162"/>
+  <p:tag name="LATEXADDIN" val="\documentclass{article}&#10;\usepackage{amsmath}&#10;\pagestyle{empty}&#10;\begin{document}&#10;&#10;$$ d\Omega = dz \cdot d\phi $$&#10;&#10;\end{document}"/>
+  <p:tag name="IGUANATEXSIZE" val="28"/>
+  <p:tag name="IGUANATEXCURSOR" val="85"/>
+  <p:tag name="TRANSPARENCY" val="True"/>
+  <p:tag name="FILENAME" val=""/>
+  <p:tag name="LATEXENGINEID" val="0"/>
+  <p:tag name="TEMPFOLDER" val="c:\temp\"/>
+  <p:tag name="LATEXFORMHEIGHT" val="312"/>
+  <p:tag name="LATEXFORMWIDTH" val="384"/>
+  <p:tag name="LATEXFORMWRAP" val="True"/>
+  <p:tag name="BITMAPVECTOR" val="0"/>
+</p:tagLst>
+</file>
+
+<file path=ppt/tags/tag9.xml><?xml version="1.0" encoding="utf-8"?>
+<p:tagLst xmlns:a="http://schemas.openxmlformats.org/drawingml/2006/main" xmlns:r="http://schemas.openxmlformats.org/officeDocument/2006/relationships" xmlns:p="http://schemas.openxmlformats.org/presentationml/2006/main">
+  <p:tag name="OUTPUTDPI" val="1200"/>
+  <p:tag name="ORIGINALHEIGHT" val="140.9824"/>
+  <p:tag name="ORIGINALWIDTH" val="1213.348"/>
+  <p:tag name="LATEXADDIN" val="\documentclass{article}&#10;\usepackage{amsmath}&#10;\pagestyle{empty}&#10;\begin{document}&#10;&#10;$$ S^2| S \le \tau \sim \textrm{Unif}(0, \tau^2) $$&#10;&#10;\end{document}"/>
+  <p:tag name="IGUANATEXSIZE" val="28"/>
+  <p:tag name="IGUANATEXCURSOR" val="128"/>
+  <p:tag name="TRANSPARENCY" val="True"/>
+  <p:tag name="FILENAME" val=""/>
+  <p:tag name="LATEXENGINEID" val="0"/>
+  <p:tag name="TEMPFOLDER" val="c:\temp\"/>
+  <p:tag name="LATEXFORMHEIGHT" val="312"/>
+  <p:tag name="LATEXFORMWIDTH" val="384"/>
   <p:tag name="LATEXFORMWRAP" val="True"/>
   <p:tag name="BITMAPVECTOR" val="0"/>
 </p:tagLst>

</xml_diff>

<commit_message>
thesis presentation / chapter 5 in progress
</commit_message>
<xml_diff>
--- a/thesis/kepler-sieve-slides.pptx
+++ b/thesis/kepler-sieve-slides.pptx
@@ -34,8 +34,22 @@
     <p:sldId id="288" r:id="rId28"/>
     <p:sldId id="262" r:id="rId29"/>
     <p:sldId id="268" r:id="rId30"/>
-    <p:sldId id="260" r:id="rId31"/>
-    <p:sldId id="257" r:id="rId32"/>
+    <p:sldId id="289" r:id="rId31"/>
+    <p:sldId id="290" r:id="rId32"/>
+    <p:sldId id="291" r:id="rId33"/>
+    <p:sldId id="292" r:id="rId34"/>
+    <p:sldId id="293" r:id="rId35"/>
+    <p:sldId id="294" r:id="rId36"/>
+    <p:sldId id="260" r:id="rId37"/>
+    <p:sldId id="257" r:id="rId38"/>
+    <p:sldId id="295" r:id="rId39"/>
+    <p:sldId id="296" r:id="rId40"/>
+    <p:sldId id="297" r:id="rId41"/>
+    <p:sldId id="298" r:id="rId42"/>
+    <p:sldId id="299" r:id="rId43"/>
+    <p:sldId id="301" r:id="rId44"/>
+    <p:sldId id="300" r:id="rId45"/>
+    <p:sldId id="302" r:id="rId46"/>
   </p:sldIdLst>
   <p:sldSz cx="12192000" cy="6858000"/>
   <p:notesSz cx="6858000" cy="9144000"/>
@@ -7520,12 +7534,8 @@
           <a:lstStyle/>
           <a:p>
             <a:r>
-              <a:rPr lang="en-US"/>
-              <a:t>Cumulative Distribution </a:t>
-            </a:r>
-            <a:r>
-              <a:rPr lang="en-US" dirty="0"/>
-              <a:t>of Hits per Asteroid</a:t>
+              <a:rPr lang="en-US" dirty="0"/>
+              <a:t>Cumulative Distribution of Hits per Asteroid</a:t>
             </a:r>
           </a:p>
         </p:txBody>
@@ -7780,35 +7790,326 @@
           <a:bodyPr/>
           <a:lstStyle/>
           <a:p>
-            <a:endParaRPr lang="en-US"/>
-          </a:p>
-        </p:txBody>
-      </p:sp>
-      <p:sp>
-        <p:nvSpPr>
-          <p:cNvPr id="3" name="Content Placeholder 2">
-            <a:extLst>
-              <a:ext uri="{FF2B5EF4-FFF2-40B4-BE49-F238E27FC236}">
-                <a16:creationId xmlns:a16="http://schemas.microsoft.com/office/drawing/2014/main" id="{E876F66D-B10E-47C6-B508-793B7A75D976}"/>
-              </a:ext>
-            </a:extLst>
-          </p:cNvPr>
-          <p:cNvSpPr>
-            <a:spLocks noGrp="1"/>
-          </p:cNvSpPr>
+            <a:r>
+              <a:rPr lang="en-US" dirty="0"/>
+              <a:t>Random Sampling of Candidate Elements</a:t>
+            </a:r>
+          </a:p>
+        </p:txBody>
+      </p:sp>
+      <p:pic>
+        <p:nvPicPr>
+          <p:cNvPr id="5" name="Content Placeholder 4">
+            <a:extLst>
+              <a:ext uri="{FF2B5EF4-FFF2-40B4-BE49-F238E27FC236}">
+                <a16:creationId xmlns:a16="http://schemas.microsoft.com/office/drawing/2014/main" id="{C7F91E89-5AF6-4227-8C36-3D3C916737E0}"/>
+              </a:ext>
+            </a:extLst>
+          </p:cNvPr>
+          <p:cNvPicPr>
+            <a:picLocks noGrp="1" noChangeAspect="1"/>
+          </p:cNvPicPr>
           <p:nvPr>
             <p:ph idx="1"/>
           </p:nvPr>
-        </p:nvSpPr>
-        <p:spPr/>
-        <p:txBody>
-          <a:bodyPr/>
+        </p:nvPicPr>
+        <p:blipFill>
+          <a:blip r:embed="rId2">
+            <a:extLst>
+              <a:ext uri="{28A0092B-C50C-407E-A947-70E740481C1C}">
+                <a14:useLocalDpi xmlns:a14="http://schemas.microsoft.com/office/drawing/2010/main" val="0"/>
+              </a:ext>
+            </a:extLst>
+          </a:blip>
+          <a:stretch>
+            <a:fillRect/>
+          </a:stretch>
+        </p:blipFill>
+        <p:spPr>
+          <a:xfrm>
+            <a:off x="707573" y="1470479"/>
+            <a:ext cx="3246513" cy="2105479"/>
+          </a:xfrm>
+        </p:spPr>
+      </p:pic>
+      <p:pic>
+        <p:nvPicPr>
+          <p:cNvPr id="7" name="Picture 6" descr="A close up of a map&#10;&#10;Description automatically generated">
+            <a:extLst>
+              <a:ext uri="{FF2B5EF4-FFF2-40B4-BE49-F238E27FC236}">
+                <a16:creationId xmlns:a16="http://schemas.microsoft.com/office/drawing/2014/main" id="{EC7B4A4D-7922-4131-BF03-C741288C5067}"/>
+              </a:ext>
+            </a:extLst>
+          </p:cNvPr>
+          <p:cNvPicPr>
+            <a:picLocks noChangeAspect="1"/>
+          </p:cNvPicPr>
+          <p:nvPr/>
+        </p:nvPicPr>
+        <p:blipFill>
+          <a:blip r:embed="rId3">
+            <a:extLst>
+              <a:ext uri="{28A0092B-C50C-407E-A947-70E740481C1C}">
+                <a14:useLocalDpi xmlns:a14="http://schemas.microsoft.com/office/drawing/2010/main" val="0"/>
+              </a:ext>
+            </a:extLst>
+          </a:blip>
+          <a:stretch>
+            <a:fillRect/>
+          </a:stretch>
+        </p:blipFill>
+        <p:spPr>
+          <a:xfrm>
+            <a:off x="508733" y="3589339"/>
+            <a:ext cx="3452145" cy="2183946"/>
+          </a:xfrm>
+          <a:prstGeom prst="rect">
+            <a:avLst/>
+          </a:prstGeom>
+        </p:spPr>
+      </p:pic>
+      <p:pic>
+        <p:nvPicPr>
+          <p:cNvPr id="9" name="Picture 8" descr="A picture containing sitting&#10;&#10;Description automatically generated">
+            <a:extLst>
+              <a:ext uri="{FF2B5EF4-FFF2-40B4-BE49-F238E27FC236}">
+                <a16:creationId xmlns:a16="http://schemas.microsoft.com/office/drawing/2014/main" id="{F9774F62-4EFD-4952-8E67-18446C9F6C47}"/>
+              </a:ext>
+            </a:extLst>
+          </p:cNvPr>
+          <p:cNvPicPr>
+            <a:picLocks noChangeAspect="1"/>
+          </p:cNvPicPr>
+          <p:nvPr/>
+        </p:nvPicPr>
+        <p:blipFill>
+          <a:blip r:embed="rId4">
+            <a:extLst>
+              <a:ext uri="{28A0092B-C50C-407E-A947-70E740481C1C}">
+                <a14:useLocalDpi xmlns:a14="http://schemas.microsoft.com/office/drawing/2010/main" val="0"/>
+              </a:ext>
+            </a:extLst>
+          </a:blip>
+          <a:stretch>
+            <a:fillRect/>
+          </a:stretch>
+        </p:blipFill>
+        <p:spPr>
+          <a:xfrm>
+            <a:off x="4049926" y="1470478"/>
+            <a:ext cx="3246513" cy="2105479"/>
+          </a:xfrm>
+          <a:prstGeom prst="rect">
+            <a:avLst/>
+          </a:prstGeom>
+        </p:spPr>
+      </p:pic>
+      <p:pic>
+        <p:nvPicPr>
+          <p:cNvPr id="11" name="Picture 10" descr="A close up of a map&#10;&#10;Description automatically generated">
+            <a:extLst>
+              <a:ext uri="{FF2B5EF4-FFF2-40B4-BE49-F238E27FC236}">
+                <a16:creationId xmlns:a16="http://schemas.microsoft.com/office/drawing/2014/main" id="{EF75AE7E-D624-4963-99DB-523CFD306A37}"/>
+              </a:ext>
+            </a:extLst>
+          </p:cNvPr>
+          <p:cNvPicPr>
+            <a:picLocks noChangeAspect="1"/>
+          </p:cNvPicPr>
+          <p:nvPr/>
+        </p:nvPicPr>
+        <p:blipFill>
+          <a:blip r:embed="rId5">
+            <a:extLst>
+              <a:ext uri="{28A0092B-C50C-407E-A947-70E740481C1C}">
+                <a14:useLocalDpi xmlns:a14="http://schemas.microsoft.com/office/drawing/2010/main" val="0"/>
+              </a:ext>
+            </a:extLst>
+          </a:blip>
+          <a:stretch>
+            <a:fillRect/>
+          </a:stretch>
+        </p:blipFill>
+        <p:spPr>
+          <a:xfrm>
+            <a:off x="4049925" y="3575957"/>
+            <a:ext cx="3246513" cy="2183946"/>
+          </a:xfrm>
+          <a:prstGeom prst="rect">
+            <a:avLst/>
+          </a:prstGeom>
+        </p:spPr>
+      </p:pic>
+      <p:pic>
+        <p:nvPicPr>
+          <p:cNvPr id="13" name="Picture 12" descr="A close up of a logo&#10;&#10;Description automatically generated">
+            <a:extLst>
+              <a:ext uri="{FF2B5EF4-FFF2-40B4-BE49-F238E27FC236}">
+                <a16:creationId xmlns:a16="http://schemas.microsoft.com/office/drawing/2014/main" id="{6FE4DAD0-11C1-4152-B20D-1A405FDCE5EC}"/>
+              </a:ext>
+            </a:extLst>
+          </p:cNvPr>
+          <p:cNvPicPr>
+            <a:picLocks noChangeAspect="1"/>
+          </p:cNvPicPr>
+          <p:nvPr/>
+        </p:nvPicPr>
+        <p:blipFill>
+          <a:blip r:embed="rId6">
+            <a:extLst>
+              <a:ext uri="{28A0092B-C50C-407E-A947-70E740481C1C}">
+                <a14:useLocalDpi xmlns:a14="http://schemas.microsoft.com/office/drawing/2010/main" val="0"/>
+              </a:ext>
+            </a:extLst>
+          </a:blip>
+          <a:stretch>
+            <a:fillRect/>
+          </a:stretch>
+        </p:blipFill>
+        <p:spPr>
+          <a:xfrm>
+            <a:off x="7495348" y="1470478"/>
+            <a:ext cx="3261493" cy="2183946"/>
+          </a:xfrm>
+          <a:prstGeom prst="rect">
+            <a:avLst/>
+          </a:prstGeom>
+        </p:spPr>
+      </p:pic>
+      <p:sp>
+        <p:nvSpPr>
+          <p:cNvPr id="16" name="TextBox 15">
+            <a:extLst>
+              <a:ext uri="{FF2B5EF4-FFF2-40B4-BE49-F238E27FC236}">
+                <a16:creationId xmlns:a16="http://schemas.microsoft.com/office/drawing/2014/main" id="{3ADF690D-B390-4ECA-9E9F-FA50D6B5DA2C}"/>
+              </a:ext>
+            </a:extLst>
+          </p:cNvPr>
+          <p:cNvSpPr txBox="1"/>
+          <p:nvPr/>
+        </p:nvSpPr>
+        <p:spPr>
+          <a:xfrm>
+            <a:off x="759279" y="5890532"/>
+            <a:ext cx="9997562" cy="1200329"/>
+          </a:xfrm>
+          <a:prstGeom prst="rect">
+            <a:avLst/>
+          </a:prstGeom>
+          <a:noFill/>
+        </p:spPr>
+        <p:txBody>
+          <a:bodyPr wrap="square" rtlCol="0">
+            <a:spAutoFit/>
+          </a:bodyPr>
           <a:lstStyle/>
           <a:p>
-            <a:endParaRPr lang="en-US"/>
-          </a:p>
-        </p:txBody>
-      </p:sp>
+            <a:pPr marL="285750" indent="-285750">
+              <a:buFont typeface="Arial" panose="020B0604020202020204" pitchFamily="34" charset="0"/>
+              <a:buChar char="•"/>
+            </a:pPr>
+            <a:r>
+              <a:rPr lang="en-US" dirty="0"/>
+              <a:t>Four elements sampled empirically: a, e, </a:t>
+            </a:r>
+            <a:r>
+              <a:rPr lang="en-US" dirty="0" err="1"/>
+              <a:t>i</a:t>
+            </a:r>
+            <a:r>
+              <a:rPr lang="en-US" dirty="0"/>
+              <a:t>, </a:t>
+            </a:r>
+            <a:r>
+              <a:rPr lang="el-GR" dirty="0">
+                <a:latin typeface="Times New Roman" panose="02020603050405020304" pitchFamily="18" charset="0"/>
+                <a:cs typeface="Times New Roman" panose="02020603050405020304" pitchFamily="18" charset="0"/>
+              </a:rPr>
+              <a:t>Ω</a:t>
+            </a:r>
+            <a:endParaRPr lang="en-US" dirty="0">
+              <a:latin typeface="Times New Roman" panose="02020603050405020304" pitchFamily="18" charset="0"/>
+              <a:cs typeface="Times New Roman" panose="02020603050405020304" pitchFamily="18" charset="0"/>
+            </a:endParaRPr>
+          </a:p>
+          <a:p>
+            <a:pPr marL="742950" lvl="1" indent="-285750">
+              <a:buFont typeface="Arial" panose="020B0604020202020204" pitchFamily="34" charset="0"/>
+              <a:buChar char="•"/>
+            </a:pPr>
+            <a:r>
+              <a:rPr lang="en-US" dirty="0">
+                <a:latin typeface="Times New Roman" panose="02020603050405020304" pitchFamily="18" charset="0"/>
+                <a:cs typeface="Times New Roman" panose="02020603050405020304" pitchFamily="18" charset="0"/>
+              </a:rPr>
+              <a:t>Randomly choose an index from 1 to 733,489 and take element of that asteroid</a:t>
+            </a:r>
+          </a:p>
+          <a:p>
+            <a:pPr marL="285750" indent="-285750">
+              <a:buFont typeface="Arial" panose="020B0604020202020204" pitchFamily="34" charset="0"/>
+              <a:buChar char="•"/>
+            </a:pPr>
+            <a:r>
+              <a:rPr lang="en-US" dirty="0">
+                <a:latin typeface="Times New Roman" panose="02020603050405020304" pitchFamily="18" charset="0"/>
+                <a:cs typeface="Times New Roman" panose="02020603050405020304" pitchFamily="18" charset="0"/>
+              </a:rPr>
+              <a:t>Two elements sampled uniformly at random: ω, M</a:t>
+            </a:r>
+          </a:p>
+          <a:p>
+            <a:pPr marL="742950" lvl="1" indent="-285750">
+              <a:buFont typeface="Arial" panose="020B0604020202020204" pitchFamily="34" charset="0"/>
+              <a:buChar char="•"/>
+            </a:pPr>
+            <a:r>
+              <a:rPr lang="en-US" dirty="0">
+                <a:latin typeface="Times New Roman" panose="02020603050405020304" pitchFamily="18" charset="0"/>
+                <a:cs typeface="Times New Roman" panose="02020603050405020304" pitchFamily="18" charset="0"/>
+              </a:rPr>
+              <a:t>Convert mean anomaly M to true anomaly f in REBOUND</a:t>
+            </a:r>
+            <a:endParaRPr lang="en-US" dirty="0"/>
+          </a:p>
+        </p:txBody>
+      </p:sp>
+      <p:pic>
+        <p:nvPicPr>
+          <p:cNvPr id="18" name="Picture 17" descr="A close up of a logo&#10;&#10;Description automatically generated">
+            <a:extLst>
+              <a:ext uri="{FF2B5EF4-FFF2-40B4-BE49-F238E27FC236}">
+                <a16:creationId xmlns:a16="http://schemas.microsoft.com/office/drawing/2014/main" id="{CC2C31E8-CEA6-4305-B98F-9DC960FEBFE8}"/>
+              </a:ext>
+            </a:extLst>
+          </p:cNvPr>
+          <p:cNvPicPr>
+            <a:picLocks noChangeAspect="1"/>
+          </p:cNvPicPr>
+          <p:nvPr/>
+        </p:nvPicPr>
+        <p:blipFill>
+          <a:blip r:embed="rId7">
+            <a:extLst>
+              <a:ext uri="{28A0092B-C50C-407E-A947-70E740481C1C}">
+                <a14:useLocalDpi xmlns:a14="http://schemas.microsoft.com/office/drawing/2010/main" val="0"/>
+              </a:ext>
+            </a:extLst>
+          </a:blip>
+          <a:stretch>
+            <a:fillRect/>
+          </a:stretch>
+        </p:blipFill>
+        <p:spPr>
+          <a:xfrm>
+            <a:off x="7445829" y="3558155"/>
+            <a:ext cx="3332638" cy="2144599"/>
+          </a:xfrm>
+          <a:prstGeom prst="rect">
+            <a:avLst/>
+          </a:prstGeom>
+        </p:spPr>
+      </p:pic>
     </p:spTree>
     <p:extLst>
       <p:ext uri="{BB962C8B-B14F-4D97-AF65-F5344CB8AC3E}">
@@ -7927,7 +8228,7 @@
           <p:cNvPr id="2" name="Title 1">
             <a:extLst>
               <a:ext uri="{FF2B5EF4-FFF2-40B4-BE49-F238E27FC236}">
-                <a16:creationId xmlns:a16="http://schemas.microsoft.com/office/drawing/2014/main" id="{6A94D88C-A974-4E67-89D9-53DEAA96FC71}"/>
+                <a16:creationId xmlns:a16="http://schemas.microsoft.com/office/drawing/2014/main" id="{D21FF410-BBC3-4296-B668-E819DFC54A6A}"/>
               </a:ext>
             </a:extLst>
           </p:cNvPr>
@@ -7940,47 +8241,104 @@
         </p:nvSpPr>
         <p:spPr/>
         <p:txBody>
-          <a:bodyPr>
-            <a:normAutofit/>
+          <a:bodyPr/>
+          <a:lstStyle/>
+          <a:p>
+            <a:r>
+              <a:rPr lang="en-US" dirty="0"/>
+              <a:t>Assemble ZTF Detections Near Elements</a:t>
+            </a:r>
+          </a:p>
+        </p:txBody>
+      </p:sp>
+      <p:pic>
+        <p:nvPicPr>
+          <p:cNvPr id="5" name="Content Placeholder 4" descr="A screenshot of a social media post&#10;&#10;Description automatically generated">
+            <a:extLst>
+              <a:ext uri="{FF2B5EF4-FFF2-40B4-BE49-F238E27FC236}">
+                <a16:creationId xmlns:a16="http://schemas.microsoft.com/office/drawing/2014/main" id="{D5C4B8AE-4F43-4AC6-82CF-3EC682777323}"/>
+              </a:ext>
+            </a:extLst>
+          </p:cNvPr>
+          <p:cNvPicPr>
+            <a:picLocks noGrp="1" noChangeAspect="1"/>
+          </p:cNvPicPr>
+          <p:nvPr>
+            <p:ph idx="1"/>
+          </p:nvPr>
+        </p:nvPicPr>
+        <p:blipFill>
+          <a:blip r:embed="rId2">
+            <a:extLst>
+              <a:ext uri="{28A0092B-C50C-407E-A947-70E740481C1C}">
+                <a14:useLocalDpi xmlns:a14="http://schemas.microsoft.com/office/drawing/2010/main" val="0"/>
+              </a:ext>
+            </a:extLst>
+          </a:blip>
+          <a:stretch>
+            <a:fillRect/>
+          </a:stretch>
+        </p:blipFill>
+        <p:spPr>
+          <a:xfrm>
+            <a:off x="838200" y="1327603"/>
+            <a:ext cx="9312567" cy="4351338"/>
+          </a:xfrm>
+        </p:spPr>
+      </p:pic>
+      <p:sp>
+        <p:nvSpPr>
+          <p:cNvPr id="6" name="TextBox 5">
+            <a:extLst>
+              <a:ext uri="{FF2B5EF4-FFF2-40B4-BE49-F238E27FC236}">
+                <a16:creationId xmlns:a16="http://schemas.microsoft.com/office/drawing/2014/main" id="{B380BBAD-D7EF-4B98-91EB-01A6307F043D}"/>
+              </a:ext>
+            </a:extLst>
+          </p:cNvPr>
+          <p:cNvSpPr txBox="1"/>
+          <p:nvPr/>
+        </p:nvSpPr>
+        <p:spPr>
+          <a:xfrm>
+            <a:off x="889907" y="5719082"/>
+            <a:ext cx="9260860" cy="646331"/>
+          </a:xfrm>
+          <a:prstGeom prst="rect">
+            <a:avLst/>
+          </a:prstGeom>
+          <a:noFill/>
+        </p:spPr>
+        <p:txBody>
+          <a:bodyPr wrap="square" rtlCol="0">
+            <a:spAutoFit/>
           </a:bodyPr>
           <a:lstStyle/>
           <a:p>
-            <a:r>
-              <a:rPr lang="en-US" sz="5600" dirty="0"/>
-              <a:t>Asteroid Search Results</a:t>
-            </a:r>
-          </a:p>
-        </p:txBody>
-      </p:sp>
-      <p:sp>
-        <p:nvSpPr>
-          <p:cNvPr id="3" name="Text Placeholder 2">
-            <a:extLst>
-              <a:ext uri="{FF2B5EF4-FFF2-40B4-BE49-F238E27FC236}">
-                <a16:creationId xmlns:a16="http://schemas.microsoft.com/office/drawing/2014/main" id="{5C8581F0-497B-4867-9CB1-3D6A5C04EF6A}"/>
-              </a:ext>
-            </a:extLst>
-          </p:cNvPr>
-          <p:cNvSpPr>
-            <a:spLocks noGrp="1"/>
-          </p:cNvSpPr>
-          <p:nvPr>
-            <p:ph type="body" idx="1"/>
-          </p:nvPr>
-        </p:nvSpPr>
-        <p:spPr/>
-        <p:txBody>
-          <a:bodyPr/>
-          <a:lstStyle/>
-          <a:p>
-            <a:endParaRPr lang="en-US"/>
+            <a:pPr marL="285750" indent="-285750">
+              <a:buFont typeface="Arial" panose="020B0604020202020204" pitchFamily="34" charset="0"/>
+              <a:buChar char="•"/>
+            </a:pPr>
+            <a:r>
+              <a:rPr lang="en-US" dirty="0"/>
+              <a:t>Integrate the candidate elements on the fly in REBOUND and compute directions</a:t>
+            </a:r>
+          </a:p>
+          <a:p>
+            <a:pPr marL="285750" indent="-285750">
+              <a:buFont typeface="Arial" panose="020B0604020202020204" pitchFamily="34" charset="0"/>
+              <a:buChar char="•"/>
+            </a:pPr>
+            <a:r>
+              <a:rPr lang="en-US" dirty="0"/>
+              <a:t>Filter the ZTF detections to those within threshold of the elements</a:t>
+            </a:r>
           </a:p>
         </p:txBody>
       </p:sp>
     </p:spTree>
     <p:extLst>
       <p:ext uri="{BB962C8B-B14F-4D97-AF65-F5344CB8AC3E}">
-        <p14:creationId xmlns:p14="http://schemas.microsoft.com/office/powerpoint/2010/main" val="1163642287"/>
+        <p14:creationId xmlns:p14="http://schemas.microsoft.com/office/powerpoint/2010/main" val="3836470543"/>
       </p:ext>
     </p:extLst>
   </p:cSld>
@@ -8012,7 +8370,7 @@
           <p:cNvPr id="2" name="Title 1">
             <a:extLst>
               <a:ext uri="{FF2B5EF4-FFF2-40B4-BE49-F238E27FC236}">
-                <a16:creationId xmlns:a16="http://schemas.microsoft.com/office/drawing/2014/main" id="{3E26F76F-90C6-4718-820D-94CFA898DA3E}"/>
+                <a16:creationId xmlns:a16="http://schemas.microsoft.com/office/drawing/2014/main" id="{AC9B5073-898A-42D8-A2D1-BD79FEA6815F}"/>
               </a:ext>
             </a:extLst>
           </p:cNvPr>
@@ -8025,19 +8383,249 @@
         </p:nvSpPr>
         <p:spPr/>
         <p:txBody>
-          <a:bodyPr/>
+          <a:bodyPr>
+            <a:normAutofit/>
+          </a:bodyPr>
           <a:lstStyle/>
           <a:p>
-            <a:endParaRPr lang="en-US"/>
-          </a:p>
-        </p:txBody>
-      </p:sp>
-      <p:sp>
-        <p:nvSpPr>
-          <p:cNvPr id="3" name="Content Placeholder 2">
-            <a:extLst>
-              <a:ext uri="{FF2B5EF4-FFF2-40B4-BE49-F238E27FC236}">
-                <a16:creationId xmlns:a16="http://schemas.microsoft.com/office/drawing/2014/main" id="{D3D1E12F-B6D1-4F78-A0C2-2F18DF210B68}"/>
+            <a:r>
+              <a:rPr lang="en-US" sz="4200" dirty="0"/>
+              <a:t>Distribution of V = (S/τ)</a:t>
+            </a:r>
+            <a:r>
+              <a:rPr lang="en-US" sz="4200" baseline="30000" dirty="0"/>
+              <a:t>2</a:t>
+            </a:r>
+            <a:r>
+              <a:rPr lang="en-US" sz="4200" dirty="0"/>
+              <a:t>  for 3 Element Batches</a:t>
+            </a:r>
+            <a:endParaRPr lang="en-US" sz="4200" baseline="30000" dirty="0"/>
+          </a:p>
+        </p:txBody>
+      </p:sp>
+      <p:pic>
+        <p:nvPicPr>
+          <p:cNvPr id="5" name="Content Placeholder 4" descr="A picture containing sitting, white, large&#10;&#10;Description automatically generated">
+            <a:extLst>
+              <a:ext uri="{FF2B5EF4-FFF2-40B4-BE49-F238E27FC236}">
+                <a16:creationId xmlns:a16="http://schemas.microsoft.com/office/drawing/2014/main" id="{09D44456-BBE8-413C-97AA-EF22131DEB5B}"/>
+              </a:ext>
+            </a:extLst>
+          </p:cNvPr>
+          <p:cNvPicPr>
+            <a:picLocks noGrp="1" noChangeAspect="1"/>
+          </p:cNvPicPr>
+          <p:nvPr>
+            <p:ph idx="1"/>
+          </p:nvPr>
+        </p:nvPicPr>
+        <p:blipFill>
+          <a:blip r:embed="rId2">
+            <a:extLst>
+              <a:ext uri="{28A0092B-C50C-407E-A947-70E740481C1C}">
+                <a14:useLocalDpi xmlns:a14="http://schemas.microsoft.com/office/drawing/2010/main" val="0"/>
+              </a:ext>
+            </a:extLst>
+          </a:blip>
+          <a:stretch>
+            <a:fillRect/>
+          </a:stretch>
+        </p:blipFill>
+        <p:spPr>
+          <a:xfrm>
+            <a:off x="6811656" y="1416504"/>
+            <a:ext cx="4274083" cy="2743200"/>
+          </a:xfrm>
+        </p:spPr>
+      </p:pic>
+      <p:pic>
+        <p:nvPicPr>
+          <p:cNvPr id="7" name="Picture 6" descr="A screenshot of a cell phone&#10;&#10;Description automatically generated">
+            <a:extLst>
+              <a:ext uri="{FF2B5EF4-FFF2-40B4-BE49-F238E27FC236}">
+                <a16:creationId xmlns:a16="http://schemas.microsoft.com/office/drawing/2014/main" id="{705F24EB-CD8C-4493-AFAC-CB4DB2ADF1E4}"/>
+              </a:ext>
+            </a:extLst>
+          </p:cNvPr>
+          <p:cNvPicPr>
+            <a:picLocks noChangeAspect="1"/>
+          </p:cNvPicPr>
+          <p:nvPr/>
+        </p:nvPicPr>
+        <p:blipFill>
+          <a:blip r:embed="rId3">
+            <a:extLst>
+              <a:ext uri="{28A0092B-C50C-407E-A947-70E740481C1C}">
+                <a14:useLocalDpi xmlns:a14="http://schemas.microsoft.com/office/drawing/2010/main" val="0"/>
+              </a:ext>
+            </a:extLst>
+          </a:blip>
+          <a:stretch>
+            <a:fillRect/>
+          </a:stretch>
+        </p:blipFill>
+        <p:spPr>
+          <a:xfrm>
+            <a:off x="379639" y="1325562"/>
+            <a:ext cx="6226913" cy="4038374"/>
+          </a:xfrm>
+          <a:prstGeom prst="rect">
+            <a:avLst/>
+          </a:prstGeom>
+        </p:spPr>
+      </p:pic>
+      <p:pic>
+        <p:nvPicPr>
+          <p:cNvPr id="9" name="Picture 8" descr="A close up of a logo&#10;&#10;Description automatically generated">
+            <a:extLst>
+              <a:ext uri="{FF2B5EF4-FFF2-40B4-BE49-F238E27FC236}">
+                <a16:creationId xmlns:a16="http://schemas.microsoft.com/office/drawing/2014/main" id="{47815615-3B83-4C4B-B5AD-7BF8E69D7D9E}"/>
+              </a:ext>
+            </a:extLst>
+          </p:cNvPr>
+          <p:cNvPicPr>
+            <a:picLocks noChangeAspect="1"/>
+          </p:cNvPicPr>
+          <p:nvPr/>
+        </p:nvPicPr>
+        <p:blipFill>
+          <a:blip r:embed="rId4">
+            <a:extLst>
+              <a:ext uri="{28A0092B-C50C-407E-A947-70E740481C1C}">
+                <a14:useLocalDpi xmlns:a14="http://schemas.microsoft.com/office/drawing/2010/main" val="0"/>
+              </a:ext>
+            </a:extLst>
+          </a:blip>
+          <a:stretch>
+            <a:fillRect/>
+          </a:stretch>
+        </p:blipFill>
+        <p:spPr>
+          <a:xfrm>
+            <a:off x="6711583" y="4282169"/>
+            <a:ext cx="4474227" cy="2856870"/>
+          </a:xfrm>
+          <a:prstGeom prst="rect">
+            <a:avLst/>
+          </a:prstGeom>
+        </p:spPr>
+      </p:pic>
+      <p:sp>
+        <p:nvSpPr>
+          <p:cNvPr id="12" name="TextBox 11">
+            <a:extLst>
+              <a:ext uri="{FF2B5EF4-FFF2-40B4-BE49-F238E27FC236}">
+                <a16:creationId xmlns:a16="http://schemas.microsoft.com/office/drawing/2014/main" id="{21EEA765-1A7B-4509-8CDA-8F8FEE14970C}"/>
+              </a:ext>
+            </a:extLst>
+          </p:cNvPr>
+          <p:cNvSpPr txBox="1"/>
+          <p:nvPr/>
+        </p:nvSpPr>
+        <p:spPr>
+          <a:xfrm>
+            <a:off x="379640" y="5441496"/>
+            <a:ext cx="6226912" cy="1477328"/>
+          </a:xfrm>
+          <a:prstGeom prst="rect">
+            <a:avLst/>
+          </a:prstGeom>
+          <a:noFill/>
+        </p:spPr>
+        <p:txBody>
+          <a:bodyPr wrap="square" rtlCol="0">
+            <a:spAutoFit/>
+          </a:bodyPr>
+          <a:lstStyle/>
+          <a:p>
+            <a:pPr marL="285750" indent="-285750">
+              <a:buFont typeface="Arial" panose="020B0604020202020204" pitchFamily="34" charset="0"/>
+              <a:buChar char="•"/>
+            </a:pPr>
+            <a:r>
+              <a:rPr lang="en-US" dirty="0"/>
+              <a:t>Plot V for 3 batches: unperturbed, perturbed, and random</a:t>
+            </a:r>
+          </a:p>
+          <a:p>
+            <a:pPr marL="285750" indent="-285750">
+              <a:buFont typeface="Arial" panose="020B0604020202020204" pitchFamily="34" charset="0"/>
+              <a:buChar char="•"/>
+            </a:pPr>
+            <a:r>
+              <a:rPr lang="en-US" dirty="0"/>
+              <a:t>Results match theory perfectly!</a:t>
+            </a:r>
+          </a:p>
+          <a:p>
+            <a:pPr marL="285750" indent="-285750">
+              <a:buFont typeface="Arial" panose="020B0604020202020204" pitchFamily="34" charset="0"/>
+              <a:buChar char="•"/>
+            </a:pPr>
+            <a:r>
+              <a:rPr lang="en-US" dirty="0"/>
+              <a:t>Random elements close to uniform distribution</a:t>
+            </a:r>
+          </a:p>
+          <a:p>
+            <a:pPr marL="285750" indent="-285750">
+              <a:buFont typeface="Arial" panose="020B0604020202020204" pitchFamily="34" charset="0"/>
+              <a:buChar char="•"/>
+            </a:pPr>
+            <a:r>
+              <a:rPr lang="en-US" dirty="0"/>
+              <a:t>Unperturbed: uniform on misses with spike in first bucket</a:t>
+            </a:r>
+          </a:p>
+          <a:p>
+            <a:pPr marL="285750" indent="-285750">
+              <a:buFont typeface="Arial" panose="020B0604020202020204" pitchFamily="34" charset="0"/>
+              <a:buChar char="•"/>
+            </a:pPr>
+            <a:r>
+              <a:rPr lang="en-US" dirty="0"/>
+              <a:t>Perturbed: in between; hits leak out to ~250 arc seconds</a:t>
+            </a:r>
+          </a:p>
+        </p:txBody>
+      </p:sp>
+    </p:spTree>
+    <p:extLst>
+      <p:ext uri="{BB962C8B-B14F-4D97-AF65-F5344CB8AC3E}">
+        <p14:creationId xmlns:p14="http://schemas.microsoft.com/office/powerpoint/2010/main" val="4076599928"/>
+      </p:ext>
+    </p:extLst>
+  </p:cSld>
+  <p:clrMapOvr>
+    <a:masterClrMapping/>
+  </p:clrMapOvr>
+</p:sld>
+</file>
+
+<file path=ppt/slides/slide32.xml><?xml version="1.0" encoding="utf-8"?>
+<p:sld xmlns:a="http://schemas.openxmlformats.org/drawingml/2006/main" xmlns:r="http://schemas.openxmlformats.org/officeDocument/2006/relationships" xmlns:p="http://schemas.openxmlformats.org/presentationml/2006/main">
+  <p:cSld>
+    <p:spTree>
+      <p:nvGrpSpPr>
+        <p:cNvPr id="1" name=""/>
+        <p:cNvGrpSpPr/>
+        <p:nvPr/>
+      </p:nvGrpSpPr>
+      <p:grpSpPr>
+        <a:xfrm>
+          <a:off x="0" y="0"/>
+          <a:ext cx="0" cy="0"/>
+          <a:chOff x="0" y="0"/>
+          <a:chExt cx="0" cy="0"/>
+        </a:xfrm>
+      </p:grpSpPr>
+      <p:sp>
+        <p:nvSpPr>
+          <p:cNvPr id="2" name="Title 1">
+            <a:extLst>
+              <a:ext uri="{FF2B5EF4-FFF2-40B4-BE49-F238E27FC236}">
+                <a16:creationId xmlns:a16="http://schemas.microsoft.com/office/drawing/2014/main" id="{6D38313A-8CD3-40A1-8DE7-DD80F45994C3}"/>
               </a:ext>
             </a:extLst>
           </p:cNvPr>
@@ -8045,7 +8633,7 @@
             <a:spLocks noGrp="1"/>
           </p:cNvSpPr>
           <p:nvPr>
-            <p:ph idx="1"/>
+            <p:ph type="title"/>
           </p:nvPr>
         </p:nvSpPr>
         <p:spPr/>
@@ -8053,7 +8641,1458 @@
           <a:bodyPr/>
           <a:lstStyle/>
           <a:p>
+            <a:r>
+              <a:rPr lang="en-US" dirty="0"/>
+              <a:t>Log Likelihood Objective Function</a:t>
+            </a:r>
+          </a:p>
+        </p:txBody>
+      </p:sp>
+      <p:sp>
+        <p:nvSpPr>
+          <p:cNvPr id="3" name="Content Placeholder 2">
+            <a:extLst>
+              <a:ext uri="{FF2B5EF4-FFF2-40B4-BE49-F238E27FC236}">
+                <a16:creationId xmlns:a16="http://schemas.microsoft.com/office/drawing/2014/main" id="{9C29592A-4C90-489D-A1A5-9D19EF5B2F04}"/>
+              </a:ext>
+            </a:extLst>
+          </p:cNvPr>
+          <p:cNvSpPr>
+            <a:spLocks noGrp="1"/>
+          </p:cNvSpPr>
+          <p:nvPr>
+            <p:ph idx="1"/>
+          </p:nvPr>
+        </p:nvSpPr>
+        <p:spPr>
+          <a:xfrm>
+            <a:off x="838200" y="1825625"/>
+            <a:ext cx="10515600" cy="4667250"/>
+          </a:xfrm>
+        </p:spPr>
+        <p:txBody>
+          <a:bodyPr/>
+          <a:lstStyle/>
+          <a:p>
+            <a:r>
+              <a:rPr lang="en-US" dirty="0"/>
+              <a:t>Mixture probability model: V mixture of h hits, (1-h) misses</a:t>
+            </a:r>
+          </a:p>
+          <a:p>
+            <a:endParaRPr lang="en-US" dirty="0"/>
+          </a:p>
+          <a:p>
+            <a:r>
+              <a:rPr lang="en-US" dirty="0"/>
+              <a:t>Relate decay rate to “resolution” parameter R</a:t>
+            </a:r>
+          </a:p>
+          <a:p>
+            <a:endParaRPr lang="en-US" dirty="0"/>
+          </a:p>
+          <a:p>
+            <a:r>
+              <a:rPr lang="en-US" dirty="0"/>
+              <a:t>The resolution R controls how tightly the model focuses</a:t>
+            </a:r>
+          </a:p>
+          <a:p>
+            <a:r>
+              <a:rPr lang="en-US" dirty="0"/>
+              <a:t>Mixture PDF:</a:t>
+            </a:r>
+          </a:p>
+          <a:p>
+            <a:endParaRPr lang="en-US" dirty="0"/>
+          </a:p>
+          <a:p>
+            <a:r>
+              <a:rPr lang="en-US" dirty="0"/>
+              <a:t>Log Likelihood:</a:t>
+            </a:r>
+          </a:p>
+        </p:txBody>
+      </p:sp>
+      <p:pic>
+        <p:nvPicPr>
+          <p:cNvPr id="7" name="Picture 6">
+            <a:extLst>
+              <a:ext uri="{FF2B5EF4-FFF2-40B4-BE49-F238E27FC236}">
+                <a16:creationId xmlns:a16="http://schemas.microsoft.com/office/drawing/2014/main" id="{E96CEB15-A6D5-428B-BDE1-B67EA1ED403B}"/>
+              </a:ext>
+            </a:extLst>
+          </p:cNvPr>
+          <p:cNvPicPr>
+            <a:picLocks noChangeAspect="1"/>
+          </p:cNvPicPr>
+          <p:nvPr>
+            <p:custDataLst>
+              <p:tags r:id="rId1"/>
+            </p:custDataLst>
+          </p:nvPr>
+        </p:nvPicPr>
+        <p:blipFill>
+          <a:blip r:embed="rId9">
+            <a:extLst>
+              <a:ext uri="{28A0092B-C50C-407E-A947-70E740481C1C}">
+                <a14:useLocalDpi xmlns:a14="http://schemas.microsoft.com/office/drawing/2010/main" val="0"/>
+              </a:ext>
+            </a:extLst>
+          </a:blip>
+          <a:stretch>
+            <a:fillRect/>
+          </a:stretch>
+        </p:blipFill>
+        <p:spPr>
+          <a:xfrm>
+            <a:off x="1757819" y="2339976"/>
+            <a:ext cx="3258116" cy="444045"/>
+          </a:xfrm>
+          <a:prstGeom prst="rect">
+            <a:avLst/>
+          </a:prstGeom>
+        </p:spPr>
+      </p:pic>
+      <p:pic>
+        <p:nvPicPr>
+          <p:cNvPr id="10" name="Picture 9">
+            <a:extLst>
+              <a:ext uri="{FF2B5EF4-FFF2-40B4-BE49-F238E27FC236}">
+                <a16:creationId xmlns:a16="http://schemas.microsoft.com/office/drawing/2014/main" id="{2E8D5ACC-AC6A-42BB-87B3-A3B7CCF4AA09}"/>
+              </a:ext>
+            </a:extLst>
+          </p:cNvPr>
+          <p:cNvPicPr>
+            <a:picLocks noChangeAspect="1"/>
+          </p:cNvPicPr>
+          <p:nvPr>
+            <p:custDataLst>
+              <p:tags r:id="rId2"/>
+            </p:custDataLst>
+          </p:nvPr>
+        </p:nvPicPr>
+        <p:blipFill>
+          <a:blip r:embed="rId10">
+            <a:extLst>
+              <a:ext uri="{28A0092B-C50C-407E-A947-70E740481C1C}">
+                <a14:useLocalDpi xmlns:a14="http://schemas.microsoft.com/office/drawing/2010/main" val="0"/>
+              </a:ext>
+            </a:extLst>
+          </a:blip>
+          <a:stretch>
+            <a:fillRect/>
+          </a:stretch>
+        </p:blipFill>
+        <p:spPr>
+          <a:xfrm>
+            <a:off x="5857652" y="2339976"/>
+            <a:ext cx="3712861" cy="444045"/>
+          </a:xfrm>
+          <a:prstGeom prst="rect">
+            <a:avLst/>
+          </a:prstGeom>
+        </p:spPr>
+      </p:pic>
+      <p:pic>
+        <p:nvPicPr>
+          <p:cNvPr id="19" name="Picture 18">
+            <a:extLst>
+              <a:ext uri="{FF2B5EF4-FFF2-40B4-BE49-F238E27FC236}">
+                <a16:creationId xmlns:a16="http://schemas.microsoft.com/office/drawing/2014/main" id="{10D41D4F-4F61-41EB-802F-E819396D37F1}"/>
+              </a:ext>
+            </a:extLst>
+          </p:cNvPr>
+          <p:cNvPicPr>
+            <a:picLocks noChangeAspect="1"/>
+          </p:cNvPicPr>
+          <p:nvPr>
+            <p:custDataLst>
+              <p:tags r:id="rId3"/>
+            </p:custDataLst>
+          </p:nvPr>
+        </p:nvPicPr>
+        <p:blipFill>
+          <a:blip r:embed="rId11">
+            <a:extLst>
+              <a:ext uri="{28A0092B-C50C-407E-A947-70E740481C1C}">
+                <a14:useLocalDpi xmlns:a14="http://schemas.microsoft.com/office/drawing/2010/main" val="0"/>
+              </a:ext>
+            </a:extLst>
+          </a:blip>
+          <a:stretch>
+            <a:fillRect/>
+          </a:stretch>
+        </p:blipFill>
+        <p:spPr>
+          <a:xfrm>
+            <a:off x="1556205" y="3298372"/>
+            <a:ext cx="3556266" cy="458667"/>
+          </a:xfrm>
+          <a:prstGeom prst="rect">
+            <a:avLst/>
+          </a:prstGeom>
+        </p:spPr>
+      </p:pic>
+      <p:pic>
+        <p:nvPicPr>
+          <p:cNvPr id="17" name="Picture 16">
+            <a:extLst>
+              <a:ext uri="{FF2B5EF4-FFF2-40B4-BE49-F238E27FC236}">
+                <a16:creationId xmlns:a16="http://schemas.microsoft.com/office/drawing/2014/main" id="{07304450-E9EA-4D93-AB9E-B8D9A551F76D}"/>
+              </a:ext>
+            </a:extLst>
+          </p:cNvPr>
+          <p:cNvPicPr>
+            <a:picLocks noChangeAspect="1"/>
+          </p:cNvPicPr>
+          <p:nvPr>
+            <p:custDataLst>
+              <p:tags r:id="rId4"/>
+            </p:custDataLst>
+          </p:nvPr>
+        </p:nvPicPr>
+        <p:blipFill>
+          <a:blip r:embed="rId12">
+            <a:extLst>
+              <a:ext uri="{28A0092B-C50C-407E-A947-70E740481C1C}">
+                <a14:useLocalDpi xmlns:a14="http://schemas.microsoft.com/office/drawing/2010/main" val="0"/>
+              </a:ext>
+            </a:extLst>
+          </a:blip>
+          <a:stretch>
+            <a:fillRect/>
+          </a:stretch>
+        </p:blipFill>
+        <p:spPr>
+          <a:xfrm>
+            <a:off x="5939786" y="3267075"/>
+            <a:ext cx="2391466" cy="458667"/>
+          </a:xfrm>
+          <a:prstGeom prst="rect">
+            <a:avLst/>
+          </a:prstGeom>
+        </p:spPr>
+      </p:pic>
+      <p:pic>
+        <p:nvPicPr>
+          <p:cNvPr id="22" name="Picture 21">
+            <a:extLst>
+              <a:ext uri="{FF2B5EF4-FFF2-40B4-BE49-F238E27FC236}">
+                <a16:creationId xmlns:a16="http://schemas.microsoft.com/office/drawing/2014/main" id="{49B25B2F-697E-4848-A111-47235D9A335C}"/>
+              </a:ext>
+            </a:extLst>
+          </p:cNvPr>
+          <p:cNvPicPr>
+            <a:picLocks noChangeAspect="1"/>
+          </p:cNvPicPr>
+          <p:nvPr>
+            <p:custDataLst>
+              <p:tags r:id="rId5"/>
+            </p:custDataLst>
+          </p:nvPr>
+        </p:nvPicPr>
+        <p:blipFill>
+          <a:blip r:embed="rId13">
+            <a:extLst>
+              <a:ext uri="{28A0092B-C50C-407E-A947-70E740481C1C}">
+                <a14:useLocalDpi xmlns:a14="http://schemas.microsoft.com/office/drawing/2010/main" val="0"/>
+              </a:ext>
+            </a:extLst>
+          </a:blip>
+          <a:stretch>
+            <a:fillRect/>
+          </a:stretch>
+        </p:blipFill>
+        <p:spPr>
+          <a:xfrm>
+            <a:off x="9060544" y="3017144"/>
+            <a:ext cx="1311999" cy="787201"/>
+          </a:xfrm>
+          <a:prstGeom prst="rect">
+            <a:avLst/>
+          </a:prstGeom>
+        </p:spPr>
+      </p:pic>
+      <p:pic>
+        <p:nvPicPr>
+          <p:cNvPr id="25" name="Picture 24">
+            <a:extLst>
+              <a:ext uri="{FF2B5EF4-FFF2-40B4-BE49-F238E27FC236}">
+                <a16:creationId xmlns:a16="http://schemas.microsoft.com/office/drawing/2014/main" id="{F934529A-F609-454C-9102-4241EE01A2C8}"/>
+              </a:ext>
+            </a:extLst>
+          </p:cNvPr>
+          <p:cNvPicPr>
+            <a:picLocks noChangeAspect="1"/>
+          </p:cNvPicPr>
+          <p:nvPr>
+            <p:custDataLst>
+              <p:tags r:id="rId6"/>
+            </p:custDataLst>
+          </p:nvPr>
+        </p:nvPicPr>
+        <p:blipFill>
+          <a:blip r:embed="rId14">
+            <a:extLst>
+              <a:ext uri="{28A0092B-C50C-407E-A947-70E740481C1C}">
+                <a14:useLocalDpi xmlns:a14="http://schemas.microsoft.com/office/drawing/2010/main" val="0"/>
+              </a:ext>
+            </a:extLst>
+          </a:blip>
+          <a:stretch>
+            <a:fillRect/>
+          </a:stretch>
+        </p:blipFill>
+        <p:spPr>
+          <a:xfrm>
+            <a:off x="5015935" y="4341503"/>
+            <a:ext cx="4007830" cy="917682"/>
+          </a:xfrm>
+          <a:prstGeom prst="rect">
+            <a:avLst/>
+          </a:prstGeom>
+        </p:spPr>
+      </p:pic>
+      <p:pic>
+        <p:nvPicPr>
+          <p:cNvPr id="27" name="Picture 26">
+            <a:extLst>
+              <a:ext uri="{FF2B5EF4-FFF2-40B4-BE49-F238E27FC236}">
+                <a16:creationId xmlns:a16="http://schemas.microsoft.com/office/drawing/2014/main" id="{BA536F0D-76E0-46FE-8EA9-1DEA6F403AE8}"/>
+              </a:ext>
+            </a:extLst>
+          </p:cNvPr>
+          <p:cNvPicPr>
+            <a:picLocks noChangeAspect="1"/>
+          </p:cNvPicPr>
+          <p:nvPr>
+            <p:custDataLst>
+              <p:tags r:id="rId7"/>
+            </p:custDataLst>
+          </p:nvPr>
+        </p:nvPicPr>
+        <p:blipFill>
+          <a:blip r:embed="rId15">
+            <a:extLst>
+              <a:ext uri="{28A0092B-C50C-407E-A947-70E740481C1C}">
+                <a14:useLocalDpi xmlns:a14="http://schemas.microsoft.com/office/drawing/2010/main" val="0"/>
+              </a:ext>
+            </a:extLst>
+          </a:blip>
+          <a:stretch>
+            <a:fillRect/>
+          </a:stretch>
+        </p:blipFill>
+        <p:spPr>
+          <a:xfrm>
+            <a:off x="3768725" y="5474351"/>
+            <a:ext cx="6436267" cy="1019733"/>
+          </a:xfrm>
+          <a:prstGeom prst="rect">
+            <a:avLst/>
+          </a:prstGeom>
+        </p:spPr>
+      </p:pic>
+    </p:spTree>
+    <p:extLst>
+      <p:ext uri="{BB962C8B-B14F-4D97-AF65-F5344CB8AC3E}">
+        <p14:creationId xmlns:p14="http://schemas.microsoft.com/office/powerpoint/2010/main" val="3468477518"/>
+      </p:ext>
+    </p:extLst>
+  </p:cSld>
+  <p:clrMapOvr>
+    <a:masterClrMapping/>
+  </p:clrMapOvr>
+</p:sld>
+</file>
+
+<file path=ppt/slides/slide33.xml><?xml version="1.0" encoding="utf-8"?>
+<p:sld xmlns:a="http://schemas.openxmlformats.org/drawingml/2006/main" xmlns:r="http://schemas.openxmlformats.org/officeDocument/2006/relationships" xmlns:p="http://schemas.openxmlformats.org/presentationml/2006/main">
+  <p:cSld>
+    <p:spTree>
+      <p:nvGrpSpPr>
+        <p:cNvPr id="1" name=""/>
+        <p:cNvGrpSpPr/>
+        <p:nvPr/>
+      </p:nvGrpSpPr>
+      <p:grpSpPr>
+        <a:xfrm>
+          <a:off x="0" y="0"/>
+          <a:ext cx="0" cy="0"/>
+          <a:chOff x="0" y="0"/>
+          <a:chExt cx="0" cy="0"/>
+        </a:xfrm>
+      </p:grpSpPr>
+      <p:sp>
+        <p:nvSpPr>
+          <p:cNvPr id="2" name="Title 1">
+            <a:extLst>
+              <a:ext uri="{FF2B5EF4-FFF2-40B4-BE49-F238E27FC236}">
+                <a16:creationId xmlns:a16="http://schemas.microsoft.com/office/drawing/2014/main" id="{EFE90743-F4D0-4AAF-B276-89A8C28A7E19}"/>
+              </a:ext>
+            </a:extLst>
+          </p:cNvPr>
+          <p:cNvSpPr>
+            <a:spLocks noGrp="1"/>
+          </p:cNvSpPr>
+          <p:nvPr>
+            <p:ph type="title"/>
+          </p:nvPr>
+        </p:nvSpPr>
+        <p:spPr/>
+        <p:txBody>
+          <a:bodyPr/>
+          <a:lstStyle/>
+          <a:p>
+            <a:r>
+              <a:rPr lang="en-US" dirty="0"/>
+              <a:t>Search Overview</a:t>
+            </a:r>
+          </a:p>
+        </p:txBody>
+      </p:sp>
+      <p:sp>
+        <p:nvSpPr>
+          <p:cNvPr id="3" name="Content Placeholder 2">
+            <a:extLst>
+              <a:ext uri="{FF2B5EF4-FFF2-40B4-BE49-F238E27FC236}">
+                <a16:creationId xmlns:a16="http://schemas.microsoft.com/office/drawing/2014/main" id="{5907A3DD-50A6-4981-A5FE-71377EA5263B}"/>
+              </a:ext>
+            </a:extLst>
+          </p:cNvPr>
+          <p:cNvSpPr>
+            <a:spLocks noGrp="1"/>
+          </p:cNvSpPr>
+          <p:nvPr>
+            <p:ph idx="1"/>
+          </p:nvPr>
+        </p:nvSpPr>
+        <p:spPr/>
+        <p:txBody>
+          <a:bodyPr/>
+          <a:lstStyle/>
+          <a:p>
+            <a:r>
+              <a:rPr lang="en-US" dirty="0"/>
+              <a:t>Six trainable orbital elements </a:t>
+            </a:r>
+            <a:r>
+              <a:rPr lang="en-US" i="1" dirty="0"/>
+              <a:t>a</a:t>
+            </a:r>
+            <a:r>
+              <a:rPr lang="en-US" dirty="0"/>
+              <a:t>, </a:t>
+            </a:r>
+            <a:r>
+              <a:rPr lang="en-US" i="1" dirty="0"/>
+              <a:t>e</a:t>
+            </a:r>
+            <a:r>
+              <a:rPr lang="en-US" dirty="0"/>
+              <a:t>, </a:t>
+            </a:r>
+            <a:r>
+              <a:rPr lang="en-US" i="1" dirty="0" err="1"/>
+              <a:t>i</a:t>
+            </a:r>
+            <a:r>
+              <a:rPr lang="en-US" dirty="0"/>
+              <a:t>, </a:t>
+            </a:r>
+            <a:r>
+              <a:rPr lang="el-GR" dirty="0">
+                <a:latin typeface="Times New Roman" panose="02020603050405020304" pitchFamily="18" charset="0"/>
+                <a:cs typeface="Times New Roman" panose="02020603050405020304" pitchFamily="18" charset="0"/>
+              </a:rPr>
+              <a:t>Ω</a:t>
+            </a:r>
+            <a:r>
+              <a:rPr lang="en-US" dirty="0">
+                <a:latin typeface="Times New Roman" panose="02020603050405020304" pitchFamily="18" charset="0"/>
+                <a:cs typeface="Times New Roman" panose="02020603050405020304" pitchFamily="18" charset="0"/>
+              </a:rPr>
+              <a:t>, </a:t>
+            </a:r>
+            <a:r>
+              <a:rPr lang="el-GR" dirty="0">
+                <a:latin typeface="Times New Roman" panose="02020603050405020304" pitchFamily="18" charset="0"/>
+                <a:cs typeface="Times New Roman" panose="02020603050405020304" pitchFamily="18" charset="0"/>
+              </a:rPr>
+              <a:t>ω</a:t>
+            </a:r>
+            <a:r>
+              <a:rPr lang="en-US" dirty="0">
+                <a:latin typeface="Times New Roman" panose="02020603050405020304" pitchFamily="18" charset="0"/>
+                <a:cs typeface="Times New Roman" panose="02020603050405020304" pitchFamily="18" charset="0"/>
+              </a:rPr>
+              <a:t>, </a:t>
+            </a:r>
+            <a:r>
+              <a:rPr lang="en-US" i="1" dirty="0">
+                <a:latin typeface="Times New Roman" panose="02020603050405020304" pitchFamily="18" charset="0"/>
+                <a:cs typeface="Times New Roman" panose="02020603050405020304" pitchFamily="18" charset="0"/>
+              </a:rPr>
+              <a:t>f; </a:t>
+            </a:r>
+            <a:r>
+              <a:rPr lang="en-US" dirty="0">
+                <a:latin typeface="Times New Roman" panose="02020603050405020304" pitchFamily="18" charset="0"/>
+                <a:cs typeface="Times New Roman" panose="02020603050405020304" pitchFamily="18" charset="0"/>
+              </a:rPr>
+              <a:t>epoch not trainable</a:t>
+            </a:r>
+          </a:p>
+          <a:p>
+            <a:r>
+              <a:rPr lang="en-US" dirty="0">
+                <a:latin typeface="Times New Roman" panose="02020603050405020304" pitchFamily="18" charset="0"/>
+                <a:cs typeface="Times New Roman" panose="02020603050405020304" pitchFamily="18" charset="0"/>
+              </a:rPr>
+              <a:t>Three trainable mixture parameters: N</a:t>
+            </a:r>
+            <a:r>
+              <a:rPr lang="en-US" baseline="-25000" dirty="0">
+                <a:latin typeface="Times New Roman" panose="02020603050405020304" pitchFamily="18" charset="0"/>
+                <a:cs typeface="Times New Roman" panose="02020603050405020304" pitchFamily="18" charset="0"/>
+              </a:rPr>
+              <a:t>h</a:t>
+            </a:r>
+            <a:r>
+              <a:rPr lang="en-US" dirty="0">
+                <a:latin typeface="Times New Roman" panose="02020603050405020304" pitchFamily="18" charset="0"/>
+                <a:cs typeface="Times New Roman" panose="02020603050405020304" pitchFamily="18" charset="0"/>
+              </a:rPr>
+              <a:t>, R, τ</a:t>
+            </a:r>
+          </a:p>
+          <a:p>
+            <a:r>
+              <a:rPr lang="en-US" dirty="0">
+                <a:latin typeface="Times New Roman" panose="02020603050405020304" pitchFamily="18" charset="0"/>
+                <a:cs typeface="Times New Roman" panose="02020603050405020304" pitchFamily="18" charset="0"/>
+              </a:rPr>
+              <a:t>Compute position </a:t>
+            </a:r>
+            <a:r>
+              <a:rPr lang="en-US" b="1" dirty="0">
+                <a:latin typeface="Times New Roman" panose="02020603050405020304" pitchFamily="18" charset="0"/>
+                <a:cs typeface="Times New Roman" panose="02020603050405020304" pitchFamily="18" charset="0"/>
+              </a:rPr>
+              <a:t>q</a:t>
+            </a:r>
+            <a:r>
+              <a:rPr lang="en-US" dirty="0">
+                <a:latin typeface="Times New Roman" panose="02020603050405020304" pitchFamily="18" charset="0"/>
+                <a:cs typeface="Times New Roman" panose="02020603050405020304" pitchFamily="18" charset="0"/>
+              </a:rPr>
+              <a:t> and velocity </a:t>
+            </a:r>
+            <a:r>
+              <a:rPr lang="en-US" b="1" dirty="0">
+                <a:latin typeface="Times New Roman" panose="02020603050405020304" pitchFamily="18" charset="0"/>
+                <a:cs typeface="Times New Roman" panose="02020603050405020304" pitchFamily="18" charset="0"/>
+              </a:rPr>
+              <a:t>v</a:t>
+            </a:r>
+            <a:r>
+              <a:rPr lang="en-US" dirty="0">
+                <a:latin typeface="Times New Roman" panose="02020603050405020304" pitchFamily="18" charset="0"/>
+                <a:cs typeface="Times New Roman" panose="02020603050405020304" pitchFamily="18" charset="0"/>
+              </a:rPr>
+              <a:t> from candidate elements</a:t>
+            </a:r>
+          </a:p>
+          <a:p>
+            <a:r>
+              <a:rPr lang="en-US" dirty="0">
+                <a:latin typeface="Times New Roman" panose="02020603050405020304" pitchFamily="18" charset="0"/>
+                <a:cs typeface="Times New Roman" panose="02020603050405020304" pitchFamily="18" charset="0"/>
+              </a:rPr>
+              <a:t>Compute direction </a:t>
+            </a:r>
+            <a:r>
+              <a:rPr lang="en-US" b="1" dirty="0" err="1">
+                <a:latin typeface="Times New Roman" panose="02020603050405020304" pitchFamily="18" charset="0"/>
+                <a:cs typeface="Times New Roman" panose="02020603050405020304" pitchFamily="18" charset="0"/>
+              </a:rPr>
+              <a:t>u</a:t>
+            </a:r>
+            <a:r>
+              <a:rPr lang="en-US" baseline="-25000" dirty="0" err="1">
+                <a:latin typeface="Times New Roman" panose="02020603050405020304" pitchFamily="18" charset="0"/>
+                <a:cs typeface="Times New Roman" panose="02020603050405020304" pitchFamily="18" charset="0"/>
+              </a:rPr>
+              <a:t>pred</a:t>
+            </a:r>
+            <a:r>
+              <a:rPr lang="en-US" dirty="0">
+                <a:latin typeface="Times New Roman" panose="02020603050405020304" pitchFamily="18" charset="0"/>
+                <a:cs typeface="Times New Roman" panose="02020603050405020304" pitchFamily="18" charset="0"/>
+              </a:rPr>
+              <a:t> from </a:t>
+            </a:r>
+            <a:r>
+              <a:rPr lang="en-US" b="1" dirty="0">
+                <a:latin typeface="Times New Roman" panose="02020603050405020304" pitchFamily="18" charset="0"/>
+                <a:cs typeface="Times New Roman" panose="02020603050405020304" pitchFamily="18" charset="0"/>
+              </a:rPr>
+              <a:t>q</a:t>
+            </a:r>
+            <a:r>
+              <a:rPr lang="en-US" dirty="0">
+                <a:latin typeface="Times New Roman" panose="02020603050405020304" pitchFamily="18" charset="0"/>
+                <a:cs typeface="Times New Roman" panose="02020603050405020304" pitchFamily="18" charset="0"/>
+              </a:rPr>
+              <a:t>, </a:t>
+            </a:r>
+            <a:r>
+              <a:rPr lang="en-US" b="1" dirty="0">
+                <a:latin typeface="Times New Roman" panose="02020603050405020304" pitchFamily="18" charset="0"/>
+                <a:cs typeface="Times New Roman" panose="02020603050405020304" pitchFamily="18" charset="0"/>
+              </a:rPr>
+              <a:t>v</a:t>
+            </a:r>
+            <a:r>
+              <a:rPr lang="en-US" dirty="0">
+                <a:latin typeface="Times New Roman" panose="02020603050405020304" pitchFamily="18" charset="0"/>
+                <a:cs typeface="Times New Roman" panose="02020603050405020304" pitchFamily="18" charset="0"/>
+              </a:rPr>
+              <a:t> with light time and </a:t>
+            </a:r>
+            <a:r>
+              <a:rPr lang="en-US" dirty="0" err="1">
+                <a:latin typeface="Times New Roman" panose="02020603050405020304" pitchFamily="18" charset="0"/>
+                <a:cs typeface="Times New Roman" panose="02020603050405020304" pitchFamily="18" charset="0"/>
+              </a:rPr>
+              <a:t>topos</a:t>
+            </a:r>
+            <a:endParaRPr lang="en-US" dirty="0">
+              <a:latin typeface="Times New Roman" panose="02020603050405020304" pitchFamily="18" charset="0"/>
+              <a:cs typeface="Times New Roman" panose="02020603050405020304" pitchFamily="18" charset="0"/>
+            </a:endParaRPr>
+          </a:p>
+          <a:p>
+            <a:r>
+              <a:rPr lang="en-US" dirty="0">
+                <a:latin typeface="Times New Roman" panose="02020603050405020304" pitchFamily="18" charset="0"/>
+                <a:cs typeface="Times New Roman" panose="02020603050405020304" pitchFamily="18" charset="0"/>
+              </a:rPr>
+              <a:t>Compute distance s from </a:t>
+            </a:r>
+            <a:r>
+              <a:rPr lang="en-US" b="1" dirty="0" err="1">
+                <a:latin typeface="Times New Roman" panose="02020603050405020304" pitchFamily="18" charset="0"/>
+                <a:cs typeface="Times New Roman" panose="02020603050405020304" pitchFamily="18" charset="0"/>
+              </a:rPr>
+              <a:t>u</a:t>
+            </a:r>
+            <a:r>
+              <a:rPr lang="en-US" baseline="-25000" dirty="0" err="1">
+                <a:latin typeface="Times New Roman" panose="02020603050405020304" pitchFamily="18" charset="0"/>
+                <a:cs typeface="Times New Roman" panose="02020603050405020304" pitchFamily="18" charset="0"/>
+              </a:rPr>
+              <a:t>pred</a:t>
+            </a:r>
+            <a:r>
+              <a:rPr lang="en-US" dirty="0">
+                <a:latin typeface="Times New Roman" panose="02020603050405020304" pitchFamily="18" charset="0"/>
+                <a:cs typeface="Times New Roman" panose="02020603050405020304" pitchFamily="18" charset="0"/>
+              </a:rPr>
+              <a:t> to</a:t>
+            </a:r>
+            <a:r>
+              <a:rPr lang="en-US" b="1" dirty="0">
+                <a:latin typeface="Times New Roman" panose="02020603050405020304" pitchFamily="18" charset="0"/>
+                <a:cs typeface="Times New Roman" panose="02020603050405020304" pitchFamily="18" charset="0"/>
+              </a:rPr>
+              <a:t> </a:t>
+            </a:r>
+            <a:r>
+              <a:rPr lang="en-US" b="1" dirty="0" err="1">
+                <a:latin typeface="Times New Roman" panose="02020603050405020304" pitchFamily="18" charset="0"/>
+                <a:cs typeface="Times New Roman" panose="02020603050405020304" pitchFamily="18" charset="0"/>
+              </a:rPr>
+              <a:t>u</a:t>
+            </a:r>
+            <a:r>
+              <a:rPr lang="en-US" baseline="-25000" dirty="0" err="1">
+                <a:latin typeface="Times New Roman" panose="02020603050405020304" pitchFamily="18" charset="0"/>
+                <a:cs typeface="Times New Roman" panose="02020603050405020304" pitchFamily="18" charset="0"/>
+              </a:rPr>
+              <a:t>obs</a:t>
+            </a:r>
+            <a:r>
+              <a:rPr lang="en-US" dirty="0">
+                <a:latin typeface="Times New Roman" panose="02020603050405020304" pitchFamily="18" charset="0"/>
+                <a:cs typeface="Times New Roman" panose="02020603050405020304" pitchFamily="18" charset="0"/>
+              </a:rPr>
+              <a:t> for ZTF observations</a:t>
+            </a:r>
+          </a:p>
+          <a:p>
+            <a:r>
+              <a:rPr lang="en-US" dirty="0">
+                <a:latin typeface="Times New Roman" panose="02020603050405020304" pitchFamily="18" charset="0"/>
+                <a:cs typeface="Times New Roman" panose="02020603050405020304" pitchFamily="18" charset="0"/>
+              </a:rPr>
+              <a:t>Compute log likelihood </a:t>
+            </a:r>
+            <a:r>
+              <a:rPr lang="en-US" dirty="0" err="1">
+                <a:latin typeface="Times New Roman" panose="02020603050405020304" pitchFamily="18" charset="0"/>
+                <a:cs typeface="Times New Roman" panose="02020603050405020304" pitchFamily="18" charset="0"/>
+              </a:rPr>
+              <a:t>ℒ</a:t>
+            </a:r>
+            <a:r>
+              <a:rPr lang="en-US" baseline="-25000" dirty="0" err="1">
+                <a:latin typeface="Times New Roman" panose="02020603050405020304" pitchFamily="18" charset="0"/>
+                <a:cs typeface="Times New Roman" panose="02020603050405020304" pitchFamily="18" charset="0"/>
+              </a:rPr>
+              <a:t>i</a:t>
+            </a:r>
+            <a:r>
+              <a:rPr lang="en-US" dirty="0">
+                <a:latin typeface="Times New Roman" panose="02020603050405020304" pitchFamily="18" charset="0"/>
+                <a:cs typeface="Times New Roman" panose="02020603050405020304" pitchFamily="18" charset="0"/>
+              </a:rPr>
+              <a:t> for each candidate element</a:t>
+            </a:r>
+          </a:p>
+          <a:p>
+            <a:r>
+              <a:rPr lang="en-US" dirty="0">
+                <a:latin typeface="Times New Roman" panose="02020603050405020304" pitchFamily="18" charset="0"/>
+                <a:cs typeface="Times New Roman" panose="02020603050405020304" pitchFamily="18" charset="0"/>
+              </a:rPr>
+              <a:t>Gradient descent…</a:t>
+            </a:r>
+            <a:endParaRPr lang="en-US" dirty="0"/>
+          </a:p>
+        </p:txBody>
+      </p:sp>
+    </p:spTree>
+    <p:extLst>
+      <p:ext uri="{BB962C8B-B14F-4D97-AF65-F5344CB8AC3E}">
+        <p14:creationId xmlns:p14="http://schemas.microsoft.com/office/powerpoint/2010/main" val="76010880"/>
+      </p:ext>
+    </p:extLst>
+  </p:cSld>
+  <p:clrMapOvr>
+    <a:masterClrMapping/>
+  </p:clrMapOvr>
+</p:sld>
+</file>
+
+<file path=ppt/slides/slide34.xml><?xml version="1.0" encoding="utf-8"?>
+<p:sld xmlns:a="http://schemas.openxmlformats.org/drawingml/2006/main" xmlns:r="http://schemas.openxmlformats.org/officeDocument/2006/relationships" xmlns:p="http://schemas.openxmlformats.org/presentationml/2006/main">
+  <p:cSld>
+    <p:spTree>
+      <p:nvGrpSpPr>
+        <p:cNvPr id="1" name=""/>
+        <p:cNvGrpSpPr/>
+        <p:nvPr/>
+      </p:nvGrpSpPr>
+      <p:grpSpPr>
+        <a:xfrm>
+          <a:off x="0" y="0"/>
+          <a:ext cx="0" cy="0"/>
+          <a:chOff x="0" y="0"/>
+          <a:chExt cx="0" cy="0"/>
+        </a:xfrm>
+      </p:grpSpPr>
+      <p:sp>
+        <p:nvSpPr>
+          <p:cNvPr id="2" name="Title 1">
+            <a:extLst>
+              <a:ext uri="{FF2B5EF4-FFF2-40B4-BE49-F238E27FC236}">
+                <a16:creationId xmlns:a16="http://schemas.microsoft.com/office/drawing/2014/main" id="{A73B1405-393F-400A-96F6-164D1CD7BD19}"/>
+              </a:ext>
+            </a:extLst>
+          </p:cNvPr>
+          <p:cNvSpPr>
+            <a:spLocks noGrp="1"/>
+          </p:cNvSpPr>
+          <p:nvPr>
+            <p:ph type="title"/>
+          </p:nvPr>
+        </p:nvSpPr>
+        <p:spPr/>
+        <p:txBody>
+          <a:bodyPr/>
+          <a:lstStyle/>
+          <a:p>
+            <a:r>
+              <a:rPr lang="en-US" dirty="0"/>
+              <a:t>Search Techniques: Uniform Scale, Gradient Clipping and Independent Weights</a:t>
+            </a:r>
+          </a:p>
+        </p:txBody>
+      </p:sp>
+      <p:sp>
+        <p:nvSpPr>
+          <p:cNvPr id="3" name="Content Placeholder 2">
+            <a:extLst>
+              <a:ext uri="{FF2B5EF4-FFF2-40B4-BE49-F238E27FC236}">
+                <a16:creationId xmlns:a16="http://schemas.microsoft.com/office/drawing/2014/main" id="{4F203071-A4B7-40EE-89E0-EB86199B4D67}"/>
+              </a:ext>
+            </a:extLst>
+          </p:cNvPr>
+          <p:cNvSpPr>
+            <a:spLocks noGrp="1"/>
+          </p:cNvSpPr>
+          <p:nvPr>
+            <p:ph idx="1"/>
+          </p:nvPr>
+        </p:nvSpPr>
+        <p:spPr>
+          <a:xfrm>
+            <a:off x="838200" y="1616530"/>
+            <a:ext cx="10515600" cy="5049610"/>
+          </a:xfrm>
+        </p:spPr>
+        <p:txBody>
+          <a:bodyPr>
+            <a:normAutofit fontScale="92500" lnSpcReduction="10000"/>
+          </a:bodyPr>
+          <a:lstStyle/>
+          <a:p>
+            <a:r>
+              <a:rPr lang="en-US" dirty="0"/>
+              <a:t>Control variables on uniform scale in [0, 1]</a:t>
+            </a:r>
+          </a:p>
+          <a:p>
+            <a:pPr lvl="1"/>
+            <a:r>
+              <a:rPr lang="en-US" dirty="0"/>
+              <a:t>e.g. a = </a:t>
+            </a:r>
+            <a:r>
+              <a:rPr lang="en-US" dirty="0" err="1"/>
+              <a:t>a_min</a:t>
+            </a:r>
+            <a:r>
+              <a:rPr lang="en-US" dirty="0"/>
+              <a:t> x exp(a_ + log(</a:t>
+            </a:r>
+            <a:r>
+              <a:rPr lang="en-US" dirty="0" err="1"/>
+              <a:t>a_max</a:t>
+            </a:r>
+            <a:r>
+              <a:rPr lang="en-US" dirty="0"/>
+              <a:t> / </a:t>
+            </a:r>
+            <a:r>
+              <a:rPr lang="en-US" dirty="0" err="1"/>
+              <a:t>a_min</a:t>
+            </a:r>
+            <a:r>
+              <a:rPr lang="en-US" dirty="0"/>
+              <a:t>); a_ trainable in [0,1]</a:t>
+            </a:r>
+          </a:p>
+          <a:p>
+            <a:r>
+              <a:rPr lang="en-US" dirty="0"/>
+              <a:t>Clip gradients by norm; max || Grad </a:t>
+            </a:r>
+            <a:r>
+              <a:rPr lang="en-US" dirty="0">
+                <a:latin typeface="Times New Roman" panose="02020603050405020304" pitchFamily="18" charset="0"/>
+                <a:cs typeface="Times New Roman" panose="02020603050405020304" pitchFamily="18" charset="0"/>
+              </a:rPr>
+              <a:t>ℒ</a:t>
+            </a:r>
+            <a:r>
+              <a:rPr lang="en-US" dirty="0"/>
+              <a:t> || = 1</a:t>
+            </a:r>
+          </a:p>
+          <a:p>
+            <a:pPr lvl="1"/>
+            <a:r>
+              <a:rPr lang="en-US" dirty="0"/>
+              <a:t>would be better to do this elementwise, but requires custom class</a:t>
+            </a:r>
+          </a:p>
+          <a:p>
+            <a:r>
+              <a:rPr lang="en-US" dirty="0"/>
+              <a:t>Weight log likelihood for each element in batch independently</a:t>
+            </a:r>
+          </a:p>
+          <a:p>
+            <a:pPr lvl="1"/>
+            <a:endParaRPr lang="en-US" dirty="0"/>
+          </a:p>
+          <a:p>
+            <a:pPr lvl="1"/>
+            <a:endParaRPr lang="en-US" dirty="0"/>
+          </a:p>
+          <a:p>
+            <a:pPr lvl="1"/>
+            <a:endParaRPr lang="en-US" dirty="0"/>
+          </a:p>
+          <a:p>
+            <a:pPr lvl="1"/>
+            <a:r>
+              <a:rPr lang="en-US" dirty="0"/>
+              <a:t>equivalent to controlling 64 learning rates independently</a:t>
+            </a:r>
+          </a:p>
+          <a:p>
+            <a:pPr lvl="1"/>
+            <a:r>
+              <a:rPr lang="en-US" dirty="0"/>
+              <a:t>reduce learning rate on an element when it overshoots</a:t>
+            </a:r>
+          </a:p>
+          <a:p>
+            <a:r>
+              <a:rPr lang="en-US" dirty="0"/>
+              <a:t>Track of log likelihood and hits for each candidate element before summing them in the objective function</a:t>
+            </a:r>
+          </a:p>
+          <a:p>
+            <a:r>
+              <a:rPr lang="en-US" dirty="0"/>
+              <a:t>Revert changes only on elements that got worse during an episode</a:t>
+            </a:r>
+          </a:p>
+          <a:p>
+            <a:endParaRPr lang="en-US" dirty="0"/>
+          </a:p>
+        </p:txBody>
+      </p:sp>
+      <p:pic>
+        <p:nvPicPr>
+          <p:cNvPr id="5" name="Picture 4">
+            <a:extLst>
+              <a:ext uri="{FF2B5EF4-FFF2-40B4-BE49-F238E27FC236}">
+                <a16:creationId xmlns:a16="http://schemas.microsoft.com/office/drawing/2014/main" id="{CA111AF0-A1C8-481B-B2DC-B6A409486E3C}"/>
+              </a:ext>
+            </a:extLst>
+          </p:cNvPr>
+          <p:cNvPicPr>
+            <a:picLocks noChangeAspect="1"/>
+          </p:cNvPicPr>
+          <p:nvPr>
+            <p:custDataLst>
+              <p:tags r:id="rId1"/>
+            </p:custDataLst>
+          </p:nvPr>
+        </p:nvPicPr>
+        <p:blipFill>
+          <a:blip r:embed="rId3">
+            <a:extLst>
+              <a:ext uri="{28A0092B-C50C-407E-A947-70E740481C1C}">
+                <a14:useLocalDpi xmlns:a14="http://schemas.microsoft.com/office/drawing/2010/main" val="0"/>
+              </a:ext>
+            </a:extLst>
+          </a:blip>
+          <a:stretch>
+            <a:fillRect/>
+          </a:stretch>
+        </p:blipFill>
+        <p:spPr>
+          <a:xfrm>
+            <a:off x="4528918" y="3595064"/>
+            <a:ext cx="2064637" cy="954427"/>
+          </a:xfrm>
+          <a:prstGeom prst="rect">
+            <a:avLst/>
+          </a:prstGeom>
+        </p:spPr>
+      </p:pic>
+    </p:spTree>
+    <p:extLst>
+      <p:ext uri="{BB962C8B-B14F-4D97-AF65-F5344CB8AC3E}">
+        <p14:creationId xmlns:p14="http://schemas.microsoft.com/office/powerpoint/2010/main" val="4264133958"/>
+      </p:ext>
+    </p:extLst>
+  </p:cSld>
+  <p:clrMapOvr>
+    <a:masterClrMapping/>
+  </p:clrMapOvr>
+</p:sld>
+</file>
+
+<file path=ppt/slides/slide35.xml><?xml version="1.0" encoding="utf-8"?>
+<p:sld xmlns:a="http://schemas.openxmlformats.org/drawingml/2006/main" xmlns:r="http://schemas.openxmlformats.org/officeDocument/2006/relationships" xmlns:p="http://schemas.openxmlformats.org/presentationml/2006/main">
+  <p:cSld>
+    <p:spTree>
+      <p:nvGrpSpPr>
+        <p:cNvPr id="1" name=""/>
+        <p:cNvGrpSpPr/>
+        <p:nvPr/>
+      </p:nvGrpSpPr>
+      <p:grpSpPr>
+        <a:xfrm>
+          <a:off x="0" y="0"/>
+          <a:ext cx="0" cy="0"/>
+          <a:chOff x="0" y="0"/>
+          <a:chExt cx="0" cy="0"/>
+        </a:xfrm>
+      </p:grpSpPr>
+      <p:sp>
+        <p:nvSpPr>
+          <p:cNvPr id="2" name="Title 1">
+            <a:extLst>
+              <a:ext uri="{FF2B5EF4-FFF2-40B4-BE49-F238E27FC236}">
+                <a16:creationId xmlns:a16="http://schemas.microsoft.com/office/drawing/2014/main" id="{DE09512C-3DC6-412E-A8FD-55E75C305BB0}"/>
+              </a:ext>
+            </a:extLst>
+          </p:cNvPr>
+          <p:cNvSpPr>
+            <a:spLocks noGrp="1"/>
+          </p:cNvSpPr>
+          <p:nvPr>
+            <p:ph type="title"/>
+          </p:nvPr>
+        </p:nvSpPr>
+        <p:spPr/>
+        <p:txBody>
+          <a:bodyPr/>
+          <a:lstStyle/>
+          <a:p>
+            <a:r>
+              <a:rPr lang="en-US" dirty="0"/>
+              <a:t>Search Techniques: Mixture vs. Joint, Encouraging Convergence</a:t>
+            </a:r>
+          </a:p>
+        </p:txBody>
+      </p:sp>
+      <p:sp>
+        <p:nvSpPr>
+          <p:cNvPr id="3" name="Content Placeholder 2">
+            <a:extLst>
+              <a:ext uri="{FF2B5EF4-FFF2-40B4-BE49-F238E27FC236}">
+                <a16:creationId xmlns:a16="http://schemas.microsoft.com/office/drawing/2014/main" id="{4A1D567F-00BD-4EC4-9986-876A5016D9B8}"/>
+              </a:ext>
+            </a:extLst>
+          </p:cNvPr>
+          <p:cNvSpPr>
+            <a:spLocks noGrp="1"/>
+          </p:cNvSpPr>
+          <p:nvPr>
+            <p:ph idx="1"/>
+          </p:nvPr>
+        </p:nvSpPr>
+        <p:spPr/>
+        <p:txBody>
+          <a:bodyPr/>
+          <a:lstStyle/>
+          <a:p>
+            <a:r>
+              <a:rPr lang="en-US" dirty="0"/>
+              <a:t>Mixture mode: only learn </a:t>
+            </a:r>
+            <a:r>
+              <a:rPr lang="en-US" dirty="0">
+                <a:latin typeface="Times New Roman" panose="02020603050405020304" pitchFamily="18" charset="0"/>
+                <a:cs typeface="Times New Roman" panose="02020603050405020304" pitchFamily="18" charset="0"/>
+              </a:rPr>
+              <a:t>N</a:t>
+            </a:r>
+            <a:r>
+              <a:rPr lang="en-US" baseline="-25000" dirty="0">
+                <a:latin typeface="Times New Roman" panose="02020603050405020304" pitchFamily="18" charset="0"/>
+                <a:cs typeface="Times New Roman" panose="02020603050405020304" pitchFamily="18" charset="0"/>
+              </a:rPr>
+              <a:t>h</a:t>
+            </a:r>
+            <a:r>
+              <a:rPr lang="en-US" dirty="0">
+                <a:latin typeface="Times New Roman" panose="02020603050405020304" pitchFamily="18" charset="0"/>
+                <a:cs typeface="Times New Roman" panose="02020603050405020304" pitchFamily="18" charset="0"/>
+              </a:rPr>
+              <a:t>, R, τ; orbital elements frozen</a:t>
+            </a:r>
+          </a:p>
+          <a:p>
+            <a:r>
+              <a:rPr lang="en-US" dirty="0">
+                <a:latin typeface="Times New Roman" panose="02020603050405020304" pitchFamily="18" charset="0"/>
+                <a:cs typeface="Times New Roman" panose="02020603050405020304" pitchFamily="18" charset="0"/>
+              </a:rPr>
+              <a:t>Joint mode: learn all parameters jointly</a:t>
+            </a:r>
+          </a:p>
+          <a:p>
+            <a:pPr lvl="1"/>
+            <a:r>
+              <a:rPr lang="en-US" dirty="0"/>
+              <a:t>Higher learning rate 2</a:t>
+            </a:r>
+            <a:r>
+              <a:rPr lang="en-US" baseline="30000" dirty="0"/>
+              <a:t>-12</a:t>
+            </a:r>
+            <a:r>
+              <a:rPr lang="en-US" dirty="0"/>
+              <a:t> in mixture mode vs. 2</a:t>
+            </a:r>
+            <a:r>
+              <a:rPr lang="en-US" baseline="30000" dirty="0"/>
+              <a:t>-16</a:t>
+            </a:r>
+            <a:r>
+              <a:rPr lang="en-US" dirty="0"/>
+              <a:t> in joint mode</a:t>
+            </a:r>
+          </a:p>
+          <a:p>
+            <a:r>
+              <a:rPr lang="en-US" dirty="0"/>
+              <a:t>Modified objective function in mixture mode</a:t>
+            </a:r>
+          </a:p>
+          <a:p>
+            <a:endParaRPr lang="en-US" dirty="0"/>
+          </a:p>
+          <a:p>
+            <a:endParaRPr lang="en-US" dirty="0"/>
+          </a:p>
+          <a:p>
+            <a:r>
+              <a:rPr lang="en-US" dirty="0"/>
+              <a:t>Theoretical motivation: likelihood would always look better with a larger </a:t>
+            </a:r>
+            <a:r>
+              <a:rPr lang="en-US" dirty="0">
+                <a:latin typeface="Times New Roman" panose="02020603050405020304" pitchFamily="18" charset="0"/>
+                <a:cs typeface="Times New Roman" panose="02020603050405020304" pitchFamily="18" charset="0"/>
+              </a:rPr>
+              <a:t>τ; this encourages the model to converge</a:t>
+            </a:r>
+          </a:p>
+          <a:p>
+            <a:r>
+              <a:rPr lang="en-US" dirty="0">
+                <a:latin typeface="Times New Roman" panose="02020603050405020304" pitchFamily="18" charset="0"/>
+                <a:cs typeface="Times New Roman" panose="02020603050405020304" pitchFamily="18" charset="0"/>
+              </a:rPr>
+              <a:t>Like adjusting score for degree of difficulty in diving and gymnastics</a:t>
+            </a:r>
+            <a:endParaRPr lang="en-US" dirty="0"/>
+          </a:p>
+          <a:p>
+            <a:endParaRPr lang="en-US" dirty="0"/>
+          </a:p>
+        </p:txBody>
+      </p:sp>
+      <p:pic>
+        <p:nvPicPr>
+          <p:cNvPr id="7" name="Picture 6">
+            <a:extLst>
+              <a:ext uri="{FF2B5EF4-FFF2-40B4-BE49-F238E27FC236}">
+                <a16:creationId xmlns:a16="http://schemas.microsoft.com/office/drawing/2014/main" id="{EC8ECD4C-A9E9-4400-B6E0-7A7C0738B553}"/>
+              </a:ext>
+            </a:extLst>
+          </p:cNvPr>
+          <p:cNvPicPr>
+            <a:picLocks noChangeAspect="1"/>
+          </p:cNvPicPr>
+          <p:nvPr>
+            <p:custDataLst>
+              <p:tags r:id="rId1"/>
+            </p:custDataLst>
+          </p:nvPr>
+        </p:nvPicPr>
+        <p:blipFill>
+          <a:blip r:embed="rId3">
+            <a:extLst>
+              <a:ext uri="{28A0092B-C50C-407E-A947-70E740481C1C}">
+                <a14:useLocalDpi xmlns:a14="http://schemas.microsoft.com/office/drawing/2010/main" val="0"/>
+              </a:ext>
+            </a:extLst>
+          </a:blip>
+          <a:stretch>
+            <a:fillRect/>
+          </a:stretch>
+        </p:blipFill>
+        <p:spPr>
+          <a:xfrm>
+            <a:off x="3500218" y="3697117"/>
+            <a:ext cx="2829756" cy="954427"/>
+          </a:xfrm>
+          <a:prstGeom prst="rect">
+            <a:avLst/>
+          </a:prstGeom>
+        </p:spPr>
+      </p:pic>
+    </p:spTree>
+    <p:extLst>
+      <p:ext uri="{BB962C8B-B14F-4D97-AF65-F5344CB8AC3E}">
+        <p14:creationId xmlns:p14="http://schemas.microsoft.com/office/powerpoint/2010/main" val="2420119647"/>
+      </p:ext>
+    </p:extLst>
+  </p:cSld>
+  <p:clrMapOvr>
+    <a:masterClrMapping/>
+  </p:clrMapOvr>
+</p:sld>
+</file>
+
+<file path=ppt/slides/slide36.xml><?xml version="1.0" encoding="utf-8"?>
+<p:sld xmlns:a="http://schemas.openxmlformats.org/drawingml/2006/main" xmlns:r="http://schemas.openxmlformats.org/officeDocument/2006/relationships" xmlns:p="http://schemas.openxmlformats.org/presentationml/2006/main">
+  <p:cSld>
+    <p:spTree>
+      <p:nvGrpSpPr>
+        <p:cNvPr id="1" name=""/>
+        <p:cNvGrpSpPr/>
+        <p:nvPr/>
+      </p:nvGrpSpPr>
+      <p:grpSpPr>
+        <a:xfrm>
+          <a:off x="0" y="0"/>
+          <a:ext cx="0" cy="0"/>
+          <a:chOff x="0" y="0"/>
+          <a:chExt cx="0" cy="0"/>
+        </a:xfrm>
+      </p:grpSpPr>
+      <p:sp>
+        <p:nvSpPr>
+          <p:cNvPr id="2" name="Title 1">
+            <a:extLst>
+              <a:ext uri="{FF2B5EF4-FFF2-40B4-BE49-F238E27FC236}">
+                <a16:creationId xmlns:a16="http://schemas.microsoft.com/office/drawing/2014/main" id="{6A94D88C-A974-4E67-89D9-53DEAA96FC71}"/>
+              </a:ext>
+            </a:extLst>
+          </p:cNvPr>
+          <p:cNvSpPr>
+            <a:spLocks noGrp="1"/>
+          </p:cNvSpPr>
+          <p:nvPr>
+            <p:ph type="title"/>
+          </p:nvPr>
+        </p:nvSpPr>
+        <p:spPr/>
+        <p:txBody>
+          <a:bodyPr>
+            <a:normAutofit/>
+          </a:bodyPr>
+          <a:lstStyle/>
+          <a:p>
+            <a:r>
+              <a:rPr lang="en-US" sz="5600" dirty="0"/>
+              <a:t>Asteroid Search Results</a:t>
+            </a:r>
+          </a:p>
+        </p:txBody>
+      </p:sp>
+      <p:sp>
+        <p:nvSpPr>
+          <p:cNvPr id="3" name="Text Placeholder 2">
+            <a:extLst>
+              <a:ext uri="{FF2B5EF4-FFF2-40B4-BE49-F238E27FC236}">
+                <a16:creationId xmlns:a16="http://schemas.microsoft.com/office/drawing/2014/main" id="{5C8581F0-497B-4867-9CB1-3D6A5C04EF6A}"/>
+              </a:ext>
+            </a:extLst>
+          </p:cNvPr>
+          <p:cNvSpPr>
+            <a:spLocks noGrp="1"/>
+          </p:cNvSpPr>
+          <p:nvPr>
+            <p:ph type="body" idx="1"/>
+          </p:nvPr>
+        </p:nvSpPr>
+        <p:spPr/>
+        <p:txBody>
+          <a:bodyPr/>
+          <a:lstStyle/>
+          <a:p>
             <a:endParaRPr lang="en-US"/>
+          </a:p>
+        </p:txBody>
+      </p:sp>
+    </p:spTree>
+    <p:extLst>
+      <p:ext uri="{BB962C8B-B14F-4D97-AF65-F5344CB8AC3E}">
+        <p14:creationId xmlns:p14="http://schemas.microsoft.com/office/powerpoint/2010/main" val="1163642287"/>
+      </p:ext>
+    </p:extLst>
+  </p:cSld>
+  <p:clrMapOvr>
+    <a:masterClrMapping/>
+  </p:clrMapOvr>
+</p:sld>
+</file>
+
+<file path=ppt/slides/slide37.xml><?xml version="1.0" encoding="utf-8"?>
+<p:sld xmlns:a="http://schemas.openxmlformats.org/drawingml/2006/main" xmlns:r="http://schemas.openxmlformats.org/officeDocument/2006/relationships" xmlns:p="http://schemas.openxmlformats.org/presentationml/2006/main">
+  <p:cSld>
+    <p:spTree>
+      <p:nvGrpSpPr>
+        <p:cNvPr id="1" name=""/>
+        <p:cNvGrpSpPr/>
+        <p:nvPr/>
+      </p:nvGrpSpPr>
+      <p:grpSpPr>
+        <a:xfrm>
+          <a:off x="0" y="0"/>
+          <a:ext cx="0" cy="0"/>
+          <a:chOff x="0" y="0"/>
+          <a:chExt cx="0" cy="0"/>
+        </a:xfrm>
+      </p:grpSpPr>
+      <p:sp>
+        <p:nvSpPr>
+          <p:cNvPr id="2" name="Title 1">
+            <a:extLst>
+              <a:ext uri="{FF2B5EF4-FFF2-40B4-BE49-F238E27FC236}">
+                <a16:creationId xmlns:a16="http://schemas.microsoft.com/office/drawing/2014/main" id="{3E26F76F-90C6-4718-820D-94CFA898DA3E}"/>
+              </a:ext>
+            </a:extLst>
+          </p:cNvPr>
+          <p:cNvSpPr>
+            <a:spLocks noGrp="1"/>
+          </p:cNvSpPr>
+          <p:nvPr>
+            <p:ph type="title"/>
+          </p:nvPr>
+        </p:nvSpPr>
+        <p:spPr/>
+        <p:txBody>
+          <a:bodyPr/>
+          <a:lstStyle/>
+          <a:p>
+            <a:r>
+              <a:rPr lang="en-US" dirty="0"/>
+              <a:t>Comparing Two Orbital Elements</a:t>
+            </a:r>
+          </a:p>
+        </p:txBody>
+      </p:sp>
+      <p:sp>
+        <p:nvSpPr>
+          <p:cNvPr id="3" name="Content Placeholder 2">
+            <a:extLst>
+              <a:ext uri="{FF2B5EF4-FFF2-40B4-BE49-F238E27FC236}">
+                <a16:creationId xmlns:a16="http://schemas.microsoft.com/office/drawing/2014/main" id="{D3D1E12F-B6D1-4F78-A0C2-2F18DF210B68}"/>
+              </a:ext>
+            </a:extLst>
+          </p:cNvPr>
+          <p:cNvSpPr>
+            <a:spLocks noGrp="1"/>
+          </p:cNvSpPr>
+          <p:nvPr>
+            <p:ph idx="1"/>
+          </p:nvPr>
+        </p:nvSpPr>
+        <p:spPr/>
+        <p:txBody>
+          <a:bodyPr/>
+          <a:lstStyle/>
+          <a:p>
+            <a:r>
+              <a:rPr lang="en-US" dirty="0"/>
+              <a:t>How far apart are two 6D orbital elements </a:t>
+            </a:r>
+            <a:r>
+              <a:rPr lang="el-GR" dirty="0">
+                <a:latin typeface="Times New Roman" panose="02020603050405020304" pitchFamily="18" charset="0"/>
+                <a:cs typeface="Times New Roman" panose="02020603050405020304" pitchFamily="18" charset="0"/>
+              </a:rPr>
+              <a:t>ε</a:t>
+            </a:r>
+            <a:r>
+              <a:rPr lang="en-US" baseline="-25000" dirty="0">
+                <a:latin typeface="Times New Roman" panose="02020603050405020304" pitchFamily="18" charset="0"/>
+                <a:cs typeface="Times New Roman" panose="02020603050405020304" pitchFamily="18" charset="0"/>
+              </a:rPr>
+              <a:t>1</a:t>
+            </a:r>
+            <a:r>
+              <a:rPr lang="en-US" dirty="0">
+                <a:latin typeface="Times New Roman" panose="02020603050405020304" pitchFamily="18" charset="0"/>
+                <a:cs typeface="Times New Roman" panose="02020603050405020304" pitchFamily="18" charset="0"/>
+              </a:rPr>
+              <a:t> and </a:t>
+            </a:r>
+            <a:r>
+              <a:rPr lang="el-GR" dirty="0">
+                <a:latin typeface="Times New Roman" panose="02020603050405020304" pitchFamily="18" charset="0"/>
+                <a:cs typeface="Times New Roman" panose="02020603050405020304" pitchFamily="18" charset="0"/>
+              </a:rPr>
+              <a:t>ε</a:t>
+            </a:r>
+            <a:r>
+              <a:rPr lang="en-US" baseline="-25000" dirty="0">
+                <a:latin typeface="Times New Roman" panose="02020603050405020304" pitchFamily="18" charset="0"/>
+                <a:cs typeface="Times New Roman" panose="02020603050405020304" pitchFamily="18" charset="0"/>
+              </a:rPr>
+              <a:t>2</a:t>
+            </a:r>
+            <a:r>
+              <a:rPr lang="en-US" dirty="0"/>
+              <a:t>?</a:t>
+            </a:r>
+          </a:p>
+          <a:p>
+            <a:r>
+              <a:rPr lang="en-US" dirty="0"/>
+              <a:t>A naïve Euclidean norm makes no sense at all</a:t>
+            </a:r>
+          </a:p>
+          <a:p>
+            <a:r>
+              <a:rPr lang="en-US" dirty="0"/>
+              <a:t>Idea 1: inject the elements into space at a set of times</a:t>
+            </a:r>
+          </a:p>
+          <a:p>
+            <a:pPr lvl="1"/>
+            <a:r>
+              <a:rPr lang="en-US" dirty="0"/>
+              <a:t>The distance between two elements is the mean distance in AU between the orbits they describe</a:t>
+            </a:r>
+          </a:p>
+          <a:p>
+            <a:pPr lvl="1"/>
+            <a:r>
+              <a:rPr lang="en-US" dirty="0"/>
+              <a:t>Set 240 sample time points at monthly intervals from 2010 to 2030</a:t>
+            </a:r>
+          </a:p>
+          <a:p>
+            <a:r>
+              <a:rPr lang="en-US" dirty="0"/>
+              <a:t>Idea 2: transform elements into low dimensional Cartesian space</a:t>
+            </a:r>
+          </a:p>
+          <a:p>
+            <a:pPr lvl="1"/>
+            <a:r>
+              <a:rPr lang="en-US" dirty="0"/>
+              <a:t>Try to make each component approximately normal</a:t>
+            </a:r>
+          </a:p>
+          <a:p>
+            <a:pPr lvl="1"/>
+            <a:r>
+              <a:rPr lang="en-US" dirty="0"/>
+              <a:t>Try to make joint approximately multivariate normal</a:t>
+            </a:r>
+          </a:p>
+          <a:p>
+            <a:pPr lvl="1"/>
+            <a:r>
+              <a:rPr lang="en-US" dirty="0"/>
+              <a:t>Use the </a:t>
+            </a:r>
+            <a:r>
+              <a:rPr lang="en-US" dirty="0" err="1"/>
+              <a:t>Mahalanobis</a:t>
+            </a:r>
+            <a:r>
+              <a:rPr lang="en-US" dirty="0"/>
+              <a:t> distance on these transformed elements</a:t>
+            </a:r>
           </a:p>
         </p:txBody>
       </p:sp>
@@ -8061,6 +10100,919 @@
     <p:extLst>
       <p:ext uri="{BB962C8B-B14F-4D97-AF65-F5344CB8AC3E}">
         <p14:creationId xmlns:p14="http://schemas.microsoft.com/office/powerpoint/2010/main" val="3305066290"/>
+      </p:ext>
+    </p:extLst>
+  </p:cSld>
+  <p:clrMapOvr>
+    <a:masterClrMapping/>
+  </p:clrMapOvr>
+</p:sld>
+</file>
+
+<file path=ppt/slides/slide38.xml><?xml version="1.0" encoding="utf-8"?>
+<p:sld xmlns:a="http://schemas.openxmlformats.org/drawingml/2006/main" xmlns:r="http://schemas.openxmlformats.org/officeDocument/2006/relationships" xmlns:p="http://schemas.openxmlformats.org/presentationml/2006/main">
+  <p:cSld>
+    <p:spTree>
+      <p:nvGrpSpPr>
+        <p:cNvPr id="1" name=""/>
+        <p:cNvGrpSpPr/>
+        <p:nvPr/>
+      </p:nvGrpSpPr>
+      <p:grpSpPr>
+        <a:xfrm>
+          <a:off x="0" y="0"/>
+          <a:ext cx="0" cy="0"/>
+          <a:chOff x="0" y="0"/>
+          <a:chExt cx="0" cy="0"/>
+        </a:xfrm>
+      </p:grpSpPr>
+      <p:sp>
+        <p:nvSpPr>
+          <p:cNvPr id="2" name="Title 1">
+            <a:extLst>
+              <a:ext uri="{FF2B5EF4-FFF2-40B4-BE49-F238E27FC236}">
+                <a16:creationId xmlns:a16="http://schemas.microsoft.com/office/drawing/2014/main" id="{F8B21B8A-B36B-44EC-A0B6-FDF7948624A2}"/>
+              </a:ext>
+            </a:extLst>
+          </p:cNvPr>
+          <p:cNvSpPr>
+            <a:spLocks noGrp="1"/>
+          </p:cNvSpPr>
+          <p:nvPr>
+            <p:ph type="title"/>
+          </p:nvPr>
+        </p:nvSpPr>
+        <p:spPr/>
+        <p:txBody>
+          <a:bodyPr/>
+          <a:lstStyle/>
+          <a:p>
+            <a:r>
+              <a:rPr lang="en-US" dirty="0"/>
+              <a:t>Transforming Elements for Covariance Norm</a:t>
+            </a:r>
+          </a:p>
+        </p:txBody>
+      </p:sp>
+      <p:pic>
+        <p:nvPicPr>
+          <p:cNvPr id="5" name="Content Placeholder 4" descr="A screenshot of a cell phone&#10;&#10;Description automatically generated">
+            <a:extLst>
+              <a:ext uri="{FF2B5EF4-FFF2-40B4-BE49-F238E27FC236}">
+                <a16:creationId xmlns:a16="http://schemas.microsoft.com/office/drawing/2014/main" id="{759C1214-6044-4D6B-A98D-57DFA04B19BF}"/>
+              </a:ext>
+            </a:extLst>
+          </p:cNvPr>
+          <p:cNvPicPr>
+            <a:picLocks noGrp="1" noChangeAspect="1"/>
+          </p:cNvPicPr>
+          <p:nvPr>
+            <p:ph idx="1"/>
+          </p:nvPr>
+        </p:nvPicPr>
+        <p:blipFill>
+          <a:blip r:embed="rId4">
+            <a:extLst>
+              <a:ext uri="{28A0092B-C50C-407E-A947-70E740481C1C}">
+                <a14:useLocalDpi xmlns:a14="http://schemas.microsoft.com/office/drawing/2010/main" val="0"/>
+              </a:ext>
+            </a:extLst>
+          </a:blip>
+          <a:stretch>
+            <a:fillRect/>
+          </a:stretch>
+        </p:blipFill>
+        <p:spPr>
+          <a:xfrm>
+            <a:off x="448384" y="1458232"/>
+            <a:ext cx="3942358" cy="2542268"/>
+          </a:xfrm>
+        </p:spPr>
+      </p:pic>
+      <p:pic>
+        <p:nvPicPr>
+          <p:cNvPr id="7" name="Picture 6" descr="A screenshot of a cell phone&#10;&#10;Description automatically generated">
+            <a:extLst>
+              <a:ext uri="{FF2B5EF4-FFF2-40B4-BE49-F238E27FC236}">
+                <a16:creationId xmlns:a16="http://schemas.microsoft.com/office/drawing/2014/main" id="{4EBD3F9D-9055-48C4-A72D-877703AF9DC4}"/>
+              </a:ext>
+            </a:extLst>
+          </p:cNvPr>
+          <p:cNvPicPr>
+            <a:picLocks noChangeAspect="1"/>
+          </p:cNvPicPr>
+          <p:nvPr/>
+        </p:nvPicPr>
+        <p:blipFill>
+          <a:blip r:embed="rId5">
+            <a:extLst>
+              <a:ext uri="{28A0092B-C50C-407E-A947-70E740481C1C}">
+                <a14:useLocalDpi xmlns:a14="http://schemas.microsoft.com/office/drawing/2010/main" val="0"/>
+              </a:ext>
+            </a:extLst>
+          </a:blip>
+          <a:stretch>
+            <a:fillRect/>
+          </a:stretch>
+        </p:blipFill>
+        <p:spPr>
+          <a:xfrm>
+            <a:off x="4517809" y="1458232"/>
+            <a:ext cx="4057710" cy="2616654"/>
+          </a:xfrm>
+          <a:prstGeom prst="rect">
+            <a:avLst/>
+          </a:prstGeom>
+        </p:spPr>
+      </p:pic>
+      <p:pic>
+        <p:nvPicPr>
+          <p:cNvPr id="9" name="Picture 8" descr="A close up of a map&#10;&#10;Description automatically generated">
+            <a:extLst>
+              <a:ext uri="{FF2B5EF4-FFF2-40B4-BE49-F238E27FC236}">
+                <a16:creationId xmlns:a16="http://schemas.microsoft.com/office/drawing/2014/main" id="{3548114B-CED1-408E-B4E9-08D62BBA9909}"/>
+              </a:ext>
+            </a:extLst>
+          </p:cNvPr>
+          <p:cNvPicPr>
+            <a:picLocks noChangeAspect="1"/>
+          </p:cNvPicPr>
+          <p:nvPr/>
+        </p:nvPicPr>
+        <p:blipFill>
+          <a:blip r:embed="rId6">
+            <a:extLst>
+              <a:ext uri="{28A0092B-C50C-407E-A947-70E740481C1C}">
+                <a14:useLocalDpi xmlns:a14="http://schemas.microsoft.com/office/drawing/2010/main" val="0"/>
+              </a:ext>
+            </a:extLst>
+          </a:blip>
+          <a:stretch>
+            <a:fillRect/>
+          </a:stretch>
+        </p:blipFill>
+        <p:spPr>
+          <a:xfrm>
+            <a:off x="412864" y="4074886"/>
+            <a:ext cx="4013398" cy="2588079"/>
+          </a:xfrm>
+          <a:prstGeom prst="rect">
+            <a:avLst/>
+          </a:prstGeom>
+        </p:spPr>
+      </p:pic>
+      <p:pic>
+        <p:nvPicPr>
+          <p:cNvPr id="11" name="Picture 10" descr="A close up of a mans face&#10;&#10;Description automatically generated">
+            <a:extLst>
+              <a:ext uri="{FF2B5EF4-FFF2-40B4-BE49-F238E27FC236}">
+                <a16:creationId xmlns:a16="http://schemas.microsoft.com/office/drawing/2014/main" id="{120C2A7C-0A09-4B03-856E-7B91C54BB70B}"/>
+              </a:ext>
+            </a:extLst>
+          </p:cNvPr>
+          <p:cNvPicPr>
+            <a:picLocks noChangeAspect="1"/>
+          </p:cNvPicPr>
+          <p:nvPr/>
+        </p:nvPicPr>
+        <p:blipFill>
+          <a:blip r:embed="rId7">
+            <a:extLst>
+              <a:ext uri="{28A0092B-C50C-407E-A947-70E740481C1C}">
+                <a14:useLocalDpi xmlns:a14="http://schemas.microsoft.com/office/drawing/2010/main" val="0"/>
+              </a:ext>
+            </a:extLst>
+          </a:blip>
+          <a:stretch>
+            <a:fillRect/>
+          </a:stretch>
+        </p:blipFill>
+        <p:spPr>
+          <a:xfrm>
+            <a:off x="4517809" y="4091441"/>
+            <a:ext cx="4057710" cy="2616654"/>
+          </a:xfrm>
+          <a:prstGeom prst="rect">
+            <a:avLst/>
+          </a:prstGeom>
+        </p:spPr>
+      </p:pic>
+      <p:sp>
+        <p:nvSpPr>
+          <p:cNvPr id="12" name="TextBox 11">
+            <a:extLst>
+              <a:ext uri="{FF2B5EF4-FFF2-40B4-BE49-F238E27FC236}">
+                <a16:creationId xmlns:a16="http://schemas.microsoft.com/office/drawing/2014/main" id="{FDC0754B-8439-4BCF-8B9A-AA22427D603A}"/>
+              </a:ext>
+            </a:extLst>
+          </p:cNvPr>
+          <p:cNvSpPr txBox="1"/>
+          <p:nvPr/>
+        </p:nvSpPr>
+        <p:spPr>
+          <a:xfrm>
+            <a:off x="8702586" y="1458232"/>
+            <a:ext cx="3270339" cy="4801314"/>
+          </a:xfrm>
+          <a:prstGeom prst="rect">
+            <a:avLst/>
+          </a:prstGeom>
+          <a:noFill/>
+        </p:spPr>
+        <p:txBody>
+          <a:bodyPr wrap="square" rtlCol="0">
+            <a:spAutoFit/>
+          </a:bodyPr>
+          <a:lstStyle/>
+          <a:p>
+            <a:pPr marL="285750" indent="-285750">
+              <a:buFont typeface="Arial" panose="020B0604020202020204" pitchFamily="34" charset="0"/>
+              <a:buChar char="•"/>
+            </a:pPr>
+            <a:r>
+              <a:rPr lang="en-US" dirty="0"/>
+              <a:t>Standardize log(</a:t>
+            </a:r>
+            <a:r>
+              <a:rPr lang="en-US" i="1" dirty="0"/>
+              <a:t>a</a:t>
+            </a:r>
+            <a:r>
+              <a:rPr lang="en-US" dirty="0"/>
+              <a:t>)</a:t>
+            </a:r>
+          </a:p>
+          <a:p>
+            <a:pPr marL="285750" indent="-285750">
+              <a:buFont typeface="Arial" panose="020B0604020202020204" pitchFamily="34" charset="0"/>
+              <a:buChar char="•"/>
+            </a:pPr>
+            <a:r>
+              <a:rPr lang="en-US" dirty="0"/>
+              <a:t>Standardize </a:t>
+            </a:r>
+            <a:r>
+              <a:rPr lang="en-US" i="1" dirty="0"/>
+              <a:t>e</a:t>
+            </a:r>
+          </a:p>
+          <a:p>
+            <a:pPr marL="285750" indent="-285750">
+              <a:buFont typeface="Arial" panose="020B0604020202020204" pitchFamily="34" charset="0"/>
+              <a:buChar char="•"/>
+            </a:pPr>
+            <a:r>
+              <a:rPr lang="en-US" dirty="0"/>
+              <a:t>Standardize sin(</a:t>
+            </a:r>
+            <a:r>
+              <a:rPr lang="en-US" i="1" dirty="0" err="1"/>
+              <a:t>i</a:t>
+            </a:r>
+            <a:r>
+              <a:rPr lang="en-US" dirty="0"/>
+              <a:t>)</a:t>
+            </a:r>
+          </a:p>
+          <a:p>
+            <a:pPr marL="285750" indent="-285750">
+              <a:buFont typeface="Arial" panose="020B0604020202020204" pitchFamily="34" charset="0"/>
+              <a:buChar char="•"/>
+            </a:pPr>
+            <a:r>
+              <a:rPr lang="en-US" dirty="0"/>
+              <a:t>Same transformation for sin and cos of </a:t>
+            </a:r>
+            <a:r>
+              <a:rPr lang="el-GR" dirty="0">
+                <a:latin typeface="Times New Roman" panose="02020603050405020304" pitchFamily="18" charset="0"/>
+                <a:cs typeface="Times New Roman" panose="02020603050405020304" pitchFamily="18" charset="0"/>
+              </a:rPr>
+              <a:t>Ω</a:t>
+            </a:r>
+            <a:r>
+              <a:rPr lang="en-US" dirty="0">
+                <a:latin typeface="Times New Roman" panose="02020603050405020304" pitchFamily="18" charset="0"/>
+                <a:cs typeface="Times New Roman" panose="02020603050405020304" pitchFamily="18" charset="0"/>
+              </a:rPr>
+              <a:t>, </a:t>
+            </a:r>
+            <a:r>
+              <a:rPr lang="el-GR" dirty="0">
+                <a:latin typeface="Times New Roman" panose="02020603050405020304" pitchFamily="18" charset="0"/>
+                <a:cs typeface="Times New Roman" panose="02020603050405020304" pitchFamily="18" charset="0"/>
+              </a:rPr>
+              <a:t>ω</a:t>
+            </a:r>
+            <a:r>
+              <a:rPr lang="en-US" dirty="0">
+                <a:latin typeface="Times New Roman" panose="02020603050405020304" pitchFamily="18" charset="0"/>
+                <a:cs typeface="Times New Roman" panose="02020603050405020304" pitchFamily="18" charset="0"/>
+              </a:rPr>
+              <a:t>, </a:t>
+            </a:r>
+            <a:r>
+              <a:rPr lang="en-US" i="1" dirty="0">
+                <a:latin typeface="Times New Roman" panose="02020603050405020304" pitchFamily="18" charset="0"/>
+                <a:cs typeface="Times New Roman" panose="02020603050405020304" pitchFamily="18" charset="0"/>
+              </a:rPr>
+              <a:t>f</a:t>
+            </a:r>
+          </a:p>
+          <a:p>
+            <a:pPr marL="285750" indent="-285750">
+              <a:buFont typeface="Arial" panose="020B0604020202020204" pitchFamily="34" charset="0"/>
+              <a:buChar char="•"/>
+            </a:pPr>
+            <a:endParaRPr lang="en-US" i="1" dirty="0">
+              <a:latin typeface="Times New Roman" panose="02020603050405020304" pitchFamily="18" charset="0"/>
+              <a:cs typeface="Times New Roman" panose="02020603050405020304" pitchFamily="18" charset="0"/>
+            </a:endParaRPr>
+          </a:p>
+          <a:p>
+            <a:pPr marL="285750" indent="-285750">
+              <a:buFont typeface="Arial" panose="020B0604020202020204" pitchFamily="34" charset="0"/>
+              <a:buChar char="•"/>
+            </a:pPr>
+            <a:endParaRPr lang="en-US" i="1" dirty="0">
+              <a:latin typeface="Times New Roman" panose="02020603050405020304" pitchFamily="18" charset="0"/>
+              <a:cs typeface="Times New Roman" panose="02020603050405020304" pitchFamily="18" charset="0"/>
+            </a:endParaRPr>
+          </a:p>
+          <a:p>
+            <a:pPr marL="285750" indent="-285750">
+              <a:buFont typeface="Arial" panose="020B0604020202020204" pitchFamily="34" charset="0"/>
+              <a:buChar char="•"/>
+            </a:pPr>
+            <a:endParaRPr lang="en-US" i="1" dirty="0">
+              <a:latin typeface="Times New Roman" panose="02020603050405020304" pitchFamily="18" charset="0"/>
+              <a:cs typeface="Times New Roman" panose="02020603050405020304" pitchFamily="18" charset="0"/>
+            </a:endParaRPr>
+          </a:p>
+          <a:p>
+            <a:pPr marL="285750" indent="-285750">
+              <a:buFont typeface="Arial" panose="020B0604020202020204" pitchFamily="34" charset="0"/>
+              <a:buChar char="•"/>
+            </a:pPr>
+            <a:r>
+              <a:rPr lang="en-US" dirty="0">
+                <a:latin typeface="Times New Roman" panose="02020603050405020304" pitchFamily="18" charset="0"/>
+                <a:cs typeface="Times New Roman" panose="02020603050405020304" pitchFamily="18" charset="0"/>
+              </a:rPr>
+              <a:t>This injects elements into R</a:t>
+            </a:r>
+            <a:r>
+              <a:rPr lang="en-US" baseline="30000" dirty="0">
+                <a:latin typeface="Times New Roman" panose="02020603050405020304" pitchFamily="18" charset="0"/>
+                <a:cs typeface="Times New Roman" panose="02020603050405020304" pitchFamily="18" charset="0"/>
+              </a:rPr>
+              <a:t>9</a:t>
+            </a:r>
+          </a:p>
+          <a:p>
+            <a:pPr marL="285750" indent="-285750">
+              <a:buFont typeface="Arial" panose="020B0604020202020204" pitchFamily="34" charset="0"/>
+              <a:buChar char="•"/>
+            </a:pPr>
+            <a:r>
+              <a:rPr lang="en-US" dirty="0"/>
+              <a:t>Apply importance weights</a:t>
+            </a:r>
+          </a:p>
+          <a:p>
+            <a:pPr marL="742950" lvl="1" indent="-285750">
+              <a:buFont typeface="Arial" panose="020B0604020202020204" pitchFamily="34" charset="0"/>
+              <a:buChar char="•"/>
+            </a:pPr>
+            <a:r>
+              <a:rPr lang="en-US" dirty="0"/>
+              <a:t>1.0 for </a:t>
+            </a:r>
+            <a:r>
+              <a:rPr lang="en-US" i="1" dirty="0"/>
+              <a:t>a</a:t>
+            </a:r>
+            <a:r>
+              <a:rPr lang="en-US" dirty="0"/>
+              <a:t>, </a:t>
+            </a:r>
+            <a:r>
+              <a:rPr lang="en-US" i="1" dirty="0"/>
+              <a:t>e</a:t>
+            </a:r>
+          </a:p>
+          <a:p>
+            <a:pPr marL="742950" lvl="1" indent="-285750">
+              <a:buFont typeface="Arial" panose="020B0604020202020204" pitchFamily="34" charset="0"/>
+              <a:buChar char="•"/>
+            </a:pPr>
+            <a:r>
+              <a:rPr lang="en-US" dirty="0"/>
+              <a:t>0.5 for </a:t>
+            </a:r>
+            <a:r>
+              <a:rPr lang="en-US" i="1" dirty="0" err="1"/>
+              <a:t>i</a:t>
+            </a:r>
+            <a:endParaRPr lang="en-US" i="1" dirty="0"/>
+          </a:p>
+          <a:p>
+            <a:pPr marL="742950" lvl="1" indent="-285750">
+              <a:buFont typeface="Arial" panose="020B0604020202020204" pitchFamily="34" charset="0"/>
+              <a:buChar char="•"/>
+            </a:pPr>
+            <a:r>
+              <a:rPr lang="en-US" dirty="0"/>
+              <a:t>0.1 for sin, cos of </a:t>
+            </a:r>
+            <a:r>
+              <a:rPr lang="el-GR" dirty="0">
+                <a:latin typeface="Times New Roman" panose="02020603050405020304" pitchFamily="18" charset="0"/>
+                <a:cs typeface="Times New Roman" panose="02020603050405020304" pitchFamily="18" charset="0"/>
+              </a:rPr>
+              <a:t>Ω</a:t>
+            </a:r>
+            <a:r>
+              <a:rPr lang="en-US" dirty="0">
+                <a:latin typeface="Times New Roman" panose="02020603050405020304" pitchFamily="18" charset="0"/>
+                <a:cs typeface="Times New Roman" panose="02020603050405020304" pitchFamily="18" charset="0"/>
+              </a:rPr>
+              <a:t>, </a:t>
+            </a:r>
+            <a:r>
+              <a:rPr lang="el-GR" dirty="0">
+                <a:latin typeface="Times New Roman" panose="02020603050405020304" pitchFamily="18" charset="0"/>
+                <a:cs typeface="Times New Roman" panose="02020603050405020304" pitchFamily="18" charset="0"/>
+              </a:rPr>
+              <a:t>ω</a:t>
+            </a:r>
+            <a:r>
+              <a:rPr lang="en-US" dirty="0">
+                <a:latin typeface="Times New Roman" panose="02020603050405020304" pitchFamily="18" charset="0"/>
+                <a:cs typeface="Times New Roman" panose="02020603050405020304" pitchFamily="18" charset="0"/>
+              </a:rPr>
+              <a:t>, </a:t>
+            </a:r>
+            <a:r>
+              <a:rPr lang="en-US" i="1" dirty="0">
+                <a:latin typeface="Times New Roman" panose="02020603050405020304" pitchFamily="18" charset="0"/>
+                <a:cs typeface="Times New Roman" panose="02020603050405020304" pitchFamily="18" charset="0"/>
+              </a:rPr>
+              <a:t>f</a:t>
+            </a:r>
+          </a:p>
+          <a:p>
+            <a:pPr marL="285750" indent="-285750">
+              <a:buFont typeface="Arial" panose="020B0604020202020204" pitchFamily="34" charset="0"/>
+              <a:buChar char="•"/>
+            </a:pPr>
+            <a:r>
+              <a:rPr lang="en-US" dirty="0">
+                <a:latin typeface="Times New Roman" panose="02020603050405020304" pitchFamily="18" charset="0"/>
+                <a:cs typeface="Times New Roman" panose="02020603050405020304" pitchFamily="18" charset="0"/>
+              </a:rPr>
+              <a:t>Use PCA to find </a:t>
+            </a:r>
+            <a:r>
+              <a:rPr lang="el-GR" dirty="0">
+                <a:latin typeface="Times New Roman" panose="02020603050405020304" pitchFamily="18" charset="0"/>
+                <a:cs typeface="Times New Roman" panose="02020603050405020304" pitchFamily="18" charset="0"/>
+              </a:rPr>
+              <a:t>β</a:t>
+            </a:r>
+            <a:r>
+              <a:rPr lang="en-US" dirty="0">
+                <a:latin typeface="Times New Roman" panose="02020603050405020304" pitchFamily="18" charset="0"/>
+                <a:cs typeface="Times New Roman" panose="02020603050405020304" pitchFamily="18" charset="0"/>
+              </a:rPr>
+              <a:t> such that X</a:t>
+            </a:r>
+            <a:r>
+              <a:rPr lang="el-GR" dirty="0">
+                <a:latin typeface="Times New Roman" panose="02020603050405020304" pitchFamily="18" charset="0"/>
+                <a:cs typeface="Times New Roman" panose="02020603050405020304" pitchFamily="18" charset="0"/>
+              </a:rPr>
+              <a:t> β</a:t>
+            </a:r>
+            <a:r>
+              <a:rPr lang="en-US" dirty="0">
+                <a:latin typeface="Times New Roman" panose="02020603050405020304" pitchFamily="18" charset="0"/>
+                <a:cs typeface="Times New Roman" panose="02020603050405020304" pitchFamily="18" charset="0"/>
+              </a:rPr>
+              <a:t> has covariance matrix I</a:t>
+            </a:r>
+            <a:r>
+              <a:rPr lang="en-US" baseline="-25000" dirty="0">
+                <a:latin typeface="Times New Roman" panose="02020603050405020304" pitchFamily="18" charset="0"/>
+                <a:cs typeface="Times New Roman" panose="02020603050405020304" pitchFamily="18" charset="0"/>
+              </a:rPr>
+              <a:t>9</a:t>
+            </a:r>
+          </a:p>
+          <a:p>
+            <a:pPr marL="285750" indent="-285750">
+              <a:buFont typeface="Arial" panose="020B0604020202020204" pitchFamily="34" charset="0"/>
+              <a:buChar char="•"/>
+            </a:pPr>
+            <a:endParaRPr lang="en-US" baseline="-25000" dirty="0">
+              <a:latin typeface="Times New Roman" panose="02020603050405020304" pitchFamily="18" charset="0"/>
+              <a:cs typeface="Times New Roman" panose="02020603050405020304" pitchFamily="18" charset="0"/>
+            </a:endParaRPr>
+          </a:p>
+          <a:p>
+            <a:pPr marL="285750" indent="-285750">
+              <a:buFont typeface="Arial" panose="020B0604020202020204" pitchFamily="34" charset="0"/>
+              <a:buChar char="•"/>
+            </a:pPr>
+            <a:endParaRPr lang="en-US" baseline="-25000" dirty="0">
+              <a:latin typeface="Times New Roman" panose="02020603050405020304" pitchFamily="18" charset="0"/>
+              <a:cs typeface="Times New Roman" panose="02020603050405020304" pitchFamily="18" charset="0"/>
+            </a:endParaRPr>
+          </a:p>
+          <a:p>
+            <a:pPr marL="285750" indent="-285750">
+              <a:buFont typeface="Arial" panose="020B0604020202020204" pitchFamily="34" charset="0"/>
+              <a:buChar char="•"/>
+            </a:pPr>
+            <a:endParaRPr lang="en-US" baseline="-25000" dirty="0">
+              <a:latin typeface="Times New Roman" panose="02020603050405020304" pitchFamily="18" charset="0"/>
+              <a:cs typeface="Times New Roman" panose="02020603050405020304" pitchFamily="18" charset="0"/>
+            </a:endParaRPr>
+          </a:p>
+        </p:txBody>
+      </p:sp>
+      <p:pic>
+        <p:nvPicPr>
+          <p:cNvPr id="14" name="Picture 13">
+            <a:extLst>
+              <a:ext uri="{FF2B5EF4-FFF2-40B4-BE49-F238E27FC236}">
+                <a16:creationId xmlns:a16="http://schemas.microsoft.com/office/drawing/2014/main" id="{CA60E53F-4845-4ECF-BC38-9EBD8A4C93B3}"/>
+              </a:ext>
+            </a:extLst>
+          </p:cNvPr>
+          <p:cNvPicPr>
+            <a:picLocks noChangeAspect="1"/>
+          </p:cNvPicPr>
+          <p:nvPr>
+            <p:custDataLst>
+              <p:tags r:id="rId1"/>
+            </p:custDataLst>
+          </p:nvPr>
+        </p:nvPicPr>
+        <p:blipFill>
+          <a:blip r:embed="rId8">
+            <a:extLst>
+              <a:ext uri="{28A0092B-C50C-407E-A947-70E740481C1C}">
+                <a14:useLocalDpi xmlns:a14="http://schemas.microsoft.com/office/drawing/2010/main" val="0"/>
+              </a:ext>
+            </a:extLst>
+          </a:blip>
+          <a:stretch>
+            <a:fillRect/>
+          </a:stretch>
+        </p:blipFill>
+        <p:spPr>
+          <a:xfrm>
+            <a:off x="9290957" y="2909526"/>
+            <a:ext cx="1853293" cy="760269"/>
+          </a:xfrm>
+          <a:prstGeom prst="rect">
+            <a:avLst/>
+          </a:prstGeom>
+        </p:spPr>
+      </p:pic>
+      <p:pic>
+        <p:nvPicPr>
+          <p:cNvPr id="17" name="Picture 16">
+            <a:extLst>
+              <a:ext uri="{FF2B5EF4-FFF2-40B4-BE49-F238E27FC236}">
+                <a16:creationId xmlns:a16="http://schemas.microsoft.com/office/drawing/2014/main" id="{BC3789EB-3A94-4A6C-8B01-4D6C7FA21794}"/>
+              </a:ext>
+            </a:extLst>
+          </p:cNvPr>
+          <p:cNvPicPr>
+            <a:picLocks noChangeAspect="1"/>
+          </p:cNvPicPr>
+          <p:nvPr>
+            <p:custDataLst>
+              <p:tags r:id="rId2"/>
+            </p:custDataLst>
+          </p:nvPr>
+        </p:nvPicPr>
+        <p:blipFill>
+          <a:blip r:embed="rId9">
+            <a:extLst>
+              <a:ext uri="{28A0092B-C50C-407E-A947-70E740481C1C}">
+                <a14:useLocalDpi xmlns:a14="http://schemas.microsoft.com/office/drawing/2010/main" val="0"/>
+              </a:ext>
+            </a:extLst>
+          </a:blip>
+          <a:stretch>
+            <a:fillRect/>
+          </a:stretch>
+        </p:blipFill>
+        <p:spPr>
+          <a:xfrm>
+            <a:off x="8879449" y="5714916"/>
+            <a:ext cx="3093476" cy="249095"/>
+          </a:xfrm>
+          <a:prstGeom prst="rect">
+            <a:avLst/>
+          </a:prstGeom>
+        </p:spPr>
+      </p:pic>
+    </p:spTree>
+    <p:extLst>
+      <p:ext uri="{BB962C8B-B14F-4D97-AF65-F5344CB8AC3E}">
+        <p14:creationId xmlns:p14="http://schemas.microsoft.com/office/powerpoint/2010/main" val="666566169"/>
+      </p:ext>
+    </p:extLst>
+  </p:cSld>
+  <p:clrMapOvr>
+    <a:masterClrMapping/>
+  </p:clrMapOvr>
+</p:sld>
+</file>
+
+<file path=ppt/slides/slide39.xml><?xml version="1.0" encoding="utf-8"?>
+<p:sld xmlns:a="http://schemas.openxmlformats.org/drawingml/2006/main" xmlns:r="http://schemas.openxmlformats.org/officeDocument/2006/relationships" xmlns:p="http://schemas.openxmlformats.org/presentationml/2006/main">
+  <p:cSld>
+    <p:spTree>
+      <p:nvGrpSpPr>
+        <p:cNvPr id="1" name=""/>
+        <p:cNvGrpSpPr/>
+        <p:nvPr/>
+      </p:nvGrpSpPr>
+      <p:grpSpPr>
+        <a:xfrm>
+          <a:off x="0" y="0"/>
+          <a:ext cx="0" cy="0"/>
+          <a:chOff x="0" y="0"/>
+          <a:chExt cx="0" cy="0"/>
+        </a:xfrm>
+      </p:grpSpPr>
+      <p:sp>
+        <p:nvSpPr>
+          <p:cNvPr id="2" name="Title 1">
+            <a:extLst>
+              <a:ext uri="{FF2B5EF4-FFF2-40B4-BE49-F238E27FC236}">
+                <a16:creationId xmlns:a16="http://schemas.microsoft.com/office/drawing/2014/main" id="{14C54F83-1489-4CFC-AE65-BCB7D7EA7C6B}"/>
+              </a:ext>
+            </a:extLst>
+          </p:cNvPr>
+          <p:cNvSpPr>
+            <a:spLocks noGrp="1"/>
+          </p:cNvSpPr>
+          <p:nvPr>
+            <p:ph type="title"/>
+          </p:nvPr>
+        </p:nvSpPr>
+        <p:spPr/>
+        <p:txBody>
+          <a:bodyPr>
+            <a:normAutofit/>
+          </a:bodyPr>
+          <a:lstStyle/>
+          <a:p>
+            <a:r>
+              <a:rPr lang="en-US" sz="3600" dirty="0"/>
+              <a:t>Train Known Asteroid Elements: Unperturbed</a:t>
+            </a:r>
+          </a:p>
+        </p:txBody>
+      </p:sp>
+      <p:pic>
+        <p:nvPicPr>
+          <p:cNvPr id="5" name="Content Placeholder 4">
+            <a:extLst>
+              <a:ext uri="{FF2B5EF4-FFF2-40B4-BE49-F238E27FC236}">
+                <a16:creationId xmlns:a16="http://schemas.microsoft.com/office/drawing/2014/main" id="{607D30C2-3627-433B-B9F8-865F106F6BE6}"/>
+              </a:ext>
+            </a:extLst>
+          </p:cNvPr>
+          <p:cNvPicPr>
+            <a:picLocks noGrp="1" noChangeAspect="1"/>
+          </p:cNvPicPr>
+          <p:nvPr>
+            <p:ph idx="1"/>
+          </p:nvPr>
+        </p:nvPicPr>
+        <p:blipFill>
+          <a:blip r:embed="rId2">
+            <a:extLst>
+              <a:ext uri="{28A0092B-C50C-407E-A947-70E740481C1C}">
+                <a14:useLocalDpi xmlns:a14="http://schemas.microsoft.com/office/drawing/2010/main" val="0"/>
+              </a:ext>
+            </a:extLst>
+          </a:blip>
+          <a:srcRect/>
+          <a:stretch/>
+        </p:blipFill>
+        <p:spPr>
+          <a:xfrm>
+            <a:off x="858464" y="1436914"/>
+            <a:ext cx="3902843" cy="2512734"/>
+          </a:xfrm>
+        </p:spPr>
+      </p:pic>
+      <p:pic>
+        <p:nvPicPr>
+          <p:cNvPr id="7" name="Picture 6">
+            <a:extLst>
+              <a:ext uri="{FF2B5EF4-FFF2-40B4-BE49-F238E27FC236}">
+                <a16:creationId xmlns:a16="http://schemas.microsoft.com/office/drawing/2014/main" id="{2602DB02-0CA2-4849-9269-F215A6374F52}"/>
+              </a:ext>
+            </a:extLst>
+          </p:cNvPr>
+          <p:cNvPicPr>
+            <a:picLocks noChangeAspect="1"/>
+          </p:cNvPicPr>
+          <p:nvPr/>
+        </p:nvPicPr>
+        <p:blipFill>
+          <a:blip r:embed="rId3">
+            <a:extLst>
+              <a:ext uri="{28A0092B-C50C-407E-A947-70E740481C1C}">
+                <a14:useLocalDpi xmlns:a14="http://schemas.microsoft.com/office/drawing/2010/main" val="0"/>
+              </a:ext>
+            </a:extLst>
+          </a:blip>
+          <a:srcRect/>
+          <a:stretch/>
+        </p:blipFill>
+        <p:spPr>
+          <a:xfrm>
+            <a:off x="4927894" y="1450016"/>
+            <a:ext cx="3960343" cy="2523548"/>
+          </a:xfrm>
+          <a:prstGeom prst="rect">
+            <a:avLst/>
+          </a:prstGeom>
+        </p:spPr>
+      </p:pic>
+      <p:pic>
+        <p:nvPicPr>
+          <p:cNvPr id="9" name="Picture 8">
+            <a:extLst>
+              <a:ext uri="{FF2B5EF4-FFF2-40B4-BE49-F238E27FC236}">
+                <a16:creationId xmlns:a16="http://schemas.microsoft.com/office/drawing/2014/main" id="{D1F7CDA0-467C-4FF4-A43C-5F5C89B0DA0C}"/>
+              </a:ext>
+            </a:extLst>
+          </p:cNvPr>
+          <p:cNvPicPr>
+            <a:picLocks noChangeAspect="1"/>
+          </p:cNvPicPr>
+          <p:nvPr/>
+        </p:nvPicPr>
+        <p:blipFill>
+          <a:blip r:embed="rId4">
+            <a:extLst>
+              <a:ext uri="{28A0092B-C50C-407E-A947-70E740481C1C}">
+                <a14:useLocalDpi xmlns:a14="http://schemas.microsoft.com/office/drawing/2010/main" val="0"/>
+              </a:ext>
+            </a:extLst>
+          </a:blip>
+          <a:srcRect/>
+          <a:stretch/>
+        </p:blipFill>
+        <p:spPr>
+          <a:xfrm>
+            <a:off x="880355" y="4122964"/>
+            <a:ext cx="3923107" cy="2512734"/>
+          </a:xfrm>
+          <a:prstGeom prst="rect">
+            <a:avLst/>
+          </a:prstGeom>
+        </p:spPr>
+      </p:pic>
+      <p:pic>
+        <p:nvPicPr>
+          <p:cNvPr id="11" name="Picture 10">
+            <a:extLst>
+              <a:ext uri="{FF2B5EF4-FFF2-40B4-BE49-F238E27FC236}">
+                <a16:creationId xmlns:a16="http://schemas.microsoft.com/office/drawing/2014/main" id="{1E75D57E-C5D3-4755-BD9C-CE1E2F5DB82D}"/>
+              </a:ext>
+            </a:extLst>
+          </p:cNvPr>
+          <p:cNvPicPr>
+            <a:picLocks noChangeAspect="1"/>
+          </p:cNvPicPr>
+          <p:nvPr/>
+        </p:nvPicPr>
+        <p:blipFill>
+          <a:blip r:embed="rId5">
+            <a:extLst>
+              <a:ext uri="{28A0092B-C50C-407E-A947-70E740481C1C}">
+                <a14:useLocalDpi xmlns:a14="http://schemas.microsoft.com/office/drawing/2010/main" val="0"/>
+              </a:ext>
+            </a:extLst>
+          </a:blip>
+          <a:srcRect/>
+          <a:stretch/>
+        </p:blipFill>
+        <p:spPr>
+          <a:xfrm>
+            <a:off x="4864232" y="4129454"/>
+            <a:ext cx="3943371" cy="2512733"/>
+          </a:xfrm>
+          <a:prstGeom prst="rect">
+            <a:avLst/>
+          </a:prstGeom>
+        </p:spPr>
+      </p:pic>
+      <p:sp>
+        <p:nvSpPr>
+          <p:cNvPr id="12" name="TextBox 11">
+            <a:extLst>
+              <a:ext uri="{FF2B5EF4-FFF2-40B4-BE49-F238E27FC236}">
+                <a16:creationId xmlns:a16="http://schemas.microsoft.com/office/drawing/2014/main" id="{848DF235-7E8A-4A09-92C7-2E061ADF1150}"/>
+              </a:ext>
+            </a:extLst>
+          </p:cNvPr>
+          <p:cNvSpPr txBox="1"/>
+          <p:nvPr/>
+        </p:nvSpPr>
+        <p:spPr>
+          <a:xfrm>
+            <a:off x="8948083" y="1477735"/>
+            <a:ext cx="3243917" cy="1815882"/>
+          </a:xfrm>
+          <a:prstGeom prst="rect">
+            <a:avLst/>
+          </a:prstGeom>
+          <a:noFill/>
+        </p:spPr>
+        <p:txBody>
+          <a:bodyPr wrap="square" rtlCol="0">
+            <a:spAutoFit/>
+          </a:bodyPr>
+          <a:lstStyle/>
+          <a:p>
+            <a:pPr marL="285750" indent="-285750">
+              <a:buFont typeface="Arial" panose="020B0604020202020204" pitchFamily="34" charset="0"/>
+              <a:buChar char="•"/>
+            </a:pPr>
+            <a:r>
+              <a:rPr lang="en-US" sz="1600" dirty="0"/>
+              <a:t>Start with correct elements but uniformed mixture parameters</a:t>
+            </a:r>
+          </a:p>
+          <a:p>
+            <a:pPr marL="285750" indent="-285750">
+              <a:buFont typeface="Arial" panose="020B0604020202020204" pitchFamily="34" charset="0"/>
+              <a:buChar char="•"/>
+            </a:pPr>
+            <a:r>
+              <a:rPr lang="en-US" sz="1600" dirty="0"/>
+              <a:t>Convergence is almost perfect</a:t>
+            </a:r>
+          </a:p>
+          <a:p>
+            <a:pPr marL="285750" indent="-285750">
+              <a:buFont typeface="Arial" panose="020B0604020202020204" pitchFamily="34" charset="0"/>
+              <a:buChar char="•"/>
+            </a:pPr>
+            <a:r>
+              <a:rPr lang="en-US" sz="1600" dirty="0"/>
+              <a:t>Recovered Elements: 64 (100%)</a:t>
+            </a:r>
+          </a:p>
+          <a:p>
+            <a:pPr marL="285750" indent="-285750">
+              <a:buFont typeface="Arial" panose="020B0604020202020204" pitchFamily="34" charset="0"/>
+              <a:buChar char="•"/>
+            </a:pPr>
+            <a:r>
+              <a:rPr lang="en-US" sz="1600" dirty="0"/>
+              <a:t>Hits: 162.6</a:t>
+            </a:r>
+          </a:p>
+          <a:p>
+            <a:pPr marL="285750" indent="-285750">
+              <a:buFont typeface="Arial" panose="020B0604020202020204" pitchFamily="34" charset="0"/>
+              <a:buChar char="•"/>
+            </a:pPr>
+            <a:r>
+              <a:rPr lang="en-US" sz="1600" dirty="0"/>
+              <a:t>Resolution: 3.0 arc seconds</a:t>
+            </a:r>
+          </a:p>
+          <a:p>
+            <a:pPr marL="285750" indent="-285750">
+              <a:buFont typeface="Arial" panose="020B0604020202020204" pitchFamily="34" charset="0"/>
+              <a:buChar char="•"/>
+            </a:pPr>
+            <a:r>
+              <a:rPr lang="en-US" sz="1600" dirty="0"/>
+              <a:t>Log Like: 1097</a:t>
+            </a:r>
+          </a:p>
+        </p:txBody>
+      </p:sp>
+    </p:spTree>
+    <p:extLst>
+      <p:ext uri="{BB962C8B-B14F-4D97-AF65-F5344CB8AC3E}">
+        <p14:creationId xmlns:p14="http://schemas.microsoft.com/office/powerpoint/2010/main" val="2315067974"/>
       </p:ext>
     </p:extLst>
   </p:cSld>
@@ -8171,6 +11123,1473 @@
     <p:extLst>
       <p:ext uri="{BB962C8B-B14F-4D97-AF65-F5344CB8AC3E}">
         <p14:creationId xmlns:p14="http://schemas.microsoft.com/office/powerpoint/2010/main" val="1488302526"/>
+      </p:ext>
+    </p:extLst>
+  </p:cSld>
+  <p:clrMapOvr>
+    <a:masterClrMapping/>
+  </p:clrMapOvr>
+</p:sld>
+</file>
+
+<file path=ppt/slides/slide40.xml><?xml version="1.0" encoding="utf-8"?>
+<p:sld xmlns:a="http://schemas.openxmlformats.org/drawingml/2006/main" xmlns:r="http://schemas.openxmlformats.org/officeDocument/2006/relationships" xmlns:p="http://schemas.openxmlformats.org/presentationml/2006/main">
+  <p:cSld>
+    <p:spTree>
+      <p:nvGrpSpPr>
+        <p:cNvPr id="1" name=""/>
+        <p:cNvGrpSpPr/>
+        <p:nvPr/>
+      </p:nvGrpSpPr>
+      <p:grpSpPr>
+        <a:xfrm>
+          <a:off x="0" y="0"/>
+          <a:ext cx="0" cy="0"/>
+          <a:chOff x="0" y="0"/>
+          <a:chExt cx="0" cy="0"/>
+        </a:xfrm>
+      </p:grpSpPr>
+      <p:sp>
+        <p:nvSpPr>
+          <p:cNvPr id="2" name="Title 1">
+            <a:extLst>
+              <a:ext uri="{FF2B5EF4-FFF2-40B4-BE49-F238E27FC236}">
+                <a16:creationId xmlns:a16="http://schemas.microsoft.com/office/drawing/2014/main" id="{1D78E768-7C7C-4F9A-BBA9-D090E3C9891C}"/>
+              </a:ext>
+            </a:extLst>
+          </p:cNvPr>
+          <p:cNvSpPr>
+            <a:spLocks noGrp="1"/>
+          </p:cNvSpPr>
+          <p:nvPr>
+            <p:ph type="title"/>
+          </p:nvPr>
+        </p:nvSpPr>
+        <p:spPr/>
+        <p:txBody>
+          <a:bodyPr/>
+          <a:lstStyle/>
+          <a:p>
+            <a:r>
+              <a:rPr lang="en-US" dirty="0"/>
+              <a:t>Fit Quality: Unperturbed Elements</a:t>
+            </a:r>
+          </a:p>
+        </p:txBody>
+      </p:sp>
+      <p:pic>
+        <p:nvPicPr>
+          <p:cNvPr id="5" name="Content Placeholder 4" descr="A screenshot of a cell phone&#10;&#10;Description automatically generated">
+            <a:extLst>
+              <a:ext uri="{FF2B5EF4-FFF2-40B4-BE49-F238E27FC236}">
+                <a16:creationId xmlns:a16="http://schemas.microsoft.com/office/drawing/2014/main" id="{BF8A62D7-230B-4F5B-900D-A9D5D70D34B6}"/>
+              </a:ext>
+            </a:extLst>
+          </p:cNvPr>
+          <p:cNvPicPr>
+            <a:picLocks noGrp="1" noChangeAspect="1"/>
+          </p:cNvPicPr>
+          <p:nvPr>
+            <p:ph idx="1"/>
+          </p:nvPr>
+        </p:nvPicPr>
+        <p:blipFill>
+          <a:blip r:embed="rId2">
+            <a:extLst>
+              <a:ext uri="{28A0092B-C50C-407E-A947-70E740481C1C}">
+                <a14:useLocalDpi xmlns:a14="http://schemas.microsoft.com/office/drawing/2010/main" val="0"/>
+              </a:ext>
+            </a:extLst>
+          </a:blip>
+          <a:stretch>
+            <a:fillRect/>
+          </a:stretch>
+        </p:blipFill>
+        <p:spPr>
+          <a:xfrm>
+            <a:off x="746810" y="1641928"/>
+            <a:ext cx="4765783" cy="3081111"/>
+          </a:xfrm>
+        </p:spPr>
+      </p:pic>
+      <p:pic>
+        <p:nvPicPr>
+          <p:cNvPr id="7" name="Picture 6" descr="A close up of a logo&#10;&#10;Description automatically generated">
+            <a:extLst>
+              <a:ext uri="{FF2B5EF4-FFF2-40B4-BE49-F238E27FC236}">
+                <a16:creationId xmlns:a16="http://schemas.microsoft.com/office/drawing/2014/main" id="{BDF2DE18-D659-45EE-8E00-BD093C94C555}"/>
+              </a:ext>
+            </a:extLst>
+          </p:cNvPr>
+          <p:cNvPicPr>
+            <a:picLocks noChangeAspect="1"/>
+          </p:cNvPicPr>
+          <p:nvPr/>
+        </p:nvPicPr>
+        <p:blipFill>
+          <a:blip r:embed="rId3">
+            <a:extLst>
+              <a:ext uri="{28A0092B-C50C-407E-A947-70E740481C1C}">
+                <a14:useLocalDpi xmlns:a14="http://schemas.microsoft.com/office/drawing/2010/main" val="0"/>
+              </a:ext>
+            </a:extLst>
+          </a:blip>
+          <a:stretch>
+            <a:fillRect/>
+          </a:stretch>
+        </p:blipFill>
+        <p:spPr>
+          <a:xfrm>
+            <a:off x="5711093" y="1641928"/>
+            <a:ext cx="4765782" cy="3081111"/>
+          </a:xfrm>
+          <a:prstGeom prst="rect">
+            <a:avLst/>
+          </a:prstGeom>
+        </p:spPr>
+      </p:pic>
+      <p:sp>
+        <p:nvSpPr>
+          <p:cNvPr id="11" name="TextBox 10">
+            <a:extLst>
+              <a:ext uri="{FF2B5EF4-FFF2-40B4-BE49-F238E27FC236}">
+                <a16:creationId xmlns:a16="http://schemas.microsoft.com/office/drawing/2014/main" id="{1A07C9C5-7DA5-4E8B-AEB5-EAD90CF89ECA}"/>
+              </a:ext>
+            </a:extLst>
+          </p:cNvPr>
+          <p:cNvSpPr txBox="1"/>
+          <p:nvPr/>
+        </p:nvSpPr>
+        <p:spPr>
+          <a:xfrm>
+            <a:off x="1008289" y="4878161"/>
+            <a:ext cx="9468586" cy="1631216"/>
+          </a:xfrm>
+          <a:prstGeom prst="rect">
+            <a:avLst/>
+          </a:prstGeom>
+          <a:noFill/>
+        </p:spPr>
+        <p:txBody>
+          <a:bodyPr wrap="square" rtlCol="0">
+            <a:spAutoFit/>
+          </a:bodyPr>
+          <a:lstStyle/>
+          <a:p>
+            <a:pPr marL="285750" indent="-285750">
+              <a:buFont typeface="Arial" panose="020B0604020202020204" pitchFamily="34" charset="0"/>
+              <a:buChar char="•"/>
+            </a:pPr>
+            <a:r>
+              <a:rPr lang="en-US" sz="2000" dirty="0"/>
+              <a:t>Do recovered elements match the nearest asteroid?</a:t>
+            </a:r>
+          </a:p>
+          <a:p>
+            <a:pPr marL="285750" indent="-285750">
+              <a:buFont typeface="Arial" panose="020B0604020202020204" pitchFamily="34" charset="0"/>
+              <a:buChar char="•"/>
+            </a:pPr>
+            <a:r>
+              <a:rPr lang="en-US" sz="2000" dirty="0"/>
+              <a:t>4.6E-8 AU mean distance</a:t>
+            </a:r>
+          </a:p>
+          <a:p>
+            <a:pPr marL="285750" indent="-285750">
+              <a:buFont typeface="Arial" panose="020B0604020202020204" pitchFamily="34" charset="0"/>
+              <a:buChar char="•"/>
+            </a:pPr>
+            <a:r>
+              <a:rPr lang="en-US" sz="2000" dirty="0"/>
+              <a:t>5.7E-6 covariance norm</a:t>
+            </a:r>
+          </a:p>
+          <a:p>
+            <a:pPr marL="285750" indent="-285750">
+              <a:buFont typeface="Arial" panose="020B0604020202020204" pitchFamily="34" charset="0"/>
+              <a:buChar char="•"/>
+            </a:pPr>
+            <a:r>
+              <a:rPr lang="en-US" sz="2000" dirty="0"/>
+              <a:t>The fit is almost perfect</a:t>
+            </a:r>
+          </a:p>
+          <a:p>
+            <a:pPr marL="285750" indent="-285750">
+              <a:buFont typeface="Arial" panose="020B0604020202020204" pitchFamily="34" charset="0"/>
+              <a:buChar char="•"/>
+            </a:pPr>
+            <a:r>
+              <a:rPr lang="en-US" sz="2000" dirty="0"/>
+              <a:t>Big deal, this is about as hard as hitting a baseball off a tee…</a:t>
+            </a:r>
+          </a:p>
+        </p:txBody>
+      </p:sp>
+    </p:spTree>
+    <p:extLst>
+      <p:ext uri="{BB962C8B-B14F-4D97-AF65-F5344CB8AC3E}">
+        <p14:creationId xmlns:p14="http://schemas.microsoft.com/office/powerpoint/2010/main" val="252364110"/>
+      </p:ext>
+    </p:extLst>
+  </p:cSld>
+  <p:clrMapOvr>
+    <a:masterClrMapping/>
+  </p:clrMapOvr>
+</p:sld>
+</file>
+
+<file path=ppt/slides/slide41.xml><?xml version="1.0" encoding="utf-8"?>
+<p:sld xmlns:a="http://schemas.openxmlformats.org/drawingml/2006/main" xmlns:r="http://schemas.openxmlformats.org/officeDocument/2006/relationships" xmlns:p="http://schemas.openxmlformats.org/presentationml/2006/main">
+  <p:cSld>
+    <p:spTree>
+      <p:nvGrpSpPr>
+        <p:cNvPr id="1" name=""/>
+        <p:cNvGrpSpPr/>
+        <p:nvPr/>
+      </p:nvGrpSpPr>
+      <p:grpSpPr>
+        <a:xfrm>
+          <a:off x="0" y="0"/>
+          <a:ext cx="0" cy="0"/>
+          <a:chOff x="0" y="0"/>
+          <a:chExt cx="0" cy="0"/>
+        </a:xfrm>
+      </p:grpSpPr>
+      <p:sp>
+        <p:nvSpPr>
+          <p:cNvPr id="2" name="Title 1">
+            <a:extLst>
+              <a:ext uri="{FF2B5EF4-FFF2-40B4-BE49-F238E27FC236}">
+                <a16:creationId xmlns:a16="http://schemas.microsoft.com/office/drawing/2014/main" id="{14C54F83-1489-4CFC-AE65-BCB7D7EA7C6B}"/>
+              </a:ext>
+            </a:extLst>
+          </p:cNvPr>
+          <p:cNvSpPr>
+            <a:spLocks noGrp="1"/>
+          </p:cNvSpPr>
+          <p:nvPr>
+            <p:ph type="title"/>
+          </p:nvPr>
+        </p:nvSpPr>
+        <p:spPr/>
+        <p:txBody>
+          <a:bodyPr>
+            <a:normAutofit/>
+          </a:bodyPr>
+          <a:lstStyle/>
+          <a:p>
+            <a:r>
+              <a:rPr lang="en-US" sz="3600" dirty="0"/>
+              <a:t>Train Known Asteroid Elements: Small Perturbation</a:t>
+            </a:r>
+          </a:p>
+        </p:txBody>
+      </p:sp>
+      <p:pic>
+        <p:nvPicPr>
+          <p:cNvPr id="5" name="Content Placeholder 4">
+            <a:extLst>
+              <a:ext uri="{FF2B5EF4-FFF2-40B4-BE49-F238E27FC236}">
+                <a16:creationId xmlns:a16="http://schemas.microsoft.com/office/drawing/2014/main" id="{607D30C2-3627-433B-B9F8-865F106F6BE6}"/>
+              </a:ext>
+            </a:extLst>
+          </p:cNvPr>
+          <p:cNvPicPr>
+            <a:picLocks noGrp="1" noChangeAspect="1"/>
+          </p:cNvPicPr>
+          <p:nvPr>
+            <p:ph idx="1"/>
+          </p:nvPr>
+        </p:nvPicPr>
+        <p:blipFill>
+          <a:blip r:embed="rId2">
+            <a:extLst>
+              <a:ext uri="{28A0092B-C50C-407E-A947-70E740481C1C}">
+                <a14:useLocalDpi xmlns:a14="http://schemas.microsoft.com/office/drawing/2010/main" val="0"/>
+              </a:ext>
+            </a:extLst>
+          </a:blip>
+          <a:srcRect/>
+          <a:stretch/>
+        </p:blipFill>
+        <p:spPr>
+          <a:xfrm>
+            <a:off x="858464" y="1436914"/>
+            <a:ext cx="3902843" cy="2512734"/>
+          </a:xfrm>
+        </p:spPr>
+      </p:pic>
+      <p:pic>
+        <p:nvPicPr>
+          <p:cNvPr id="7" name="Picture 6">
+            <a:extLst>
+              <a:ext uri="{FF2B5EF4-FFF2-40B4-BE49-F238E27FC236}">
+                <a16:creationId xmlns:a16="http://schemas.microsoft.com/office/drawing/2014/main" id="{2602DB02-0CA2-4849-9269-F215A6374F52}"/>
+              </a:ext>
+            </a:extLst>
+          </p:cNvPr>
+          <p:cNvPicPr>
+            <a:picLocks noChangeAspect="1"/>
+          </p:cNvPicPr>
+          <p:nvPr/>
+        </p:nvPicPr>
+        <p:blipFill>
+          <a:blip r:embed="rId3">
+            <a:extLst>
+              <a:ext uri="{28A0092B-C50C-407E-A947-70E740481C1C}">
+                <a14:useLocalDpi xmlns:a14="http://schemas.microsoft.com/office/drawing/2010/main" val="0"/>
+              </a:ext>
+            </a:extLst>
+          </a:blip>
+          <a:srcRect/>
+          <a:stretch/>
+        </p:blipFill>
+        <p:spPr>
+          <a:xfrm>
+            <a:off x="4927894" y="1450016"/>
+            <a:ext cx="3960343" cy="2523548"/>
+          </a:xfrm>
+          <a:prstGeom prst="rect">
+            <a:avLst/>
+          </a:prstGeom>
+        </p:spPr>
+      </p:pic>
+      <p:pic>
+        <p:nvPicPr>
+          <p:cNvPr id="9" name="Picture 8">
+            <a:extLst>
+              <a:ext uri="{FF2B5EF4-FFF2-40B4-BE49-F238E27FC236}">
+                <a16:creationId xmlns:a16="http://schemas.microsoft.com/office/drawing/2014/main" id="{D1F7CDA0-467C-4FF4-A43C-5F5C89B0DA0C}"/>
+              </a:ext>
+            </a:extLst>
+          </p:cNvPr>
+          <p:cNvPicPr>
+            <a:picLocks noChangeAspect="1"/>
+          </p:cNvPicPr>
+          <p:nvPr/>
+        </p:nvPicPr>
+        <p:blipFill>
+          <a:blip r:embed="rId4">
+            <a:extLst>
+              <a:ext uri="{28A0092B-C50C-407E-A947-70E740481C1C}">
+                <a14:useLocalDpi xmlns:a14="http://schemas.microsoft.com/office/drawing/2010/main" val="0"/>
+              </a:ext>
+            </a:extLst>
+          </a:blip>
+          <a:srcRect/>
+          <a:stretch/>
+        </p:blipFill>
+        <p:spPr>
+          <a:xfrm>
+            <a:off x="874276" y="4122964"/>
+            <a:ext cx="3935265" cy="2512734"/>
+          </a:xfrm>
+          <a:prstGeom prst="rect">
+            <a:avLst/>
+          </a:prstGeom>
+        </p:spPr>
+      </p:pic>
+      <p:pic>
+        <p:nvPicPr>
+          <p:cNvPr id="11" name="Picture 10">
+            <a:extLst>
+              <a:ext uri="{FF2B5EF4-FFF2-40B4-BE49-F238E27FC236}">
+                <a16:creationId xmlns:a16="http://schemas.microsoft.com/office/drawing/2014/main" id="{1E75D57E-C5D3-4755-BD9C-CE1E2F5DB82D}"/>
+              </a:ext>
+            </a:extLst>
+          </p:cNvPr>
+          <p:cNvPicPr>
+            <a:picLocks noChangeAspect="1"/>
+          </p:cNvPicPr>
+          <p:nvPr/>
+        </p:nvPicPr>
+        <p:blipFill>
+          <a:blip r:embed="rId5">
+            <a:extLst>
+              <a:ext uri="{28A0092B-C50C-407E-A947-70E740481C1C}">
+                <a14:useLocalDpi xmlns:a14="http://schemas.microsoft.com/office/drawing/2010/main" val="0"/>
+              </a:ext>
+            </a:extLst>
+          </a:blip>
+          <a:srcRect/>
+          <a:stretch/>
+        </p:blipFill>
+        <p:spPr>
+          <a:xfrm>
+            <a:off x="4864232" y="4139699"/>
+            <a:ext cx="3943371" cy="2492242"/>
+          </a:xfrm>
+          <a:prstGeom prst="rect">
+            <a:avLst/>
+          </a:prstGeom>
+        </p:spPr>
+      </p:pic>
+      <p:sp>
+        <p:nvSpPr>
+          <p:cNvPr id="12" name="TextBox 11">
+            <a:extLst>
+              <a:ext uri="{FF2B5EF4-FFF2-40B4-BE49-F238E27FC236}">
+                <a16:creationId xmlns:a16="http://schemas.microsoft.com/office/drawing/2014/main" id="{848DF235-7E8A-4A09-92C7-2E061ADF1150}"/>
+              </a:ext>
+            </a:extLst>
+          </p:cNvPr>
+          <p:cNvSpPr txBox="1"/>
+          <p:nvPr/>
+        </p:nvSpPr>
+        <p:spPr>
+          <a:xfrm>
+            <a:off x="8948083" y="1477735"/>
+            <a:ext cx="3243917" cy="2554545"/>
+          </a:xfrm>
+          <a:prstGeom prst="rect">
+            <a:avLst/>
+          </a:prstGeom>
+          <a:noFill/>
+        </p:spPr>
+        <p:txBody>
+          <a:bodyPr wrap="square" rtlCol="0">
+            <a:spAutoFit/>
+          </a:bodyPr>
+          <a:lstStyle/>
+          <a:p>
+            <a:pPr marL="285750" indent="-285750">
+              <a:buFont typeface="Arial" panose="020B0604020202020204" pitchFamily="34" charset="0"/>
+              <a:buChar char="•"/>
+            </a:pPr>
+            <a:r>
+              <a:rPr lang="en-US" sz="1600" dirty="0"/>
+              <a:t>Small perturbation:</a:t>
+            </a:r>
+          </a:p>
+          <a:p>
+            <a:pPr marL="742950" lvl="1" indent="-285750">
+              <a:buFont typeface="Arial" panose="020B0604020202020204" pitchFamily="34" charset="0"/>
+              <a:buChar char="•"/>
+            </a:pPr>
+            <a:r>
+              <a:rPr lang="en-US" sz="1600" dirty="0"/>
+              <a:t>1.0% to </a:t>
+            </a:r>
+            <a:r>
+              <a:rPr lang="en-US" sz="1600" i="1" dirty="0"/>
+              <a:t>a</a:t>
+            </a:r>
+          </a:p>
+          <a:p>
+            <a:pPr marL="742950" lvl="1" indent="-285750">
+              <a:buFont typeface="Arial" panose="020B0604020202020204" pitchFamily="34" charset="0"/>
+              <a:buChar char="•"/>
+            </a:pPr>
+            <a:r>
+              <a:rPr lang="en-US" sz="1600" dirty="0"/>
+              <a:t>0.25% to </a:t>
+            </a:r>
+            <a:r>
+              <a:rPr lang="en-US" sz="1600" i="1" dirty="0"/>
+              <a:t>e</a:t>
+            </a:r>
+          </a:p>
+          <a:p>
+            <a:pPr marL="742950" lvl="1" indent="-285750">
+              <a:buFont typeface="Arial" panose="020B0604020202020204" pitchFamily="34" charset="0"/>
+              <a:buChar char="•"/>
+            </a:pPr>
+            <a:r>
+              <a:rPr lang="en-US" sz="1600" dirty="0"/>
+              <a:t>0.05 degrees to </a:t>
+            </a:r>
+            <a:r>
+              <a:rPr lang="en-US" sz="1600" i="1" dirty="0"/>
+              <a:t>i</a:t>
+            </a:r>
+          </a:p>
+          <a:p>
+            <a:pPr marL="742950" lvl="1" indent="-285750">
+              <a:buFont typeface="Arial" panose="020B0604020202020204" pitchFamily="34" charset="0"/>
+              <a:buChar char="•"/>
+            </a:pPr>
+            <a:r>
+              <a:rPr lang="en-US" sz="1600" dirty="0"/>
+              <a:t>0.25 degrees to </a:t>
+            </a:r>
+            <a:r>
+              <a:rPr lang="el-GR" sz="1600" dirty="0">
+                <a:latin typeface="Times New Roman" panose="02020603050405020304" pitchFamily="18" charset="0"/>
+                <a:cs typeface="Times New Roman" panose="02020603050405020304" pitchFamily="18" charset="0"/>
+              </a:rPr>
+              <a:t>Ω</a:t>
+            </a:r>
+            <a:r>
+              <a:rPr lang="en-US" sz="1600" dirty="0">
+                <a:latin typeface="Times New Roman" panose="02020603050405020304" pitchFamily="18" charset="0"/>
+                <a:cs typeface="Times New Roman" panose="02020603050405020304" pitchFamily="18" charset="0"/>
+              </a:rPr>
+              <a:t>, </a:t>
+            </a:r>
+            <a:r>
+              <a:rPr lang="el-GR" sz="1600" dirty="0">
+                <a:latin typeface="Times New Roman" panose="02020603050405020304" pitchFamily="18" charset="0"/>
+                <a:cs typeface="Times New Roman" panose="02020603050405020304" pitchFamily="18" charset="0"/>
+              </a:rPr>
+              <a:t>ω</a:t>
+            </a:r>
+            <a:r>
+              <a:rPr lang="en-US" sz="1600" dirty="0">
+                <a:latin typeface="Times New Roman" panose="02020603050405020304" pitchFamily="18" charset="0"/>
+                <a:cs typeface="Times New Roman" panose="02020603050405020304" pitchFamily="18" charset="0"/>
+              </a:rPr>
+              <a:t>, </a:t>
+            </a:r>
+            <a:r>
+              <a:rPr lang="en-US" sz="1600" i="1" dirty="0">
+                <a:latin typeface="Times New Roman" panose="02020603050405020304" pitchFamily="18" charset="0"/>
+                <a:cs typeface="Times New Roman" panose="02020603050405020304" pitchFamily="18" charset="0"/>
+              </a:rPr>
+              <a:t>f</a:t>
+            </a:r>
+            <a:endParaRPr lang="en-US" sz="1600" i="1" dirty="0"/>
+          </a:p>
+          <a:p>
+            <a:pPr marL="285750" indent="-285750">
+              <a:buFont typeface="Arial" panose="020B0604020202020204" pitchFamily="34" charset="0"/>
+              <a:buChar char="•"/>
+            </a:pPr>
+            <a:r>
+              <a:rPr lang="en-US" sz="1600" dirty="0"/>
+              <a:t>Convergence is very good</a:t>
+            </a:r>
+          </a:p>
+          <a:p>
+            <a:pPr marL="285750" indent="-285750">
+              <a:buFont typeface="Arial" panose="020B0604020202020204" pitchFamily="34" charset="0"/>
+              <a:buChar char="•"/>
+            </a:pPr>
+            <a:r>
+              <a:rPr lang="en-US" sz="1600" dirty="0"/>
+              <a:t>Recovered Elements: 42 (65.6%)</a:t>
+            </a:r>
+          </a:p>
+          <a:p>
+            <a:pPr marL="285750" indent="-285750">
+              <a:buFont typeface="Arial" panose="020B0604020202020204" pitchFamily="34" charset="0"/>
+              <a:buChar char="•"/>
+            </a:pPr>
+            <a:r>
+              <a:rPr lang="en-US" sz="1600" dirty="0"/>
+              <a:t>Hits: 117.5</a:t>
+            </a:r>
+          </a:p>
+          <a:p>
+            <a:pPr marL="285750" indent="-285750">
+              <a:buFont typeface="Arial" panose="020B0604020202020204" pitchFamily="34" charset="0"/>
+              <a:buChar char="•"/>
+            </a:pPr>
+            <a:r>
+              <a:rPr lang="en-US" sz="1600" dirty="0"/>
+              <a:t>Resolution: 18.2 arc seconds</a:t>
+            </a:r>
+          </a:p>
+          <a:p>
+            <a:pPr marL="285750" indent="-285750">
+              <a:buFont typeface="Arial" panose="020B0604020202020204" pitchFamily="34" charset="0"/>
+              <a:buChar char="•"/>
+            </a:pPr>
+            <a:r>
+              <a:rPr lang="en-US" sz="1600" dirty="0"/>
+              <a:t>Log Like: 798</a:t>
+            </a:r>
+          </a:p>
+        </p:txBody>
+      </p:sp>
+    </p:spTree>
+    <p:extLst>
+      <p:ext uri="{BB962C8B-B14F-4D97-AF65-F5344CB8AC3E}">
+        <p14:creationId xmlns:p14="http://schemas.microsoft.com/office/powerpoint/2010/main" val="903453210"/>
+      </p:ext>
+    </p:extLst>
+  </p:cSld>
+  <p:clrMapOvr>
+    <a:masterClrMapping/>
+  </p:clrMapOvr>
+</p:sld>
+</file>
+
+<file path=ppt/slides/slide42.xml><?xml version="1.0" encoding="utf-8"?>
+<p:sld xmlns:a="http://schemas.openxmlformats.org/drawingml/2006/main" xmlns:r="http://schemas.openxmlformats.org/officeDocument/2006/relationships" xmlns:p="http://schemas.openxmlformats.org/presentationml/2006/main">
+  <p:cSld>
+    <p:spTree>
+      <p:nvGrpSpPr>
+        <p:cNvPr id="1" name=""/>
+        <p:cNvGrpSpPr/>
+        <p:nvPr/>
+      </p:nvGrpSpPr>
+      <p:grpSpPr>
+        <a:xfrm>
+          <a:off x="0" y="0"/>
+          <a:ext cx="0" cy="0"/>
+          <a:chOff x="0" y="0"/>
+          <a:chExt cx="0" cy="0"/>
+        </a:xfrm>
+      </p:grpSpPr>
+      <p:sp>
+        <p:nvSpPr>
+          <p:cNvPr id="2" name="Title 1">
+            <a:extLst>
+              <a:ext uri="{FF2B5EF4-FFF2-40B4-BE49-F238E27FC236}">
+                <a16:creationId xmlns:a16="http://schemas.microsoft.com/office/drawing/2014/main" id="{1D78E768-7C7C-4F9A-BBA9-D090E3C9891C}"/>
+              </a:ext>
+            </a:extLst>
+          </p:cNvPr>
+          <p:cNvSpPr>
+            <a:spLocks noGrp="1"/>
+          </p:cNvSpPr>
+          <p:nvPr>
+            <p:ph type="title"/>
+          </p:nvPr>
+        </p:nvSpPr>
+        <p:spPr/>
+        <p:txBody>
+          <a:bodyPr/>
+          <a:lstStyle/>
+          <a:p>
+            <a:r>
+              <a:rPr lang="en-US" dirty="0"/>
+              <a:t>Fit Quality: Small Perturbation</a:t>
+            </a:r>
+          </a:p>
+        </p:txBody>
+      </p:sp>
+      <p:pic>
+        <p:nvPicPr>
+          <p:cNvPr id="5" name="Content Placeholder 4">
+            <a:extLst>
+              <a:ext uri="{FF2B5EF4-FFF2-40B4-BE49-F238E27FC236}">
+                <a16:creationId xmlns:a16="http://schemas.microsoft.com/office/drawing/2014/main" id="{BF8A62D7-230B-4F5B-900D-A9D5D70D34B6}"/>
+              </a:ext>
+            </a:extLst>
+          </p:cNvPr>
+          <p:cNvPicPr>
+            <a:picLocks noGrp="1" noChangeAspect="1"/>
+          </p:cNvPicPr>
+          <p:nvPr>
+            <p:ph idx="1"/>
+          </p:nvPr>
+        </p:nvPicPr>
+        <p:blipFill>
+          <a:blip r:embed="rId2">
+            <a:extLst>
+              <a:ext uri="{28A0092B-C50C-407E-A947-70E740481C1C}">
+                <a14:useLocalDpi xmlns:a14="http://schemas.microsoft.com/office/drawing/2010/main" val="0"/>
+              </a:ext>
+            </a:extLst>
+          </a:blip>
+          <a:srcRect/>
+          <a:stretch/>
+        </p:blipFill>
+        <p:spPr>
+          <a:xfrm>
+            <a:off x="746810" y="1641928"/>
+            <a:ext cx="4765783" cy="3081110"/>
+          </a:xfrm>
+        </p:spPr>
+      </p:pic>
+      <p:pic>
+        <p:nvPicPr>
+          <p:cNvPr id="7" name="Picture 6">
+            <a:extLst>
+              <a:ext uri="{FF2B5EF4-FFF2-40B4-BE49-F238E27FC236}">
+                <a16:creationId xmlns:a16="http://schemas.microsoft.com/office/drawing/2014/main" id="{BDF2DE18-D659-45EE-8E00-BD093C94C555}"/>
+              </a:ext>
+            </a:extLst>
+          </p:cNvPr>
+          <p:cNvPicPr>
+            <a:picLocks noChangeAspect="1"/>
+          </p:cNvPicPr>
+          <p:nvPr/>
+        </p:nvPicPr>
+        <p:blipFill>
+          <a:blip r:embed="rId3">
+            <a:extLst>
+              <a:ext uri="{28A0092B-C50C-407E-A947-70E740481C1C}">
+                <a14:useLocalDpi xmlns:a14="http://schemas.microsoft.com/office/drawing/2010/main" val="0"/>
+              </a:ext>
+            </a:extLst>
+          </a:blip>
+          <a:srcRect/>
+          <a:stretch/>
+        </p:blipFill>
+        <p:spPr>
+          <a:xfrm>
+            <a:off x="5711093" y="1641928"/>
+            <a:ext cx="4765782" cy="3081110"/>
+          </a:xfrm>
+          <a:prstGeom prst="rect">
+            <a:avLst/>
+          </a:prstGeom>
+        </p:spPr>
+      </p:pic>
+      <p:sp>
+        <p:nvSpPr>
+          <p:cNvPr id="11" name="TextBox 10">
+            <a:extLst>
+              <a:ext uri="{FF2B5EF4-FFF2-40B4-BE49-F238E27FC236}">
+                <a16:creationId xmlns:a16="http://schemas.microsoft.com/office/drawing/2014/main" id="{1A07C9C5-7DA5-4E8B-AEB5-EAD90CF89ECA}"/>
+              </a:ext>
+            </a:extLst>
+          </p:cNvPr>
+          <p:cNvSpPr txBox="1"/>
+          <p:nvPr/>
+        </p:nvSpPr>
+        <p:spPr>
+          <a:xfrm>
+            <a:off x="1008289" y="4878161"/>
+            <a:ext cx="9468586" cy="1631216"/>
+          </a:xfrm>
+          <a:prstGeom prst="rect">
+            <a:avLst/>
+          </a:prstGeom>
+          <a:noFill/>
+        </p:spPr>
+        <p:txBody>
+          <a:bodyPr wrap="square" rtlCol="0">
+            <a:spAutoFit/>
+          </a:bodyPr>
+          <a:lstStyle/>
+          <a:p>
+            <a:pPr marL="285750" indent="-285750">
+              <a:buFont typeface="Arial" panose="020B0604020202020204" pitchFamily="34" charset="0"/>
+              <a:buChar char="•"/>
+            </a:pPr>
+            <a:r>
+              <a:rPr lang="en-US" sz="2000" dirty="0"/>
+              <a:t>Do recovered elements match the nearest asteroid?</a:t>
+            </a:r>
+          </a:p>
+          <a:p>
+            <a:pPr marL="285750" indent="-285750">
+              <a:buFont typeface="Arial" panose="020B0604020202020204" pitchFamily="34" charset="0"/>
+              <a:buChar char="•"/>
+            </a:pPr>
+            <a:r>
+              <a:rPr lang="en-US" sz="2000" dirty="0"/>
+              <a:t>2.6E-4 AU mean distance</a:t>
+            </a:r>
+          </a:p>
+          <a:p>
+            <a:pPr marL="285750" indent="-285750">
+              <a:buFont typeface="Arial" panose="020B0604020202020204" pitchFamily="34" charset="0"/>
+              <a:buChar char="•"/>
+            </a:pPr>
+            <a:r>
+              <a:rPr lang="en-US" sz="2000" dirty="0"/>
+              <a:t>0.012 covariance norm</a:t>
+            </a:r>
+          </a:p>
+          <a:p>
+            <a:pPr marL="285750" indent="-285750">
+              <a:buFont typeface="Arial" panose="020B0604020202020204" pitchFamily="34" charset="0"/>
+              <a:buChar char="•"/>
+            </a:pPr>
+            <a:r>
+              <a:rPr lang="en-US" sz="2000" dirty="0"/>
+              <a:t>This is still a very good fit on the 42 elements that have been recovered</a:t>
+            </a:r>
+          </a:p>
+          <a:p>
+            <a:pPr marL="285750" indent="-285750">
+              <a:buFont typeface="Arial" panose="020B0604020202020204" pitchFamily="34" charset="0"/>
+              <a:buChar char="•"/>
+            </a:pPr>
+            <a:r>
+              <a:rPr lang="en-US" sz="2000" dirty="0"/>
+              <a:t>This is like your little league coach lobbing the ball over the plate in batting practice</a:t>
+            </a:r>
+          </a:p>
+        </p:txBody>
+      </p:sp>
+    </p:spTree>
+    <p:extLst>
+      <p:ext uri="{BB962C8B-B14F-4D97-AF65-F5344CB8AC3E}">
+        <p14:creationId xmlns:p14="http://schemas.microsoft.com/office/powerpoint/2010/main" val="1078062339"/>
+      </p:ext>
+    </p:extLst>
+  </p:cSld>
+  <p:clrMapOvr>
+    <a:masterClrMapping/>
+  </p:clrMapOvr>
+</p:sld>
+</file>
+
+<file path=ppt/slides/slide43.xml><?xml version="1.0" encoding="utf-8"?>
+<p:sld xmlns:a="http://schemas.openxmlformats.org/drawingml/2006/main" xmlns:r="http://schemas.openxmlformats.org/officeDocument/2006/relationships" xmlns:p="http://schemas.openxmlformats.org/presentationml/2006/main">
+  <p:cSld>
+    <p:spTree>
+      <p:nvGrpSpPr>
+        <p:cNvPr id="1" name=""/>
+        <p:cNvGrpSpPr/>
+        <p:nvPr/>
+      </p:nvGrpSpPr>
+      <p:grpSpPr>
+        <a:xfrm>
+          <a:off x="0" y="0"/>
+          <a:ext cx="0" cy="0"/>
+          <a:chOff x="0" y="0"/>
+          <a:chExt cx="0" cy="0"/>
+        </a:xfrm>
+      </p:grpSpPr>
+      <p:sp>
+        <p:nvSpPr>
+          <p:cNvPr id="2" name="Title 1">
+            <a:extLst>
+              <a:ext uri="{FF2B5EF4-FFF2-40B4-BE49-F238E27FC236}">
+                <a16:creationId xmlns:a16="http://schemas.microsoft.com/office/drawing/2014/main" id="{14C54F83-1489-4CFC-AE65-BCB7D7EA7C6B}"/>
+              </a:ext>
+            </a:extLst>
+          </p:cNvPr>
+          <p:cNvSpPr>
+            <a:spLocks noGrp="1"/>
+          </p:cNvSpPr>
+          <p:nvPr>
+            <p:ph type="title"/>
+          </p:nvPr>
+        </p:nvSpPr>
+        <p:spPr/>
+        <p:txBody>
+          <a:bodyPr>
+            <a:normAutofit/>
+          </a:bodyPr>
+          <a:lstStyle/>
+          <a:p>
+            <a:r>
+              <a:rPr lang="en-US" sz="3600" dirty="0"/>
+              <a:t>Train Known Asteroid Elements: Large Perturbation</a:t>
+            </a:r>
+          </a:p>
+        </p:txBody>
+      </p:sp>
+      <p:pic>
+        <p:nvPicPr>
+          <p:cNvPr id="5" name="Content Placeholder 4">
+            <a:extLst>
+              <a:ext uri="{FF2B5EF4-FFF2-40B4-BE49-F238E27FC236}">
+                <a16:creationId xmlns:a16="http://schemas.microsoft.com/office/drawing/2014/main" id="{607D30C2-3627-433B-B9F8-865F106F6BE6}"/>
+              </a:ext>
+            </a:extLst>
+          </p:cNvPr>
+          <p:cNvPicPr>
+            <a:picLocks noGrp="1" noChangeAspect="1"/>
+          </p:cNvPicPr>
+          <p:nvPr>
+            <p:ph idx="1"/>
+          </p:nvPr>
+        </p:nvPicPr>
+        <p:blipFill>
+          <a:blip r:embed="rId2">
+            <a:extLst>
+              <a:ext uri="{28A0092B-C50C-407E-A947-70E740481C1C}">
+                <a14:useLocalDpi xmlns:a14="http://schemas.microsoft.com/office/drawing/2010/main" val="0"/>
+              </a:ext>
+            </a:extLst>
+          </a:blip>
+          <a:srcRect/>
+          <a:stretch/>
+        </p:blipFill>
+        <p:spPr>
+          <a:xfrm>
+            <a:off x="858464" y="1436914"/>
+            <a:ext cx="3902843" cy="2512733"/>
+          </a:xfrm>
+        </p:spPr>
+      </p:pic>
+      <p:pic>
+        <p:nvPicPr>
+          <p:cNvPr id="7" name="Picture 6">
+            <a:extLst>
+              <a:ext uri="{FF2B5EF4-FFF2-40B4-BE49-F238E27FC236}">
+                <a16:creationId xmlns:a16="http://schemas.microsoft.com/office/drawing/2014/main" id="{2602DB02-0CA2-4849-9269-F215A6374F52}"/>
+              </a:ext>
+            </a:extLst>
+          </p:cNvPr>
+          <p:cNvPicPr>
+            <a:picLocks noChangeAspect="1"/>
+          </p:cNvPicPr>
+          <p:nvPr/>
+        </p:nvPicPr>
+        <p:blipFill>
+          <a:blip r:embed="rId3">
+            <a:extLst>
+              <a:ext uri="{28A0092B-C50C-407E-A947-70E740481C1C}">
+                <a14:useLocalDpi xmlns:a14="http://schemas.microsoft.com/office/drawing/2010/main" val="0"/>
+              </a:ext>
+            </a:extLst>
+          </a:blip>
+          <a:srcRect/>
+          <a:stretch/>
+        </p:blipFill>
+        <p:spPr>
+          <a:xfrm>
+            <a:off x="4927894" y="1450016"/>
+            <a:ext cx="3960342" cy="2523548"/>
+          </a:xfrm>
+          <a:prstGeom prst="rect">
+            <a:avLst/>
+          </a:prstGeom>
+        </p:spPr>
+      </p:pic>
+      <p:pic>
+        <p:nvPicPr>
+          <p:cNvPr id="9" name="Picture 8">
+            <a:extLst>
+              <a:ext uri="{FF2B5EF4-FFF2-40B4-BE49-F238E27FC236}">
+                <a16:creationId xmlns:a16="http://schemas.microsoft.com/office/drawing/2014/main" id="{D1F7CDA0-467C-4FF4-A43C-5F5C89B0DA0C}"/>
+              </a:ext>
+            </a:extLst>
+          </p:cNvPr>
+          <p:cNvPicPr>
+            <a:picLocks noChangeAspect="1"/>
+          </p:cNvPicPr>
+          <p:nvPr/>
+        </p:nvPicPr>
+        <p:blipFill>
+          <a:blip r:embed="rId4">
+            <a:extLst>
+              <a:ext uri="{28A0092B-C50C-407E-A947-70E740481C1C}">
+                <a14:useLocalDpi xmlns:a14="http://schemas.microsoft.com/office/drawing/2010/main" val="0"/>
+              </a:ext>
+            </a:extLst>
+          </a:blip>
+          <a:srcRect/>
+          <a:stretch/>
+        </p:blipFill>
+        <p:spPr>
+          <a:xfrm>
+            <a:off x="890487" y="4122964"/>
+            <a:ext cx="3902843" cy="2512734"/>
+          </a:xfrm>
+          <a:prstGeom prst="rect">
+            <a:avLst/>
+          </a:prstGeom>
+        </p:spPr>
+      </p:pic>
+      <p:pic>
+        <p:nvPicPr>
+          <p:cNvPr id="11" name="Picture 10">
+            <a:extLst>
+              <a:ext uri="{FF2B5EF4-FFF2-40B4-BE49-F238E27FC236}">
+                <a16:creationId xmlns:a16="http://schemas.microsoft.com/office/drawing/2014/main" id="{1E75D57E-C5D3-4755-BD9C-CE1E2F5DB82D}"/>
+              </a:ext>
+            </a:extLst>
+          </p:cNvPr>
+          <p:cNvPicPr>
+            <a:picLocks noChangeAspect="1"/>
+          </p:cNvPicPr>
+          <p:nvPr/>
+        </p:nvPicPr>
+        <p:blipFill>
+          <a:blip r:embed="rId5">
+            <a:extLst>
+              <a:ext uri="{28A0092B-C50C-407E-A947-70E740481C1C}">
+                <a14:useLocalDpi xmlns:a14="http://schemas.microsoft.com/office/drawing/2010/main" val="0"/>
+              </a:ext>
+            </a:extLst>
+          </a:blip>
+          <a:srcRect/>
+          <a:stretch/>
+        </p:blipFill>
+        <p:spPr>
+          <a:xfrm>
+            <a:off x="4880311" y="4139699"/>
+            <a:ext cx="3911212" cy="2492242"/>
+          </a:xfrm>
+          <a:prstGeom prst="rect">
+            <a:avLst/>
+          </a:prstGeom>
+        </p:spPr>
+      </p:pic>
+      <p:sp>
+        <p:nvSpPr>
+          <p:cNvPr id="12" name="TextBox 11">
+            <a:extLst>
+              <a:ext uri="{FF2B5EF4-FFF2-40B4-BE49-F238E27FC236}">
+                <a16:creationId xmlns:a16="http://schemas.microsoft.com/office/drawing/2014/main" id="{848DF235-7E8A-4A09-92C7-2E061ADF1150}"/>
+              </a:ext>
+            </a:extLst>
+          </p:cNvPr>
+          <p:cNvSpPr txBox="1"/>
+          <p:nvPr/>
+        </p:nvSpPr>
+        <p:spPr>
+          <a:xfrm>
+            <a:off x="8948083" y="1477735"/>
+            <a:ext cx="3243917" cy="3293209"/>
+          </a:xfrm>
+          <a:prstGeom prst="rect">
+            <a:avLst/>
+          </a:prstGeom>
+          <a:noFill/>
+        </p:spPr>
+        <p:txBody>
+          <a:bodyPr wrap="square" rtlCol="0">
+            <a:spAutoFit/>
+          </a:bodyPr>
+          <a:lstStyle/>
+          <a:p>
+            <a:pPr marL="285750" indent="-285750">
+              <a:buFont typeface="Arial" panose="020B0604020202020204" pitchFamily="34" charset="0"/>
+              <a:buChar char="•"/>
+            </a:pPr>
+            <a:r>
+              <a:rPr lang="en-US" sz="1600" dirty="0"/>
+              <a:t>Small perturbation:</a:t>
+            </a:r>
+          </a:p>
+          <a:p>
+            <a:pPr marL="742950" lvl="1" indent="-285750">
+              <a:buFont typeface="Arial" panose="020B0604020202020204" pitchFamily="34" charset="0"/>
+              <a:buChar char="•"/>
+            </a:pPr>
+            <a:r>
+              <a:rPr lang="en-US" sz="1600" dirty="0"/>
+              <a:t>5.0% to </a:t>
+            </a:r>
+            <a:r>
+              <a:rPr lang="en-US" sz="1600" i="1" dirty="0"/>
+              <a:t>a</a:t>
+            </a:r>
+          </a:p>
+          <a:p>
+            <a:pPr marL="742950" lvl="1" indent="-285750">
+              <a:buFont typeface="Arial" panose="020B0604020202020204" pitchFamily="34" charset="0"/>
+              <a:buChar char="•"/>
+            </a:pPr>
+            <a:r>
+              <a:rPr lang="en-US" sz="1600" dirty="0"/>
+              <a:t>1.0% to </a:t>
+            </a:r>
+            <a:r>
+              <a:rPr lang="en-US" sz="1600" i="1" dirty="0"/>
+              <a:t>e</a:t>
+            </a:r>
+          </a:p>
+          <a:p>
+            <a:pPr marL="742950" lvl="1" indent="-285750">
+              <a:buFont typeface="Arial" panose="020B0604020202020204" pitchFamily="34" charset="0"/>
+              <a:buChar char="•"/>
+            </a:pPr>
+            <a:r>
+              <a:rPr lang="en-US" sz="1600" dirty="0"/>
+              <a:t>0.25 degrees to </a:t>
+            </a:r>
+            <a:r>
+              <a:rPr lang="en-US" sz="1600" i="1" dirty="0"/>
+              <a:t>i</a:t>
+            </a:r>
+          </a:p>
+          <a:p>
+            <a:pPr marL="742950" lvl="1" indent="-285750">
+              <a:buFont typeface="Arial" panose="020B0604020202020204" pitchFamily="34" charset="0"/>
+              <a:buChar char="•"/>
+            </a:pPr>
+            <a:r>
+              <a:rPr lang="en-US" sz="1600" dirty="0"/>
+              <a:t>1.0 degrees to </a:t>
+            </a:r>
+            <a:r>
+              <a:rPr lang="el-GR" sz="1600" dirty="0">
+                <a:latin typeface="Times New Roman" panose="02020603050405020304" pitchFamily="18" charset="0"/>
+                <a:cs typeface="Times New Roman" panose="02020603050405020304" pitchFamily="18" charset="0"/>
+              </a:rPr>
+              <a:t>Ω</a:t>
+            </a:r>
+            <a:r>
+              <a:rPr lang="en-US" sz="1600" dirty="0">
+                <a:latin typeface="Times New Roman" panose="02020603050405020304" pitchFamily="18" charset="0"/>
+                <a:cs typeface="Times New Roman" panose="02020603050405020304" pitchFamily="18" charset="0"/>
+              </a:rPr>
+              <a:t>, </a:t>
+            </a:r>
+            <a:r>
+              <a:rPr lang="el-GR" sz="1600" dirty="0">
+                <a:latin typeface="Times New Roman" panose="02020603050405020304" pitchFamily="18" charset="0"/>
+                <a:cs typeface="Times New Roman" panose="02020603050405020304" pitchFamily="18" charset="0"/>
+              </a:rPr>
+              <a:t>ω</a:t>
+            </a:r>
+            <a:r>
+              <a:rPr lang="en-US" sz="1600" dirty="0">
+                <a:latin typeface="Times New Roman" panose="02020603050405020304" pitchFamily="18" charset="0"/>
+                <a:cs typeface="Times New Roman" panose="02020603050405020304" pitchFamily="18" charset="0"/>
+              </a:rPr>
+              <a:t>, </a:t>
+            </a:r>
+            <a:r>
+              <a:rPr lang="en-US" sz="1600" i="1" dirty="0">
+                <a:latin typeface="Times New Roman" panose="02020603050405020304" pitchFamily="18" charset="0"/>
+                <a:cs typeface="Times New Roman" panose="02020603050405020304" pitchFamily="18" charset="0"/>
+              </a:rPr>
+              <a:t>f</a:t>
+            </a:r>
+            <a:endParaRPr lang="en-US" sz="1600" i="1" dirty="0"/>
+          </a:p>
+          <a:p>
+            <a:pPr marL="285750" indent="-285750">
+              <a:buFont typeface="Arial" panose="020B0604020202020204" pitchFamily="34" charset="0"/>
+              <a:buChar char="•"/>
+            </a:pPr>
+            <a:r>
+              <a:rPr lang="en-US" sz="1600" dirty="0"/>
+              <a:t>Convergence is decent</a:t>
+            </a:r>
+          </a:p>
+          <a:p>
+            <a:pPr marL="285750" indent="-285750">
+              <a:buFont typeface="Arial" panose="020B0604020202020204" pitchFamily="34" charset="0"/>
+              <a:buChar char="•"/>
+            </a:pPr>
+            <a:r>
+              <a:rPr lang="en-US" sz="1600" dirty="0"/>
+              <a:t>Recovered Elements: 12 (18.8%)</a:t>
+            </a:r>
+          </a:p>
+          <a:p>
+            <a:pPr marL="285750" indent="-285750">
+              <a:buFont typeface="Arial" panose="020B0604020202020204" pitchFamily="34" charset="0"/>
+              <a:buChar char="•"/>
+            </a:pPr>
+            <a:r>
+              <a:rPr lang="en-US" sz="1600" dirty="0"/>
+              <a:t>Hits: 98.2</a:t>
+            </a:r>
+          </a:p>
+          <a:p>
+            <a:pPr marL="285750" indent="-285750">
+              <a:buFont typeface="Arial" panose="020B0604020202020204" pitchFamily="34" charset="0"/>
+              <a:buChar char="•"/>
+            </a:pPr>
+            <a:r>
+              <a:rPr lang="en-US" sz="1600" dirty="0"/>
+              <a:t>Resolution: 32.4 arc seconds</a:t>
+            </a:r>
+          </a:p>
+          <a:p>
+            <a:pPr marL="285750" indent="-285750">
+              <a:buFont typeface="Arial" panose="020B0604020202020204" pitchFamily="34" charset="0"/>
+              <a:buChar char="•"/>
+            </a:pPr>
+            <a:r>
+              <a:rPr lang="en-US" sz="1600" dirty="0"/>
+              <a:t>Log Like: 748</a:t>
+            </a:r>
+          </a:p>
+          <a:p>
+            <a:pPr marL="285750" indent="-285750">
+              <a:buFont typeface="Arial" panose="020B0604020202020204" pitchFamily="34" charset="0"/>
+              <a:buChar char="•"/>
+            </a:pPr>
+            <a:r>
+              <a:rPr lang="en-US" sz="1600" dirty="0"/>
+              <a:t>Many of these elements were perturbed so far the original is no longer even the nearest asteroid!</a:t>
+            </a:r>
+          </a:p>
+        </p:txBody>
+      </p:sp>
+    </p:spTree>
+    <p:extLst>
+      <p:ext uri="{BB962C8B-B14F-4D97-AF65-F5344CB8AC3E}">
+        <p14:creationId xmlns:p14="http://schemas.microsoft.com/office/powerpoint/2010/main" val="406023902"/>
+      </p:ext>
+    </p:extLst>
+  </p:cSld>
+  <p:clrMapOvr>
+    <a:masterClrMapping/>
+  </p:clrMapOvr>
+</p:sld>
+</file>
+
+<file path=ppt/slides/slide44.xml><?xml version="1.0" encoding="utf-8"?>
+<p:sld xmlns:a="http://schemas.openxmlformats.org/drawingml/2006/main" xmlns:r="http://schemas.openxmlformats.org/officeDocument/2006/relationships" xmlns:p="http://schemas.openxmlformats.org/presentationml/2006/main">
+  <p:cSld>
+    <p:spTree>
+      <p:nvGrpSpPr>
+        <p:cNvPr id="1" name=""/>
+        <p:cNvGrpSpPr/>
+        <p:nvPr/>
+      </p:nvGrpSpPr>
+      <p:grpSpPr>
+        <a:xfrm>
+          <a:off x="0" y="0"/>
+          <a:ext cx="0" cy="0"/>
+          <a:chOff x="0" y="0"/>
+          <a:chExt cx="0" cy="0"/>
+        </a:xfrm>
+      </p:grpSpPr>
+      <p:sp>
+        <p:nvSpPr>
+          <p:cNvPr id="2" name="Title 1">
+            <a:extLst>
+              <a:ext uri="{FF2B5EF4-FFF2-40B4-BE49-F238E27FC236}">
+                <a16:creationId xmlns:a16="http://schemas.microsoft.com/office/drawing/2014/main" id="{1D78E768-7C7C-4F9A-BBA9-D090E3C9891C}"/>
+              </a:ext>
+            </a:extLst>
+          </p:cNvPr>
+          <p:cNvSpPr>
+            <a:spLocks noGrp="1"/>
+          </p:cNvSpPr>
+          <p:nvPr>
+            <p:ph type="title"/>
+          </p:nvPr>
+        </p:nvSpPr>
+        <p:spPr/>
+        <p:txBody>
+          <a:bodyPr/>
+          <a:lstStyle/>
+          <a:p>
+            <a:r>
+              <a:rPr lang="en-US" dirty="0"/>
+              <a:t>Fit Quality: Large Perturbation</a:t>
+            </a:r>
+          </a:p>
+        </p:txBody>
+      </p:sp>
+      <p:pic>
+        <p:nvPicPr>
+          <p:cNvPr id="5" name="Content Placeholder 4">
+            <a:extLst>
+              <a:ext uri="{FF2B5EF4-FFF2-40B4-BE49-F238E27FC236}">
+                <a16:creationId xmlns:a16="http://schemas.microsoft.com/office/drawing/2014/main" id="{BF8A62D7-230B-4F5B-900D-A9D5D70D34B6}"/>
+              </a:ext>
+            </a:extLst>
+          </p:cNvPr>
+          <p:cNvPicPr>
+            <a:picLocks noGrp="1" noChangeAspect="1"/>
+          </p:cNvPicPr>
+          <p:nvPr>
+            <p:ph idx="1"/>
+          </p:nvPr>
+        </p:nvPicPr>
+        <p:blipFill>
+          <a:blip r:embed="rId2">
+            <a:extLst>
+              <a:ext uri="{28A0092B-C50C-407E-A947-70E740481C1C}">
+                <a14:useLocalDpi xmlns:a14="http://schemas.microsoft.com/office/drawing/2010/main" val="0"/>
+              </a:ext>
+            </a:extLst>
+          </a:blip>
+          <a:srcRect/>
+          <a:stretch/>
+        </p:blipFill>
+        <p:spPr>
+          <a:xfrm>
+            <a:off x="749296" y="1641928"/>
+            <a:ext cx="4760811" cy="3081110"/>
+          </a:xfrm>
+        </p:spPr>
+      </p:pic>
+      <p:pic>
+        <p:nvPicPr>
+          <p:cNvPr id="7" name="Picture 6">
+            <a:extLst>
+              <a:ext uri="{FF2B5EF4-FFF2-40B4-BE49-F238E27FC236}">
+                <a16:creationId xmlns:a16="http://schemas.microsoft.com/office/drawing/2014/main" id="{BDF2DE18-D659-45EE-8E00-BD093C94C555}"/>
+              </a:ext>
+            </a:extLst>
+          </p:cNvPr>
+          <p:cNvPicPr>
+            <a:picLocks noChangeAspect="1"/>
+          </p:cNvPicPr>
+          <p:nvPr/>
+        </p:nvPicPr>
+        <p:blipFill>
+          <a:blip r:embed="rId3">
+            <a:extLst>
+              <a:ext uri="{28A0092B-C50C-407E-A947-70E740481C1C}">
+                <a14:useLocalDpi xmlns:a14="http://schemas.microsoft.com/office/drawing/2010/main" val="0"/>
+              </a:ext>
+            </a:extLst>
+          </a:blip>
+          <a:srcRect/>
+          <a:stretch/>
+        </p:blipFill>
+        <p:spPr>
+          <a:xfrm>
+            <a:off x="5711093" y="1645134"/>
+            <a:ext cx="4765782" cy="3074697"/>
+          </a:xfrm>
+          <a:prstGeom prst="rect">
+            <a:avLst/>
+          </a:prstGeom>
+        </p:spPr>
+      </p:pic>
+      <p:sp>
+        <p:nvSpPr>
+          <p:cNvPr id="11" name="TextBox 10">
+            <a:extLst>
+              <a:ext uri="{FF2B5EF4-FFF2-40B4-BE49-F238E27FC236}">
+                <a16:creationId xmlns:a16="http://schemas.microsoft.com/office/drawing/2014/main" id="{1A07C9C5-7DA5-4E8B-AEB5-EAD90CF89ECA}"/>
+              </a:ext>
+            </a:extLst>
+          </p:cNvPr>
+          <p:cNvSpPr txBox="1"/>
+          <p:nvPr/>
+        </p:nvSpPr>
+        <p:spPr>
+          <a:xfrm>
+            <a:off x="1008289" y="4878161"/>
+            <a:ext cx="9468586" cy="1631216"/>
+          </a:xfrm>
+          <a:prstGeom prst="rect">
+            <a:avLst/>
+          </a:prstGeom>
+          <a:noFill/>
+        </p:spPr>
+        <p:txBody>
+          <a:bodyPr wrap="square" rtlCol="0">
+            <a:spAutoFit/>
+          </a:bodyPr>
+          <a:lstStyle/>
+          <a:p>
+            <a:pPr marL="285750" indent="-285750">
+              <a:buFont typeface="Arial" panose="020B0604020202020204" pitchFamily="34" charset="0"/>
+              <a:buChar char="•"/>
+            </a:pPr>
+            <a:r>
+              <a:rPr lang="en-US" sz="2000" dirty="0"/>
+              <a:t>Do recovered elements match the nearest asteroid? Quite well.</a:t>
+            </a:r>
+          </a:p>
+          <a:p>
+            <a:pPr marL="285750" indent="-285750">
+              <a:buFont typeface="Arial" panose="020B0604020202020204" pitchFamily="34" charset="0"/>
+              <a:buChar char="•"/>
+            </a:pPr>
+            <a:r>
+              <a:rPr lang="en-US" sz="2000" dirty="0"/>
+              <a:t>4.5E-4 AU mean distance</a:t>
+            </a:r>
+          </a:p>
+          <a:p>
+            <a:pPr marL="285750" indent="-285750">
+              <a:buFont typeface="Arial" panose="020B0604020202020204" pitchFamily="34" charset="0"/>
+              <a:buChar char="•"/>
+            </a:pPr>
+            <a:r>
+              <a:rPr lang="en-US" sz="2000" dirty="0"/>
+              <a:t>0.032 covariance norm</a:t>
+            </a:r>
+          </a:p>
+          <a:p>
+            <a:pPr marL="285750" indent="-285750">
+              <a:buFont typeface="Arial" panose="020B0604020202020204" pitchFamily="34" charset="0"/>
+              <a:buChar char="•"/>
+            </a:pPr>
+            <a:r>
+              <a:rPr lang="en-US" sz="2000" dirty="0"/>
+              <a:t>This is a decent fit on the 12 elements that have been recovered</a:t>
+            </a:r>
+          </a:p>
+          <a:p>
+            <a:pPr marL="285750" indent="-285750">
+              <a:buFont typeface="Arial" panose="020B0604020202020204" pitchFamily="34" charset="0"/>
+              <a:buChar char="•"/>
+            </a:pPr>
+            <a:r>
+              <a:rPr lang="en-US" sz="2000" dirty="0"/>
+              <a:t>This is a lot harder than the last task-like facing a high school pitcher</a:t>
+            </a:r>
+          </a:p>
+        </p:txBody>
+      </p:sp>
+    </p:spTree>
+    <p:extLst>
+      <p:ext uri="{BB962C8B-B14F-4D97-AF65-F5344CB8AC3E}">
+        <p14:creationId xmlns:p14="http://schemas.microsoft.com/office/powerpoint/2010/main" val="1763637038"/>
+      </p:ext>
+    </p:extLst>
+  </p:cSld>
+  <p:clrMapOvr>
+    <a:masterClrMapping/>
+  </p:clrMapOvr>
+</p:sld>
+</file>
+
+<file path=ppt/slides/slide45.xml><?xml version="1.0" encoding="utf-8"?>
+<p:sld xmlns:a="http://schemas.openxmlformats.org/drawingml/2006/main" xmlns:r="http://schemas.openxmlformats.org/officeDocument/2006/relationships" xmlns:p="http://schemas.openxmlformats.org/presentationml/2006/main">
+  <p:cSld>
+    <p:spTree>
+      <p:nvGrpSpPr>
+        <p:cNvPr id="1" name=""/>
+        <p:cNvGrpSpPr/>
+        <p:nvPr/>
+      </p:nvGrpSpPr>
+      <p:grpSpPr>
+        <a:xfrm>
+          <a:off x="0" y="0"/>
+          <a:ext cx="0" cy="0"/>
+          <a:chOff x="0" y="0"/>
+          <a:chExt cx="0" cy="0"/>
+        </a:xfrm>
+      </p:grpSpPr>
+      <p:sp>
+        <p:nvSpPr>
+          <p:cNvPr id="2" name="Title 1">
+            <a:extLst>
+              <a:ext uri="{FF2B5EF4-FFF2-40B4-BE49-F238E27FC236}">
+                <a16:creationId xmlns:a16="http://schemas.microsoft.com/office/drawing/2014/main" id="{9C69E8AC-E149-4DFE-A645-5167EF738C89}"/>
+              </a:ext>
+            </a:extLst>
+          </p:cNvPr>
+          <p:cNvSpPr>
+            <a:spLocks noGrp="1"/>
+          </p:cNvSpPr>
+          <p:nvPr>
+            <p:ph type="title"/>
+          </p:nvPr>
+        </p:nvSpPr>
+        <p:spPr/>
+        <p:txBody>
+          <a:bodyPr>
+            <a:normAutofit/>
+          </a:bodyPr>
+          <a:lstStyle/>
+          <a:p>
+            <a:r>
+              <a:rPr lang="en-US" sz="3800" dirty="0"/>
+              <a:t>Search Known Asteroids with Random Initializations</a:t>
+            </a:r>
+          </a:p>
+        </p:txBody>
+      </p:sp>
+      <p:sp>
+        <p:nvSpPr>
+          <p:cNvPr id="3" name="Content Placeholder 2">
+            <a:extLst>
+              <a:ext uri="{FF2B5EF4-FFF2-40B4-BE49-F238E27FC236}">
+                <a16:creationId xmlns:a16="http://schemas.microsoft.com/office/drawing/2014/main" id="{F410BE54-9C53-4A0E-B6E7-9D515380C1F9}"/>
+              </a:ext>
+            </a:extLst>
+          </p:cNvPr>
+          <p:cNvSpPr>
+            <a:spLocks noGrp="1"/>
+          </p:cNvSpPr>
+          <p:nvPr>
+            <p:ph idx="1"/>
+          </p:nvPr>
+        </p:nvSpPr>
+        <p:spPr/>
+        <p:txBody>
+          <a:bodyPr/>
+          <a:lstStyle/>
+          <a:p>
+            <a:endParaRPr lang="en-US" dirty="0"/>
+          </a:p>
+        </p:txBody>
+      </p:sp>
+    </p:spTree>
+    <p:extLst>
+      <p:ext uri="{BB962C8B-B14F-4D97-AF65-F5344CB8AC3E}">
+        <p14:creationId xmlns:p14="http://schemas.microsoft.com/office/powerpoint/2010/main" val="174721646"/>
       </p:ext>
     </p:extLst>
   </p:cSld>
@@ -9221,6 +13640,82 @@
 </p:tagLst>
 </file>
 
+<file path=ppt/tags/tag16.xml><?xml version="1.0" encoding="utf-8"?>
+<p:tagLst xmlns:a="http://schemas.openxmlformats.org/drawingml/2006/main" xmlns:r="http://schemas.openxmlformats.org/officeDocument/2006/relationships" xmlns:p="http://schemas.openxmlformats.org/presentationml/2006/main">
+  <p:tag name="OUTPUTDPI" val="1200"/>
+  <p:tag name="ORIGINALHEIGHT" val="124.4844"/>
+  <p:tag name="ORIGINALWIDTH" val="913.3858"/>
+  <p:tag name="LATEXADDIN" val="\documentclass{article}&#10;\usepackage{amsmath}&#10;\pagestyle{empty}&#10;\begin{document}&#10;&#10;&#10;$$ V | \textrm{Hit} \sim \textrm{Expo}(\lambda)$$&#10;&#10;\end{document}"/>
+  <p:tag name="IGUANATEXSIZE" val="28"/>
+  <p:tag name="IGUANATEXCURSOR" val="82"/>
+  <p:tag name="TRANSPARENCY" val="True"/>
+  <p:tag name="FILENAME" val=""/>
+  <p:tag name="LATEXENGINEID" val="0"/>
+  <p:tag name="TEMPFOLDER" val="c:\temp\"/>
+  <p:tag name="LATEXFORMHEIGHT" val="312"/>
+  <p:tag name="LATEXFORMWIDTH" val="384"/>
+  <p:tag name="LATEXFORMWRAP" val="True"/>
+  <p:tag name="BITMAPVECTOR" val="0"/>
+</p:tagLst>
+</file>
+
+<file path=ppt/tags/tag17.xml><?xml version="1.0" encoding="utf-8"?>
+<p:tagLst xmlns:a="http://schemas.openxmlformats.org/drawingml/2006/main" xmlns:r="http://schemas.openxmlformats.org/officeDocument/2006/relationships" xmlns:p="http://schemas.openxmlformats.org/presentationml/2006/main">
+  <p:tag name="OUTPUTDPI" val="1200"/>
+  <p:tag name="ORIGINALHEIGHT" val="124.4844"/>
+  <p:tag name="ORIGINALWIDTH" val="1040.87"/>
+  <p:tag name="LATEXADDIN" val="\documentclass{article}&#10;\usepackage{amsmath}&#10;\pagestyle{empty}&#10;\begin{document}&#10;&#10;&#10;$$ V | \textrm{Miss} \sim \textrm{Unif}(0, 1)$$&#10;&#10;\end{document}"/>
+  <p:tag name="IGUANATEXSIZE" val="28"/>
+  <p:tag name="IGUANATEXCURSOR" val="126"/>
+  <p:tag name="TRANSPARENCY" val="True"/>
+  <p:tag name="FILENAME" val=""/>
+  <p:tag name="LATEXENGINEID" val="0"/>
+  <p:tag name="TEMPFOLDER" val="c:\temp\"/>
+  <p:tag name="LATEXFORMHEIGHT" val="312"/>
+  <p:tag name="LATEXFORMWIDTH" val="384"/>
+  <p:tag name="LATEXFORMWRAP" val="True"/>
+  <p:tag name="BITMAPVECTOR" val="0"/>
+</p:tagLst>
+</file>
+
+<file path=ppt/tags/tag18.xml><?xml version="1.0" encoding="utf-8"?>
+<p:tagLst xmlns:a="http://schemas.openxmlformats.org/drawingml/2006/main" xmlns:r="http://schemas.openxmlformats.org/officeDocument/2006/relationships" xmlns:p="http://schemas.openxmlformats.org/presentationml/2006/main">
+  <p:tag name="OUTPUTDPI" val="1200"/>
+  <p:tag name="ORIGINALHEIGHT" val="161.2298"/>
+  <p:tag name="ORIGINALWIDTH" val="1250.094"/>
+  <p:tag name="LATEXADDIN" val="\documentclass{article}&#10;\usepackage{amsmath}&#10;\pagestyle{empty}&#10;\begin{document}&#10;&#10;&#10;$$ f(v) \propto e^{-\lambda v} = e^{-\lambda s^2/ \tau^2}$$&#10;&#10;\end{document}"/>
+  <p:tag name="IGUANATEXSIZE" val="28"/>
+  <p:tag name="IGUANATEXCURSOR" val="130"/>
+  <p:tag name="TRANSPARENCY" val="True"/>
+  <p:tag name="FILENAME" val=""/>
+  <p:tag name="LATEXENGINEID" val="0"/>
+  <p:tag name="TEMPFOLDER" val="c:\temp\"/>
+  <p:tag name="LATEXFORMHEIGHT" val="312"/>
+  <p:tag name="LATEXFORMWIDTH" val="513"/>
+  <p:tag name="LATEXFORMWRAP" val="True"/>
+  <p:tag name="BITMAPVECTOR" val="0"/>
+</p:tagLst>
+</file>
+
+<file path=ppt/tags/tag19.xml><?xml version="1.0" encoding="utf-8"?>
+<p:tagLst xmlns:a="http://schemas.openxmlformats.org/drawingml/2006/main" xmlns:r="http://schemas.openxmlformats.org/officeDocument/2006/relationships" xmlns:p="http://schemas.openxmlformats.org/presentationml/2006/main">
+  <p:tag name="OUTPUTDPI" val="1200"/>
+  <p:tag name="ORIGINALHEIGHT" val="161.2298"/>
+  <p:tag name="ORIGINALWIDTH" val="840.6449"/>
+  <p:tag name="LATEXADDIN" val="\documentclass{article}&#10;\usepackage{amsmath}&#10;\pagestyle{empty}&#10;\begin{document}&#10;&#10;&#10;$$ f(v) \propto e^{-s^2 / 2 R^2}$$&#10;&#10;\end{document}"/>
+  <p:tag name="IGUANATEXSIZE" val="28"/>
+  <p:tag name="IGUANATEXCURSOR" val="98"/>
+  <p:tag name="TRANSPARENCY" val="True"/>
+  <p:tag name="FILENAME" val=""/>
+  <p:tag name="LATEXENGINEID" val="0"/>
+  <p:tag name="TEMPFOLDER" val="c:\temp\"/>
+  <p:tag name="LATEXFORMHEIGHT" val="312"/>
+  <p:tag name="LATEXFORMWIDTH" val="513"/>
+  <p:tag name="LATEXFORMWRAP" val="True"/>
+  <p:tag name="BITMAPVECTOR" val="0"/>
+</p:tagLst>
+</file>
+
 <file path=ppt/tags/tag2.xml><?xml version="1.0" encoding="utf-8"?>
 <p:tagLst xmlns:a="http://schemas.openxmlformats.org/drawingml/2006/main" xmlns:r="http://schemas.openxmlformats.org/officeDocument/2006/relationships" xmlns:p="http://schemas.openxmlformats.org/presentationml/2006/main">
   <p:tag name="OUTPUTDPI" val="1200"/>
@@ -9229,6 +13724,139 @@
   <p:tag name="LATEXADDIN" val="\documentclass{article}&#10;\usepackage{amsmath}&#10;\pagestyle{empty}&#10;\begin{document}&#10;&#10;\begin{align*}&#10;M &amp;= E - e \sin(E) &amp; \textrm{Kepler's Equation} \\&#10;\tan \left(\frac{f}{2} \right) &amp;= \sqrt{\frac{1+e}{1-e}} \cdot \tan \left( \frac{E}{2} \right) &amp;\textrm{true to eccentric}&#10;\end{align*}&#10;&#10;\end{document}"/>
   <p:tag name="IGUANATEXSIZE" val="20"/>
   <p:tag name="IGUANATEXCURSOR" val="282"/>
+  <p:tag name="TRANSPARENCY" val="True"/>
+  <p:tag name="FILENAME" val=""/>
+  <p:tag name="LATEXENGINEID" val="0"/>
+  <p:tag name="TEMPFOLDER" val="c:\temp\"/>
+  <p:tag name="LATEXFORMHEIGHT" val="312"/>
+  <p:tag name="LATEXFORMWIDTH" val="384"/>
+  <p:tag name="LATEXFORMWRAP" val="True"/>
+  <p:tag name="BITMAPVECTOR" val="0"/>
+</p:tagLst>
+</file>
+
+<file path=ppt/tags/tag20.xml><?xml version="1.0" encoding="utf-8"?>
+<p:tagLst xmlns:a="http://schemas.openxmlformats.org/drawingml/2006/main" xmlns:r="http://schemas.openxmlformats.org/officeDocument/2006/relationships" xmlns:p="http://schemas.openxmlformats.org/presentationml/2006/main">
+  <p:tag name="OUTPUTDPI" val="1200"/>
+  <p:tag name="ORIGINALHEIGHT" val="276.7154"/>
+  <p:tag name="ORIGINALWIDTH" val="461.1924"/>
+  <p:tag name="LATEXADDIN" val="\documentclass{article}&#10;\usepackage{amsmath}&#10;\pagestyle{empty}&#10;\begin{document}&#10;&#10;&#10;$$ \lambda = \frac{\tau^2}{2R^2}$$&#10;&#10;\end{document}"/>
+  <p:tag name="IGUANATEXSIZE" val="28"/>
+  <p:tag name="IGUANATEXCURSOR" val="113"/>
+  <p:tag name="TRANSPARENCY" val="True"/>
+  <p:tag name="FILENAME" val=""/>
+  <p:tag name="LATEXENGINEID" val="0"/>
+  <p:tag name="TEMPFOLDER" val="c:\temp\"/>
+  <p:tag name="LATEXFORMHEIGHT" val="312"/>
+  <p:tag name="LATEXFORMWIDTH" val="513"/>
+  <p:tag name="LATEXFORMWRAP" val="True"/>
+  <p:tag name="BITMAPVECTOR" val="0"/>
+</p:tagLst>
+</file>
+
+<file path=ppt/tags/tag21.xml><?xml version="1.0" encoding="utf-8"?>
+<p:tagLst xmlns:a="http://schemas.openxmlformats.org/drawingml/2006/main" xmlns:r="http://schemas.openxmlformats.org/officeDocument/2006/relationships" xmlns:p="http://schemas.openxmlformats.org/presentationml/2006/main">
+  <p:tag name="OUTPUTDPI" val="1200"/>
+  <p:tag name="ORIGINALHEIGHT" val="257.2179"/>
+  <p:tag name="ORIGINALWIDTH" val="1123.36"/>
+  <p:tag name="LATEXADDIN" val="\documentclass{article}&#10;\usepackage{amsmath}&#10;\pagestyle{empty}&#10;\begin{document}&#10;&#10;$$ h \cdot \frac{\lambda v}{1 - e^{-\lambda}} + (1 - h)$$&#10;&#10;\end{document}"/>
+  <p:tag name="IGUANATEXSIZE" val="28"/>
+  <p:tag name="IGUANATEXCURSOR" val="81"/>
+  <p:tag name="TRANSPARENCY" val="True"/>
+  <p:tag name="FILENAME" val=""/>
+  <p:tag name="LATEXENGINEID" val="0"/>
+  <p:tag name="TEMPFOLDER" val="c:\temp\"/>
+  <p:tag name="LATEXFORMHEIGHT" val="312"/>
+  <p:tag name="LATEXFORMWIDTH" val="513"/>
+  <p:tag name="LATEXFORMWRAP" val="True"/>
+  <p:tag name="BITMAPVECTOR" val="0"/>
+</p:tagLst>
+</file>
+
+<file path=ppt/tags/tag22.xml><?xml version="1.0" encoding="utf-8"?>
+<p:tagLst xmlns:a="http://schemas.openxmlformats.org/drawingml/2006/main" xmlns:r="http://schemas.openxmlformats.org/officeDocument/2006/relationships" xmlns:p="http://schemas.openxmlformats.org/presentationml/2006/main">
+  <p:tag name="OUTPUTDPI" val="1200"/>
+  <p:tag name="ORIGINALHEIGHT" val="358.4552"/>
+  <p:tag name="ORIGINALWIDTH" val="2262.467"/>
+  <p:tag name="LATEXADDIN" val="\documentclass{article}&#10;\usepackage{amsmath}&#10;\pagestyle{empty}&#10;\begin{document}&#10;&#10;$$ \mathcal{L}(\mathbf{v}, h, \lambda) = \sum_{j=1}^{n} \log \left( h \cdot \frac{\lambda v_j}{1 - e^{-\lambda}} + 1 - h \right)$$&#10;&#10;&#10;\end{document}"/>
+  <p:tag name="IGUANATEXSIZE" val="28"/>
+  <p:tag name="IGUANATEXCURSOR" val="106"/>
+  <p:tag name="TRANSPARENCY" val="True"/>
+  <p:tag name="FILENAME" val=""/>
+  <p:tag name="LATEXENGINEID" val="0"/>
+  <p:tag name="TEMPFOLDER" val="c:\temp\"/>
+  <p:tag name="LATEXFORMHEIGHT" val="312"/>
+  <p:tag name="LATEXFORMWIDTH" val="384"/>
+  <p:tag name="LATEXFORMWRAP" val="True"/>
+  <p:tag name="BITMAPVECTOR" val="0"/>
+</p:tagLst>
+</file>
+
+<file path=ppt/tags/tag23.xml><?xml version="1.0" encoding="utf-8"?>
+<p:tagLst xmlns:a="http://schemas.openxmlformats.org/drawingml/2006/main" xmlns:r="http://schemas.openxmlformats.org/officeDocument/2006/relationships" xmlns:p="http://schemas.openxmlformats.org/presentationml/2006/main">
+  <p:tag name="OUTPUTDPI" val="1200"/>
+  <p:tag name="ORIGINALHEIGHT" val="362.9547"/>
+  <p:tag name="ORIGINALWIDTH" val="785.1518"/>
+  <p:tag name="LATEXADDIN" val="\documentclass{article}&#10;\usepackage{amsmath}&#10;\pagestyle{empty}&#10;\begin{document}&#10;&#10;$$ \mathcal{L} = \sum_{i=1}^{b} w_i \cdot \mathcal{L}_i $$&#10;&#10;&#10;\end{document}"/>
+  <p:tag name="IGUANATEXSIZE" val="24"/>
+  <p:tag name="IGUANATEXCURSOR" val="123"/>
+  <p:tag name="TRANSPARENCY" val="True"/>
+  <p:tag name="FILENAME" val=""/>
+  <p:tag name="LATEXENGINEID" val="0"/>
+  <p:tag name="TEMPFOLDER" val="c:\temp\"/>
+  <p:tag name="LATEXFORMHEIGHT" val="312"/>
+  <p:tag name="LATEXFORMWIDTH" val="384"/>
+  <p:tag name="LATEXFORMWRAP" val="True"/>
+  <p:tag name="BITMAPVECTOR" val="0"/>
+</p:tagLst>
+</file>
+
+<file path=ppt/tags/tag24.xml><?xml version="1.0" encoding="utf-8"?>
+<p:tagLst xmlns:a="http://schemas.openxmlformats.org/drawingml/2006/main" xmlns:r="http://schemas.openxmlformats.org/officeDocument/2006/relationships" xmlns:p="http://schemas.openxmlformats.org/presentationml/2006/main">
+  <p:tag name="OUTPUTDPI" val="1200"/>
+  <p:tag name="ORIGINALHEIGHT" val="362.9547"/>
+  <p:tag name="ORIGINALWIDTH" val="1076.115"/>
+  <p:tag name="LATEXADDIN" val="\documentclass{article}&#10;\usepackage{amsmath}&#10;\pagestyle{empty}&#10;\begin{document}&#10;&#10;$$ \mathcal{L} = \sum_{i=1}^{b} w_i \cdot \frac{\mathcal{L}_i}{R_i^\alpha \cdot \tau_i^\beta} $$&#10;&#10;&#10;\end{document}"/>
+  <p:tag name="IGUANATEXSIZE" val="24"/>
+  <p:tag name="IGUANATEXCURSOR" val="173"/>
+  <p:tag name="TRANSPARENCY" val="True"/>
+  <p:tag name="FILENAME" val=""/>
+  <p:tag name="LATEXENGINEID" val="0"/>
+  <p:tag name="TEMPFOLDER" val="c:\temp\"/>
+  <p:tag name="LATEXFORMHEIGHT" val="312"/>
+  <p:tag name="LATEXFORMWIDTH" val="384"/>
+  <p:tag name="LATEXFORMWRAP" val="True"/>
+  <p:tag name="BITMAPVECTOR" val="0"/>
+</p:tagLst>
+</file>
+
+<file path=ppt/tags/tag25.xml><?xml version="1.0" encoding="utf-8"?>
+<p:tagLst xmlns:a="http://schemas.openxmlformats.org/drawingml/2006/main" xmlns:r="http://schemas.openxmlformats.org/officeDocument/2006/relationships" xmlns:p="http://schemas.openxmlformats.org/presentationml/2006/main">
+  <p:tag name="OUTPUTDPI" val="1200"/>
+  <p:tag name="ORIGINALHEIGHT" val="450.6936"/>
+  <p:tag name="ORIGINALWIDTH" val="1075.366"/>
+  <p:tag name="LATEXADDIN" val="\documentclass{article}&#10;\usepackage{amsmath}&#10;\pagestyle{empty}&#10;\begin{document}&#10;&#10;&#10;\begin{align*}&#10;u &amp;= \frac{1/2 + \arcsin(x)}{\pi} \\&#10;z &amp;= \Phi^{-1}(u)&#10;\end{align*}&#10;&#10;\end{document}"/>
+  <p:tag name="IGUANATEXSIZE" val="18"/>
+  <p:tag name="IGUANATEXCURSOR" val="164"/>
+  <p:tag name="TRANSPARENCY" val="True"/>
+  <p:tag name="FILENAME" val=""/>
+  <p:tag name="LATEXENGINEID" val="0"/>
+  <p:tag name="TEMPFOLDER" val="c:\temp\"/>
+  <p:tag name="LATEXFORMHEIGHT" val="312"/>
+  <p:tag name="LATEXFORMWIDTH" val="384"/>
+  <p:tag name="LATEXFORMWRAP" val="True"/>
+  <p:tag name="BITMAPVECTOR" val="0"/>
+</p:tagLst>
+</file>
+
+<file path=ppt/tags/tag26.xml><?xml version="1.0" encoding="utf-8"?>
+<p:tagLst xmlns:a="http://schemas.openxmlformats.org/drawingml/2006/main" xmlns:r="http://schemas.openxmlformats.org/officeDocument/2006/relationships" xmlns:p="http://schemas.openxmlformats.org/presentationml/2006/main">
+  <p:tag name="OUTPUTDPI" val="1200"/>
+  <p:tag name="ORIGINALHEIGHT" val="125.2343"/>
+  <p:tag name="ORIGINALWIDTH" val="1522.31"/>
+  <p:tag name="LATEXADDIN" val="\documentclass{article}&#10;\usepackage{amsmath}&#10;\pagestyle{empty}&#10;\begin{document}&#10;&#10;$$\lVert \epsilon_2 - \epsilon_2 \rVert_{\mathrm{cov}} =  &#10;\lVert X_2 \beta - X_1 \beta \rVert $$&#10;&#10;\end{document}"/>
+  <p:tag name="IGUANATEXSIZE" val="18"/>
+  <p:tag name="IGUANATEXCURSOR" val="176"/>
   <p:tag name="TRANSPARENCY" val="True"/>
   <p:tag name="FILENAME" val=""/>
   <p:tag name="LATEXENGINEID" val="0"/>

</xml_diff>

<commit_message>
thesis presentation / completed draft
</commit_message>
<xml_diff>
--- a/thesis/kepler-sieve-slides.pptx
+++ b/thesis/kepler-sieve-slides.pptx
@@ -49,7 +49,14 @@
     <p:sldId id="299" r:id="rId43"/>
     <p:sldId id="301" r:id="rId44"/>
     <p:sldId id="300" r:id="rId45"/>
-    <p:sldId id="302" r:id="rId46"/>
+    <p:sldId id="303" r:id="rId46"/>
+    <p:sldId id="304" r:id="rId47"/>
+    <p:sldId id="302" r:id="rId48"/>
+    <p:sldId id="305" r:id="rId49"/>
+    <p:sldId id="307" r:id="rId50"/>
+    <p:sldId id="308" r:id="rId51"/>
+    <p:sldId id="309" r:id="rId52"/>
+    <p:sldId id="310" r:id="rId53"/>
   </p:sldIdLst>
   <p:sldSz cx="12192000" cy="6858000"/>
   <p:notesSz cx="6858000" cy="9144000"/>
@@ -12536,7 +12543,7 @@
           <p:cNvPr id="2" name="Title 1">
             <a:extLst>
               <a:ext uri="{FF2B5EF4-FFF2-40B4-BE49-F238E27FC236}">
-                <a16:creationId xmlns:a16="http://schemas.microsoft.com/office/drawing/2014/main" id="{9C69E8AC-E149-4DFE-A645-5167EF738C89}"/>
+                <a16:creationId xmlns:a16="http://schemas.microsoft.com/office/drawing/2014/main" id="{14C54F83-1489-4CFC-AE65-BCB7D7EA7C6B}"/>
               </a:ext>
             </a:extLst>
           </p:cNvPr>
@@ -12555,18 +12562,384 @@
           <a:lstStyle/>
           <a:p>
             <a:r>
-              <a:rPr lang="en-US" sz="3800" dirty="0"/>
+              <a:rPr lang="en-US" sz="3600" dirty="0"/>
               <a:t>Search Known Asteroids with Random Initializations</a:t>
             </a:r>
           </a:p>
         </p:txBody>
       </p:sp>
-      <p:sp>
-        <p:nvSpPr>
-          <p:cNvPr id="3" name="Content Placeholder 2">
-            <a:extLst>
-              <a:ext uri="{FF2B5EF4-FFF2-40B4-BE49-F238E27FC236}">
-                <a16:creationId xmlns:a16="http://schemas.microsoft.com/office/drawing/2014/main" id="{F410BE54-9C53-4A0E-B6E7-9D515380C1F9}"/>
+      <p:pic>
+        <p:nvPicPr>
+          <p:cNvPr id="5" name="Content Placeholder 4">
+            <a:extLst>
+              <a:ext uri="{FF2B5EF4-FFF2-40B4-BE49-F238E27FC236}">
+                <a16:creationId xmlns:a16="http://schemas.microsoft.com/office/drawing/2014/main" id="{607D30C2-3627-433B-B9F8-865F106F6BE6}"/>
+              </a:ext>
+            </a:extLst>
+          </p:cNvPr>
+          <p:cNvPicPr>
+            <a:picLocks noGrp="1" noChangeAspect="1"/>
+          </p:cNvPicPr>
+          <p:nvPr>
+            <p:ph idx="1"/>
+          </p:nvPr>
+        </p:nvPicPr>
+        <p:blipFill>
+          <a:blip r:embed="rId2">
+            <a:extLst>
+              <a:ext uri="{28A0092B-C50C-407E-A947-70E740481C1C}">
+                <a14:useLocalDpi xmlns:a14="http://schemas.microsoft.com/office/drawing/2010/main" val="0"/>
+              </a:ext>
+            </a:extLst>
+          </a:blip>
+          <a:srcRect/>
+          <a:stretch/>
+        </p:blipFill>
+        <p:spPr>
+          <a:xfrm>
+            <a:off x="119595" y="1436914"/>
+            <a:ext cx="3902843" cy="2512733"/>
+          </a:xfrm>
+        </p:spPr>
+      </p:pic>
+      <p:pic>
+        <p:nvPicPr>
+          <p:cNvPr id="7" name="Picture 6">
+            <a:extLst>
+              <a:ext uri="{FF2B5EF4-FFF2-40B4-BE49-F238E27FC236}">
+                <a16:creationId xmlns:a16="http://schemas.microsoft.com/office/drawing/2014/main" id="{2602DB02-0CA2-4849-9269-F215A6374F52}"/>
+              </a:ext>
+            </a:extLst>
+          </p:cNvPr>
+          <p:cNvPicPr>
+            <a:picLocks noChangeAspect="1"/>
+          </p:cNvPicPr>
+          <p:nvPr/>
+        </p:nvPicPr>
+        <p:blipFill>
+          <a:blip r:embed="rId3">
+            <a:extLst>
+              <a:ext uri="{28A0092B-C50C-407E-A947-70E740481C1C}">
+                <a14:useLocalDpi xmlns:a14="http://schemas.microsoft.com/office/drawing/2010/main" val="0"/>
+              </a:ext>
+            </a:extLst>
+          </a:blip>
+          <a:srcRect/>
+          <a:stretch/>
+        </p:blipFill>
+        <p:spPr>
+          <a:xfrm>
+            <a:off x="4209376" y="1450016"/>
+            <a:ext cx="3919640" cy="2523548"/>
+          </a:xfrm>
+          <a:prstGeom prst="rect">
+            <a:avLst/>
+          </a:prstGeom>
+        </p:spPr>
+      </p:pic>
+      <p:pic>
+        <p:nvPicPr>
+          <p:cNvPr id="9" name="Picture 8">
+            <a:extLst>
+              <a:ext uri="{FF2B5EF4-FFF2-40B4-BE49-F238E27FC236}">
+                <a16:creationId xmlns:a16="http://schemas.microsoft.com/office/drawing/2014/main" id="{D1F7CDA0-467C-4FF4-A43C-5F5C89B0DA0C}"/>
+              </a:ext>
+            </a:extLst>
+          </p:cNvPr>
+          <p:cNvPicPr>
+            <a:picLocks noChangeAspect="1"/>
+          </p:cNvPicPr>
+          <p:nvPr/>
+        </p:nvPicPr>
+        <p:blipFill>
+          <a:blip r:embed="rId4">
+            <a:extLst>
+              <a:ext uri="{28A0092B-C50C-407E-A947-70E740481C1C}">
+                <a14:useLocalDpi xmlns:a14="http://schemas.microsoft.com/office/drawing/2010/main" val="0"/>
+              </a:ext>
+            </a:extLst>
+          </a:blip>
+          <a:srcRect/>
+          <a:stretch/>
+        </p:blipFill>
+        <p:spPr>
+          <a:xfrm>
+            <a:off x="159723" y="4122964"/>
+            <a:ext cx="3886632" cy="2512734"/>
+          </a:xfrm>
+          <a:prstGeom prst="rect">
+            <a:avLst/>
+          </a:prstGeom>
+        </p:spPr>
+      </p:pic>
+      <p:pic>
+        <p:nvPicPr>
+          <p:cNvPr id="11" name="Picture 10">
+            <a:extLst>
+              <a:ext uri="{FF2B5EF4-FFF2-40B4-BE49-F238E27FC236}">
+                <a16:creationId xmlns:a16="http://schemas.microsoft.com/office/drawing/2014/main" id="{1E75D57E-C5D3-4755-BD9C-CE1E2F5DB82D}"/>
+              </a:ext>
+            </a:extLst>
+          </p:cNvPr>
+          <p:cNvPicPr>
+            <a:picLocks noChangeAspect="1"/>
+          </p:cNvPicPr>
+          <p:nvPr/>
+        </p:nvPicPr>
+        <p:blipFill>
+          <a:blip r:embed="rId5">
+            <a:extLst>
+              <a:ext uri="{28A0092B-C50C-407E-A947-70E740481C1C}">
+                <a14:useLocalDpi xmlns:a14="http://schemas.microsoft.com/office/drawing/2010/main" val="0"/>
+              </a:ext>
+            </a:extLst>
+          </a:blip>
+          <a:srcRect/>
+          <a:stretch/>
+        </p:blipFill>
+        <p:spPr>
+          <a:xfrm>
+            <a:off x="4165561" y="4139699"/>
+            <a:ext cx="3862975" cy="2492242"/>
+          </a:xfrm>
+          <a:prstGeom prst="rect">
+            <a:avLst/>
+          </a:prstGeom>
+        </p:spPr>
+      </p:pic>
+      <p:sp>
+        <p:nvSpPr>
+          <p:cNvPr id="12" name="TextBox 11">
+            <a:extLst>
+              <a:ext uri="{FF2B5EF4-FFF2-40B4-BE49-F238E27FC236}">
+                <a16:creationId xmlns:a16="http://schemas.microsoft.com/office/drawing/2014/main" id="{848DF235-7E8A-4A09-92C7-2E061ADF1150}"/>
+              </a:ext>
+            </a:extLst>
+          </p:cNvPr>
+          <p:cNvSpPr txBox="1"/>
+          <p:nvPr/>
+        </p:nvSpPr>
+        <p:spPr>
+          <a:xfrm>
+            <a:off x="8352088" y="1450016"/>
+            <a:ext cx="3643968" cy="5016758"/>
+          </a:xfrm>
+          <a:prstGeom prst="rect">
+            <a:avLst/>
+          </a:prstGeom>
+          <a:noFill/>
+        </p:spPr>
+        <p:txBody>
+          <a:bodyPr wrap="square" rtlCol="0">
+            <a:spAutoFit/>
+          </a:bodyPr>
+          <a:lstStyle/>
+          <a:p>
+            <a:pPr marL="285750" indent="-285750">
+              <a:buFont typeface="Arial" panose="020B0604020202020204" pitchFamily="34" charset="0"/>
+              <a:buChar char="•"/>
+            </a:pPr>
+            <a:r>
+              <a:rPr lang="en-US" sz="1600" dirty="0"/>
+              <a:t>~4096 random seeds</a:t>
+            </a:r>
+          </a:p>
+          <a:p>
+            <a:pPr marL="285750" indent="-285750">
+              <a:buFont typeface="Arial" panose="020B0604020202020204" pitchFamily="34" charset="0"/>
+              <a:buChar char="•"/>
+            </a:pPr>
+            <a:r>
+              <a:rPr lang="en-US" sz="1600" dirty="0"/>
+              <a:t>Each batch started with 1024 random elements</a:t>
+            </a:r>
+          </a:p>
+          <a:p>
+            <a:pPr marL="285750" indent="-285750">
+              <a:buFont typeface="Arial" panose="020B0604020202020204" pitchFamily="34" charset="0"/>
+              <a:buChar char="•"/>
+            </a:pPr>
+            <a:r>
+              <a:rPr lang="en-US" sz="1600" dirty="0"/>
+              <a:t>Selected best 64 by mean log(v)</a:t>
+            </a:r>
+          </a:p>
+          <a:p>
+            <a:pPr marL="285750" indent="-285750">
+              <a:buFont typeface="Arial" panose="020B0604020202020204" pitchFamily="34" charset="0"/>
+              <a:buChar char="•"/>
+            </a:pPr>
+            <a:r>
+              <a:rPr lang="en-US" sz="1600" dirty="0"/>
+              <a:t>Trained for ~5 days on 4 GPUs</a:t>
+            </a:r>
+          </a:p>
+          <a:p>
+            <a:pPr marL="285750" indent="-285750">
+              <a:buFont typeface="Arial" panose="020B0604020202020204" pitchFamily="34" charset="0"/>
+              <a:buChar char="•"/>
+            </a:pPr>
+            <a:r>
+              <a:rPr lang="en-US" sz="1600" dirty="0"/>
+              <a:t>Reported fits with ≥ 8 hits and resolution &lt; 20 arc seconds</a:t>
+            </a:r>
+          </a:p>
+          <a:p>
+            <a:pPr marL="285750" indent="-285750">
+              <a:buFont typeface="Arial" panose="020B0604020202020204" pitchFamily="34" charset="0"/>
+              <a:buChar char="•"/>
+            </a:pPr>
+            <a:r>
+              <a:rPr lang="en-US" sz="1600" dirty="0"/>
+              <a:t>Recovered Elements: 125</a:t>
+            </a:r>
+          </a:p>
+          <a:p>
+            <a:pPr marL="285750" indent="-285750">
+              <a:buFont typeface="Arial" panose="020B0604020202020204" pitchFamily="34" charset="0"/>
+              <a:buChar char="•"/>
+            </a:pPr>
+            <a:r>
+              <a:rPr lang="en-US" sz="1600" dirty="0"/>
+              <a:t>Hits: 19.2</a:t>
+            </a:r>
+          </a:p>
+          <a:p>
+            <a:pPr marL="285750" indent="-285750">
+              <a:buFont typeface="Arial" panose="020B0604020202020204" pitchFamily="34" charset="0"/>
+              <a:buChar char="•"/>
+            </a:pPr>
+            <a:r>
+              <a:rPr lang="en-US" sz="1600" dirty="0"/>
+              <a:t>Resolution: 9.3 arc seconds</a:t>
+            </a:r>
+          </a:p>
+          <a:p>
+            <a:pPr marL="285750" indent="-285750">
+              <a:buFont typeface="Arial" panose="020B0604020202020204" pitchFamily="34" charset="0"/>
+              <a:buChar char="•"/>
+            </a:pPr>
+            <a:r>
+              <a:rPr lang="en-US" sz="1600" dirty="0"/>
+              <a:t>Nearest Asteroid Distance: 2.66E-3 AU</a:t>
+            </a:r>
+          </a:p>
+          <a:p>
+            <a:pPr marL="285750" indent="-285750">
+              <a:buFont typeface="Arial" panose="020B0604020202020204" pitchFamily="34" charset="0"/>
+              <a:buChar char="•"/>
+            </a:pPr>
+            <a:r>
+              <a:rPr lang="en-US" sz="1600" dirty="0"/>
+              <a:t>Nearest Asteroid </a:t>
+            </a:r>
+            <a:r>
+              <a:rPr lang="en-US" sz="1600" dirty="0" err="1"/>
+              <a:t>Cov</a:t>
+            </a:r>
+            <a:r>
+              <a:rPr lang="en-US" sz="1600" dirty="0"/>
+              <a:t>. Norm: 0.73</a:t>
+            </a:r>
+          </a:p>
+          <a:p>
+            <a:pPr marL="285750" indent="-285750">
+              <a:buFont typeface="Arial" panose="020B0604020202020204" pitchFamily="34" charset="0"/>
+              <a:buChar char="•"/>
+            </a:pPr>
+            <a:r>
+              <a:rPr lang="en-US" sz="1600" dirty="0"/>
+              <a:t>Comments on fit quality:</a:t>
+            </a:r>
+          </a:p>
+          <a:p>
+            <a:pPr marL="742950" lvl="1" indent="-285750">
+              <a:buFont typeface="Arial" panose="020B0604020202020204" pitchFamily="34" charset="0"/>
+              <a:buChar char="•"/>
+            </a:pPr>
+            <a:r>
+              <a:rPr lang="en-US" sz="1600" dirty="0"/>
+              <a:t>Decent fit on some</a:t>
+            </a:r>
+          </a:p>
+          <a:p>
+            <a:pPr marL="742950" lvl="1" indent="-285750">
+              <a:buFont typeface="Arial" panose="020B0604020202020204" pitchFamily="34" charset="0"/>
+              <a:buChar char="•"/>
+            </a:pPr>
+            <a:r>
+              <a:rPr lang="en-US" sz="1600" dirty="0"/>
+              <a:t>Probably spurious on others</a:t>
+            </a:r>
+          </a:p>
+          <a:p>
+            <a:pPr marL="742950" lvl="1" indent="-285750">
+              <a:buFont typeface="Arial" panose="020B0604020202020204" pitchFamily="34" charset="0"/>
+              <a:buChar char="•"/>
+            </a:pPr>
+            <a:r>
+              <a:rPr lang="en-US" sz="1600" dirty="0"/>
+              <a:t>Overall shows that this can work</a:t>
+            </a:r>
+          </a:p>
+          <a:p>
+            <a:pPr marL="742950" lvl="1" indent="-285750">
+              <a:buFont typeface="Arial" panose="020B0604020202020204" pitchFamily="34" charset="0"/>
+              <a:buChar char="•"/>
+            </a:pPr>
+            <a:r>
+              <a:rPr lang="en-US" sz="1600" dirty="0"/>
+              <a:t>But not ready for production</a:t>
+            </a:r>
+          </a:p>
+          <a:p>
+            <a:pPr marL="285750" indent="-285750">
+              <a:buFont typeface="Arial" panose="020B0604020202020204" pitchFamily="34" charset="0"/>
+              <a:buChar char="•"/>
+            </a:pPr>
+            <a:r>
+              <a:rPr lang="en-US" sz="1600" dirty="0"/>
+              <a:t>Baseball analogy continued: facing Roger Clemens, but trying to get hit by the pitch to get on base cheaply</a:t>
+            </a:r>
+          </a:p>
+        </p:txBody>
+      </p:sp>
+    </p:spTree>
+    <p:extLst>
+      <p:ext uri="{BB962C8B-B14F-4D97-AF65-F5344CB8AC3E}">
+        <p14:creationId xmlns:p14="http://schemas.microsoft.com/office/powerpoint/2010/main" val="4011990801"/>
+      </p:ext>
+    </p:extLst>
+  </p:cSld>
+  <p:clrMapOvr>
+    <a:masterClrMapping/>
+  </p:clrMapOvr>
+</p:sld>
+</file>
+
+<file path=ppt/slides/slide46.xml><?xml version="1.0" encoding="utf-8"?>
+<p:sld xmlns:a="http://schemas.openxmlformats.org/drawingml/2006/main" xmlns:r="http://schemas.openxmlformats.org/officeDocument/2006/relationships" xmlns:p="http://schemas.openxmlformats.org/presentationml/2006/main">
+  <p:cSld>
+    <p:spTree>
+      <p:nvGrpSpPr>
+        <p:cNvPr id="1" name=""/>
+        <p:cNvGrpSpPr/>
+        <p:nvPr/>
+      </p:nvGrpSpPr>
+      <p:grpSpPr>
+        <a:xfrm>
+          <a:off x="0" y="0"/>
+          <a:ext cx="0" cy="0"/>
+          <a:chOff x="0" y="0"/>
+          <a:chExt cx="0" cy="0"/>
+        </a:xfrm>
+      </p:grpSpPr>
+      <p:sp>
+        <p:nvSpPr>
+          <p:cNvPr id="2" name="Title 1">
+            <a:extLst>
+              <a:ext uri="{FF2B5EF4-FFF2-40B4-BE49-F238E27FC236}">
+                <a16:creationId xmlns:a16="http://schemas.microsoft.com/office/drawing/2014/main" id="{14C54F83-1489-4CFC-AE65-BCB7D7EA7C6B}"/>
               </a:ext>
             </a:extLst>
           </p:cNvPr>
@@ -12574,22 +12947,1008 @@
             <a:spLocks noGrp="1"/>
           </p:cNvSpPr>
           <p:nvPr>
+            <p:ph type="title"/>
+          </p:nvPr>
+        </p:nvSpPr>
+        <p:spPr/>
+        <p:txBody>
+          <a:bodyPr>
+            <a:normAutofit/>
+          </a:bodyPr>
+          <a:lstStyle/>
+          <a:p>
+            <a:r>
+              <a:rPr lang="en-US" sz="3600" dirty="0"/>
+              <a:t>Search Unknown Asteroids with Random Initializations</a:t>
+            </a:r>
+          </a:p>
+        </p:txBody>
+      </p:sp>
+      <p:pic>
+        <p:nvPicPr>
+          <p:cNvPr id="5" name="Content Placeholder 4">
+            <a:extLst>
+              <a:ext uri="{FF2B5EF4-FFF2-40B4-BE49-F238E27FC236}">
+                <a16:creationId xmlns:a16="http://schemas.microsoft.com/office/drawing/2014/main" id="{607D30C2-3627-433B-B9F8-865F106F6BE6}"/>
+              </a:ext>
+            </a:extLst>
+          </p:cNvPr>
+          <p:cNvPicPr>
+            <a:picLocks noGrp="1" noChangeAspect="1"/>
+          </p:cNvPicPr>
+          <p:nvPr>
             <p:ph idx="1"/>
           </p:nvPr>
+        </p:nvPicPr>
+        <p:blipFill>
+          <a:blip r:embed="rId2">
+            <a:extLst>
+              <a:ext uri="{28A0092B-C50C-407E-A947-70E740481C1C}">
+                <a14:useLocalDpi xmlns:a14="http://schemas.microsoft.com/office/drawing/2010/main" val="0"/>
+              </a:ext>
+            </a:extLst>
+          </a:blip>
+          <a:srcRect/>
+          <a:stretch/>
+        </p:blipFill>
+        <p:spPr>
+          <a:xfrm>
+            <a:off x="139860" y="1436914"/>
+            <a:ext cx="3862313" cy="2512733"/>
+          </a:xfrm>
+        </p:spPr>
+      </p:pic>
+      <p:pic>
+        <p:nvPicPr>
+          <p:cNvPr id="7" name="Picture 6">
+            <a:extLst>
+              <a:ext uri="{FF2B5EF4-FFF2-40B4-BE49-F238E27FC236}">
+                <a16:creationId xmlns:a16="http://schemas.microsoft.com/office/drawing/2014/main" id="{2602DB02-0CA2-4849-9269-F215A6374F52}"/>
+              </a:ext>
+            </a:extLst>
+          </p:cNvPr>
+          <p:cNvPicPr>
+            <a:picLocks noChangeAspect="1"/>
+          </p:cNvPicPr>
+          <p:nvPr/>
+        </p:nvPicPr>
+        <p:blipFill>
+          <a:blip r:embed="rId3">
+            <a:extLst>
+              <a:ext uri="{28A0092B-C50C-407E-A947-70E740481C1C}">
+                <a14:useLocalDpi xmlns:a14="http://schemas.microsoft.com/office/drawing/2010/main" val="0"/>
+              </a:ext>
+            </a:extLst>
+          </a:blip>
+          <a:srcRect/>
+          <a:stretch/>
+        </p:blipFill>
+        <p:spPr>
+          <a:xfrm>
+            <a:off x="4229727" y="1450016"/>
+            <a:ext cx="3878937" cy="2523548"/>
+          </a:xfrm>
+          <a:prstGeom prst="rect">
+            <a:avLst/>
+          </a:prstGeom>
+        </p:spPr>
+      </p:pic>
+      <p:pic>
+        <p:nvPicPr>
+          <p:cNvPr id="9" name="Picture 8">
+            <a:extLst>
+              <a:ext uri="{FF2B5EF4-FFF2-40B4-BE49-F238E27FC236}">
+                <a16:creationId xmlns:a16="http://schemas.microsoft.com/office/drawing/2014/main" id="{D1F7CDA0-467C-4FF4-A43C-5F5C89B0DA0C}"/>
+              </a:ext>
+            </a:extLst>
+          </p:cNvPr>
+          <p:cNvPicPr>
+            <a:picLocks noChangeAspect="1"/>
+          </p:cNvPicPr>
+          <p:nvPr/>
+        </p:nvPicPr>
+        <p:blipFill>
+          <a:blip r:embed="rId4">
+            <a:extLst>
+              <a:ext uri="{28A0092B-C50C-407E-A947-70E740481C1C}">
+                <a14:useLocalDpi xmlns:a14="http://schemas.microsoft.com/office/drawing/2010/main" val="0"/>
+              </a:ext>
+            </a:extLst>
+          </a:blip>
+          <a:srcRect/>
+          <a:stretch/>
+        </p:blipFill>
+        <p:spPr>
+          <a:xfrm>
+            <a:off x="159723" y="4122964"/>
+            <a:ext cx="3886632" cy="2512733"/>
+          </a:xfrm>
+          <a:prstGeom prst="rect">
+            <a:avLst/>
+          </a:prstGeom>
+        </p:spPr>
+      </p:pic>
+      <p:pic>
+        <p:nvPicPr>
+          <p:cNvPr id="11" name="Picture 10">
+            <a:extLst>
+              <a:ext uri="{FF2B5EF4-FFF2-40B4-BE49-F238E27FC236}">
+                <a16:creationId xmlns:a16="http://schemas.microsoft.com/office/drawing/2014/main" id="{1E75D57E-C5D3-4755-BD9C-CE1E2F5DB82D}"/>
+              </a:ext>
+            </a:extLst>
+          </p:cNvPr>
+          <p:cNvPicPr>
+            <a:picLocks noChangeAspect="1"/>
+          </p:cNvPicPr>
+          <p:nvPr/>
+        </p:nvPicPr>
+        <p:blipFill>
+          <a:blip r:embed="rId5">
+            <a:extLst>
+              <a:ext uri="{28A0092B-C50C-407E-A947-70E740481C1C}">
+                <a14:useLocalDpi xmlns:a14="http://schemas.microsoft.com/office/drawing/2010/main" val="0"/>
+              </a:ext>
+            </a:extLst>
+          </a:blip>
+          <a:srcRect/>
+          <a:stretch/>
+        </p:blipFill>
+        <p:spPr>
+          <a:xfrm>
+            <a:off x="4183650" y="4139699"/>
+            <a:ext cx="3826797" cy="2492242"/>
+          </a:xfrm>
+          <a:prstGeom prst="rect">
+            <a:avLst/>
+          </a:prstGeom>
+        </p:spPr>
+      </p:pic>
+      <p:sp>
+        <p:nvSpPr>
+          <p:cNvPr id="12" name="TextBox 11">
+            <a:extLst>
+              <a:ext uri="{FF2B5EF4-FFF2-40B4-BE49-F238E27FC236}">
+                <a16:creationId xmlns:a16="http://schemas.microsoft.com/office/drawing/2014/main" id="{848DF235-7E8A-4A09-92C7-2E061ADF1150}"/>
+              </a:ext>
+            </a:extLst>
+          </p:cNvPr>
+          <p:cNvSpPr txBox="1"/>
+          <p:nvPr/>
+        </p:nvSpPr>
+        <p:spPr>
+          <a:xfrm>
+            <a:off x="8352088" y="1450016"/>
+            <a:ext cx="3643968" cy="5016758"/>
+          </a:xfrm>
+          <a:prstGeom prst="rect">
+            <a:avLst/>
+          </a:prstGeom>
+          <a:noFill/>
+        </p:spPr>
+        <p:txBody>
+          <a:bodyPr wrap="square" rtlCol="0">
+            <a:spAutoFit/>
+          </a:bodyPr>
+          <a:lstStyle/>
+          <a:p>
+            <a:pPr marL="285750" indent="-285750">
+              <a:buFont typeface="Arial" panose="020B0604020202020204" pitchFamily="34" charset="0"/>
+              <a:buChar char="•"/>
+            </a:pPr>
+            <a:r>
+              <a:rPr lang="en-US" sz="1600" dirty="0"/>
+              <a:t>4096 random seeds</a:t>
+            </a:r>
+          </a:p>
+          <a:p>
+            <a:pPr marL="285750" indent="-285750">
+              <a:buFont typeface="Arial" panose="020B0604020202020204" pitchFamily="34" charset="0"/>
+              <a:buChar char="•"/>
+            </a:pPr>
+            <a:r>
+              <a:rPr lang="en-US" sz="1600" dirty="0"/>
+              <a:t>Each batch started with 1024 random elements</a:t>
+            </a:r>
+          </a:p>
+          <a:p>
+            <a:pPr marL="285750" indent="-285750">
+              <a:buFont typeface="Arial" panose="020B0604020202020204" pitchFamily="34" charset="0"/>
+              <a:buChar char="•"/>
+            </a:pPr>
+            <a:r>
+              <a:rPr lang="en-US" sz="1600" dirty="0"/>
+              <a:t>Selected best 64 by mean log(v)</a:t>
+            </a:r>
+          </a:p>
+          <a:p>
+            <a:pPr marL="285750" indent="-285750">
+              <a:buFont typeface="Arial" panose="020B0604020202020204" pitchFamily="34" charset="0"/>
+              <a:buChar char="•"/>
+            </a:pPr>
+            <a:r>
+              <a:rPr lang="en-US" sz="1600" dirty="0"/>
+              <a:t>Trained for ~5 days on 4 GPUs</a:t>
+            </a:r>
+          </a:p>
+          <a:p>
+            <a:pPr marL="285750" indent="-285750">
+              <a:buFont typeface="Arial" panose="020B0604020202020204" pitchFamily="34" charset="0"/>
+              <a:buChar char="•"/>
+            </a:pPr>
+            <a:r>
+              <a:rPr lang="en-US" sz="1600" dirty="0"/>
+              <a:t>Reported fits with ≥ 8 hits and resolution &lt; 20 arc seconds</a:t>
+            </a:r>
+          </a:p>
+          <a:p>
+            <a:pPr marL="285750" indent="-285750">
+              <a:buFont typeface="Arial" panose="020B0604020202020204" pitchFamily="34" charset="0"/>
+              <a:buChar char="•"/>
+            </a:pPr>
+            <a:r>
+              <a:rPr lang="en-US" sz="1600" dirty="0"/>
+              <a:t>Recovered Elements: 9</a:t>
+            </a:r>
+          </a:p>
+          <a:p>
+            <a:pPr marL="285750" indent="-285750">
+              <a:buFont typeface="Arial" panose="020B0604020202020204" pitchFamily="34" charset="0"/>
+              <a:buChar char="•"/>
+            </a:pPr>
+            <a:r>
+              <a:rPr lang="en-US" sz="1600" dirty="0"/>
+              <a:t>Hits: 9.1</a:t>
+            </a:r>
+          </a:p>
+          <a:p>
+            <a:pPr marL="285750" indent="-285750">
+              <a:buFont typeface="Arial" panose="020B0604020202020204" pitchFamily="34" charset="0"/>
+              <a:buChar char="•"/>
+            </a:pPr>
+            <a:r>
+              <a:rPr lang="en-US" sz="1600" dirty="0"/>
+              <a:t>Resolution: 5.3 arc seconds</a:t>
+            </a:r>
+          </a:p>
+          <a:p>
+            <a:pPr marL="285750" indent="-285750">
+              <a:buFont typeface="Arial" panose="020B0604020202020204" pitchFamily="34" charset="0"/>
+              <a:buChar char="•"/>
+            </a:pPr>
+            <a:r>
+              <a:rPr lang="en-US" sz="1600" dirty="0"/>
+              <a:t>Nearest Asteroid Distance: 4.10E-3 AU</a:t>
+            </a:r>
+          </a:p>
+          <a:p>
+            <a:pPr marL="285750" indent="-285750">
+              <a:buFont typeface="Arial" panose="020B0604020202020204" pitchFamily="34" charset="0"/>
+              <a:buChar char="•"/>
+            </a:pPr>
+            <a:r>
+              <a:rPr lang="en-US" sz="1600" dirty="0"/>
+              <a:t>Nearest Asteroid </a:t>
+            </a:r>
+            <a:r>
+              <a:rPr lang="en-US" sz="1600" dirty="0" err="1"/>
+              <a:t>Cov</a:t>
+            </a:r>
+            <a:r>
+              <a:rPr lang="en-US" sz="1600" dirty="0"/>
+              <a:t>. Norm: 1.10</a:t>
+            </a:r>
+          </a:p>
+          <a:p>
+            <a:pPr marL="285750" indent="-285750">
+              <a:buFont typeface="Arial" panose="020B0604020202020204" pitchFamily="34" charset="0"/>
+              <a:buChar char="•"/>
+            </a:pPr>
+            <a:r>
+              <a:rPr lang="en-US" sz="1600" dirty="0"/>
+              <a:t>Comments on fit quality:</a:t>
+            </a:r>
+          </a:p>
+          <a:p>
+            <a:pPr marL="742950" lvl="1" indent="-285750">
+              <a:buFont typeface="Arial" panose="020B0604020202020204" pitchFamily="34" charset="0"/>
+              <a:buChar char="•"/>
+            </a:pPr>
+            <a:r>
+              <a:rPr lang="en-US" sz="1600" dirty="0"/>
+              <a:t>Pretty good resolution</a:t>
+            </a:r>
+          </a:p>
+          <a:p>
+            <a:pPr marL="742950" lvl="1" indent="-285750">
+              <a:buFont typeface="Arial" panose="020B0604020202020204" pitchFamily="34" charset="0"/>
+              <a:buChar char="•"/>
+            </a:pPr>
+            <a:r>
+              <a:rPr lang="en-US" sz="1600" dirty="0"/>
+              <a:t>But not many hits</a:t>
+            </a:r>
+          </a:p>
+          <a:p>
+            <a:pPr marL="742950" lvl="1" indent="-285750">
+              <a:buFont typeface="Arial" panose="020B0604020202020204" pitchFamily="34" charset="0"/>
+              <a:buChar char="•"/>
+            </a:pPr>
+            <a:r>
+              <a:rPr lang="en-US" sz="1600" dirty="0"/>
+              <a:t>Not surprising: searching for new asteroids!</a:t>
+            </a:r>
+          </a:p>
+          <a:p>
+            <a:pPr marL="285750" indent="-285750">
+              <a:buFont typeface="Arial" panose="020B0604020202020204" pitchFamily="34" charset="0"/>
+              <a:buChar char="•"/>
+            </a:pPr>
+            <a:r>
+              <a:rPr lang="en-US" sz="1600" dirty="0"/>
+              <a:t>Would prefer to see greater differentiation in distance to nearest known asteroid vs. previous run</a:t>
+            </a:r>
+          </a:p>
+        </p:txBody>
+      </p:sp>
+    </p:spTree>
+    <p:extLst>
+      <p:ext uri="{BB962C8B-B14F-4D97-AF65-F5344CB8AC3E}">
+        <p14:creationId xmlns:p14="http://schemas.microsoft.com/office/powerpoint/2010/main" val="2457472314"/>
+      </p:ext>
+    </p:extLst>
+  </p:cSld>
+  <p:clrMapOvr>
+    <a:masterClrMapping/>
+  </p:clrMapOvr>
+</p:sld>
+</file>
+
+<file path=ppt/slides/slide47.xml><?xml version="1.0" encoding="utf-8"?>
+<p:sld xmlns:a="http://schemas.openxmlformats.org/drawingml/2006/main" xmlns:r="http://schemas.openxmlformats.org/officeDocument/2006/relationships" xmlns:p="http://schemas.openxmlformats.org/presentationml/2006/main">
+  <p:cSld>
+    <p:spTree>
+      <p:nvGrpSpPr>
+        <p:cNvPr id="1" name=""/>
+        <p:cNvGrpSpPr/>
+        <p:nvPr/>
+      </p:nvGrpSpPr>
+      <p:grpSpPr>
+        <a:xfrm>
+          <a:off x="0" y="0"/>
+          <a:ext cx="0" cy="0"/>
+          <a:chOff x="0" y="0"/>
+          <a:chExt cx="0" cy="0"/>
+        </a:xfrm>
+      </p:grpSpPr>
+      <p:sp>
+        <p:nvSpPr>
+          <p:cNvPr id="2" name="Title 1">
+            <a:extLst>
+              <a:ext uri="{FF2B5EF4-FFF2-40B4-BE49-F238E27FC236}">
+                <a16:creationId xmlns:a16="http://schemas.microsoft.com/office/drawing/2014/main" id="{9C69E8AC-E149-4DFE-A645-5167EF738C89}"/>
+              </a:ext>
+            </a:extLst>
+          </p:cNvPr>
+          <p:cNvSpPr>
+            <a:spLocks noGrp="1"/>
+          </p:cNvSpPr>
+          <p:nvPr>
+            <p:ph type="title"/>
+          </p:nvPr>
         </p:nvSpPr>
         <p:spPr/>
         <p:txBody>
-          <a:bodyPr/>
+          <a:bodyPr>
+            <a:normAutofit/>
+          </a:bodyPr>
           <a:lstStyle/>
           <a:p>
-            <a:endParaRPr lang="en-US" dirty="0"/>
-          </a:p>
-        </p:txBody>
-      </p:sp>
+            <a:r>
+              <a:rPr lang="en-US" sz="3800" dirty="0"/>
+              <a:t>Presenting 9 New Asteroid Candidates</a:t>
+            </a:r>
+          </a:p>
+        </p:txBody>
+      </p:sp>
+      <p:pic>
+        <p:nvPicPr>
+          <p:cNvPr id="5" name="Content Placeholder 4" descr="A close up of text on a white background&#10;&#10;Description automatically generated">
+            <a:extLst>
+              <a:ext uri="{FF2B5EF4-FFF2-40B4-BE49-F238E27FC236}">
+                <a16:creationId xmlns:a16="http://schemas.microsoft.com/office/drawing/2014/main" id="{6B635A06-E46E-47FF-A90A-F6192E1D6AB2}"/>
+              </a:ext>
+            </a:extLst>
+          </p:cNvPr>
+          <p:cNvPicPr>
+            <a:picLocks noGrp="1" noChangeAspect="1"/>
+          </p:cNvPicPr>
+          <p:nvPr>
+            <p:ph idx="1"/>
+          </p:nvPr>
+        </p:nvPicPr>
+        <p:blipFill>
+          <a:blip r:embed="rId2">
+            <a:extLst>
+              <a:ext uri="{28A0092B-C50C-407E-A947-70E740481C1C}">
+                <a14:useLocalDpi xmlns:a14="http://schemas.microsoft.com/office/drawing/2010/main" val="0"/>
+              </a:ext>
+            </a:extLst>
+          </a:blip>
+          <a:stretch>
+            <a:fillRect/>
+          </a:stretch>
+        </p:blipFill>
+        <p:spPr>
+          <a:xfrm>
+            <a:off x="802134" y="1577334"/>
+            <a:ext cx="9093667" cy="2863997"/>
+          </a:xfrm>
+        </p:spPr>
+      </p:pic>
     </p:spTree>
     <p:extLst>
       <p:ext uri="{BB962C8B-B14F-4D97-AF65-F5344CB8AC3E}">
         <p14:creationId xmlns:p14="http://schemas.microsoft.com/office/powerpoint/2010/main" val="174721646"/>
+      </p:ext>
+    </p:extLst>
+  </p:cSld>
+  <p:clrMapOvr>
+    <a:masterClrMapping/>
+  </p:clrMapOvr>
+</p:sld>
+</file>
+
+<file path=ppt/slides/slide48.xml><?xml version="1.0" encoding="utf-8"?>
+<p:sld xmlns:a="http://schemas.openxmlformats.org/drawingml/2006/main" xmlns:r="http://schemas.openxmlformats.org/officeDocument/2006/relationships" xmlns:p="http://schemas.openxmlformats.org/presentationml/2006/main">
+  <p:cSld>
+    <p:spTree>
+      <p:nvGrpSpPr>
+        <p:cNvPr id="1" name=""/>
+        <p:cNvGrpSpPr/>
+        <p:nvPr/>
+      </p:nvGrpSpPr>
+      <p:grpSpPr>
+        <a:xfrm>
+          <a:off x="0" y="0"/>
+          <a:ext cx="0" cy="0"/>
+          <a:chOff x="0" y="0"/>
+          <a:chExt cx="0" cy="0"/>
+        </a:xfrm>
+      </p:grpSpPr>
+      <p:sp>
+        <p:nvSpPr>
+          <p:cNvPr id="2" name="Title 1">
+            <a:extLst>
+              <a:ext uri="{FF2B5EF4-FFF2-40B4-BE49-F238E27FC236}">
+                <a16:creationId xmlns:a16="http://schemas.microsoft.com/office/drawing/2014/main" id="{94BF9C36-7A4E-40FD-8644-F146DD9E0970}"/>
+              </a:ext>
+            </a:extLst>
+          </p:cNvPr>
+          <p:cNvSpPr>
+            <a:spLocks noGrp="1"/>
+          </p:cNvSpPr>
+          <p:nvPr>
+            <p:ph type="title"/>
+          </p:nvPr>
+        </p:nvSpPr>
+        <p:spPr>
+          <a:xfrm>
+            <a:off x="838200" y="365125"/>
+            <a:ext cx="10515600" cy="786039"/>
+          </a:xfrm>
+        </p:spPr>
+        <p:txBody>
+          <a:bodyPr/>
+          <a:lstStyle/>
+          <a:p>
+            <a:r>
+              <a:rPr lang="en-US" dirty="0"/>
+              <a:t>ZTF Hits for Selected Asteroid Candidates</a:t>
+            </a:r>
+          </a:p>
+        </p:txBody>
+      </p:sp>
+      <p:pic>
+        <p:nvPicPr>
+          <p:cNvPr id="5" name="Content Placeholder 4" descr="A screenshot of a cell phone&#10;&#10;Description automatically generated">
+            <a:extLst>
+              <a:ext uri="{FF2B5EF4-FFF2-40B4-BE49-F238E27FC236}">
+                <a16:creationId xmlns:a16="http://schemas.microsoft.com/office/drawing/2014/main" id="{E1B2B6D6-521B-474D-A07B-F1037B36BC66}"/>
+              </a:ext>
+            </a:extLst>
+          </p:cNvPr>
+          <p:cNvPicPr>
+            <a:picLocks noGrp="1" noChangeAspect="1"/>
+          </p:cNvPicPr>
+          <p:nvPr>
+            <p:ph idx="1"/>
+          </p:nvPr>
+        </p:nvPicPr>
+        <p:blipFill>
+          <a:blip r:embed="rId2">
+            <a:extLst>
+              <a:ext uri="{28A0092B-C50C-407E-A947-70E740481C1C}">
+                <a14:useLocalDpi xmlns:a14="http://schemas.microsoft.com/office/drawing/2010/main" val="0"/>
+              </a:ext>
+            </a:extLst>
+          </a:blip>
+          <a:stretch>
+            <a:fillRect/>
+          </a:stretch>
+        </p:blipFill>
+        <p:spPr>
+          <a:xfrm>
+            <a:off x="748395" y="1132848"/>
+            <a:ext cx="4197803" cy="1862005"/>
+          </a:xfrm>
+        </p:spPr>
+      </p:pic>
+      <p:pic>
+        <p:nvPicPr>
+          <p:cNvPr id="6" name="Content Placeholder 4">
+            <a:extLst>
+              <a:ext uri="{FF2B5EF4-FFF2-40B4-BE49-F238E27FC236}">
+                <a16:creationId xmlns:a16="http://schemas.microsoft.com/office/drawing/2014/main" id="{9C5CF918-4343-4F61-9C42-8FFEC7604E84}"/>
+              </a:ext>
+            </a:extLst>
+          </p:cNvPr>
+          <p:cNvPicPr>
+            <a:picLocks noChangeAspect="1"/>
+          </p:cNvPicPr>
+          <p:nvPr/>
+        </p:nvPicPr>
+        <p:blipFill>
+          <a:blip r:embed="rId3">
+            <a:extLst>
+              <a:ext uri="{28A0092B-C50C-407E-A947-70E740481C1C}">
+                <a14:useLocalDpi xmlns:a14="http://schemas.microsoft.com/office/drawing/2010/main" val="0"/>
+              </a:ext>
+            </a:extLst>
+          </a:blip>
+          <a:srcRect/>
+          <a:stretch/>
+        </p:blipFill>
+        <p:spPr>
+          <a:xfrm>
+            <a:off x="5900915" y="1132848"/>
+            <a:ext cx="4092677" cy="1862005"/>
+          </a:xfrm>
+          <a:prstGeom prst="rect">
+            <a:avLst/>
+          </a:prstGeom>
+        </p:spPr>
+      </p:pic>
+      <p:pic>
+        <p:nvPicPr>
+          <p:cNvPr id="7" name="Content Placeholder 4">
+            <a:extLst>
+              <a:ext uri="{FF2B5EF4-FFF2-40B4-BE49-F238E27FC236}">
+                <a16:creationId xmlns:a16="http://schemas.microsoft.com/office/drawing/2014/main" id="{E19D41E9-EFBC-435C-AB0D-A6BA1B8DF648}"/>
+              </a:ext>
+            </a:extLst>
+          </p:cNvPr>
+          <p:cNvPicPr>
+            <a:picLocks noChangeAspect="1"/>
+          </p:cNvPicPr>
+          <p:nvPr/>
+        </p:nvPicPr>
+        <p:blipFill>
+          <a:blip r:embed="rId4">
+            <a:extLst>
+              <a:ext uri="{28A0092B-C50C-407E-A947-70E740481C1C}">
+                <a14:useLocalDpi xmlns:a14="http://schemas.microsoft.com/office/drawing/2010/main" val="0"/>
+              </a:ext>
+            </a:extLst>
+          </a:blip>
+          <a:srcRect/>
+          <a:stretch/>
+        </p:blipFill>
+        <p:spPr>
+          <a:xfrm>
+            <a:off x="791806" y="3244674"/>
+            <a:ext cx="4110980" cy="1862005"/>
+          </a:xfrm>
+          <a:prstGeom prst="rect">
+            <a:avLst/>
+          </a:prstGeom>
+        </p:spPr>
+      </p:pic>
+      <p:pic>
+        <p:nvPicPr>
+          <p:cNvPr id="8" name="Content Placeholder 4">
+            <a:extLst>
+              <a:ext uri="{FF2B5EF4-FFF2-40B4-BE49-F238E27FC236}">
+                <a16:creationId xmlns:a16="http://schemas.microsoft.com/office/drawing/2014/main" id="{1592C0F7-7BBB-49E2-8451-7140B6AC7F1E}"/>
+              </a:ext>
+            </a:extLst>
+          </p:cNvPr>
+          <p:cNvPicPr>
+            <a:picLocks noChangeAspect="1"/>
+          </p:cNvPicPr>
+          <p:nvPr/>
+        </p:nvPicPr>
+        <p:blipFill>
+          <a:blip r:embed="rId5">
+            <a:extLst>
+              <a:ext uri="{28A0092B-C50C-407E-A947-70E740481C1C}">
+                <a14:useLocalDpi xmlns:a14="http://schemas.microsoft.com/office/drawing/2010/main" val="0"/>
+              </a:ext>
+            </a:extLst>
+          </a:blip>
+          <a:srcRect/>
+          <a:stretch/>
+        </p:blipFill>
+        <p:spPr>
+          <a:xfrm>
+            <a:off x="5932363" y="3244674"/>
+            <a:ext cx="4029780" cy="1862005"/>
+          </a:xfrm>
+          <a:prstGeom prst="rect">
+            <a:avLst/>
+          </a:prstGeom>
+        </p:spPr>
+      </p:pic>
+      <p:sp>
+        <p:nvSpPr>
+          <p:cNvPr id="9" name="TextBox 8">
+            <a:extLst>
+              <a:ext uri="{FF2B5EF4-FFF2-40B4-BE49-F238E27FC236}">
+                <a16:creationId xmlns:a16="http://schemas.microsoft.com/office/drawing/2014/main" id="{74A8ABFA-DD4C-40C7-AAEE-1D74393A908F}"/>
+              </a:ext>
+            </a:extLst>
+          </p:cNvPr>
+          <p:cNvSpPr txBox="1"/>
+          <p:nvPr/>
+        </p:nvSpPr>
+        <p:spPr>
+          <a:xfrm>
+            <a:off x="444954" y="5200650"/>
+            <a:ext cx="10254342" cy="2308324"/>
+          </a:xfrm>
+          <a:prstGeom prst="rect">
+            <a:avLst/>
+          </a:prstGeom>
+          <a:noFill/>
+        </p:spPr>
+        <p:txBody>
+          <a:bodyPr wrap="square" rtlCol="0">
+            <a:spAutoFit/>
+          </a:bodyPr>
+          <a:lstStyle/>
+          <a:p>
+            <a:pPr marL="285750" indent="-285750">
+              <a:buFont typeface="Arial" panose="020B0604020202020204" pitchFamily="34" charset="0"/>
+              <a:buChar char="•"/>
+            </a:pPr>
+            <a:r>
+              <a:rPr lang="en-US" dirty="0"/>
+              <a:t>Should we believe these new asteroid candidates? Look at ZTF hit details to decide.</a:t>
+            </a:r>
+          </a:p>
+          <a:p>
+            <a:pPr marL="285750" indent="-285750">
+              <a:buFont typeface="Arial" panose="020B0604020202020204" pitchFamily="34" charset="0"/>
+              <a:buChar char="•"/>
+            </a:pPr>
+            <a:r>
+              <a:rPr lang="en-US" dirty="0"/>
+              <a:t>Element </a:t>
+            </a:r>
+            <a:r>
+              <a:rPr lang="en-US" dirty="0">
+                <a:latin typeface="Consolas" panose="020B0609020204030204" pitchFamily="49" charset="0"/>
+              </a:rPr>
+              <a:t>178421</a:t>
+            </a:r>
+            <a:r>
+              <a:rPr lang="en-US" dirty="0"/>
+              <a:t> has 4 hits on </a:t>
+            </a:r>
+            <a:r>
+              <a:rPr lang="en-US" dirty="0">
+                <a:latin typeface="Consolas" panose="020B0609020204030204" pitchFamily="49" charset="0"/>
+              </a:rPr>
+              <a:t>ZTF18aboluox</a:t>
+            </a:r>
+            <a:r>
+              <a:rPr lang="en-US" dirty="0"/>
+              <a:t> and 4 hits on </a:t>
+            </a:r>
+            <a:r>
+              <a:rPr lang="en-US" dirty="0">
+                <a:latin typeface="Consolas" panose="020B0609020204030204" pitchFamily="49" charset="0"/>
+              </a:rPr>
+              <a:t>ZTF18acewaex</a:t>
+            </a:r>
+            <a:r>
+              <a:rPr lang="en-US" dirty="0"/>
+              <a:t>, made 433 days apart</a:t>
+            </a:r>
+          </a:p>
+          <a:p>
+            <a:pPr marL="742950" lvl="1" indent="-285750">
+              <a:buFont typeface="Arial" panose="020B0604020202020204" pitchFamily="34" charset="0"/>
+              <a:buChar char="•"/>
+            </a:pPr>
+            <a:r>
+              <a:rPr lang="en-US" dirty="0"/>
+              <a:t>Magnitudes are too different (4), spurious connection of 2 different objects</a:t>
+            </a:r>
+          </a:p>
+          <a:p>
+            <a:pPr marL="285750" indent="-285750">
+              <a:buFont typeface="Arial" panose="020B0604020202020204" pitchFamily="34" charset="0"/>
+              <a:buChar char="•"/>
+            </a:pPr>
+            <a:r>
+              <a:rPr lang="en-US" dirty="0"/>
+              <a:t>Element </a:t>
+            </a:r>
+            <a:r>
+              <a:rPr lang="en-US" dirty="0">
+                <a:latin typeface="Consolas" panose="020B0609020204030204" pitchFamily="49" charset="0"/>
+              </a:rPr>
+              <a:t>3308</a:t>
+            </a:r>
+            <a:r>
+              <a:rPr lang="en-US" dirty="0"/>
+              <a:t> has 6 hits on </a:t>
+            </a:r>
+            <a:r>
+              <a:rPr lang="en-US" dirty="0">
+                <a:latin typeface="Consolas" panose="020B0609020204030204" pitchFamily="49" charset="0"/>
+              </a:rPr>
+              <a:t>ZTF18abtpdzg</a:t>
+            </a:r>
+            <a:r>
+              <a:rPr lang="en-US" dirty="0"/>
+              <a:t> and 2 hits on </a:t>
+            </a:r>
+            <a:r>
+              <a:rPr lang="en-US" dirty="0">
+                <a:latin typeface="Consolas" panose="020B0609020204030204" pitchFamily="49" charset="0"/>
+              </a:rPr>
+              <a:t>ZTF18abspkzw</a:t>
+            </a:r>
+            <a:r>
+              <a:rPr lang="en-US" dirty="0"/>
+              <a:t>, made 193 days apart</a:t>
+            </a:r>
+          </a:p>
+          <a:p>
+            <a:pPr marL="285750" indent="-285750">
+              <a:buFont typeface="Arial" panose="020B0604020202020204" pitchFamily="34" charset="0"/>
+              <a:buChar char="•"/>
+            </a:pPr>
+            <a:r>
+              <a:rPr lang="en-US" dirty="0"/>
+              <a:t>Element </a:t>
+            </a:r>
+            <a:r>
+              <a:rPr lang="en-US" dirty="0">
+                <a:latin typeface="Consolas" panose="020B0609020204030204" pitchFamily="49" charset="0"/>
+              </a:rPr>
+              <a:t>191915</a:t>
+            </a:r>
+            <a:r>
+              <a:rPr lang="en-US" dirty="0"/>
+              <a:t> has 6 hits on </a:t>
+            </a:r>
+            <a:r>
+              <a:rPr lang="en-US" dirty="0">
+                <a:latin typeface="Consolas" panose="020B0609020204030204" pitchFamily="49" charset="0"/>
+              </a:rPr>
+              <a:t>ZTF19abtsqmn</a:t>
+            </a:r>
+            <a:r>
+              <a:rPr lang="en-US" dirty="0"/>
+              <a:t> and 2 hits on </a:t>
+            </a:r>
+            <a:r>
+              <a:rPr lang="en-US" dirty="0">
+                <a:latin typeface="Consolas" panose="020B0609020204030204" pitchFamily="49" charset="0"/>
+              </a:rPr>
+              <a:t>ZTF18abtxtgd</a:t>
+            </a:r>
+            <a:r>
+              <a:rPr lang="en-US" dirty="0"/>
+              <a:t>, made 469 days apart</a:t>
+            </a:r>
+          </a:p>
+          <a:p>
+            <a:pPr marL="742950" lvl="1" indent="-285750">
+              <a:buFont typeface="Arial" panose="020B0604020202020204" pitchFamily="34" charset="0"/>
+              <a:buChar char="•"/>
+            </a:pPr>
+            <a:r>
+              <a:rPr lang="en-US" dirty="0"/>
+              <a:t>Magnitudes are compatible: The model has made a non-obvious connection on compatible tracks!</a:t>
+            </a:r>
+          </a:p>
+          <a:p>
+            <a:pPr marL="285750" indent="-285750">
+              <a:buFont typeface="Arial" panose="020B0604020202020204" pitchFamily="34" charset="0"/>
+              <a:buChar char="•"/>
+            </a:pPr>
+            <a:r>
+              <a:rPr lang="en-US" dirty="0"/>
+              <a:t>Element </a:t>
+            </a:r>
+            <a:r>
+              <a:rPr lang="en-US" dirty="0">
+                <a:latin typeface="Consolas" panose="020B0609020204030204" pitchFamily="49" charset="0"/>
+              </a:rPr>
+              <a:t>170789</a:t>
+            </a:r>
+            <a:r>
+              <a:rPr lang="en-US" dirty="0"/>
+              <a:t> has 8 hits on </a:t>
+            </a:r>
+            <a:r>
+              <a:rPr lang="en-US" dirty="0">
+                <a:latin typeface="Consolas" panose="020B0609020204030204" pitchFamily="49" charset="0"/>
+              </a:rPr>
+              <a:t>ZTF17aaaqwwg</a:t>
+            </a:r>
+            <a:r>
+              <a:rPr lang="en-US" dirty="0"/>
+              <a:t> made in a 55 minute interval</a:t>
+            </a:r>
+          </a:p>
+          <a:p>
+            <a:pPr marL="742950" lvl="1" indent="-285750">
+              <a:buFont typeface="Arial" panose="020B0604020202020204" pitchFamily="34" charset="0"/>
+              <a:buChar char="•"/>
+            </a:pPr>
+            <a:r>
+              <a:rPr lang="en-US" dirty="0"/>
+              <a:t>Model agrees with ZTF that this is one track for the same </a:t>
+            </a:r>
+            <a:r>
+              <a:rPr lang="en-US" dirty="0" err="1"/>
+              <a:t>obejct</a:t>
+            </a:r>
+            <a:endParaRPr lang="en-US" dirty="0"/>
+          </a:p>
+        </p:txBody>
+      </p:sp>
+    </p:spTree>
+    <p:extLst>
+      <p:ext uri="{BB962C8B-B14F-4D97-AF65-F5344CB8AC3E}">
+        <p14:creationId xmlns:p14="http://schemas.microsoft.com/office/powerpoint/2010/main" val="2131799417"/>
+      </p:ext>
+    </p:extLst>
+  </p:cSld>
+  <p:clrMapOvr>
+    <a:masterClrMapping/>
+  </p:clrMapOvr>
+</p:sld>
+</file>
+
+<file path=ppt/slides/slide49.xml><?xml version="1.0" encoding="utf-8"?>
+<p:sld xmlns:a="http://schemas.openxmlformats.org/drawingml/2006/main" xmlns:r="http://schemas.openxmlformats.org/officeDocument/2006/relationships" xmlns:p="http://schemas.openxmlformats.org/presentationml/2006/main">
+  <p:cSld>
+    <p:spTree>
+      <p:nvGrpSpPr>
+        <p:cNvPr id="1" name=""/>
+        <p:cNvGrpSpPr/>
+        <p:nvPr/>
+      </p:nvGrpSpPr>
+      <p:grpSpPr>
+        <a:xfrm>
+          <a:off x="0" y="0"/>
+          <a:ext cx="0" cy="0"/>
+          <a:chOff x="0" y="0"/>
+          <a:chExt cx="0" cy="0"/>
+        </a:xfrm>
+      </p:grpSpPr>
+      <p:sp>
+        <p:nvSpPr>
+          <p:cNvPr id="2" name="Title 1">
+            <a:extLst>
+              <a:ext uri="{FF2B5EF4-FFF2-40B4-BE49-F238E27FC236}">
+                <a16:creationId xmlns:a16="http://schemas.microsoft.com/office/drawing/2014/main" id="{2B5BB06F-112C-4038-A60D-BC27B7C9A1CD}"/>
+              </a:ext>
+            </a:extLst>
+          </p:cNvPr>
+          <p:cNvSpPr>
+            <a:spLocks noGrp="1"/>
+          </p:cNvSpPr>
+          <p:nvPr>
+            <p:ph type="title"/>
+          </p:nvPr>
+        </p:nvSpPr>
+        <p:spPr/>
+        <p:txBody>
+          <a:bodyPr/>
+          <a:lstStyle/>
+          <a:p>
+            <a:r>
+              <a:rPr lang="en-US" dirty="0"/>
+              <a:t>Conclusions</a:t>
+            </a:r>
+          </a:p>
+        </p:txBody>
+      </p:sp>
+      <p:sp>
+        <p:nvSpPr>
+          <p:cNvPr id="3" name="Content Placeholder 2">
+            <a:extLst>
+              <a:ext uri="{FF2B5EF4-FFF2-40B4-BE49-F238E27FC236}">
+                <a16:creationId xmlns:a16="http://schemas.microsoft.com/office/drawing/2014/main" id="{D7CF63C0-6E00-46CA-BF97-BC113A347389}"/>
+              </a:ext>
+            </a:extLst>
+          </p:cNvPr>
+          <p:cNvSpPr>
+            <a:spLocks noGrp="1"/>
+          </p:cNvSpPr>
+          <p:nvPr>
+            <p:ph idx="1"/>
+          </p:nvPr>
+        </p:nvSpPr>
+        <p:spPr/>
+        <p:txBody>
+          <a:bodyPr>
+            <a:normAutofit fontScale="92500"/>
+          </a:bodyPr>
+          <a:lstStyle/>
+          <a:p>
+            <a:r>
+              <a:rPr lang="en-US" dirty="0"/>
+              <a:t>Prove that asteroid search over orbital elements works with an adequate initialization and representation in data set</a:t>
+            </a:r>
+          </a:p>
+          <a:p>
+            <a:r>
+              <a:rPr lang="en-US" dirty="0"/>
+              <a:t>Built a working prototype in TensorFlow</a:t>
+            </a:r>
+          </a:p>
+          <a:p>
+            <a:pPr lvl="1"/>
+            <a:r>
+              <a:rPr lang="en-US" dirty="0"/>
+              <a:t>First demonstration of efficient astrometric computations on GPU?</a:t>
+            </a:r>
+          </a:p>
+          <a:p>
+            <a:r>
+              <a:rPr lang="en-US" dirty="0"/>
+              <a:t>High quality integration of the Solar System and astrometric directions</a:t>
+            </a:r>
+          </a:p>
+          <a:p>
+            <a:pPr lvl="1"/>
+            <a:r>
+              <a:rPr lang="en-US" dirty="0"/>
+              <a:t>Associated each of 5.7E6 ZTF observations to nearest asteroid</a:t>
+            </a:r>
+          </a:p>
+          <a:p>
+            <a:pPr lvl="1"/>
+            <a:r>
+              <a:rPr lang="en-US" dirty="0"/>
+              <a:t>4.2E12 interactions, possibly novel and useful data set</a:t>
+            </a:r>
+          </a:p>
+          <a:p>
+            <a:r>
+              <a:rPr lang="en-US" dirty="0"/>
+              <a:t>Developed candidate orbital elements for 9 new asteroids</a:t>
+            </a:r>
+          </a:p>
+          <a:p>
+            <a:r>
+              <a:rPr lang="en-US" dirty="0"/>
+              <a:t>Proof of concept for an automated pipeline to search for new asteroids</a:t>
+            </a:r>
+          </a:p>
+        </p:txBody>
+      </p:sp>
+    </p:spTree>
+    <p:extLst>
+      <p:ext uri="{BB962C8B-B14F-4D97-AF65-F5344CB8AC3E}">
+        <p14:creationId xmlns:p14="http://schemas.microsoft.com/office/powerpoint/2010/main" val="2140357050"/>
       </p:ext>
     </p:extLst>
   </p:cSld>
@@ -12783,6 +14142,454 @@
     <p:extLst>
       <p:ext uri="{BB962C8B-B14F-4D97-AF65-F5344CB8AC3E}">
         <p14:creationId xmlns:p14="http://schemas.microsoft.com/office/powerpoint/2010/main" val="2736996674"/>
+      </p:ext>
+    </p:extLst>
+  </p:cSld>
+  <p:clrMapOvr>
+    <a:masterClrMapping/>
+  </p:clrMapOvr>
+</p:sld>
+</file>
+
+<file path=ppt/slides/slide50.xml><?xml version="1.0" encoding="utf-8"?>
+<p:sld xmlns:a="http://schemas.openxmlformats.org/drawingml/2006/main" xmlns:r="http://schemas.openxmlformats.org/officeDocument/2006/relationships" xmlns:p="http://schemas.openxmlformats.org/presentationml/2006/main">
+  <p:cSld>
+    <p:spTree>
+      <p:nvGrpSpPr>
+        <p:cNvPr id="1" name=""/>
+        <p:cNvGrpSpPr/>
+        <p:nvPr/>
+      </p:nvGrpSpPr>
+      <p:grpSpPr>
+        <a:xfrm>
+          <a:off x="0" y="0"/>
+          <a:ext cx="0" cy="0"/>
+          <a:chOff x="0" y="0"/>
+          <a:chExt cx="0" cy="0"/>
+        </a:xfrm>
+      </p:grpSpPr>
+      <p:sp>
+        <p:nvSpPr>
+          <p:cNvPr id="2" name="Title 1">
+            <a:extLst>
+              <a:ext uri="{FF2B5EF4-FFF2-40B4-BE49-F238E27FC236}">
+                <a16:creationId xmlns:a16="http://schemas.microsoft.com/office/drawing/2014/main" id="{2B5BB06F-112C-4038-A60D-BC27B7C9A1CD}"/>
+              </a:ext>
+            </a:extLst>
+          </p:cNvPr>
+          <p:cNvSpPr>
+            <a:spLocks noGrp="1"/>
+          </p:cNvSpPr>
+          <p:nvPr>
+            <p:ph type="title"/>
+          </p:nvPr>
+        </p:nvSpPr>
+        <p:spPr/>
+        <p:txBody>
+          <a:bodyPr/>
+          <a:lstStyle/>
+          <a:p>
+            <a:r>
+              <a:rPr lang="en-US" dirty="0"/>
+              <a:t>Future Work I: Initialization, More Data</a:t>
+            </a:r>
+          </a:p>
+        </p:txBody>
+      </p:sp>
+      <p:sp>
+        <p:nvSpPr>
+          <p:cNvPr id="3" name="Content Placeholder 2">
+            <a:extLst>
+              <a:ext uri="{FF2B5EF4-FFF2-40B4-BE49-F238E27FC236}">
+                <a16:creationId xmlns:a16="http://schemas.microsoft.com/office/drawing/2014/main" id="{D7CF63C0-6E00-46CA-BF97-BC113A347389}"/>
+              </a:ext>
+            </a:extLst>
+          </p:cNvPr>
+          <p:cNvSpPr>
+            <a:spLocks noGrp="1"/>
+          </p:cNvSpPr>
+          <p:nvPr>
+            <p:ph idx="1"/>
+          </p:nvPr>
+        </p:nvSpPr>
+        <p:spPr/>
+        <p:txBody>
+          <a:bodyPr>
+            <a:normAutofit fontScale="92500" lnSpcReduction="20000"/>
+          </a:bodyPr>
+          <a:lstStyle/>
+          <a:p>
+            <a:r>
+              <a:rPr lang="en-US" dirty="0"/>
+              <a:t>Intelligent initialization of candidate elements</a:t>
+            </a:r>
+          </a:p>
+          <a:p>
+            <a:pPr lvl="1"/>
+            <a:r>
+              <a:rPr lang="en-US" dirty="0"/>
+              <a:t>Random initialization was just a quick and dirty placeholder; ran out of time</a:t>
+            </a:r>
+          </a:p>
+          <a:p>
+            <a:pPr lvl="1"/>
+            <a:r>
+              <a:rPr lang="en-US" dirty="0"/>
+              <a:t>ZTF </a:t>
+            </a:r>
+            <a:r>
+              <a:rPr lang="en-US" dirty="0" err="1"/>
+              <a:t>ObjectID</a:t>
+            </a:r>
+            <a:r>
+              <a:rPr lang="en-US" dirty="0"/>
+              <a:t> is a great starting point for initializations</a:t>
+            </a:r>
+          </a:p>
+          <a:p>
+            <a:pPr lvl="1"/>
+            <a:r>
+              <a:rPr lang="en-US" dirty="0"/>
+              <a:t>Provisionally assume that all the detections belong to same object</a:t>
+            </a:r>
+          </a:p>
+          <a:p>
+            <a:pPr lvl="1"/>
+            <a:r>
+              <a:rPr lang="en-US" dirty="0"/>
+              <a:t>Build least squares fit for candidate element; modify </a:t>
+            </a:r>
+            <a:r>
+              <a:rPr lang="en-US" dirty="0" err="1"/>
+              <a:t>AsteroidSearch</a:t>
+            </a:r>
+            <a:r>
+              <a:rPr lang="en-US" dirty="0"/>
+              <a:t> with new loss function</a:t>
+            </a:r>
+          </a:p>
+          <a:p>
+            <a:r>
+              <a:rPr lang="en-US" dirty="0"/>
+              <a:t>Add a second data set</a:t>
+            </a:r>
+          </a:p>
+          <a:p>
+            <a:pPr lvl="1"/>
+            <a:r>
+              <a:rPr lang="en-US" dirty="0"/>
+              <a:t>ZTF is great, but it only dates back to July 2019</a:t>
+            </a:r>
+          </a:p>
+          <a:p>
+            <a:pPr lvl="1"/>
+            <a:r>
+              <a:rPr lang="en-US" dirty="0"/>
+              <a:t>Want to add a second data source</a:t>
+            </a:r>
+          </a:p>
+          <a:p>
+            <a:pPr lvl="1"/>
+            <a:r>
+              <a:rPr lang="en-US" dirty="0"/>
+              <a:t>Ideally this should have an ML pipeline to classify probable asteroid hits</a:t>
+            </a:r>
+          </a:p>
+          <a:p>
+            <a:pPr lvl="1"/>
+            <a:r>
+              <a:rPr lang="en-US" dirty="0"/>
+              <a:t>Failing that, can use any data set with a real-bogus classifier, then subtract known stars and galaxies</a:t>
+            </a:r>
+          </a:p>
+          <a:p>
+            <a:pPr lvl="1"/>
+            <a:r>
+              <a:rPr lang="en-US" dirty="0"/>
+              <a:t>Is Pan-STARRS a good choice?</a:t>
+            </a:r>
+          </a:p>
+          <a:p>
+            <a:pPr lvl="1"/>
+            <a:r>
+              <a:rPr lang="en-US" dirty="0"/>
+              <a:t>Advice from astronomers on my Committee would be welcome here!</a:t>
+            </a:r>
+          </a:p>
+          <a:p>
+            <a:pPr lvl="1"/>
+            <a:endParaRPr lang="en-US" dirty="0"/>
+          </a:p>
+        </p:txBody>
+      </p:sp>
+    </p:spTree>
+    <p:extLst>
+      <p:ext uri="{BB962C8B-B14F-4D97-AF65-F5344CB8AC3E}">
+        <p14:creationId xmlns:p14="http://schemas.microsoft.com/office/powerpoint/2010/main" val="3333254068"/>
+      </p:ext>
+    </p:extLst>
+  </p:cSld>
+  <p:clrMapOvr>
+    <a:masterClrMapping/>
+  </p:clrMapOvr>
+</p:sld>
+</file>
+
+<file path=ppt/slides/slide51.xml><?xml version="1.0" encoding="utf-8"?>
+<p:sld xmlns:a="http://schemas.openxmlformats.org/drawingml/2006/main" xmlns:r="http://schemas.openxmlformats.org/officeDocument/2006/relationships" xmlns:p="http://schemas.openxmlformats.org/presentationml/2006/main">
+  <p:cSld>
+    <p:spTree>
+      <p:nvGrpSpPr>
+        <p:cNvPr id="1" name=""/>
+        <p:cNvGrpSpPr/>
+        <p:nvPr/>
+      </p:nvGrpSpPr>
+      <p:grpSpPr>
+        <a:xfrm>
+          <a:off x="0" y="0"/>
+          <a:ext cx="0" cy="0"/>
+          <a:chOff x="0" y="0"/>
+          <a:chExt cx="0" cy="0"/>
+        </a:xfrm>
+      </p:grpSpPr>
+      <p:sp>
+        <p:nvSpPr>
+          <p:cNvPr id="2" name="Title 1">
+            <a:extLst>
+              <a:ext uri="{FF2B5EF4-FFF2-40B4-BE49-F238E27FC236}">
+                <a16:creationId xmlns:a16="http://schemas.microsoft.com/office/drawing/2014/main" id="{2B5BB06F-112C-4038-A60D-BC27B7C9A1CD}"/>
+              </a:ext>
+            </a:extLst>
+          </p:cNvPr>
+          <p:cNvSpPr>
+            <a:spLocks noGrp="1"/>
+          </p:cNvSpPr>
+          <p:nvPr>
+            <p:ph type="title"/>
+          </p:nvPr>
+        </p:nvSpPr>
+        <p:spPr/>
+        <p:txBody>
+          <a:bodyPr>
+            <a:normAutofit/>
+          </a:bodyPr>
+          <a:lstStyle/>
+          <a:p>
+            <a:r>
+              <a:rPr lang="en-US" sz="4000" dirty="0"/>
+              <a:t>Future Work II: Magnitude, Automated Pipeline</a:t>
+            </a:r>
+          </a:p>
+        </p:txBody>
+      </p:sp>
+      <p:sp>
+        <p:nvSpPr>
+          <p:cNvPr id="3" name="Content Placeholder 2">
+            <a:extLst>
+              <a:ext uri="{FF2B5EF4-FFF2-40B4-BE49-F238E27FC236}">
+                <a16:creationId xmlns:a16="http://schemas.microsoft.com/office/drawing/2014/main" id="{D7CF63C0-6E00-46CA-BF97-BC113A347389}"/>
+              </a:ext>
+            </a:extLst>
+          </p:cNvPr>
+          <p:cNvSpPr>
+            <a:spLocks noGrp="1"/>
+          </p:cNvSpPr>
+          <p:nvPr>
+            <p:ph idx="1"/>
+          </p:nvPr>
+        </p:nvSpPr>
+        <p:spPr/>
+        <p:txBody>
+          <a:bodyPr>
+            <a:normAutofit lnSpcReduction="10000"/>
+          </a:bodyPr>
+          <a:lstStyle/>
+          <a:p>
+            <a:r>
+              <a:rPr lang="en-US" dirty="0"/>
+              <a:t>Incorporate magnitude into log likelihood</a:t>
+            </a:r>
+          </a:p>
+          <a:p>
+            <a:pPr lvl="1"/>
+            <a:r>
+              <a:rPr lang="en-US" dirty="0"/>
+              <a:t>Have prototype to predict magnitude and incorporate it</a:t>
+            </a:r>
+          </a:p>
+          <a:p>
+            <a:pPr lvl="1"/>
+            <a:r>
+              <a:rPr lang="en-US" dirty="0"/>
+              <a:t>It was too finicky, needed to turn it off to get first version working on time</a:t>
+            </a:r>
+          </a:p>
+          <a:p>
+            <a:r>
+              <a:rPr lang="en-US" dirty="0"/>
+              <a:t>Develop an automated pipeline</a:t>
+            </a:r>
+          </a:p>
+          <a:p>
+            <a:pPr lvl="1"/>
+            <a:r>
+              <a:rPr lang="en-US" dirty="0"/>
+              <a:t>Initial goal: Accurately rebuild a large fraction of the asteroid catalogue</a:t>
+            </a:r>
+          </a:p>
+          <a:p>
+            <a:pPr lvl="1"/>
+            <a:r>
+              <a:rPr lang="en-US" dirty="0"/>
+              <a:t>ZTF alone has over 100,000 asteroids with 10 or more hits in the data</a:t>
+            </a:r>
+          </a:p>
+          <a:p>
+            <a:pPr lvl="1"/>
+            <a:r>
+              <a:rPr lang="en-US" dirty="0"/>
+              <a:t>Plausible that with intelligent initialization, we can recover many of these</a:t>
+            </a:r>
+          </a:p>
+          <a:p>
+            <a:pPr lvl="1"/>
+            <a:r>
+              <a:rPr lang="en-US" dirty="0"/>
+              <a:t>With a second data set, we could really go far</a:t>
+            </a:r>
+          </a:p>
+          <a:p>
+            <a:pPr lvl="1"/>
+            <a:r>
+              <a:rPr lang="en-US" dirty="0"/>
+              <a:t>An automated process that can accurately recreate the known catalogue…</a:t>
+            </a:r>
+          </a:p>
+          <a:p>
+            <a:pPr lvl="1"/>
+            <a:r>
+              <a:rPr lang="en-US" dirty="0"/>
+              <a:t>is also an automated process that can provisionally classify new asteroids for the MPC</a:t>
+            </a:r>
+          </a:p>
+        </p:txBody>
+      </p:sp>
+    </p:spTree>
+    <p:extLst>
+      <p:ext uri="{BB962C8B-B14F-4D97-AF65-F5344CB8AC3E}">
+        <p14:creationId xmlns:p14="http://schemas.microsoft.com/office/powerpoint/2010/main" val="2705727585"/>
+      </p:ext>
+    </p:extLst>
+  </p:cSld>
+  <p:clrMapOvr>
+    <a:masterClrMapping/>
+  </p:clrMapOvr>
+</p:sld>
+</file>
+
+<file path=ppt/slides/slide52.xml><?xml version="1.0" encoding="utf-8"?>
+<p:sld xmlns:a="http://schemas.openxmlformats.org/drawingml/2006/main" xmlns:r="http://schemas.openxmlformats.org/officeDocument/2006/relationships" xmlns:p="http://schemas.openxmlformats.org/presentationml/2006/main">
+  <p:cSld>
+    <p:spTree>
+      <p:nvGrpSpPr>
+        <p:cNvPr id="1" name=""/>
+        <p:cNvGrpSpPr/>
+        <p:nvPr/>
+      </p:nvGrpSpPr>
+      <p:grpSpPr>
+        <a:xfrm>
+          <a:off x="0" y="0"/>
+          <a:ext cx="0" cy="0"/>
+          <a:chOff x="0" y="0"/>
+          <a:chExt cx="0" cy="0"/>
+        </a:xfrm>
+      </p:grpSpPr>
+      <p:sp>
+        <p:nvSpPr>
+          <p:cNvPr id="2" name="Title 1">
+            <a:extLst>
+              <a:ext uri="{FF2B5EF4-FFF2-40B4-BE49-F238E27FC236}">
+                <a16:creationId xmlns:a16="http://schemas.microsoft.com/office/drawing/2014/main" id="{F19A1323-400A-4F44-9FF6-D1A4692D371E}"/>
+              </a:ext>
+            </a:extLst>
+          </p:cNvPr>
+          <p:cNvSpPr>
+            <a:spLocks noGrp="1"/>
+          </p:cNvSpPr>
+          <p:nvPr>
+            <p:ph type="title"/>
+          </p:nvPr>
+        </p:nvSpPr>
+        <p:spPr/>
+        <p:txBody>
+          <a:bodyPr/>
+          <a:lstStyle/>
+          <a:p>
+            <a:r>
+              <a:rPr lang="en-US" dirty="0"/>
+              <a:t>Mille </a:t>
+            </a:r>
+            <a:r>
+              <a:rPr lang="en-US" dirty="0" err="1"/>
+              <a:t>Grazie</a:t>
+            </a:r>
+            <a:r>
+              <a:rPr lang="en-US" dirty="0"/>
+              <a:t>: Thank you for Your Attention</a:t>
+            </a:r>
+          </a:p>
+        </p:txBody>
+      </p:sp>
+      <p:sp>
+        <p:nvSpPr>
+          <p:cNvPr id="3" name="Content Placeholder 2">
+            <a:extLst>
+              <a:ext uri="{FF2B5EF4-FFF2-40B4-BE49-F238E27FC236}">
+                <a16:creationId xmlns:a16="http://schemas.microsoft.com/office/drawing/2014/main" id="{C14DCBA0-8258-4AF1-A57D-F759ADD8AFDB}"/>
+              </a:ext>
+            </a:extLst>
+          </p:cNvPr>
+          <p:cNvSpPr>
+            <a:spLocks noGrp="1"/>
+          </p:cNvSpPr>
+          <p:nvPr>
+            <p:ph idx="1"/>
+          </p:nvPr>
+        </p:nvSpPr>
+        <p:spPr/>
+        <p:txBody>
+          <a:bodyPr/>
+          <a:lstStyle/>
+          <a:p>
+            <a:r>
+              <a:rPr lang="en-US" dirty="0"/>
+              <a:t>Questions?</a:t>
+            </a:r>
+          </a:p>
+          <a:p>
+            <a:endParaRPr lang="en-US" dirty="0"/>
+          </a:p>
+          <a:p>
+            <a:r>
+              <a:rPr lang="en-US"/>
+              <a:t>Comments?</a:t>
+            </a:r>
+          </a:p>
+          <a:p>
+            <a:endParaRPr lang="en-US" dirty="0"/>
+          </a:p>
+          <a:p>
+            <a:r>
+              <a:rPr lang="en-US" dirty="0"/>
+              <a:t>Suggestions?</a:t>
+            </a:r>
+          </a:p>
+        </p:txBody>
+      </p:sp>
+    </p:spTree>
+    <p:extLst>
+      <p:ext uri="{BB962C8B-B14F-4D97-AF65-F5344CB8AC3E}">
+        <p14:creationId xmlns:p14="http://schemas.microsoft.com/office/powerpoint/2010/main" val="1874668875"/>
       </p:ext>
     </p:extLst>
   </p:cSld>

</xml_diff>

<commit_message>
second draft of presentation
</commit_message>
<xml_diff>
--- a/thesis/kepler-sieve-slides.pptx
+++ b/thesis/kepler-sieve-slides.pptx
@@ -4,6 +4,9 @@
   <p:sldMasterIdLst>
     <p:sldMasterId id="2147483648" r:id="rId1"/>
   </p:sldMasterIdLst>
+  <p:notesMasterIdLst>
+    <p:notesMasterId r:id="rId54"/>
+  </p:notesMasterIdLst>
   <p:sldIdLst>
     <p:sldId id="256" r:id="rId2"/>
     <p:sldId id="264" r:id="rId3"/>
@@ -59,7 +62,7 @@
     <p:sldId id="310" r:id="rId53"/>
   </p:sldIdLst>
   <p:sldSz cx="12192000" cy="6858000"/>
-  <p:notesSz cx="6858000" cy="9144000"/>
+  <p:notesSz cx="7010400" cy="9296400"/>
   <p:defaultTextStyle>
     <a:defPPr>
       <a:defRPr lang="en-US"/>
@@ -163,6 +166,355 @@
 </p:presentation>
 </file>
 
+<file path=ppt/notesMasters/notesMaster1.xml><?xml version="1.0" encoding="utf-8"?>
+<p:notesMaster xmlns:a="http://schemas.openxmlformats.org/drawingml/2006/main" xmlns:r="http://schemas.openxmlformats.org/officeDocument/2006/relationships" xmlns:p="http://schemas.openxmlformats.org/presentationml/2006/main">
+  <p:cSld>
+    <p:bg>
+      <p:bgRef idx="1001">
+        <a:schemeClr val="bg1"/>
+      </p:bgRef>
+    </p:bg>
+    <p:spTree>
+      <p:nvGrpSpPr>
+        <p:cNvPr id="1" name=""/>
+        <p:cNvGrpSpPr/>
+        <p:nvPr/>
+      </p:nvGrpSpPr>
+      <p:grpSpPr>
+        <a:xfrm>
+          <a:off x="0" y="0"/>
+          <a:ext cx="0" cy="0"/>
+          <a:chOff x="0" y="0"/>
+          <a:chExt cx="0" cy="0"/>
+        </a:xfrm>
+      </p:grpSpPr>
+      <p:sp>
+        <p:nvSpPr>
+          <p:cNvPr id="2" name="Header Placeholder 1"/>
+          <p:cNvSpPr>
+            <a:spLocks noGrp="1"/>
+          </p:cNvSpPr>
+          <p:nvPr>
+            <p:ph type="hdr" sz="quarter"/>
+          </p:nvPr>
+        </p:nvSpPr>
+        <p:spPr>
+          <a:xfrm>
+            <a:off x="0" y="0"/>
+            <a:ext cx="3038475" cy="466725"/>
+          </a:xfrm>
+          <a:prstGeom prst="rect">
+            <a:avLst/>
+          </a:prstGeom>
+        </p:spPr>
+        <p:txBody>
+          <a:bodyPr vert="horz" lIns="91440" tIns="45720" rIns="91440" bIns="45720" rtlCol="0"/>
+          <a:lstStyle>
+            <a:lvl1pPr algn="l">
+              <a:defRPr sz="1200"/>
+            </a:lvl1pPr>
+          </a:lstStyle>
+          <a:p>
+            <a:endParaRPr lang="en-US"/>
+          </a:p>
+        </p:txBody>
+      </p:sp>
+      <p:sp>
+        <p:nvSpPr>
+          <p:cNvPr id="3" name="Date Placeholder 2"/>
+          <p:cNvSpPr>
+            <a:spLocks noGrp="1"/>
+          </p:cNvSpPr>
+          <p:nvPr>
+            <p:ph type="dt" idx="1"/>
+          </p:nvPr>
+        </p:nvSpPr>
+        <p:spPr>
+          <a:xfrm>
+            <a:off x="3970338" y="0"/>
+            <a:ext cx="3038475" cy="466725"/>
+          </a:xfrm>
+          <a:prstGeom prst="rect">
+            <a:avLst/>
+          </a:prstGeom>
+        </p:spPr>
+        <p:txBody>
+          <a:bodyPr vert="horz" lIns="91440" tIns="45720" rIns="91440" bIns="45720" rtlCol="0"/>
+          <a:lstStyle>
+            <a:lvl1pPr algn="r">
+              <a:defRPr sz="1200"/>
+            </a:lvl1pPr>
+          </a:lstStyle>
+          <a:p>
+            <a:fld id="{2CC0CE5A-4CFB-4BA6-B6E3-1FF4EB50E880}" type="datetimeFigureOut">
+              <a:rPr lang="en-US" smtClean="0"/>
+              <a:t>5/4/2020</a:t>
+            </a:fld>
+            <a:endParaRPr lang="en-US"/>
+          </a:p>
+        </p:txBody>
+      </p:sp>
+      <p:sp>
+        <p:nvSpPr>
+          <p:cNvPr id="4" name="Slide Image Placeholder 3"/>
+          <p:cNvSpPr>
+            <a:spLocks noGrp="1" noRot="1" noChangeAspect="1"/>
+          </p:cNvSpPr>
+          <p:nvPr>
+            <p:ph type="sldImg" idx="2"/>
+          </p:nvPr>
+        </p:nvSpPr>
+        <p:spPr>
+          <a:xfrm>
+            <a:off x="717550" y="1162050"/>
+            <a:ext cx="5575300" cy="3136900"/>
+          </a:xfrm>
+          <a:prstGeom prst="rect">
+            <a:avLst/>
+          </a:prstGeom>
+          <a:noFill/>
+          <a:ln w="12700">
+            <a:solidFill>
+              <a:prstClr val="black"/>
+            </a:solidFill>
+          </a:ln>
+        </p:spPr>
+        <p:txBody>
+          <a:bodyPr vert="horz" lIns="91440" tIns="45720" rIns="91440" bIns="45720" rtlCol="0" anchor="ctr"/>
+          <a:lstStyle/>
+          <a:p>
+            <a:endParaRPr lang="en-US"/>
+          </a:p>
+        </p:txBody>
+      </p:sp>
+      <p:sp>
+        <p:nvSpPr>
+          <p:cNvPr id="5" name="Notes Placeholder 4"/>
+          <p:cNvSpPr>
+            <a:spLocks noGrp="1"/>
+          </p:cNvSpPr>
+          <p:nvPr>
+            <p:ph type="body" sz="quarter" idx="3"/>
+          </p:nvPr>
+        </p:nvSpPr>
+        <p:spPr>
+          <a:xfrm>
+            <a:off x="701675" y="4473575"/>
+            <a:ext cx="5607050" cy="3660775"/>
+          </a:xfrm>
+          <a:prstGeom prst="rect">
+            <a:avLst/>
+          </a:prstGeom>
+        </p:spPr>
+        <p:txBody>
+          <a:bodyPr vert="horz" lIns="91440" tIns="45720" rIns="91440" bIns="45720" rtlCol="0"/>
+          <a:lstStyle/>
+          <a:p>
+            <a:pPr lvl="0"/>
+            <a:r>
+              <a:rPr lang="en-US"/>
+              <a:t>Click to edit Master text styles</a:t>
+            </a:r>
+          </a:p>
+          <a:p>
+            <a:pPr lvl="1"/>
+            <a:r>
+              <a:rPr lang="en-US"/>
+              <a:t>Second level</a:t>
+            </a:r>
+          </a:p>
+          <a:p>
+            <a:pPr lvl="2"/>
+            <a:r>
+              <a:rPr lang="en-US"/>
+              <a:t>Third level</a:t>
+            </a:r>
+          </a:p>
+          <a:p>
+            <a:pPr lvl="3"/>
+            <a:r>
+              <a:rPr lang="en-US"/>
+              <a:t>Fourth level</a:t>
+            </a:r>
+          </a:p>
+          <a:p>
+            <a:pPr lvl="4"/>
+            <a:r>
+              <a:rPr lang="en-US"/>
+              <a:t>Fifth level</a:t>
+            </a:r>
+          </a:p>
+        </p:txBody>
+      </p:sp>
+      <p:sp>
+        <p:nvSpPr>
+          <p:cNvPr id="6" name="Footer Placeholder 5"/>
+          <p:cNvSpPr>
+            <a:spLocks noGrp="1"/>
+          </p:cNvSpPr>
+          <p:nvPr>
+            <p:ph type="ftr" sz="quarter" idx="4"/>
+          </p:nvPr>
+        </p:nvSpPr>
+        <p:spPr>
+          <a:xfrm>
+            <a:off x="0" y="8829675"/>
+            <a:ext cx="3038475" cy="466725"/>
+          </a:xfrm>
+          <a:prstGeom prst="rect">
+            <a:avLst/>
+          </a:prstGeom>
+        </p:spPr>
+        <p:txBody>
+          <a:bodyPr vert="horz" lIns="91440" tIns="45720" rIns="91440" bIns="45720" rtlCol="0" anchor="b"/>
+          <a:lstStyle>
+            <a:lvl1pPr algn="l">
+              <a:defRPr sz="1200"/>
+            </a:lvl1pPr>
+          </a:lstStyle>
+          <a:p>
+            <a:endParaRPr lang="en-US"/>
+          </a:p>
+        </p:txBody>
+      </p:sp>
+      <p:sp>
+        <p:nvSpPr>
+          <p:cNvPr id="7" name="Slide Number Placeholder 6"/>
+          <p:cNvSpPr>
+            <a:spLocks noGrp="1"/>
+          </p:cNvSpPr>
+          <p:nvPr>
+            <p:ph type="sldNum" sz="quarter" idx="5"/>
+          </p:nvPr>
+        </p:nvSpPr>
+        <p:spPr>
+          <a:xfrm>
+            <a:off x="3970338" y="8829675"/>
+            <a:ext cx="3038475" cy="466725"/>
+          </a:xfrm>
+          <a:prstGeom prst="rect">
+            <a:avLst/>
+          </a:prstGeom>
+        </p:spPr>
+        <p:txBody>
+          <a:bodyPr vert="horz" lIns="91440" tIns="45720" rIns="91440" bIns="45720" rtlCol="0" anchor="b"/>
+          <a:lstStyle>
+            <a:lvl1pPr algn="r">
+              <a:defRPr sz="1200"/>
+            </a:lvl1pPr>
+          </a:lstStyle>
+          <a:p>
+            <a:fld id="{F26B6E17-22BC-4E6C-AE46-20103EB5C692}" type="slidenum">
+              <a:rPr lang="en-US" smtClean="0"/>
+              <a:t>‹#›</a:t>
+            </a:fld>
+            <a:endParaRPr lang="en-US"/>
+          </a:p>
+        </p:txBody>
+      </p:sp>
+    </p:spTree>
+    <p:extLst>
+      <p:ext uri="{BB962C8B-B14F-4D97-AF65-F5344CB8AC3E}">
+        <p14:creationId xmlns:p14="http://schemas.microsoft.com/office/powerpoint/2010/main" val="2261630766"/>
+      </p:ext>
+    </p:extLst>
+  </p:cSld>
+  <p:clrMap bg1="lt1" tx1="dk1" bg2="lt2" tx2="dk2" accent1="accent1" accent2="accent2" accent3="accent3" accent4="accent4" accent5="accent5" accent6="accent6" hlink="hlink" folHlink="folHlink"/>
+  <p:notesStyle>
+    <a:lvl1pPr marL="0" algn="l" defTabSz="914400" rtl="0" eaLnBrk="1" latinLnBrk="0" hangingPunct="1">
+      <a:defRPr sz="1200" kern="1200">
+        <a:solidFill>
+          <a:schemeClr val="tx1"/>
+        </a:solidFill>
+        <a:latin typeface="+mn-lt"/>
+        <a:ea typeface="+mn-ea"/>
+        <a:cs typeface="+mn-cs"/>
+      </a:defRPr>
+    </a:lvl1pPr>
+    <a:lvl2pPr marL="457200" algn="l" defTabSz="914400" rtl="0" eaLnBrk="1" latinLnBrk="0" hangingPunct="1">
+      <a:defRPr sz="1200" kern="1200">
+        <a:solidFill>
+          <a:schemeClr val="tx1"/>
+        </a:solidFill>
+        <a:latin typeface="+mn-lt"/>
+        <a:ea typeface="+mn-ea"/>
+        <a:cs typeface="+mn-cs"/>
+      </a:defRPr>
+    </a:lvl2pPr>
+    <a:lvl3pPr marL="914400" algn="l" defTabSz="914400" rtl="0" eaLnBrk="1" latinLnBrk="0" hangingPunct="1">
+      <a:defRPr sz="1200" kern="1200">
+        <a:solidFill>
+          <a:schemeClr val="tx1"/>
+        </a:solidFill>
+        <a:latin typeface="+mn-lt"/>
+        <a:ea typeface="+mn-ea"/>
+        <a:cs typeface="+mn-cs"/>
+      </a:defRPr>
+    </a:lvl3pPr>
+    <a:lvl4pPr marL="1371600" algn="l" defTabSz="914400" rtl="0" eaLnBrk="1" latinLnBrk="0" hangingPunct="1">
+      <a:defRPr sz="1200" kern="1200">
+        <a:solidFill>
+          <a:schemeClr val="tx1"/>
+        </a:solidFill>
+        <a:latin typeface="+mn-lt"/>
+        <a:ea typeface="+mn-ea"/>
+        <a:cs typeface="+mn-cs"/>
+      </a:defRPr>
+    </a:lvl4pPr>
+    <a:lvl5pPr marL="1828800" algn="l" defTabSz="914400" rtl="0" eaLnBrk="1" latinLnBrk="0" hangingPunct="1">
+      <a:defRPr sz="1200" kern="1200">
+        <a:solidFill>
+          <a:schemeClr val="tx1"/>
+        </a:solidFill>
+        <a:latin typeface="+mn-lt"/>
+        <a:ea typeface="+mn-ea"/>
+        <a:cs typeface="+mn-cs"/>
+      </a:defRPr>
+    </a:lvl5pPr>
+    <a:lvl6pPr marL="2286000" algn="l" defTabSz="914400" rtl="0" eaLnBrk="1" latinLnBrk="0" hangingPunct="1">
+      <a:defRPr sz="1200" kern="1200">
+        <a:solidFill>
+          <a:schemeClr val="tx1"/>
+        </a:solidFill>
+        <a:latin typeface="+mn-lt"/>
+        <a:ea typeface="+mn-ea"/>
+        <a:cs typeface="+mn-cs"/>
+      </a:defRPr>
+    </a:lvl6pPr>
+    <a:lvl7pPr marL="2743200" algn="l" defTabSz="914400" rtl="0" eaLnBrk="1" latinLnBrk="0" hangingPunct="1">
+      <a:defRPr sz="1200" kern="1200">
+        <a:solidFill>
+          <a:schemeClr val="tx1"/>
+        </a:solidFill>
+        <a:latin typeface="+mn-lt"/>
+        <a:ea typeface="+mn-ea"/>
+        <a:cs typeface="+mn-cs"/>
+      </a:defRPr>
+    </a:lvl7pPr>
+    <a:lvl8pPr marL="3200400" algn="l" defTabSz="914400" rtl="0" eaLnBrk="1" latinLnBrk="0" hangingPunct="1">
+      <a:defRPr sz="1200" kern="1200">
+        <a:solidFill>
+          <a:schemeClr val="tx1"/>
+        </a:solidFill>
+        <a:latin typeface="+mn-lt"/>
+        <a:ea typeface="+mn-ea"/>
+        <a:cs typeface="+mn-cs"/>
+      </a:defRPr>
+    </a:lvl8pPr>
+    <a:lvl9pPr marL="3657600" algn="l" defTabSz="914400" rtl="0" eaLnBrk="1" latinLnBrk="0" hangingPunct="1">
+      <a:defRPr sz="1200" kern="1200">
+        <a:solidFill>
+          <a:schemeClr val="tx1"/>
+        </a:solidFill>
+        <a:latin typeface="+mn-lt"/>
+        <a:ea typeface="+mn-ea"/>
+        <a:cs typeface="+mn-cs"/>
+      </a:defRPr>
+    </a:lvl9pPr>
+  </p:notesStyle>
+</p:notesMaster>
+</file>
+
 <file path=ppt/slideLayouts/slideLayout1.xml><?xml version="1.0" encoding="utf-8"?>
 <p:sldLayout xmlns:a="http://schemas.openxmlformats.org/drawingml/2006/main" xmlns:r="http://schemas.openxmlformats.org/officeDocument/2006/relationships" xmlns:p="http://schemas.openxmlformats.org/presentationml/2006/main" type="title" preserve="1">
   <p:cSld name="Title Slide">
@@ -308,7 +660,7 @@
           <a:bodyPr/>
           <a:lstStyle/>
           <a:p>
-            <a:fld id="{BC40CE94-6CAD-431A-8A7D-F2EBDC4A449F}" type="datetimeFigureOut">
+            <a:fld id="{6242448E-6A2F-4F4F-9137-05A960BC84FE}" type="datetime1">
               <a:rPr lang="en-US" smtClean="0"/>
               <a:t>5/4/2020</a:t>
             </a:fld>
@@ -506,7 +858,7 @@
           <a:bodyPr/>
           <a:lstStyle/>
           <a:p>
-            <a:fld id="{BC40CE94-6CAD-431A-8A7D-F2EBDC4A449F}" type="datetimeFigureOut">
+            <a:fld id="{DFADCE8B-2874-46EA-ACFF-6F1C479FF377}" type="datetime1">
               <a:rPr lang="en-US" smtClean="0"/>
               <a:t>5/4/2020</a:t>
             </a:fld>
@@ -714,7 +1066,7 @@
           <a:bodyPr/>
           <a:lstStyle/>
           <a:p>
-            <a:fld id="{BC40CE94-6CAD-431A-8A7D-F2EBDC4A449F}" type="datetimeFigureOut">
+            <a:fld id="{D8E91D25-58DF-4738-A4DA-666FE8770861}" type="datetime1">
               <a:rPr lang="en-US" smtClean="0"/>
               <a:t>5/4/2020</a:t>
             </a:fld>
@@ -912,7 +1264,7 @@
           <a:bodyPr/>
           <a:lstStyle/>
           <a:p>
-            <a:fld id="{BC40CE94-6CAD-431A-8A7D-F2EBDC4A449F}" type="datetimeFigureOut">
+            <a:fld id="{85F3B35A-389E-457D-B0F9-573934B93734}" type="datetime1">
               <a:rPr lang="en-US" smtClean="0"/>
               <a:t>5/4/2020</a:t>
             </a:fld>
@@ -1187,7 +1539,7 @@
           <a:bodyPr/>
           <a:lstStyle/>
           <a:p>
-            <a:fld id="{BC40CE94-6CAD-431A-8A7D-F2EBDC4A449F}" type="datetimeFigureOut">
+            <a:fld id="{01102144-6888-4B2E-B70D-F32ECE9C49FB}" type="datetime1">
               <a:rPr lang="en-US" smtClean="0"/>
               <a:t>5/4/2020</a:t>
             </a:fld>
@@ -1452,7 +1804,7 @@
           <a:bodyPr/>
           <a:lstStyle/>
           <a:p>
-            <a:fld id="{BC40CE94-6CAD-431A-8A7D-F2EBDC4A449F}" type="datetimeFigureOut">
+            <a:fld id="{20CD4E42-8A24-463B-9BDF-64964846CA1C}" type="datetime1">
               <a:rPr lang="en-US" smtClean="0"/>
               <a:t>5/4/2020</a:t>
             </a:fld>
@@ -1864,7 +2216,7 @@
           <a:bodyPr/>
           <a:lstStyle/>
           <a:p>
-            <a:fld id="{BC40CE94-6CAD-431A-8A7D-F2EBDC4A449F}" type="datetimeFigureOut">
+            <a:fld id="{C1408255-B0BF-43A3-B50F-68EA830E9402}" type="datetime1">
               <a:rPr lang="en-US" smtClean="0"/>
               <a:t>5/4/2020</a:t>
             </a:fld>
@@ -2005,7 +2357,7 @@
           <a:bodyPr/>
           <a:lstStyle/>
           <a:p>
-            <a:fld id="{BC40CE94-6CAD-431A-8A7D-F2EBDC4A449F}" type="datetimeFigureOut">
+            <a:fld id="{9EDA16A9-3877-43E1-B217-53035EC24112}" type="datetime1">
               <a:rPr lang="en-US" smtClean="0"/>
               <a:t>5/4/2020</a:t>
             </a:fld>
@@ -2118,7 +2470,7 @@
           <a:bodyPr/>
           <a:lstStyle/>
           <a:p>
-            <a:fld id="{BC40CE94-6CAD-431A-8A7D-F2EBDC4A449F}" type="datetimeFigureOut">
+            <a:fld id="{63D027DD-D621-45F3-AF48-F7B72D92DFD1}" type="datetime1">
               <a:rPr lang="en-US" smtClean="0"/>
               <a:t>5/4/2020</a:t>
             </a:fld>
@@ -2429,7 +2781,7 @@
           <a:bodyPr/>
           <a:lstStyle/>
           <a:p>
-            <a:fld id="{BC40CE94-6CAD-431A-8A7D-F2EBDC4A449F}" type="datetimeFigureOut">
+            <a:fld id="{53E93A67-D87A-46DC-8693-A98686B31DE9}" type="datetime1">
               <a:rPr lang="en-US" smtClean="0"/>
               <a:t>5/4/2020</a:t>
             </a:fld>
@@ -2717,7 +3069,7 @@
           <a:bodyPr/>
           <a:lstStyle/>
           <a:p>
-            <a:fld id="{BC40CE94-6CAD-431A-8A7D-F2EBDC4A449F}" type="datetimeFigureOut">
+            <a:fld id="{1F41E13E-3CE3-4628-9E90-1A04C4E9BBE8}" type="datetime1">
               <a:rPr lang="en-US" smtClean="0"/>
               <a:t>5/4/2020</a:t>
             </a:fld>
@@ -2958,7 +3310,7 @@
             </a:lvl1pPr>
           </a:lstStyle>
           <a:p>
-            <a:fld id="{BC40CE94-6CAD-431A-8A7D-F2EBDC4A449F}" type="datetimeFigureOut">
+            <a:fld id="{CBFF61B3-BD20-4AD4-818F-68FFCC5378DE}" type="datetime1">
               <a:rPr lang="en-US" smtClean="0"/>
               <a:t>5/4/2020</a:t>
             </a:fld>
@@ -3077,6 +3429,7 @@
     <p:sldLayoutId id="2147483658" r:id="rId10"/>
     <p:sldLayoutId id="2147483659" r:id="rId11"/>
   </p:sldLayoutIdLst>
+  <p:hf hdr="0" ftr="0" dt="0"/>
   <p:txStyles>
     <p:titleStyle>
       <a:lvl1pPr algn="l" defTabSz="914400" rtl="0" eaLnBrk="1" latinLnBrk="0" hangingPunct="1">
@@ -3646,8 +3999,37 @@
           <a:p>
             <a:r>
               <a:rPr lang="en-US" dirty="0"/>
-              <a:t>By Michael S. Emanuel</a:t>
-            </a:r>
+              <a:t>Michael S. Emanuel</a:t>
+            </a:r>
+          </a:p>
+        </p:txBody>
+      </p:sp>
+      <p:sp>
+        <p:nvSpPr>
+          <p:cNvPr id="5" name="Slide Number Placeholder 4">
+            <a:extLst>
+              <a:ext uri="{FF2B5EF4-FFF2-40B4-BE49-F238E27FC236}">
+                <a16:creationId xmlns:a16="http://schemas.microsoft.com/office/drawing/2014/main" id="{E8B47B45-E752-4EF2-9968-7F24C75C629A}"/>
+              </a:ext>
+            </a:extLst>
+          </p:cNvPr>
+          <p:cNvSpPr>
+            <a:spLocks noGrp="1"/>
+          </p:cNvSpPr>
+          <p:nvPr>
+            <p:ph type="sldNum" sz="quarter" idx="12"/>
+          </p:nvPr>
+        </p:nvSpPr>
+        <p:spPr/>
+        <p:txBody>
+          <a:bodyPr/>
+          <a:lstStyle/>
+          <a:p>
+            <a:fld id="{D22732EB-17FA-4F1E-8B0F-B0087D5BE81C}" type="slidenum">
+              <a:rPr lang="en-US" smtClean="0"/>
+              <a:t>1</a:t>
+            </a:fld>
+            <a:endParaRPr lang="en-US"/>
           </a:p>
         </p:txBody>
       </p:sp>
@@ -3816,6 +4198,35 @@
           </a:prstGeom>
         </p:spPr>
       </p:pic>
+      <p:sp>
+        <p:nvSpPr>
+          <p:cNvPr id="5" name="Slide Number Placeholder 4">
+            <a:extLst>
+              <a:ext uri="{FF2B5EF4-FFF2-40B4-BE49-F238E27FC236}">
+                <a16:creationId xmlns:a16="http://schemas.microsoft.com/office/drawing/2014/main" id="{6F0A520B-C05B-44C8-A437-D4F72F5FF53A}"/>
+              </a:ext>
+            </a:extLst>
+          </p:cNvPr>
+          <p:cNvSpPr>
+            <a:spLocks noGrp="1"/>
+          </p:cNvSpPr>
+          <p:nvPr>
+            <p:ph type="sldNum" sz="quarter" idx="12"/>
+          </p:nvPr>
+        </p:nvSpPr>
+        <p:spPr/>
+        <p:txBody>
+          <a:bodyPr/>
+          <a:lstStyle/>
+          <a:p>
+            <a:fld id="{D22732EB-17FA-4F1E-8B0F-B0087D5BE81C}" type="slidenum">
+              <a:rPr lang="en-US" smtClean="0"/>
+              <a:t>10</a:t>
+            </a:fld>
+            <a:endParaRPr lang="en-US"/>
+          </a:p>
+        </p:txBody>
+      </p:sp>
     </p:spTree>
     <p:extLst>
       <p:ext uri="{BB962C8B-B14F-4D97-AF65-F5344CB8AC3E}">
@@ -3862,9 +4273,16 @@
             <p:ph type="title"/>
           </p:nvPr>
         </p:nvSpPr>
-        <p:spPr/>
-        <p:txBody>
-          <a:bodyPr/>
+        <p:spPr>
+          <a:xfrm>
+            <a:off x="838200" y="365126"/>
+            <a:ext cx="10515600" cy="626836"/>
+          </a:xfrm>
+        </p:spPr>
+        <p:txBody>
+          <a:bodyPr>
+            <a:normAutofit fontScale="90000"/>
+          </a:bodyPr>
           <a:lstStyle/>
           <a:p>
             <a:r>
@@ -3981,6 +4399,35 @@
           </a:prstGeom>
         </p:spPr>
       </p:pic>
+      <p:sp>
+        <p:nvSpPr>
+          <p:cNvPr id="6" name="Slide Number Placeholder 5">
+            <a:extLst>
+              <a:ext uri="{FF2B5EF4-FFF2-40B4-BE49-F238E27FC236}">
+                <a16:creationId xmlns:a16="http://schemas.microsoft.com/office/drawing/2014/main" id="{4C182006-4C94-4D4F-9091-964625D0C9BB}"/>
+              </a:ext>
+            </a:extLst>
+          </p:cNvPr>
+          <p:cNvSpPr>
+            <a:spLocks noGrp="1"/>
+          </p:cNvSpPr>
+          <p:nvPr>
+            <p:ph type="sldNum" sz="quarter" idx="12"/>
+          </p:nvPr>
+        </p:nvSpPr>
+        <p:spPr/>
+        <p:txBody>
+          <a:bodyPr/>
+          <a:lstStyle/>
+          <a:p>
+            <a:fld id="{D22732EB-17FA-4F1E-8B0F-B0087D5BE81C}" type="slidenum">
+              <a:rPr lang="en-US" smtClean="0"/>
+              <a:t>11</a:t>
+            </a:fld>
+            <a:endParaRPr lang="en-US"/>
+          </a:p>
+        </p:txBody>
+      </p:sp>
     </p:spTree>
     <p:extLst>
       <p:ext uri="{BB962C8B-B14F-4D97-AF65-F5344CB8AC3E}">
@@ -4027,10 +4474,15 @@
             <p:ph type="title"/>
           </p:nvPr>
         </p:nvSpPr>
-        <p:spPr/>
+        <p:spPr>
+          <a:xfrm>
+            <a:off x="838200" y="365126"/>
+            <a:ext cx="10515600" cy="618668"/>
+          </a:xfrm>
+        </p:spPr>
         <p:txBody>
           <a:bodyPr>
-            <a:normAutofit/>
+            <a:normAutofit fontScale="90000"/>
           </a:bodyPr>
           <a:lstStyle/>
           <a:p>
@@ -4218,7 +4670,7 @@
           <a:p>
             <a:r>
               <a:rPr lang="en-US" sz="2600" dirty="0"/>
-              <a:t>TensorFlow is fast! 5000 time points in 300 </a:t>
+              <a:t>TensorFlow is fast! 5000 time points in ~300 </a:t>
             </a:r>
             <a:r>
               <a:rPr lang="el-GR" sz="2600" dirty="0">
@@ -4242,11 +4694,23 @@
             </a:r>
             <a:r>
               <a:rPr lang="en-US" dirty="0" err="1"/>
-              <a:t>dq</a:t>
-            </a:r>
-            <a:r>
-              <a:rPr lang="en-US" dirty="0"/>
-              <a:t>, dv to match rebound integration at input orbital elements</a:t>
+              <a:t>d</a:t>
+            </a:r>
+            <a:r>
+              <a:rPr lang="en-US" b="1" dirty="0" err="1"/>
+              <a:t>q</a:t>
+            </a:r>
+            <a:r>
+              <a:rPr lang="en-US" dirty="0"/>
+              <a:t>, d</a:t>
+            </a:r>
+            <a:r>
+              <a:rPr lang="en-US" b="1" dirty="0"/>
+              <a:t>v</a:t>
+            </a:r>
+            <a:r>
+              <a:rPr lang="en-US" dirty="0"/>
+              <a:t> to match REBOUND integration at input orbital elements</a:t>
             </a:r>
           </a:p>
         </p:txBody>
@@ -4407,6 +4871,35 @@
           </a:prstGeom>
         </p:spPr>
       </p:pic>
+      <p:sp>
+        <p:nvSpPr>
+          <p:cNvPr id="21" name="Slide Number Placeholder 20">
+            <a:extLst>
+              <a:ext uri="{FF2B5EF4-FFF2-40B4-BE49-F238E27FC236}">
+                <a16:creationId xmlns:a16="http://schemas.microsoft.com/office/drawing/2014/main" id="{13885E3D-ECDF-4480-B6B1-EBD5445CD2EE}"/>
+              </a:ext>
+            </a:extLst>
+          </p:cNvPr>
+          <p:cNvSpPr>
+            <a:spLocks noGrp="1"/>
+          </p:cNvSpPr>
+          <p:nvPr>
+            <p:ph type="sldNum" sz="quarter" idx="12"/>
+          </p:nvPr>
+        </p:nvSpPr>
+        <p:spPr/>
+        <p:txBody>
+          <a:bodyPr/>
+          <a:lstStyle/>
+          <a:p>
+            <a:fld id="{D22732EB-17FA-4F1E-8B0F-B0087D5BE81C}" type="slidenum">
+              <a:rPr lang="en-US" smtClean="0"/>
+              <a:t>12</a:t>
+            </a:fld>
+            <a:endParaRPr lang="en-US"/>
+          </a:p>
+        </p:txBody>
+      </p:sp>
     </p:spTree>
     <p:extLst>
       <p:ext uri="{BB962C8B-B14F-4D97-AF65-F5344CB8AC3E}">
@@ -4492,6 +4985,35 @@
           </a:p>
         </p:txBody>
       </p:sp>
+      <p:sp>
+        <p:nvSpPr>
+          <p:cNvPr id="4" name="Slide Number Placeholder 3">
+            <a:extLst>
+              <a:ext uri="{FF2B5EF4-FFF2-40B4-BE49-F238E27FC236}">
+                <a16:creationId xmlns:a16="http://schemas.microsoft.com/office/drawing/2014/main" id="{900239B6-6DEA-48F5-80A6-735C8CF909A9}"/>
+              </a:ext>
+            </a:extLst>
+          </p:cNvPr>
+          <p:cNvSpPr>
+            <a:spLocks noGrp="1"/>
+          </p:cNvSpPr>
+          <p:nvPr>
+            <p:ph type="sldNum" sz="quarter" idx="12"/>
+          </p:nvPr>
+        </p:nvSpPr>
+        <p:spPr/>
+        <p:txBody>
+          <a:bodyPr/>
+          <a:lstStyle/>
+          <a:p>
+            <a:fld id="{D22732EB-17FA-4F1E-8B0F-B0087D5BE81C}" type="slidenum">
+              <a:rPr lang="en-US" smtClean="0"/>
+              <a:t>13</a:t>
+            </a:fld>
+            <a:endParaRPr lang="en-US"/>
+          </a:p>
+        </p:txBody>
+      </p:sp>
     </p:spTree>
     <p:extLst>
       <p:ext uri="{BB962C8B-B14F-4D97-AF65-F5344CB8AC3E}">
@@ -4538,9 +5060,16 @@
             <p:ph type="title"/>
           </p:nvPr>
         </p:nvSpPr>
-        <p:spPr/>
-        <p:txBody>
-          <a:bodyPr/>
+        <p:spPr>
+          <a:xfrm>
+            <a:off x="838200" y="365127"/>
+            <a:ext cx="10515600" cy="700312"/>
+          </a:xfrm>
+        </p:spPr>
+        <p:txBody>
+          <a:bodyPr>
+            <a:normAutofit/>
+          </a:bodyPr>
           <a:lstStyle/>
           <a:p>
             <a:r>
@@ -4675,11 +5204,40 @@
             </a:pPr>
             <a:r>
               <a:rPr lang="en-US" sz="2400" dirty="0"/>
-              <a:t>Two problems: precession (drift) and nutation (wobbles) in direction of north pole</a:t>
+              <a:t>Two problems: precession (drift) and nutation (wobbles) in direction of North Pole</a:t>
             </a:r>
           </a:p>
           <a:p>
             <a:endParaRPr lang="en-US" dirty="0"/>
+          </a:p>
+        </p:txBody>
+      </p:sp>
+      <p:sp>
+        <p:nvSpPr>
+          <p:cNvPr id="9" name="Slide Number Placeholder 8">
+            <a:extLst>
+              <a:ext uri="{FF2B5EF4-FFF2-40B4-BE49-F238E27FC236}">
+                <a16:creationId xmlns:a16="http://schemas.microsoft.com/office/drawing/2014/main" id="{61EA64B0-89AF-4D59-BCC0-FB70F9A21390}"/>
+              </a:ext>
+            </a:extLst>
+          </p:cNvPr>
+          <p:cNvSpPr>
+            <a:spLocks noGrp="1"/>
+          </p:cNvSpPr>
+          <p:nvPr>
+            <p:ph type="sldNum" sz="quarter" idx="12"/>
+          </p:nvPr>
+        </p:nvSpPr>
+        <p:spPr/>
+        <p:txBody>
+          <a:bodyPr/>
+          <a:lstStyle/>
+          <a:p>
+            <a:fld id="{D22732EB-17FA-4F1E-8B0F-B0087D5BE81C}" type="slidenum">
+              <a:rPr lang="en-US" smtClean="0"/>
+              <a:t>14</a:t>
+            </a:fld>
+            <a:endParaRPr lang="en-US"/>
           </a:p>
         </p:txBody>
       </p:sp>
@@ -4729,16 +5287,20 @@
             <p:ph type="title"/>
           </p:nvPr>
         </p:nvSpPr>
-        <p:spPr/>
+        <p:spPr>
+          <a:xfrm>
+            <a:off x="838200" y="365126"/>
+            <a:ext cx="10515600" cy="745218"/>
+          </a:xfrm>
+        </p:spPr>
         <p:txBody>
           <a:bodyPr/>
           <a:lstStyle/>
           <a:p>
             <a:r>
-              <a:rPr lang="en-US"/>
+              <a:rPr lang="en-US" dirty="0"/>
               <a:t>International Celestial Reference Frame (ICRF)</a:t>
             </a:r>
-            <a:endParaRPr lang="en-US" dirty="0"/>
           </a:p>
         </p:txBody>
       </p:sp>
@@ -4792,7 +5354,7 @@
         <p:spPr>
           <a:xfrm>
             <a:off x="8074479" y="1537854"/>
-            <a:ext cx="3886200" cy="2031325"/>
+            <a:ext cx="3886200" cy="3139321"/>
           </a:xfrm>
           <a:prstGeom prst="rect">
             <a:avLst/>
@@ -4845,6 +5407,24 @@
             </a:r>
           </a:p>
           <a:p>
+            <a:pPr marL="742950" lvl="1" indent="-285750">
+              <a:buFont typeface="Arial" panose="020B0604020202020204" pitchFamily="34" charset="0"/>
+              <a:buChar char="•"/>
+            </a:pPr>
+            <a:r>
+              <a:rPr lang="en-US" dirty="0"/>
+              <a:t>Not in </a:t>
+            </a:r>
+            <a:r>
+              <a:rPr lang="en-US" b="1" dirty="0"/>
+              <a:t>direction </a:t>
+            </a:r>
+            <a:r>
+              <a:rPr lang="en-US" dirty="0"/>
+              <a:t>anyway</a:t>
+            </a:r>
+          </a:p>
+          <a:p>
             <a:pPr marL="285750" indent="-285750">
               <a:buFont typeface="Arial" panose="020B0604020202020204" pitchFamily="34" charset="0"/>
               <a:buChar char="•"/>
@@ -4861,7 +5441,7 @@
             </a:pPr>
             <a:r>
               <a:rPr lang="en-US" dirty="0"/>
-              <a:t>~2 milli arc seconds</a:t>
+              <a:t>~2 milliarc-seconds</a:t>
             </a:r>
           </a:p>
           <a:p>
@@ -4869,7 +5449,49 @@
               <a:buFont typeface="Arial" panose="020B0604020202020204" pitchFamily="34" charset="0"/>
               <a:buChar char="•"/>
             </a:pPr>
-            <a:endParaRPr lang="en-US" dirty="0"/>
+            <a:r>
+              <a:rPr lang="en-US" dirty="0"/>
+              <a:t>Intuition: like using Polaris instead of Earth’s axis for the North Pole</a:t>
+            </a:r>
+          </a:p>
+          <a:p>
+            <a:pPr marL="285750" indent="-285750">
+              <a:buFont typeface="Arial" panose="020B0604020202020204" pitchFamily="34" charset="0"/>
+              <a:buChar char="•"/>
+            </a:pPr>
+            <a:r>
+              <a:rPr lang="en-US" dirty="0"/>
+              <a:t>Except you use 232 stars to get a highly accurate composite direction</a:t>
+            </a:r>
+          </a:p>
+        </p:txBody>
+      </p:sp>
+      <p:sp>
+        <p:nvSpPr>
+          <p:cNvPr id="7" name="Slide Number Placeholder 6">
+            <a:extLst>
+              <a:ext uri="{FF2B5EF4-FFF2-40B4-BE49-F238E27FC236}">
+                <a16:creationId xmlns:a16="http://schemas.microsoft.com/office/drawing/2014/main" id="{135E9D49-0D30-4971-83CC-F14E79F70DEC}"/>
+              </a:ext>
+            </a:extLst>
+          </p:cNvPr>
+          <p:cNvSpPr>
+            <a:spLocks noGrp="1"/>
+          </p:cNvSpPr>
+          <p:nvPr>
+            <p:ph type="sldNum" sz="quarter" idx="12"/>
+          </p:nvPr>
+        </p:nvSpPr>
+        <p:spPr/>
+        <p:txBody>
+          <a:bodyPr/>
+          <a:lstStyle/>
+          <a:p>
+            <a:fld id="{D22732EB-17FA-4F1E-8B0F-B0087D5BE81C}" type="slidenum">
+              <a:rPr lang="en-US" smtClean="0"/>
+              <a:t>15</a:t>
+            </a:fld>
+            <a:endParaRPr lang="en-US"/>
           </a:p>
         </p:txBody>
       </p:sp>
@@ -4919,7 +5541,12 @@
             <p:ph type="title"/>
           </p:nvPr>
         </p:nvSpPr>
-        <p:spPr/>
+        <p:spPr>
+          <a:xfrm>
+            <a:off x="838200" y="365125"/>
+            <a:ext cx="10515600" cy="790121"/>
+          </a:xfrm>
+        </p:spPr>
         <p:txBody>
           <a:bodyPr/>
           <a:lstStyle/>
@@ -5160,6 +5787,35 @@
           </a:p>
           <a:p>
             <a:endParaRPr lang="en-US" dirty="0"/>
+          </a:p>
+        </p:txBody>
+      </p:sp>
+      <p:sp>
+        <p:nvSpPr>
+          <p:cNvPr id="7" name="Slide Number Placeholder 6">
+            <a:extLst>
+              <a:ext uri="{FF2B5EF4-FFF2-40B4-BE49-F238E27FC236}">
+                <a16:creationId xmlns:a16="http://schemas.microsoft.com/office/drawing/2014/main" id="{91AAFD62-C87D-4B31-8768-AAADE430C4F8}"/>
+              </a:ext>
+            </a:extLst>
+          </p:cNvPr>
+          <p:cNvSpPr>
+            <a:spLocks noGrp="1"/>
+          </p:cNvSpPr>
+          <p:nvPr>
+            <p:ph type="sldNum" sz="quarter" idx="12"/>
+          </p:nvPr>
+        </p:nvSpPr>
+        <p:spPr/>
+        <p:txBody>
+          <a:bodyPr/>
+          <a:lstStyle/>
+          <a:p>
+            <a:fld id="{D22732EB-17FA-4F1E-8B0F-B0087D5BE81C}" type="slidenum">
+              <a:rPr lang="en-US" smtClean="0"/>
+              <a:t>16</a:t>
+            </a:fld>
+            <a:endParaRPr lang="en-US"/>
           </a:p>
         </p:txBody>
       </p:sp>
@@ -5209,7 +5865,12 @@
             <p:ph type="title"/>
           </p:nvPr>
         </p:nvSpPr>
-        <p:spPr/>
+        <p:spPr>
+          <a:xfrm>
+            <a:off x="838200" y="365125"/>
+            <a:ext cx="10515600" cy="708479"/>
+          </a:xfrm>
+        </p:spPr>
         <p:txBody>
           <a:bodyPr/>
           <a:lstStyle/>
@@ -5467,6 +6128,35 @@
               <a:rPr lang="en-US" dirty="0"/>
               <a:t> adjustment worth 0-5 arc seconds on first 16 asteroids</a:t>
             </a:r>
+          </a:p>
+        </p:txBody>
+      </p:sp>
+      <p:sp>
+        <p:nvSpPr>
+          <p:cNvPr id="43" name="Slide Number Placeholder 42">
+            <a:extLst>
+              <a:ext uri="{FF2B5EF4-FFF2-40B4-BE49-F238E27FC236}">
+                <a16:creationId xmlns:a16="http://schemas.microsoft.com/office/drawing/2014/main" id="{3BBD1FAB-335F-4F65-B427-4ECDED20155F}"/>
+              </a:ext>
+            </a:extLst>
+          </p:cNvPr>
+          <p:cNvSpPr>
+            <a:spLocks noGrp="1"/>
+          </p:cNvSpPr>
+          <p:nvPr>
+            <p:ph type="sldNum" sz="quarter" idx="12"/>
+          </p:nvPr>
+        </p:nvSpPr>
+        <p:spPr/>
+        <p:txBody>
+          <a:bodyPr/>
+          <a:lstStyle/>
+          <a:p>
+            <a:fld id="{D22732EB-17FA-4F1E-8B0F-B0087D5BE81C}" type="slidenum">
+              <a:rPr lang="en-US" smtClean="0"/>
+              <a:t>17</a:t>
+            </a:fld>
+            <a:endParaRPr lang="en-US"/>
           </a:p>
         </p:txBody>
       </p:sp>
@@ -5516,7 +6206,12 @@
             <p:ph type="title"/>
           </p:nvPr>
         </p:nvSpPr>
-        <p:spPr/>
+        <p:spPr>
+          <a:xfrm>
+            <a:off x="838200" y="365127"/>
+            <a:ext cx="10515600" cy="786038"/>
+          </a:xfrm>
+        </p:spPr>
         <p:txBody>
           <a:bodyPr/>
           <a:lstStyle/>
@@ -5572,7 +6267,7 @@
               <a:t>Both state vectors </a:t>
             </a:r>
             <a:r>
-              <a:rPr lang="en-US" i="1" dirty="0"/>
+              <a:rPr lang="en-US" b="1" i="1" dirty="0"/>
               <a:t>q</a:t>
             </a:r>
             <a:r>
@@ -5580,7 +6275,7 @@
               <a:t>, </a:t>
             </a:r>
             <a:r>
-              <a:rPr lang="en-US" i="1" dirty="0"/>
+              <a:rPr lang="en-US" b="1" i="1" dirty="0"/>
               <a:t>v</a:t>
             </a:r>
             <a:r>
@@ -5641,6 +6336,35 @@
               <a:rPr lang="en-US" dirty="0"/>
               <a:t>RMS error: 0.873 arc seconds!</a:t>
             </a:r>
+          </a:p>
+        </p:txBody>
+      </p:sp>
+      <p:sp>
+        <p:nvSpPr>
+          <p:cNvPr id="4" name="Slide Number Placeholder 3">
+            <a:extLst>
+              <a:ext uri="{FF2B5EF4-FFF2-40B4-BE49-F238E27FC236}">
+                <a16:creationId xmlns:a16="http://schemas.microsoft.com/office/drawing/2014/main" id="{F0BD2C0A-7E61-4829-B030-514920AEB5FD}"/>
+              </a:ext>
+            </a:extLst>
+          </p:cNvPr>
+          <p:cNvSpPr>
+            <a:spLocks noGrp="1"/>
+          </p:cNvSpPr>
+          <p:nvPr>
+            <p:ph type="sldNum" sz="quarter" idx="12"/>
+          </p:nvPr>
+        </p:nvSpPr>
+        <p:spPr/>
+        <p:txBody>
+          <a:bodyPr/>
+          <a:lstStyle/>
+          <a:p>
+            <a:fld id="{D22732EB-17FA-4F1E-8B0F-B0087D5BE81C}" type="slidenum">
+              <a:rPr lang="en-US" smtClean="0"/>
+              <a:t>18</a:t>
+            </a:fld>
+            <a:endParaRPr lang="en-US"/>
           </a:p>
         </p:txBody>
       </p:sp>
@@ -5729,6 +6453,35 @@
           </a:p>
         </p:txBody>
       </p:sp>
+      <p:sp>
+        <p:nvSpPr>
+          <p:cNvPr id="4" name="Slide Number Placeholder 3">
+            <a:extLst>
+              <a:ext uri="{FF2B5EF4-FFF2-40B4-BE49-F238E27FC236}">
+                <a16:creationId xmlns:a16="http://schemas.microsoft.com/office/drawing/2014/main" id="{4A1F94B1-D73D-472C-9C6D-55AE74643C1C}"/>
+              </a:ext>
+            </a:extLst>
+          </p:cNvPr>
+          <p:cNvSpPr>
+            <a:spLocks noGrp="1"/>
+          </p:cNvSpPr>
+          <p:nvPr>
+            <p:ph type="sldNum" sz="quarter" idx="12"/>
+          </p:nvPr>
+        </p:nvSpPr>
+        <p:spPr/>
+        <p:txBody>
+          <a:bodyPr/>
+          <a:lstStyle/>
+          <a:p>
+            <a:fld id="{D22732EB-17FA-4F1E-8B0F-B0087D5BE81C}" type="slidenum">
+              <a:rPr lang="en-US" smtClean="0"/>
+              <a:t>19</a:t>
+            </a:fld>
+            <a:endParaRPr lang="en-US"/>
+          </a:p>
+        </p:txBody>
+      </p:sp>
     </p:spTree>
     <p:extLst>
       <p:ext uri="{BB962C8B-B14F-4D97-AF65-F5344CB8AC3E}">
@@ -5775,6 +6528,39 @@
             <p:ph type="title"/>
           </p:nvPr>
         </p:nvSpPr>
+        <p:spPr>
+          <a:xfrm>
+            <a:off x="838200" y="365126"/>
+            <a:ext cx="10515600" cy="794204"/>
+          </a:xfrm>
+        </p:spPr>
+        <p:txBody>
+          <a:bodyPr/>
+          <a:lstStyle/>
+          <a:p>
+            <a:r>
+              <a:rPr lang="en-US" dirty="0"/>
+              <a:t>Acknowledgments</a:t>
+            </a:r>
+          </a:p>
+        </p:txBody>
+      </p:sp>
+      <p:sp>
+        <p:nvSpPr>
+          <p:cNvPr id="3" name="Content Placeholder 2">
+            <a:extLst>
+              <a:ext uri="{FF2B5EF4-FFF2-40B4-BE49-F238E27FC236}">
+                <a16:creationId xmlns:a16="http://schemas.microsoft.com/office/drawing/2014/main" id="{19EA1FE7-4042-4918-8878-7FBA625B12E0}"/>
+              </a:ext>
+            </a:extLst>
+          </p:cNvPr>
+          <p:cNvSpPr>
+            <a:spLocks noGrp="1"/>
+          </p:cNvSpPr>
+          <p:nvPr>
+            <p:ph idx="1"/>
+          </p:nvPr>
+        </p:nvSpPr>
         <p:spPr/>
         <p:txBody>
           <a:bodyPr/>
@@ -5782,25 +6568,31 @@
           <a:p>
             <a:r>
               <a:rPr lang="en-US" dirty="0"/>
-              <a:t>Acknowledgments</a:t>
-            </a:r>
-          </a:p>
-        </p:txBody>
-      </p:sp>
-      <p:sp>
-        <p:nvSpPr>
-          <p:cNvPr id="3" name="Content Placeholder 2">
-            <a:extLst>
-              <a:ext uri="{FF2B5EF4-FFF2-40B4-BE49-F238E27FC236}">
-                <a16:creationId xmlns:a16="http://schemas.microsoft.com/office/drawing/2014/main" id="{19EA1FE7-4042-4918-8878-7FBA625B12E0}"/>
-              </a:ext>
-            </a:extLst>
-          </p:cNvPr>
-          <p:cNvSpPr>
-            <a:spLocks noGrp="1"/>
-          </p:cNvSpPr>
-          <p:nvPr>
-            <p:ph idx="1"/>
+              <a:t>Advisor: Pavlos Protopapas</a:t>
+            </a:r>
+          </a:p>
+          <a:p>
+            <a:r>
+              <a:rPr lang="en-US" dirty="0"/>
+              <a:t>Secondary Advisor: Chris Rycroft</a:t>
+            </a:r>
+          </a:p>
+        </p:txBody>
+      </p:sp>
+      <p:sp>
+        <p:nvSpPr>
+          <p:cNvPr id="4" name="Slide Number Placeholder 3">
+            <a:extLst>
+              <a:ext uri="{FF2B5EF4-FFF2-40B4-BE49-F238E27FC236}">
+                <a16:creationId xmlns:a16="http://schemas.microsoft.com/office/drawing/2014/main" id="{C4C191E7-0E10-4617-8402-40754B0DD5C0}"/>
+              </a:ext>
+            </a:extLst>
+          </p:cNvPr>
+          <p:cNvSpPr>
+            <a:spLocks noGrp="1"/>
+          </p:cNvSpPr>
+          <p:nvPr>
+            <p:ph type="sldNum" sz="quarter" idx="12"/>
           </p:nvPr>
         </p:nvSpPr>
         <p:spPr/>
@@ -5808,16 +6600,11 @@
           <a:bodyPr/>
           <a:lstStyle/>
           <a:p>
-            <a:r>
-              <a:rPr lang="en-US" dirty="0"/>
-              <a:t>Advisor: Pavlos Protopapas</a:t>
-            </a:r>
-          </a:p>
-          <a:p>
-            <a:r>
-              <a:rPr lang="en-US" dirty="0"/>
-              <a:t>Secondary Advisor: Chris Rycroft</a:t>
-            </a:r>
+            <a:fld id="{D22732EB-17FA-4F1E-8B0F-B0087D5BE81C}" type="slidenum">
+              <a:rPr lang="en-US" smtClean="0"/>
+              <a:t>2</a:t>
+            </a:fld>
+            <a:endParaRPr lang="en-US"/>
           </a:p>
         </p:txBody>
       </p:sp>
@@ -5867,9 +6654,16 @@
             <p:ph type="title"/>
           </p:nvPr>
         </p:nvSpPr>
-        <p:spPr/>
-        <p:txBody>
-          <a:bodyPr/>
+        <p:spPr>
+          <a:xfrm>
+            <a:off x="838200" y="365126"/>
+            <a:ext cx="10515600" cy="651328"/>
+          </a:xfrm>
+        </p:spPr>
+        <p:txBody>
+          <a:bodyPr>
+            <a:normAutofit fontScale="90000"/>
+          </a:bodyPr>
           <a:lstStyle/>
           <a:p>
             <a:r>
@@ -6036,6 +6830,35 @@
               <a:rPr lang="en-US" dirty="0"/>
               <a:t>Data includes: MJD, RA, DEC, MAG</a:t>
             </a:r>
+          </a:p>
+        </p:txBody>
+      </p:sp>
+      <p:sp>
+        <p:nvSpPr>
+          <p:cNvPr id="9" name="Slide Number Placeholder 8">
+            <a:extLst>
+              <a:ext uri="{FF2B5EF4-FFF2-40B4-BE49-F238E27FC236}">
+                <a16:creationId xmlns:a16="http://schemas.microsoft.com/office/drawing/2014/main" id="{6A432CDE-320B-48BB-AB17-26B680DD9253}"/>
+              </a:ext>
+            </a:extLst>
+          </p:cNvPr>
+          <p:cNvSpPr>
+            <a:spLocks noGrp="1"/>
+          </p:cNvSpPr>
+          <p:nvPr>
+            <p:ph type="sldNum" sz="quarter" idx="12"/>
+          </p:nvPr>
+        </p:nvSpPr>
+        <p:spPr/>
+        <p:txBody>
+          <a:bodyPr/>
+          <a:lstStyle/>
+          <a:p>
+            <a:fld id="{D22732EB-17FA-4F1E-8B0F-B0087D5BE81C}" type="slidenum">
+              <a:rPr lang="en-US" smtClean="0"/>
+              <a:t>20</a:t>
+            </a:fld>
+            <a:endParaRPr lang="en-US"/>
           </a:p>
         </p:txBody>
       </p:sp>
@@ -6085,7 +6908,12 @@
             <p:ph type="title"/>
           </p:nvPr>
         </p:nvSpPr>
-        <p:spPr/>
+        <p:spPr>
+          <a:xfrm>
+            <a:off x="838200" y="365125"/>
+            <a:ext cx="10515600" cy="790121"/>
+          </a:xfrm>
+        </p:spPr>
         <p:txBody>
           <a:bodyPr/>
           <a:lstStyle/>
@@ -6280,6 +7108,35 @@
           </a:prstGeom>
         </p:spPr>
       </p:pic>
+      <p:sp>
+        <p:nvSpPr>
+          <p:cNvPr id="9" name="Slide Number Placeholder 8">
+            <a:extLst>
+              <a:ext uri="{FF2B5EF4-FFF2-40B4-BE49-F238E27FC236}">
+                <a16:creationId xmlns:a16="http://schemas.microsoft.com/office/drawing/2014/main" id="{B1107F29-66D8-4D8E-BE89-91D7AF1DC31E}"/>
+              </a:ext>
+            </a:extLst>
+          </p:cNvPr>
+          <p:cNvSpPr>
+            <a:spLocks noGrp="1"/>
+          </p:cNvSpPr>
+          <p:nvPr>
+            <p:ph type="sldNum" sz="quarter" idx="12"/>
+          </p:nvPr>
+        </p:nvSpPr>
+        <p:spPr/>
+        <p:txBody>
+          <a:bodyPr/>
+          <a:lstStyle/>
+          <a:p>
+            <a:fld id="{D22732EB-17FA-4F1E-8B0F-B0087D5BE81C}" type="slidenum">
+              <a:rPr lang="en-US" smtClean="0"/>
+              <a:t>21</a:t>
+            </a:fld>
+            <a:endParaRPr lang="en-US"/>
+          </a:p>
+        </p:txBody>
+      </p:sp>
     </p:spTree>
     <p:extLst>
       <p:ext uri="{BB962C8B-B14F-4D97-AF65-F5344CB8AC3E}">
@@ -6326,7 +7183,12 @@
             <p:ph type="title"/>
           </p:nvPr>
         </p:nvSpPr>
-        <p:spPr/>
+        <p:spPr>
+          <a:xfrm>
+            <a:off x="838200" y="365125"/>
+            <a:ext cx="10515600" cy="708479"/>
+          </a:xfrm>
+        </p:spPr>
         <p:txBody>
           <a:bodyPr/>
           <a:lstStyle/>
@@ -6369,7 +7231,7 @@
             </a:r>
             <a:r>
               <a:rPr lang="en-US" baseline="-25000" dirty="0" err="1"/>
-              <a:t>ztf</a:t>
+              <a:t>obs</a:t>
             </a:r>
             <a:r>
               <a:rPr lang="en-US" dirty="0"/>
@@ -6433,7 +7295,7 @@
           <a:p>
             <a:r>
               <a:rPr lang="en-US" dirty="0"/>
-              <a:t>5.7E6 detections x 7.3E5 asteroids = 4.2E12 (4.2 trillion) interactions</a:t>
+              <a:t>5.7E6 detections x 7.3E5 asteroids = 4.2E12 (4.2 trillion) interactions!</a:t>
             </a:r>
           </a:p>
           <a:p>
@@ -6460,6 +7322,41 @@
               <a:rPr lang="en-US" dirty="0"/>
               <a:t>Then perform reduction operation to find globally nearest asteroid</a:t>
             </a:r>
+          </a:p>
+          <a:p>
+            <a:r>
+              <a:rPr lang="en-US" dirty="0"/>
+              <a:t>Still large compute job: 25 hours on 40 CPUs, 256 GB RAM server</a:t>
+            </a:r>
+          </a:p>
+        </p:txBody>
+      </p:sp>
+      <p:sp>
+        <p:nvSpPr>
+          <p:cNvPr id="4" name="Slide Number Placeholder 3">
+            <a:extLst>
+              <a:ext uri="{FF2B5EF4-FFF2-40B4-BE49-F238E27FC236}">
+                <a16:creationId xmlns:a16="http://schemas.microsoft.com/office/drawing/2014/main" id="{3E12C09E-01A9-4920-BFBA-09A6197BB86A}"/>
+              </a:ext>
+            </a:extLst>
+          </p:cNvPr>
+          <p:cNvSpPr>
+            <a:spLocks noGrp="1"/>
+          </p:cNvSpPr>
+          <p:nvPr>
+            <p:ph type="sldNum" sz="quarter" idx="12"/>
+          </p:nvPr>
+        </p:nvSpPr>
+        <p:spPr/>
+        <p:txBody>
+          <a:bodyPr/>
+          <a:lstStyle/>
+          <a:p>
+            <a:fld id="{D22732EB-17FA-4F1E-8B0F-B0087D5BE81C}" type="slidenum">
+              <a:rPr lang="en-US" smtClean="0"/>
+              <a:t>22</a:t>
+            </a:fld>
+            <a:endParaRPr lang="en-US"/>
           </a:p>
         </p:txBody>
       </p:sp>
@@ -6509,7 +7406,12 @@
             <p:ph type="title"/>
           </p:nvPr>
         </p:nvSpPr>
-        <p:spPr/>
+        <p:spPr>
+          <a:xfrm>
+            <a:off x="838200" y="365126"/>
+            <a:ext cx="10515600" cy="696232"/>
+          </a:xfrm>
+        </p:spPr>
         <p:txBody>
           <a:bodyPr>
             <a:normAutofit/>
@@ -6558,6 +7460,35 @@
           </a:xfrm>
         </p:spPr>
       </p:pic>
+      <p:sp>
+        <p:nvSpPr>
+          <p:cNvPr id="6" name="Slide Number Placeholder 5">
+            <a:extLst>
+              <a:ext uri="{FF2B5EF4-FFF2-40B4-BE49-F238E27FC236}">
+                <a16:creationId xmlns:a16="http://schemas.microsoft.com/office/drawing/2014/main" id="{E0419A26-3163-44D2-8E57-62BA46B57F2E}"/>
+              </a:ext>
+            </a:extLst>
+          </p:cNvPr>
+          <p:cNvSpPr>
+            <a:spLocks noGrp="1"/>
+          </p:cNvSpPr>
+          <p:nvPr>
+            <p:ph type="sldNum" sz="quarter" idx="12"/>
+          </p:nvPr>
+        </p:nvSpPr>
+        <p:spPr/>
+        <p:txBody>
+          <a:bodyPr/>
+          <a:lstStyle/>
+          <a:p>
+            <a:fld id="{D22732EB-17FA-4F1E-8B0F-B0087D5BE81C}" type="slidenum">
+              <a:rPr lang="en-US" smtClean="0"/>
+              <a:t>23</a:t>
+            </a:fld>
+            <a:endParaRPr lang="en-US"/>
+          </a:p>
+        </p:txBody>
+      </p:sp>
     </p:spTree>
     <p:extLst>
       <p:ext uri="{BB962C8B-B14F-4D97-AF65-F5344CB8AC3E}">
@@ -6604,7 +7535,12 @@
             <p:ph type="title"/>
           </p:nvPr>
         </p:nvSpPr>
-        <p:spPr/>
+        <p:spPr>
+          <a:xfrm>
+            <a:off x="838200" y="365125"/>
+            <a:ext cx="10515600" cy="754289"/>
+          </a:xfrm>
+        </p:spPr>
         <p:txBody>
           <a:bodyPr/>
           <a:lstStyle/>
@@ -6968,6 +7904,35 @@
           </a:prstGeom>
         </p:spPr>
       </p:pic>
+      <p:sp>
+        <p:nvSpPr>
+          <p:cNvPr id="28" name="Slide Number Placeholder 27">
+            <a:extLst>
+              <a:ext uri="{FF2B5EF4-FFF2-40B4-BE49-F238E27FC236}">
+                <a16:creationId xmlns:a16="http://schemas.microsoft.com/office/drawing/2014/main" id="{60453B32-BCFD-4B2F-9648-9AC92B42A1C4}"/>
+              </a:ext>
+            </a:extLst>
+          </p:cNvPr>
+          <p:cNvSpPr>
+            <a:spLocks noGrp="1"/>
+          </p:cNvSpPr>
+          <p:nvPr>
+            <p:ph type="sldNum" sz="quarter" idx="12"/>
+          </p:nvPr>
+        </p:nvSpPr>
+        <p:spPr/>
+        <p:txBody>
+          <a:bodyPr/>
+          <a:lstStyle/>
+          <a:p>
+            <a:fld id="{D22732EB-17FA-4F1E-8B0F-B0087D5BE81C}" type="slidenum">
+              <a:rPr lang="en-US" smtClean="0"/>
+              <a:t>24</a:t>
+            </a:fld>
+            <a:endParaRPr lang="en-US"/>
+          </a:p>
+        </p:txBody>
+      </p:sp>
     </p:spTree>
     <p:extLst>
       <p:ext uri="{BB962C8B-B14F-4D97-AF65-F5344CB8AC3E}">
@@ -7014,7 +7979,12 @@
             <p:ph type="title"/>
           </p:nvPr>
         </p:nvSpPr>
-        <p:spPr/>
+        <p:spPr>
+          <a:xfrm>
+            <a:off x="838200" y="365125"/>
+            <a:ext cx="10515600" cy="708479"/>
+          </a:xfrm>
+        </p:spPr>
         <p:txBody>
           <a:bodyPr/>
           <a:lstStyle/>
@@ -7064,7 +8034,7 @@
             </a:r>
             <a:r>
               <a:rPr lang="en-US" sz="2600" dirty="0"/>
-              <a:t> and define relative distance V</a:t>
+              <a:t> and define relative squared distance V</a:t>
             </a:r>
           </a:p>
           <a:p>
@@ -7291,6 +8261,35 @@
           </a:prstGeom>
         </p:spPr>
       </p:pic>
+      <p:sp>
+        <p:nvSpPr>
+          <p:cNvPr id="18" name="Slide Number Placeholder 17">
+            <a:extLst>
+              <a:ext uri="{FF2B5EF4-FFF2-40B4-BE49-F238E27FC236}">
+                <a16:creationId xmlns:a16="http://schemas.microsoft.com/office/drawing/2014/main" id="{74F19AC2-95D8-4218-82E5-868A12F8AF7A}"/>
+              </a:ext>
+            </a:extLst>
+          </p:cNvPr>
+          <p:cNvSpPr>
+            <a:spLocks noGrp="1"/>
+          </p:cNvSpPr>
+          <p:nvPr>
+            <p:ph type="sldNum" sz="quarter" idx="12"/>
+          </p:nvPr>
+        </p:nvSpPr>
+        <p:spPr/>
+        <p:txBody>
+          <a:bodyPr/>
+          <a:lstStyle/>
+          <a:p>
+            <a:fld id="{D22732EB-17FA-4F1E-8B0F-B0087D5BE81C}" type="slidenum">
+              <a:rPr lang="en-US" smtClean="0"/>
+              <a:t>25</a:t>
+            </a:fld>
+            <a:endParaRPr lang="en-US"/>
+          </a:p>
+        </p:txBody>
+      </p:sp>
     </p:spTree>
     <p:extLst>
       <p:ext uri="{BB962C8B-B14F-4D97-AF65-F5344CB8AC3E}">
@@ -7337,7 +8336,12 @@
             <p:ph type="title"/>
           </p:nvPr>
         </p:nvSpPr>
-        <p:spPr/>
+        <p:spPr>
+          <a:xfrm>
+            <a:off x="838200" y="365125"/>
+            <a:ext cx="10515600" cy="724807"/>
+          </a:xfrm>
+        </p:spPr>
         <p:txBody>
           <a:bodyPr/>
           <a:lstStyle/>
@@ -7486,6 +8490,35 @@
               <a:rPr lang="en-US" dirty="0"/>
               <a:t>Right tail seems to have an exponential decay pattern</a:t>
             </a:r>
+          </a:p>
+        </p:txBody>
+      </p:sp>
+      <p:sp>
+        <p:nvSpPr>
+          <p:cNvPr id="9" name="Slide Number Placeholder 8">
+            <a:extLst>
+              <a:ext uri="{FF2B5EF4-FFF2-40B4-BE49-F238E27FC236}">
+                <a16:creationId xmlns:a16="http://schemas.microsoft.com/office/drawing/2014/main" id="{E2609851-4356-4E84-989D-93ADD943C284}"/>
+              </a:ext>
+            </a:extLst>
+          </p:cNvPr>
+          <p:cNvSpPr>
+            <a:spLocks noGrp="1"/>
+          </p:cNvSpPr>
+          <p:nvPr>
+            <p:ph type="sldNum" sz="quarter" idx="12"/>
+          </p:nvPr>
+        </p:nvSpPr>
+        <p:spPr/>
+        <p:txBody>
+          <a:bodyPr/>
+          <a:lstStyle/>
+          <a:p>
+            <a:fld id="{D22732EB-17FA-4F1E-8B0F-B0087D5BE81C}" type="slidenum">
+              <a:rPr lang="en-US" smtClean="0"/>
+              <a:t>26</a:t>
+            </a:fld>
+            <a:endParaRPr lang="en-US"/>
           </a:p>
         </p:txBody>
       </p:sp>
@@ -7535,7 +8568,12 @@
             <p:ph type="title"/>
           </p:nvPr>
         </p:nvSpPr>
-        <p:spPr/>
+        <p:spPr>
+          <a:xfrm>
+            <a:off x="838200" y="365125"/>
+            <a:ext cx="10515600" cy="708479"/>
+          </a:xfrm>
+        </p:spPr>
         <p:txBody>
           <a:bodyPr/>
           <a:lstStyle/>
@@ -7658,6 +8696,35 @@
               <a:rPr lang="en-US" dirty="0"/>
               <a:t>We have a sporting chance to rebuild 13.6% of the catalogue if we require 10 or more hits</a:t>
             </a:r>
+          </a:p>
+        </p:txBody>
+      </p:sp>
+      <p:sp>
+        <p:nvSpPr>
+          <p:cNvPr id="7" name="Slide Number Placeholder 6">
+            <a:extLst>
+              <a:ext uri="{FF2B5EF4-FFF2-40B4-BE49-F238E27FC236}">
+                <a16:creationId xmlns:a16="http://schemas.microsoft.com/office/drawing/2014/main" id="{B83D8E92-4FC5-4A54-897B-2961C2C03D46}"/>
+              </a:ext>
+            </a:extLst>
+          </p:cNvPr>
+          <p:cNvSpPr>
+            <a:spLocks noGrp="1"/>
+          </p:cNvSpPr>
+          <p:nvPr>
+            <p:ph type="sldNum" sz="quarter" idx="12"/>
+          </p:nvPr>
+        </p:nvSpPr>
+        <p:spPr/>
+        <p:txBody>
+          <a:bodyPr/>
+          <a:lstStyle/>
+          <a:p>
+            <a:fld id="{D22732EB-17FA-4F1E-8B0F-B0087D5BE81C}" type="slidenum">
+              <a:rPr lang="en-US" smtClean="0"/>
+              <a:t>27</a:t>
+            </a:fld>
+            <a:endParaRPr lang="en-US"/>
           </a:p>
         </p:txBody>
       </p:sp>
@@ -7746,6 +8813,35 @@
           </a:p>
         </p:txBody>
       </p:sp>
+      <p:sp>
+        <p:nvSpPr>
+          <p:cNvPr id="4" name="Slide Number Placeholder 3">
+            <a:extLst>
+              <a:ext uri="{FF2B5EF4-FFF2-40B4-BE49-F238E27FC236}">
+                <a16:creationId xmlns:a16="http://schemas.microsoft.com/office/drawing/2014/main" id="{7CF5CCC2-746A-49A0-B006-491AE72D8CAF}"/>
+              </a:ext>
+            </a:extLst>
+          </p:cNvPr>
+          <p:cNvSpPr>
+            <a:spLocks noGrp="1"/>
+          </p:cNvSpPr>
+          <p:nvPr>
+            <p:ph type="sldNum" sz="quarter" idx="12"/>
+          </p:nvPr>
+        </p:nvSpPr>
+        <p:spPr/>
+        <p:txBody>
+          <a:bodyPr/>
+          <a:lstStyle/>
+          <a:p>
+            <a:fld id="{D22732EB-17FA-4F1E-8B0F-B0087D5BE81C}" type="slidenum">
+              <a:rPr lang="en-US" smtClean="0"/>
+              <a:t>28</a:t>
+            </a:fld>
+            <a:endParaRPr lang="en-US"/>
+          </a:p>
+        </p:txBody>
+      </p:sp>
     </p:spTree>
     <p:extLst>
       <p:ext uri="{BB962C8B-B14F-4D97-AF65-F5344CB8AC3E}">
@@ -7792,9 +8888,16 @@
             <p:ph type="title"/>
           </p:nvPr>
         </p:nvSpPr>
-        <p:spPr/>
-        <p:txBody>
-          <a:bodyPr/>
+        <p:spPr>
+          <a:xfrm>
+            <a:off x="838200" y="365125"/>
+            <a:ext cx="10515600" cy="732971"/>
+          </a:xfrm>
+        </p:spPr>
+        <p:txBody>
+          <a:bodyPr>
+            <a:normAutofit/>
+          </a:bodyPr>
           <a:lstStyle/>
           <a:p>
             <a:r>
@@ -7834,7 +8937,7 @@
         </p:blipFill>
         <p:spPr>
           <a:xfrm>
-            <a:off x="707573" y="1470479"/>
+            <a:off x="707573" y="1074513"/>
             <a:ext cx="3246513" cy="2105479"/>
           </a:xfrm>
         </p:spPr>
@@ -7867,7 +8970,7 @@
         </p:blipFill>
         <p:spPr>
           <a:xfrm>
-            <a:off x="508733" y="3589339"/>
+            <a:off x="508733" y="3193373"/>
             <a:ext cx="3452145" cy="2183946"/>
           </a:xfrm>
           <a:prstGeom prst="rect">
@@ -7903,7 +9006,7 @@
         </p:blipFill>
         <p:spPr>
           <a:xfrm>
-            <a:off x="4049926" y="1470478"/>
+            <a:off x="4049926" y="1074512"/>
             <a:ext cx="3246513" cy="2105479"/>
           </a:xfrm>
           <a:prstGeom prst="rect">
@@ -7939,7 +9042,7 @@
         </p:blipFill>
         <p:spPr>
           <a:xfrm>
-            <a:off x="4049925" y="3575957"/>
+            <a:off x="4049925" y="3179991"/>
             <a:ext cx="3246513" cy="2183946"/>
           </a:xfrm>
           <a:prstGeom prst="rect">
@@ -7975,7 +9078,7 @@
         </p:blipFill>
         <p:spPr>
           <a:xfrm>
-            <a:off x="7495348" y="1470478"/>
+            <a:off x="7495348" y="1074512"/>
             <a:ext cx="3261493" cy="2183946"/>
           </a:xfrm>
           <a:prstGeom prst="rect">
@@ -7997,7 +9100,7 @@
         </p:nvSpPr>
         <p:spPr>
           <a:xfrm>
-            <a:off x="759279" y="5890532"/>
+            <a:off x="759279" y="5457824"/>
             <a:ext cx="9997562" cy="1200329"/>
           </a:xfrm>
           <a:prstGeom prst="rect">
@@ -8109,7 +9212,7 @@
         </p:blipFill>
         <p:spPr>
           <a:xfrm>
-            <a:off x="7445829" y="3558155"/>
+            <a:off x="7445829" y="3162189"/>
             <a:ext cx="3332638" cy="2144599"/>
           </a:xfrm>
           <a:prstGeom prst="rect">
@@ -8117,6 +9220,35 @@
           </a:prstGeom>
         </p:spPr>
       </p:pic>
+      <p:sp>
+        <p:nvSpPr>
+          <p:cNvPr id="19" name="Slide Number Placeholder 18">
+            <a:extLst>
+              <a:ext uri="{FF2B5EF4-FFF2-40B4-BE49-F238E27FC236}">
+                <a16:creationId xmlns:a16="http://schemas.microsoft.com/office/drawing/2014/main" id="{6D1D4FCA-A3A3-43FD-9B85-B3C2A83BD5C6}"/>
+              </a:ext>
+            </a:extLst>
+          </p:cNvPr>
+          <p:cNvSpPr>
+            <a:spLocks noGrp="1"/>
+          </p:cNvSpPr>
+          <p:nvPr>
+            <p:ph type="sldNum" sz="quarter" idx="12"/>
+          </p:nvPr>
+        </p:nvSpPr>
+        <p:spPr/>
+        <p:txBody>
+          <a:bodyPr/>
+          <a:lstStyle/>
+          <a:p>
+            <a:fld id="{D22732EB-17FA-4F1E-8B0F-B0087D5BE81C}" type="slidenum">
+              <a:rPr lang="en-US" smtClean="0"/>
+              <a:t>29</a:t>
+            </a:fld>
+            <a:endParaRPr lang="en-US"/>
+          </a:p>
+        </p:txBody>
+      </p:sp>
     </p:spTree>
     <p:extLst>
       <p:ext uri="{BB962C8B-B14F-4D97-AF65-F5344CB8AC3E}">
@@ -8200,6 +9332,35 @@
           </a:p>
         </p:txBody>
       </p:sp>
+      <p:sp>
+        <p:nvSpPr>
+          <p:cNvPr id="4" name="Slide Number Placeholder 3">
+            <a:extLst>
+              <a:ext uri="{FF2B5EF4-FFF2-40B4-BE49-F238E27FC236}">
+                <a16:creationId xmlns:a16="http://schemas.microsoft.com/office/drawing/2014/main" id="{C9E779F3-516A-4D9B-8E8E-7F0F15730919}"/>
+              </a:ext>
+            </a:extLst>
+          </p:cNvPr>
+          <p:cNvSpPr>
+            <a:spLocks noGrp="1"/>
+          </p:cNvSpPr>
+          <p:nvPr>
+            <p:ph type="sldNum" sz="quarter" idx="12"/>
+          </p:nvPr>
+        </p:nvSpPr>
+        <p:spPr/>
+        <p:txBody>
+          <a:bodyPr/>
+          <a:lstStyle/>
+          <a:p>
+            <a:fld id="{D22732EB-17FA-4F1E-8B0F-B0087D5BE81C}" type="slidenum">
+              <a:rPr lang="en-US" smtClean="0"/>
+              <a:t>3</a:t>
+            </a:fld>
+            <a:endParaRPr lang="en-US"/>
+          </a:p>
+        </p:txBody>
+      </p:sp>
     </p:spTree>
     <p:extLst>
       <p:ext uri="{BB962C8B-B14F-4D97-AF65-F5344CB8AC3E}">
@@ -8246,7 +9407,12 @@
             <p:ph type="title"/>
           </p:nvPr>
         </p:nvSpPr>
-        <p:spPr/>
+        <p:spPr>
+          <a:xfrm>
+            <a:off x="838200" y="365125"/>
+            <a:ext cx="10515600" cy="716643"/>
+          </a:xfrm>
+        </p:spPr>
         <p:txBody>
           <a:bodyPr/>
           <a:lstStyle/>
@@ -8339,6 +9505,35 @@
               <a:rPr lang="en-US" dirty="0"/>
               <a:t>Filter the ZTF detections to those within threshold of the elements</a:t>
             </a:r>
+          </a:p>
+        </p:txBody>
+      </p:sp>
+      <p:sp>
+        <p:nvSpPr>
+          <p:cNvPr id="7" name="Slide Number Placeholder 6">
+            <a:extLst>
+              <a:ext uri="{FF2B5EF4-FFF2-40B4-BE49-F238E27FC236}">
+                <a16:creationId xmlns:a16="http://schemas.microsoft.com/office/drawing/2014/main" id="{492E4417-C3CC-407B-A5C4-80CA4875BEC5}"/>
+              </a:ext>
+            </a:extLst>
+          </p:cNvPr>
+          <p:cNvSpPr>
+            <a:spLocks noGrp="1"/>
+          </p:cNvSpPr>
+          <p:nvPr>
+            <p:ph type="sldNum" sz="quarter" idx="12"/>
+          </p:nvPr>
+        </p:nvSpPr>
+        <p:spPr/>
+        <p:txBody>
+          <a:bodyPr/>
+          <a:lstStyle/>
+          <a:p>
+            <a:fld id="{D22732EB-17FA-4F1E-8B0F-B0087D5BE81C}" type="slidenum">
+              <a:rPr lang="en-US" smtClean="0"/>
+              <a:t>30</a:t>
+            </a:fld>
+            <a:endParaRPr lang="en-US"/>
           </a:p>
         </p:txBody>
       </p:sp>
@@ -8388,7 +9583,12 @@
             <p:ph type="title"/>
           </p:nvPr>
         </p:nvSpPr>
-        <p:spPr/>
+        <p:spPr>
+          <a:xfrm>
+            <a:off x="838200" y="365127"/>
+            <a:ext cx="10515600" cy="732970"/>
+          </a:xfrm>
+        </p:spPr>
         <p:txBody>
           <a:bodyPr>
             <a:normAutofit/>
@@ -8594,6 +9794,35 @@
               <a:rPr lang="en-US" dirty="0"/>
               <a:t>Perturbed: in between; hits leak out to ~250 arc seconds</a:t>
             </a:r>
+          </a:p>
+        </p:txBody>
+      </p:sp>
+      <p:sp>
+        <p:nvSpPr>
+          <p:cNvPr id="13" name="Slide Number Placeholder 12">
+            <a:extLst>
+              <a:ext uri="{FF2B5EF4-FFF2-40B4-BE49-F238E27FC236}">
+                <a16:creationId xmlns:a16="http://schemas.microsoft.com/office/drawing/2014/main" id="{3B25B9A5-84BA-42C8-8AC5-6B413F4DD2C2}"/>
+              </a:ext>
+            </a:extLst>
+          </p:cNvPr>
+          <p:cNvSpPr>
+            <a:spLocks noGrp="1"/>
+          </p:cNvSpPr>
+          <p:nvPr>
+            <p:ph type="sldNum" sz="quarter" idx="12"/>
+          </p:nvPr>
+        </p:nvSpPr>
+        <p:spPr/>
+        <p:txBody>
+          <a:bodyPr/>
+          <a:lstStyle/>
+          <a:p>
+            <a:fld id="{D22732EB-17FA-4F1E-8B0F-B0087D5BE81C}" type="slidenum">
+              <a:rPr lang="en-US" smtClean="0"/>
+              <a:t>31</a:t>
+            </a:fld>
+            <a:endParaRPr lang="en-US"/>
           </a:p>
         </p:txBody>
       </p:sp>
@@ -8643,7 +9872,12 @@
             <p:ph type="title"/>
           </p:nvPr>
         </p:nvSpPr>
-        <p:spPr/>
+        <p:spPr>
+          <a:xfrm>
+            <a:off x="838200" y="365127"/>
+            <a:ext cx="10515600" cy="773792"/>
+          </a:xfrm>
+        </p:spPr>
         <p:txBody>
           <a:bodyPr/>
           <a:lstStyle/>
@@ -8963,10 +10197,10 @@
       </p:pic>
       <p:pic>
         <p:nvPicPr>
-          <p:cNvPr id="27" name="Picture 26">
-            <a:extLst>
-              <a:ext uri="{FF2B5EF4-FFF2-40B4-BE49-F238E27FC236}">
-                <a16:creationId xmlns:a16="http://schemas.microsoft.com/office/drawing/2014/main" id="{BA536F0D-76E0-46FE-8EA9-1DEA6F403AE8}"/>
+          <p:cNvPr id="30" name="Picture 29">
+            <a:extLst>
+              <a:ext uri="{FF2B5EF4-FFF2-40B4-BE49-F238E27FC236}">
+                <a16:creationId xmlns:a16="http://schemas.microsoft.com/office/drawing/2014/main" id="{AD85AA41-268F-4D9B-9B30-795149658104}"/>
               </a:ext>
             </a:extLst>
           </p:cNvPr>
@@ -8994,13 +10228,42 @@
         <p:spPr>
           <a:xfrm>
             <a:off x="3768725" y="5474351"/>
-            <a:ext cx="6436267" cy="1019733"/>
+            <a:ext cx="6865067" cy="1019733"/>
           </a:xfrm>
           <a:prstGeom prst="rect">
             <a:avLst/>
           </a:prstGeom>
         </p:spPr>
       </p:pic>
+      <p:sp>
+        <p:nvSpPr>
+          <p:cNvPr id="28" name="Slide Number Placeholder 27">
+            <a:extLst>
+              <a:ext uri="{FF2B5EF4-FFF2-40B4-BE49-F238E27FC236}">
+                <a16:creationId xmlns:a16="http://schemas.microsoft.com/office/drawing/2014/main" id="{44A034C2-C457-4BBC-A3D8-DF0C3F106E22}"/>
+              </a:ext>
+            </a:extLst>
+          </p:cNvPr>
+          <p:cNvSpPr>
+            <a:spLocks noGrp="1"/>
+          </p:cNvSpPr>
+          <p:nvPr>
+            <p:ph type="sldNum" sz="quarter" idx="12"/>
+          </p:nvPr>
+        </p:nvSpPr>
+        <p:spPr/>
+        <p:txBody>
+          <a:bodyPr/>
+          <a:lstStyle/>
+          <a:p>
+            <a:fld id="{D22732EB-17FA-4F1E-8B0F-B0087D5BE81C}" type="slidenum">
+              <a:rPr lang="en-US" smtClean="0"/>
+              <a:t>32</a:t>
+            </a:fld>
+            <a:endParaRPr lang="en-US"/>
+          </a:p>
+        </p:txBody>
+      </p:sp>
     </p:spTree>
     <p:extLst>
       <p:ext uri="{BB962C8B-B14F-4D97-AF65-F5344CB8AC3E}">
@@ -9047,7 +10310,12 @@
             <p:ph type="title"/>
           </p:nvPr>
         </p:nvSpPr>
-        <p:spPr/>
+        <p:spPr>
+          <a:xfrm>
+            <a:off x="838200" y="365126"/>
+            <a:ext cx="10515600" cy="712560"/>
+          </a:xfrm>
+        </p:spPr>
         <p:txBody>
           <a:bodyPr/>
           <a:lstStyle/>
@@ -9259,14 +10527,14 @@
                 <a:latin typeface="Times New Roman" panose="02020603050405020304" pitchFamily="18" charset="0"/>
                 <a:cs typeface="Times New Roman" panose="02020603050405020304" pitchFamily="18" charset="0"/>
               </a:rPr>
-              <a:t>v</a:t>
+              <a:t>v;</a:t>
             </a:r>
             <a:r>
               <a:rPr lang="en-US" dirty="0">
                 <a:latin typeface="Times New Roman" panose="02020603050405020304" pitchFamily="18" charset="0"/>
                 <a:cs typeface="Times New Roman" panose="02020603050405020304" pitchFamily="18" charset="0"/>
               </a:rPr>
-              <a:t> with light time and </a:t>
+              <a:t> include light time and </a:t>
             </a:r>
             <a:r>
               <a:rPr lang="en-US" dirty="0" err="1">
@@ -9377,6 +10645,35 @@
               <a:t>Gradient descent…</a:t>
             </a:r>
             <a:endParaRPr lang="en-US" dirty="0"/>
+          </a:p>
+        </p:txBody>
+      </p:sp>
+      <p:sp>
+        <p:nvSpPr>
+          <p:cNvPr id="4" name="Slide Number Placeholder 3">
+            <a:extLst>
+              <a:ext uri="{FF2B5EF4-FFF2-40B4-BE49-F238E27FC236}">
+                <a16:creationId xmlns:a16="http://schemas.microsoft.com/office/drawing/2014/main" id="{A5AFE36C-B087-4591-86F2-39038B246DF9}"/>
+              </a:ext>
+            </a:extLst>
+          </p:cNvPr>
+          <p:cNvSpPr>
+            <a:spLocks noGrp="1"/>
+          </p:cNvSpPr>
+          <p:nvPr>
+            <p:ph type="sldNum" sz="quarter" idx="12"/>
+          </p:nvPr>
+        </p:nvSpPr>
+        <p:spPr/>
+        <p:txBody>
+          <a:bodyPr/>
+          <a:lstStyle/>
+          <a:p>
+            <a:fld id="{D22732EB-17FA-4F1E-8B0F-B0087D5BE81C}" type="slidenum">
+              <a:rPr lang="en-US" smtClean="0"/>
+              <a:t>33</a:t>
+            </a:fld>
+            <a:endParaRPr lang="en-US"/>
           </a:p>
         </p:txBody>
       </p:sp>
@@ -9428,12 +10725,14 @@
         </p:nvSpPr>
         <p:spPr/>
         <p:txBody>
-          <a:bodyPr/>
-          <a:lstStyle/>
-          <a:p>
-            <a:r>
-              <a:rPr lang="en-US" dirty="0"/>
-              <a:t>Search Techniques: Uniform Scale, Gradient Clipping and Independent Weights</a:t>
+          <a:bodyPr>
+            <a:normAutofit/>
+          </a:bodyPr>
+          <a:lstStyle/>
+          <a:p>
+            <a:r>
+              <a:rPr lang="en-US" sz="4000" dirty="0"/>
+              <a:t>Search Techniques I: Uniform Scale, Gradient Clipping and Independent Weights</a:t>
             </a:r>
           </a:p>
         </p:txBody>
@@ -9615,6 +10914,35 @@
           </a:prstGeom>
         </p:spPr>
       </p:pic>
+      <p:sp>
+        <p:nvSpPr>
+          <p:cNvPr id="6" name="Slide Number Placeholder 5">
+            <a:extLst>
+              <a:ext uri="{FF2B5EF4-FFF2-40B4-BE49-F238E27FC236}">
+                <a16:creationId xmlns:a16="http://schemas.microsoft.com/office/drawing/2014/main" id="{F056885D-2BE3-4297-A00E-B41FA2C50894}"/>
+              </a:ext>
+            </a:extLst>
+          </p:cNvPr>
+          <p:cNvSpPr>
+            <a:spLocks noGrp="1"/>
+          </p:cNvSpPr>
+          <p:nvPr>
+            <p:ph type="sldNum" sz="quarter" idx="12"/>
+          </p:nvPr>
+        </p:nvSpPr>
+        <p:spPr/>
+        <p:txBody>
+          <a:bodyPr/>
+          <a:lstStyle/>
+          <a:p>
+            <a:fld id="{D22732EB-17FA-4F1E-8B0F-B0087D5BE81C}" type="slidenum">
+              <a:rPr lang="en-US" smtClean="0"/>
+              <a:t>34</a:t>
+            </a:fld>
+            <a:endParaRPr lang="en-US"/>
+          </a:p>
+        </p:txBody>
+      </p:sp>
     </p:spTree>
     <p:extLst>
       <p:ext uri="{BB962C8B-B14F-4D97-AF65-F5344CB8AC3E}">
@@ -9663,12 +10991,14 @@
         </p:nvSpPr>
         <p:spPr/>
         <p:txBody>
-          <a:bodyPr/>
-          <a:lstStyle/>
-          <a:p>
-            <a:r>
-              <a:rPr lang="en-US" dirty="0"/>
-              <a:t>Search Techniques: Mixture vs. Joint, Encouraging Convergence</a:t>
+          <a:bodyPr>
+            <a:normAutofit/>
+          </a:bodyPr>
+          <a:lstStyle/>
+          <a:p>
+            <a:r>
+              <a:rPr lang="en-US" sz="4000" dirty="0"/>
+              <a:t>Search Techniques II: Mixture vs. Joint Mode, Encouraging Convergence</a:t>
             </a:r>
           </a:p>
         </p:txBody>
@@ -9832,6 +11162,35 @@
           </a:prstGeom>
         </p:spPr>
       </p:pic>
+      <p:sp>
+        <p:nvSpPr>
+          <p:cNvPr id="8" name="Slide Number Placeholder 7">
+            <a:extLst>
+              <a:ext uri="{FF2B5EF4-FFF2-40B4-BE49-F238E27FC236}">
+                <a16:creationId xmlns:a16="http://schemas.microsoft.com/office/drawing/2014/main" id="{59C4F397-786E-4146-B787-ECBFDC8090FA}"/>
+              </a:ext>
+            </a:extLst>
+          </p:cNvPr>
+          <p:cNvSpPr>
+            <a:spLocks noGrp="1"/>
+          </p:cNvSpPr>
+          <p:nvPr>
+            <p:ph type="sldNum" sz="quarter" idx="12"/>
+          </p:nvPr>
+        </p:nvSpPr>
+        <p:spPr/>
+        <p:txBody>
+          <a:bodyPr/>
+          <a:lstStyle/>
+          <a:p>
+            <a:fld id="{D22732EB-17FA-4F1E-8B0F-B0087D5BE81C}" type="slidenum">
+              <a:rPr lang="en-US" smtClean="0"/>
+              <a:t>35</a:t>
+            </a:fld>
+            <a:endParaRPr lang="en-US"/>
+          </a:p>
+        </p:txBody>
+      </p:sp>
     </p:spTree>
     <p:extLst>
       <p:ext uri="{BB962C8B-B14F-4D97-AF65-F5344CB8AC3E}">
@@ -9917,6 +11276,35 @@
           </a:p>
         </p:txBody>
       </p:sp>
+      <p:sp>
+        <p:nvSpPr>
+          <p:cNvPr id="4" name="Slide Number Placeholder 3">
+            <a:extLst>
+              <a:ext uri="{FF2B5EF4-FFF2-40B4-BE49-F238E27FC236}">
+                <a16:creationId xmlns:a16="http://schemas.microsoft.com/office/drawing/2014/main" id="{8EEC0F85-6A94-4225-B00E-1B0A21CBF3DA}"/>
+              </a:ext>
+            </a:extLst>
+          </p:cNvPr>
+          <p:cNvSpPr>
+            <a:spLocks noGrp="1"/>
+          </p:cNvSpPr>
+          <p:nvPr>
+            <p:ph type="sldNum" sz="quarter" idx="12"/>
+          </p:nvPr>
+        </p:nvSpPr>
+        <p:spPr/>
+        <p:txBody>
+          <a:bodyPr/>
+          <a:lstStyle/>
+          <a:p>
+            <a:fld id="{D22732EB-17FA-4F1E-8B0F-B0087D5BE81C}" type="slidenum">
+              <a:rPr lang="en-US" smtClean="0"/>
+              <a:t>36</a:t>
+            </a:fld>
+            <a:endParaRPr lang="en-US"/>
+          </a:p>
+        </p:txBody>
+      </p:sp>
     </p:spTree>
     <p:extLst>
       <p:ext uri="{BB962C8B-B14F-4D97-AF65-F5344CB8AC3E}">
@@ -9963,9 +11351,16 @@
             <p:ph type="title"/>
           </p:nvPr>
         </p:nvSpPr>
-        <p:spPr/>
-        <p:txBody>
-          <a:bodyPr/>
+        <p:spPr>
+          <a:xfrm>
+            <a:off x="838200" y="365125"/>
+            <a:ext cx="10515600" cy="745217"/>
+          </a:xfrm>
+        </p:spPr>
+        <p:txBody>
+          <a:bodyPr>
+            <a:normAutofit/>
+          </a:bodyPr>
           <a:lstStyle/>
           <a:p>
             <a:r>
@@ -10083,7 +11478,7 @@
             <a:pPr lvl="1"/>
             <a:r>
               <a:rPr lang="en-US" dirty="0"/>
-              <a:t>Try to make joint approximately multivariate normal</a:t>
+              <a:t>Try to make joint distribution approximately multivariate normal</a:t>
             </a:r>
           </a:p>
           <a:p>
@@ -10100,6 +11495,35 @@
               <a:rPr lang="en-US" dirty="0"/>
               <a:t> distance on these transformed elements</a:t>
             </a:r>
+          </a:p>
+        </p:txBody>
+      </p:sp>
+      <p:sp>
+        <p:nvSpPr>
+          <p:cNvPr id="4" name="Slide Number Placeholder 3">
+            <a:extLst>
+              <a:ext uri="{FF2B5EF4-FFF2-40B4-BE49-F238E27FC236}">
+                <a16:creationId xmlns:a16="http://schemas.microsoft.com/office/drawing/2014/main" id="{F172197E-FCBE-46DD-BD2B-F3930859C238}"/>
+              </a:ext>
+            </a:extLst>
+          </p:cNvPr>
+          <p:cNvSpPr>
+            <a:spLocks noGrp="1"/>
+          </p:cNvSpPr>
+          <p:nvPr>
+            <p:ph type="sldNum" sz="quarter" idx="12"/>
+          </p:nvPr>
+        </p:nvSpPr>
+        <p:spPr/>
+        <p:txBody>
+          <a:bodyPr/>
+          <a:lstStyle/>
+          <a:p>
+            <a:fld id="{D22732EB-17FA-4F1E-8B0F-B0087D5BE81C}" type="slidenum">
+              <a:rPr lang="en-US" smtClean="0"/>
+              <a:t>37</a:t>
+            </a:fld>
+            <a:endParaRPr lang="en-US"/>
           </a:p>
         </p:txBody>
       </p:sp>
@@ -10149,7 +11573,12 @@
             <p:ph type="title"/>
           </p:nvPr>
         </p:nvSpPr>
-        <p:spPr/>
+        <p:spPr>
+          <a:xfrm>
+            <a:off x="838200" y="365126"/>
+            <a:ext cx="10515600" cy="700314"/>
+          </a:xfrm>
+        </p:spPr>
         <p:txBody>
           <a:bodyPr/>
           <a:lstStyle/>
@@ -10728,6 +12157,35 @@
           </a:prstGeom>
         </p:spPr>
       </p:pic>
+      <p:sp>
+        <p:nvSpPr>
+          <p:cNvPr id="18" name="Slide Number Placeholder 17">
+            <a:extLst>
+              <a:ext uri="{FF2B5EF4-FFF2-40B4-BE49-F238E27FC236}">
+                <a16:creationId xmlns:a16="http://schemas.microsoft.com/office/drawing/2014/main" id="{E139198A-BFF8-4A78-AC35-BA730F87F08C}"/>
+              </a:ext>
+            </a:extLst>
+          </p:cNvPr>
+          <p:cNvSpPr>
+            <a:spLocks noGrp="1"/>
+          </p:cNvSpPr>
+          <p:nvPr>
+            <p:ph type="sldNum" sz="quarter" idx="12"/>
+          </p:nvPr>
+        </p:nvSpPr>
+        <p:spPr/>
+        <p:txBody>
+          <a:bodyPr/>
+          <a:lstStyle/>
+          <a:p>
+            <a:fld id="{D22732EB-17FA-4F1E-8B0F-B0087D5BE81C}" type="slidenum">
+              <a:rPr lang="en-US" smtClean="0"/>
+              <a:t>38</a:t>
+            </a:fld>
+            <a:endParaRPr lang="en-US"/>
+          </a:p>
+        </p:txBody>
+      </p:sp>
     </p:spTree>
     <p:extLst>
       <p:ext uri="{BB962C8B-B14F-4D97-AF65-F5344CB8AC3E}">
@@ -10774,7 +12232,12 @@
             <p:ph type="title"/>
           </p:nvPr>
         </p:nvSpPr>
-        <p:spPr/>
+        <p:spPr>
+          <a:xfrm>
+            <a:off x="838200" y="365126"/>
+            <a:ext cx="10515600" cy="700314"/>
+          </a:xfrm>
+        </p:spPr>
         <p:txBody>
           <a:bodyPr>
             <a:normAutofit/>
@@ -11013,6 +12476,35 @@
               <a:rPr lang="en-US" sz="1600" dirty="0"/>
               <a:t>Log Like: 1097</a:t>
             </a:r>
+          </a:p>
+        </p:txBody>
+      </p:sp>
+      <p:sp>
+        <p:nvSpPr>
+          <p:cNvPr id="13" name="Slide Number Placeholder 12">
+            <a:extLst>
+              <a:ext uri="{FF2B5EF4-FFF2-40B4-BE49-F238E27FC236}">
+                <a16:creationId xmlns:a16="http://schemas.microsoft.com/office/drawing/2014/main" id="{8681C023-7EAB-4DD3-9FCB-702383FA4CE6}"/>
+              </a:ext>
+            </a:extLst>
+          </p:cNvPr>
+          <p:cNvSpPr>
+            <a:spLocks noGrp="1"/>
+          </p:cNvSpPr>
+          <p:nvPr>
+            <p:ph type="sldNum" sz="quarter" idx="12"/>
+          </p:nvPr>
+        </p:nvSpPr>
+        <p:spPr/>
+        <p:txBody>
+          <a:bodyPr/>
+          <a:lstStyle/>
+          <a:p>
+            <a:fld id="{D22732EB-17FA-4F1E-8B0F-B0087D5BE81C}" type="slidenum">
+              <a:rPr lang="en-US" smtClean="0"/>
+              <a:t>39</a:t>
+            </a:fld>
+            <a:endParaRPr lang="en-US"/>
           </a:p>
         </p:txBody>
       </p:sp>
@@ -11062,6 +12554,39 @@
             <p:ph type="title"/>
           </p:nvPr>
         </p:nvSpPr>
+        <p:spPr>
+          <a:xfrm>
+            <a:off x="838200" y="365127"/>
+            <a:ext cx="10515600" cy="732969"/>
+          </a:xfrm>
+        </p:spPr>
+        <p:txBody>
+          <a:bodyPr/>
+          <a:lstStyle/>
+          <a:p>
+            <a:r>
+              <a:rPr lang="en-US" dirty="0"/>
+              <a:t>The Asteroid Search Problem</a:t>
+            </a:r>
+          </a:p>
+        </p:txBody>
+      </p:sp>
+      <p:sp>
+        <p:nvSpPr>
+          <p:cNvPr id="3" name="Content Placeholder 2">
+            <a:extLst>
+              <a:ext uri="{FF2B5EF4-FFF2-40B4-BE49-F238E27FC236}">
+                <a16:creationId xmlns:a16="http://schemas.microsoft.com/office/drawing/2014/main" id="{854336F2-355F-4BA5-B961-26C74A9BBD6F}"/>
+              </a:ext>
+            </a:extLst>
+          </p:cNvPr>
+          <p:cNvSpPr>
+            <a:spLocks noGrp="1"/>
+          </p:cNvSpPr>
+          <p:nvPr>
+            <p:ph idx="1"/>
+          </p:nvPr>
+        </p:nvSpPr>
         <p:spPr/>
         <p:txBody>
           <a:bodyPr/>
@@ -11069,25 +12594,49 @@
           <a:p>
             <a:r>
               <a:rPr lang="en-US" dirty="0"/>
-              <a:t>The Asteroid Search Problem</a:t>
-            </a:r>
-          </a:p>
-        </p:txBody>
-      </p:sp>
-      <p:sp>
-        <p:nvSpPr>
-          <p:cNvPr id="3" name="Content Placeholder 2">
-            <a:extLst>
-              <a:ext uri="{FF2B5EF4-FFF2-40B4-BE49-F238E27FC236}">
-                <a16:creationId xmlns:a16="http://schemas.microsoft.com/office/drawing/2014/main" id="{854336F2-355F-4BA5-B961-26C74A9BBD6F}"/>
-              </a:ext>
-            </a:extLst>
-          </p:cNvPr>
-          <p:cNvSpPr>
-            <a:spLocks noGrp="1"/>
-          </p:cNvSpPr>
-          <p:nvPr>
-            <p:ph idx="1"/>
+              <a:t>Many asteroids (about 958,000 known) in the Solar System</a:t>
+            </a:r>
+          </a:p>
+          <a:p>
+            <a:r>
+              <a:rPr lang="en-US" dirty="0"/>
+              <a:t>We want to learn their orbits</a:t>
+            </a:r>
+          </a:p>
+          <a:p>
+            <a:r>
+              <a:rPr lang="en-US" dirty="0"/>
+              <a:t>Biggest data source: telescope detections</a:t>
+            </a:r>
+          </a:p>
+          <a:p>
+            <a:r>
+              <a:rPr lang="en-US" dirty="0"/>
+              <a:t>Easy once you know which detection matches which asteroid</a:t>
+            </a:r>
+          </a:p>
+          <a:p>
+            <a:r>
+              <a:rPr lang="en-US" dirty="0"/>
+              <a:t>This is like a jigsaw puzzle with millions of pieces!</a:t>
+            </a:r>
+          </a:p>
+        </p:txBody>
+      </p:sp>
+      <p:sp>
+        <p:nvSpPr>
+          <p:cNvPr id="4" name="Slide Number Placeholder 3">
+            <a:extLst>
+              <a:ext uri="{FF2B5EF4-FFF2-40B4-BE49-F238E27FC236}">
+                <a16:creationId xmlns:a16="http://schemas.microsoft.com/office/drawing/2014/main" id="{A79B7DFD-7A74-4E8B-B449-4585B7A9AF17}"/>
+              </a:ext>
+            </a:extLst>
+          </p:cNvPr>
+          <p:cNvSpPr>
+            <a:spLocks noGrp="1"/>
+          </p:cNvSpPr>
+          <p:nvPr>
+            <p:ph type="sldNum" sz="quarter" idx="12"/>
           </p:nvPr>
         </p:nvSpPr>
         <p:spPr/>
@@ -11095,34 +12644,11 @@
           <a:bodyPr/>
           <a:lstStyle/>
           <a:p>
-            <a:r>
-              <a:rPr lang="en-US" dirty="0"/>
-              <a:t>Many asteroids (about 800,000) in the Solar System</a:t>
-            </a:r>
-          </a:p>
-          <a:p>
-            <a:r>
-              <a:rPr lang="en-US" dirty="0"/>
-              <a:t>We want to learn their orbits</a:t>
-            </a:r>
-          </a:p>
-          <a:p>
-            <a:r>
-              <a:rPr lang="en-US" dirty="0"/>
-              <a:t>Biggest data source: telescope detections</a:t>
-            </a:r>
-          </a:p>
-          <a:p>
-            <a:r>
-              <a:rPr lang="en-US" dirty="0"/>
-              <a:t>Easy once you know which detection matches which asteroid</a:t>
-            </a:r>
-          </a:p>
-          <a:p>
-            <a:r>
-              <a:rPr lang="en-US" dirty="0"/>
-              <a:t>This is like a jigsaw puzzle with &gt; 5 million pieces</a:t>
-            </a:r>
+            <a:fld id="{D22732EB-17FA-4F1E-8B0F-B0087D5BE81C}" type="slidenum">
+              <a:rPr lang="en-US" smtClean="0"/>
+              <a:t>4</a:t>
+            </a:fld>
+            <a:endParaRPr lang="en-US"/>
           </a:p>
         </p:txBody>
       </p:sp>
@@ -11172,7 +12698,12 @@
             <p:ph type="title"/>
           </p:nvPr>
         </p:nvSpPr>
-        <p:spPr/>
+        <p:spPr>
+          <a:xfrm>
+            <a:off x="838200" y="365126"/>
+            <a:ext cx="10515600" cy="749300"/>
+          </a:xfrm>
+        </p:spPr>
         <p:txBody>
           <a:bodyPr/>
           <a:lstStyle/>
@@ -11331,6 +12862,35 @@
               <a:rPr lang="en-US" sz="2000" dirty="0"/>
               <a:t>Big deal, this is about as hard as hitting a baseball off a tee…</a:t>
             </a:r>
+          </a:p>
+        </p:txBody>
+      </p:sp>
+      <p:sp>
+        <p:nvSpPr>
+          <p:cNvPr id="12" name="Slide Number Placeholder 11">
+            <a:extLst>
+              <a:ext uri="{FF2B5EF4-FFF2-40B4-BE49-F238E27FC236}">
+                <a16:creationId xmlns:a16="http://schemas.microsoft.com/office/drawing/2014/main" id="{7C5DD344-819E-44D0-A220-54B855F09270}"/>
+              </a:ext>
+            </a:extLst>
+          </p:cNvPr>
+          <p:cNvSpPr>
+            <a:spLocks noGrp="1"/>
+          </p:cNvSpPr>
+          <p:nvPr>
+            <p:ph type="sldNum" sz="quarter" idx="12"/>
+          </p:nvPr>
+        </p:nvSpPr>
+        <p:spPr/>
+        <p:txBody>
+          <a:bodyPr/>
+          <a:lstStyle/>
+          <a:p>
+            <a:fld id="{D22732EB-17FA-4F1E-8B0F-B0087D5BE81C}" type="slidenum">
+              <a:rPr lang="en-US" smtClean="0"/>
+              <a:t>40</a:t>
+            </a:fld>
+            <a:endParaRPr lang="en-US"/>
           </a:p>
         </p:txBody>
       </p:sp>
@@ -11380,7 +12940,12 @@
             <p:ph type="title"/>
           </p:nvPr>
         </p:nvSpPr>
-        <p:spPr/>
+        <p:spPr>
+          <a:xfrm>
+            <a:off x="838200" y="365126"/>
+            <a:ext cx="10515600" cy="614588"/>
+          </a:xfrm>
+        </p:spPr>
         <p:txBody>
           <a:bodyPr>
             <a:normAutofit/>
@@ -11707,6 +13272,35 @@
               <a:rPr lang="en-US" sz="1600" dirty="0"/>
               <a:t>Log Like: 798</a:t>
             </a:r>
+          </a:p>
+        </p:txBody>
+      </p:sp>
+      <p:sp>
+        <p:nvSpPr>
+          <p:cNvPr id="3" name="Slide Number Placeholder 2">
+            <a:extLst>
+              <a:ext uri="{FF2B5EF4-FFF2-40B4-BE49-F238E27FC236}">
+                <a16:creationId xmlns:a16="http://schemas.microsoft.com/office/drawing/2014/main" id="{B99C9FDE-9EF8-45E0-AAE5-4B54E31FA00E}"/>
+              </a:ext>
+            </a:extLst>
+          </p:cNvPr>
+          <p:cNvSpPr>
+            <a:spLocks noGrp="1"/>
+          </p:cNvSpPr>
+          <p:nvPr>
+            <p:ph type="sldNum" sz="quarter" idx="12"/>
+          </p:nvPr>
+        </p:nvSpPr>
+        <p:spPr/>
+        <p:txBody>
+          <a:bodyPr/>
+          <a:lstStyle/>
+          <a:p>
+            <a:fld id="{D22732EB-17FA-4F1E-8B0F-B0087D5BE81C}" type="slidenum">
+              <a:rPr lang="en-US" smtClean="0"/>
+              <a:t>41</a:t>
+            </a:fld>
+            <a:endParaRPr lang="en-US"/>
           </a:p>
         </p:txBody>
       </p:sp>
@@ -11756,9 +13350,16 @@
             <p:ph type="title"/>
           </p:nvPr>
         </p:nvSpPr>
-        <p:spPr/>
-        <p:txBody>
-          <a:bodyPr/>
+        <p:spPr>
+          <a:xfrm>
+            <a:off x="838200" y="365126"/>
+            <a:ext cx="10515600" cy="679904"/>
+          </a:xfrm>
+        </p:spPr>
+        <p:txBody>
+          <a:bodyPr>
+            <a:normAutofit fontScale="90000"/>
+          </a:bodyPr>
           <a:lstStyle/>
           <a:p>
             <a:r>
@@ -11911,8 +13512,37 @@
             </a:pPr>
             <a:r>
               <a:rPr lang="en-US" sz="2000" dirty="0"/>
-              <a:t>This is like your little league coach lobbing the ball over the plate in batting practice</a:t>
-            </a:r>
+              <a:t>This is like your little league coach lobbing the ball over the plate in batting practice…</a:t>
+            </a:r>
+          </a:p>
+        </p:txBody>
+      </p:sp>
+      <p:sp>
+        <p:nvSpPr>
+          <p:cNvPr id="3" name="Slide Number Placeholder 2">
+            <a:extLst>
+              <a:ext uri="{FF2B5EF4-FFF2-40B4-BE49-F238E27FC236}">
+                <a16:creationId xmlns:a16="http://schemas.microsoft.com/office/drawing/2014/main" id="{62EE39FA-9C27-4866-B6ED-64625B86D98E}"/>
+              </a:ext>
+            </a:extLst>
+          </p:cNvPr>
+          <p:cNvSpPr>
+            <a:spLocks noGrp="1"/>
+          </p:cNvSpPr>
+          <p:nvPr>
+            <p:ph type="sldNum" sz="quarter" idx="12"/>
+          </p:nvPr>
+        </p:nvSpPr>
+        <p:spPr/>
+        <p:txBody>
+          <a:bodyPr/>
+          <a:lstStyle/>
+          <a:p>
+            <a:fld id="{D22732EB-17FA-4F1E-8B0F-B0087D5BE81C}" type="slidenum">
+              <a:rPr lang="en-US" smtClean="0"/>
+              <a:t>42</a:t>
+            </a:fld>
+            <a:endParaRPr lang="en-US"/>
           </a:p>
         </p:txBody>
       </p:sp>
@@ -11962,7 +13592,12 @@
             <p:ph type="title"/>
           </p:nvPr>
         </p:nvSpPr>
-        <p:spPr/>
+        <p:spPr>
+          <a:xfrm>
+            <a:off x="838200" y="365125"/>
+            <a:ext cx="10515600" cy="675821"/>
+          </a:xfrm>
+        </p:spPr>
         <p:txBody>
           <a:bodyPr>
             <a:normAutofit/>
@@ -12299,6 +13934,35 @@
               <a:rPr lang="en-US" sz="1600" dirty="0"/>
               <a:t>Many of these elements were perturbed so far the original is no longer even the nearest asteroid!</a:t>
             </a:r>
+          </a:p>
+        </p:txBody>
+      </p:sp>
+      <p:sp>
+        <p:nvSpPr>
+          <p:cNvPr id="3" name="Slide Number Placeholder 2">
+            <a:extLst>
+              <a:ext uri="{FF2B5EF4-FFF2-40B4-BE49-F238E27FC236}">
+                <a16:creationId xmlns:a16="http://schemas.microsoft.com/office/drawing/2014/main" id="{60A9749C-C430-4FF1-A777-FD8E14917F62}"/>
+              </a:ext>
+            </a:extLst>
+          </p:cNvPr>
+          <p:cNvSpPr>
+            <a:spLocks noGrp="1"/>
+          </p:cNvSpPr>
+          <p:nvPr>
+            <p:ph type="sldNum" sz="quarter" idx="12"/>
+          </p:nvPr>
+        </p:nvSpPr>
+        <p:spPr/>
+        <p:txBody>
+          <a:bodyPr/>
+          <a:lstStyle/>
+          <a:p>
+            <a:fld id="{D22732EB-17FA-4F1E-8B0F-B0087D5BE81C}" type="slidenum">
+              <a:rPr lang="en-US" smtClean="0"/>
+              <a:t>43</a:t>
+            </a:fld>
+            <a:endParaRPr lang="en-US"/>
           </a:p>
         </p:txBody>
       </p:sp>
@@ -12348,7 +14012,12 @@
             <p:ph type="title"/>
           </p:nvPr>
         </p:nvSpPr>
-        <p:spPr/>
+        <p:spPr>
+          <a:xfrm>
+            <a:off x="838200" y="365125"/>
+            <a:ext cx="10515600" cy="716643"/>
+          </a:xfrm>
+        </p:spPr>
         <p:txBody>
           <a:bodyPr/>
           <a:lstStyle/>
@@ -12503,8 +14172,37 @@
             </a:pPr>
             <a:r>
               <a:rPr lang="en-US" sz="2000" dirty="0"/>
-              <a:t>This is a lot harder than the last task-like facing a high school pitcher</a:t>
-            </a:r>
+              <a:t>This is a lot harder than the last task-like facing a high school pitcher…</a:t>
+            </a:r>
+          </a:p>
+        </p:txBody>
+      </p:sp>
+      <p:sp>
+        <p:nvSpPr>
+          <p:cNvPr id="3" name="Slide Number Placeholder 2">
+            <a:extLst>
+              <a:ext uri="{FF2B5EF4-FFF2-40B4-BE49-F238E27FC236}">
+                <a16:creationId xmlns:a16="http://schemas.microsoft.com/office/drawing/2014/main" id="{349627FA-FF00-4C9F-9350-6C9675685A94}"/>
+              </a:ext>
+            </a:extLst>
+          </p:cNvPr>
+          <p:cNvSpPr>
+            <a:spLocks noGrp="1"/>
+          </p:cNvSpPr>
+          <p:nvPr>
+            <p:ph type="sldNum" sz="quarter" idx="12"/>
+          </p:nvPr>
+        </p:nvSpPr>
+        <p:spPr/>
+        <p:txBody>
+          <a:bodyPr/>
+          <a:lstStyle/>
+          <a:p>
+            <a:fld id="{D22732EB-17FA-4F1E-8B0F-B0087D5BE81C}" type="slidenum">
+              <a:rPr lang="en-US" smtClean="0"/>
+              <a:t>44</a:t>
+            </a:fld>
+            <a:endParaRPr lang="en-US"/>
           </a:p>
         </p:txBody>
       </p:sp>
@@ -12554,7 +14252,12 @@
             <p:ph type="title"/>
           </p:nvPr>
         </p:nvSpPr>
-        <p:spPr/>
+        <p:spPr>
+          <a:xfrm>
+            <a:off x="838200" y="365126"/>
+            <a:ext cx="10515600" cy="639081"/>
+          </a:xfrm>
+        </p:spPr>
         <p:txBody>
           <a:bodyPr>
             <a:normAutofit/>
@@ -12901,6 +14604,35 @@
               <a:rPr lang="en-US" sz="1600" dirty="0"/>
               <a:t>Baseball analogy continued: facing Roger Clemens, but trying to get hit by the pitch to get on base cheaply</a:t>
             </a:r>
+          </a:p>
+        </p:txBody>
+      </p:sp>
+      <p:sp>
+        <p:nvSpPr>
+          <p:cNvPr id="3" name="Slide Number Placeholder 2">
+            <a:extLst>
+              <a:ext uri="{FF2B5EF4-FFF2-40B4-BE49-F238E27FC236}">
+                <a16:creationId xmlns:a16="http://schemas.microsoft.com/office/drawing/2014/main" id="{6203D676-09B0-44D4-82CC-58E6D4F3B794}"/>
+              </a:ext>
+            </a:extLst>
+          </p:cNvPr>
+          <p:cNvSpPr>
+            <a:spLocks noGrp="1"/>
+          </p:cNvSpPr>
+          <p:nvPr>
+            <p:ph type="sldNum" sz="quarter" idx="12"/>
+          </p:nvPr>
+        </p:nvSpPr>
+        <p:spPr/>
+        <p:txBody>
+          <a:bodyPr/>
+          <a:lstStyle/>
+          <a:p>
+            <a:fld id="{D22732EB-17FA-4F1E-8B0F-B0087D5BE81C}" type="slidenum">
+              <a:rPr lang="en-US" smtClean="0"/>
+              <a:t>45</a:t>
+            </a:fld>
+            <a:endParaRPr lang="en-US"/>
           </a:p>
         </p:txBody>
       </p:sp>
@@ -12950,7 +14682,12 @@
             <p:ph type="title"/>
           </p:nvPr>
         </p:nvSpPr>
-        <p:spPr/>
+        <p:spPr>
+          <a:xfrm>
+            <a:off x="838200" y="365125"/>
+            <a:ext cx="10515600" cy="594179"/>
+          </a:xfrm>
+        </p:spPr>
         <p:txBody>
           <a:bodyPr>
             <a:normAutofit/>
@@ -13287,6 +15024,35 @@
               <a:rPr lang="en-US" sz="1600" dirty="0"/>
               <a:t>Would prefer to see greater differentiation in distance to nearest known asteroid vs. previous run</a:t>
             </a:r>
+          </a:p>
+        </p:txBody>
+      </p:sp>
+      <p:sp>
+        <p:nvSpPr>
+          <p:cNvPr id="3" name="Slide Number Placeholder 2">
+            <a:extLst>
+              <a:ext uri="{FF2B5EF4-FFF2-40B4-BE49-F238E27FC236}">
+                <a16:creationId xmlns:a16="http://schemas.microsoft.com/office/drawing/2014/main" id="{EBBC72CF-EEC6-4C24-B767-0341DBDB6F48}"/>
+              </a:ext>
+            </a:extLst>
+          </p:cNvPr>
+          <p:cNvSpPr>
+            <a:spLocks noGrp="1"/>
+          </p:cNvSpPr>
+          <p:nvPr>
+            <p:ph type="sldNum" sz="quarter" idx="12"/>
+          </p:nvPr>
+        </p:nvSpPr>
+        <p:spPr/>
+        <p:txBody>
+          <a:bodyPr/>
+          <a:lstStyle/>
+          <a:p>
+            <a:fld id="{D22732EB-17FA-4F1E-8B0F-B0087D5BE81C}" type="slidenum">
+              <a:rPr lang="en-US" smtClean="0"/>
+              <a:t>46</a:t>
+            </a:fld>
+            <a:endParaRPr lang="en-US"/>
           </a:p>
         </p:txBody>
       </p:sp>
@@ -13336,7 +15102,12 @@
             <p:ph type="title"/>
           </p:nvPr>
         </p:nvSpPr>
-        <p:spPr/>
+        <p:spPr>
+          <a:xfrm>
+            <a:off x="838200" y="365125"/>
+            <a:ext cx="10515600" cy="712561"/>
+          </a:xfrm>
+        </p:spPr>
         <p:txBody>
           <a:bodyPr>
             <a:normAutofit/>
@@ -13385,6 +15156,35 @@
           </a:xfrm>
         </p:spPr>
       </p:pic>
+      <p:sp>
+        <p:nvSpPr>
+          <p:cNvPr id="6" name="Slide Number Placeholder 5">
+            <a:extLst>
+              <a:ext uri="{FF2B5EF4-FFF2-40B4-BE49-F238E27FC236}">
+                <a16:creationId xmlns:a16="http://schemas.microsoft.com/office/drawing/2014/main" id="{22021F87-9DFD-4614-BCDE-A2A98F1E43F7}"/>
+              </a:ext>
+            </a:extLst>
+          </p:cNvPr>
+          <p:cNvSpPr>
+            <a:spLocks noGrp="1"/>
+          </p:cNvSpPr>
+          <p:nvPr>
+            <p:ph type="sldNum" sz="quarter" idx="12"/>
+          </p:nvPr>
+        </p:nvSpPr>
+        <p:spPr/>
+        <p:txBody>
+          <a:bodyPr/>
+          <a:lstStyle/>
+          <a:p>
+            <a:fld id="{D22732EB-17FA-4F1E-8B0F-B0087D5BE81C}" type="slidenum">
+              <a:rPr lang="en-US" smtClean="0"/>
+              <a:t>47</a:t>
+            </a:fld>
+            <a:endParaRPr lang="en-US"/>
+          </a:p>
+        </p:txBody>
+      </p:sp>
     </p:spTree>
     <p:extLst>
       <p:ext uri="{BB962C8B-B14F-4D97-AF65-F5344CB8AC3E}">
@@ -13433,12 +15233,14 @@
         </p:nvSpPr>
         <p:spPr>
           <a:xfrm>
-            <a:off x="838200" y="365125"/>
-            <a:ext cx="10515600" cy="786039"/>
-          </a:xfrm>
-        </p:spPr>
-        <p:txBody>
-          <a:bodyPr/>
+            <a:off x="838200" y="119593"/>
+            <a:ext cx="10515600" cy="434974"/>
+          </a:xfrm>
+        </p:spPr>
+        <p:txBody>
+          <a:bodyPr>
+            <a:normAutofit fontScale="90000"/>
+          </a:bodyPr>
           <a:lstStyle/>
           <a:p>
             <a:r>
@@ -13478,8 +15280,8 @@
         </p:blipFill>
         <p:spPr>
           <a:xfrm>
-            <a:off x="748395" y="1132848"/>
-            <a:ext cx="4197803" cy="1862005"/>
+            <a:off x="748395" y="569818"/>
+            <a:ext cx="4093459" cy="1815721"/>
           </a:xfrm>
         </p:spPr>
       </p:pic>
@@ -13510,8 +15312,8 @@
         </p:blipFill>
         <p:spPr>
           <a:xfrm>
-            <a:off x="5900915" y="1132848"/>
-            <a:ext cx="4092677" cy="1862005"/>
+            <a:off x="5900916" y="569818"/>
+            <a:ext cx="3990946" cy="1815721"/>
           </a:xfrm>
           <a:prstGeom prst="rect">
             <a:avLst/>
@@ -13545,8 +15347,8 @@
         </p:blipFill>
         <p:spPr>
           <a:xfrm>
-            <a:off x="791806" y="3244674"/>
-            <a:ext cx="4110980" cy="1862005"/>
+            <a:off x="791806" y="2499610"/>
+            <a:ext cx="4008794" cy="1815721"/>
           </a:xfrm>
           <a:prstGeom prst="rect">
             <a:avLst/>
@@ -13580,8 +15382,8 @@
         </p:blipFill>
         <p:spPr>
           <a:xfrm>
-            <a:off x="5932363" y="3244674"/>
-            <a:ext cx="4029780" cy="1862005"/>
+            <a:off x="5932363" y="2499610"/>
+            <a:ext cx="3929612" cy="1815721"/>
           </a:xfrm>
           <a:prstGeom prst="rect">
             <a:avLst/>
@@ -13602,7 +15404,7 @@
         </p:nvSpPr>
         <p:spPr>
           <a:xfrm>
-            <a:off x="444954" y="5200650"/>
+            <a:off x="512687" y="4429402"/>
             <a:ext cx="10254342" cy="2308324"/>
           </a:xfrm>
           <a:prstGeom prst="rect">
@@ -13622,7 +15424,7 @@
             </a:pPr>
             <a:r>
               <a:rPr lang="en-US" dirty="0"/>
-              <a:t>Should we believe these new asteroid candidates? Look at ZTF hit details to decide.</a:t>
+              <a:t>Should we believe these new asteroid candidates? Look at ZTF hits to decide.</a:t>
             </a:r>
           </a:p>
           <a:p>
@@ -13802,13 +15604,37 @@
             </a:pPr>
             <a:r>
               <a:rPr lang="en-US" dirty="0"/>
-              <a:t>Model agrees with ZTF that this is one track for the same </a:t>
-            </a:r>
-            <a:r>
-              <a:rPr lang="en-US" dirty="0" err="1"/>
-              <a:t>obejct</a:t>
-            </a:r>
-            <a:endParaRPr lang="en-US" dirty="0"/>
+              <a:t>Model agrees with ZTF that this is one track for the same object</a:t>
+            </a:r>
+          </a:p>
+        </p:txBody>
+      </p:sp>
+      <p:sp>
+        <p:nvSpPr>
+          <p:cNvPr id="12" name="Slide Number Placeholder 11">
+            <a:extLst>
+              <a:ext uri="{FF2B5EF4-FFF2-40B4-BE49-F238E27FC236}">
+                <a16:creationId xmlns:a16="http://schemas.microsoft.com/office/drawing/2014/main" id="{F0BA290D-FA46-4203-9CB0-C6E83837A0EB}"/>
+              </a:ext>
+            </a:extLst>
+          </p:cNvPr>
+          <p:cNvSpPr>
+            <a:spLocks noGrp="1"/>
+          </p:cNvSpPr>
+          <p:nvPr>
+            <p:ph type="sldNum" sz="quarter" idx="12"/>
+          </p:nvPr>
+        </p:nvSpPr>
+        <p:spPr/>
+        <p:txBody>
+          <a:bodyPr/>
+          <a:lstStyle/>
+          <a:p>
+            <a:fld id="{D22732EB-17FA-4F1E-8B0F-B0087D5BE81C}" type="slidenum">
+              <a:rPr lang="en-US" smtClean="0"/>
+              <a:t>48</a:t>
+            </a:fld>
+            <a:endParaRPr lang="en-US"/>
           </a:p>
         </p:txBody>
       </p:sp>
@@ -13858,7 +15684,12 @@
             <p:ph type="title"/>
           </p:nvPr>
         </p:nvSpPr>
-        <p:spPr/>
+        <p:spPr>
+          <a:xfrm>
+            <a:off x="838200" y="365125"/>
+            <a:ext cx="10515600" cy="777875"/>
+          </a:xfrm>
+        </p:spPr>
         <p:txBody>
           <a:bodyPr/>
           <a:lstStyle/>
@@ -13895,7 +15726,14 @@
           <a:p>
             <a:r>
               <a:rPr lang="en-US" dirty="0"/>
-              <a:t>Prove that asteroid search over orbital elements works with an adequate initialization and representation in data set</a:t>
+              <a:t>Prove that asteroid search over orbital elements works</a:t>
+            </a:r>
+          </a:p>
+          <a:p>
+            <a:pPr lvl="1"/>
+            <a:r>
+              <a:rPr lang="en-US" dirty="0"/>
+              <a:t>Need an adequate initialization and representation in data set</a:t>
             </a:r>
           </a:p>
           <a:p>
@@ -13934,7 +15772,7 @@
           <a:p>
             <a:r>
               <a:rPr lang="en-US" dirty="0"/>
-              <a:t>Developed candidate orbital elements for 9 new asteroids</a:t>
+              <a:t>Proposed candidate orbital elements for 9 new asteroids</a:t>
             </a:r>
           </a:p>
           <a:p>
@@ -13942,6 +15780,35 @@
               <a:rPr lang="en-US" dirty="0"/>
               <a:t>Proof of concept for an automated pipeline to search for new asteroids</a:t>
             </a:r>
+          </a:p>
+        </p:txBody>
+      </p:sp>
+      <p:sp>
+        <p:nvSpPr>
+          <p:cNvPr id="4" name="Slide Number Placeholder 3">
+            <a:extLst>
+              <a:ext uri="{FF2B5EF4-FFF2-40B4-BE49-F238E27FC236}">
+                <a16:creationId xmlns:a16="http://schemas.microsoft.com/office/drawing/2014/main" id="{20C7D029-02BB-4271-A017-FE780CB0A5DF}"/>
+              </a:ext>
+            </a:extLst>
+          </p:cNvPr>
+          <p:cNvSpPr>
+            <a:spLocks noGrp="1"/>
+          </p:cNvSpPr>
+          <p:nvPr>
+            <p:ph type="sldNum" sz="quarter" idx="12"/>
+          </p:nvPr>
+        </p:nvSpPr>
+        <p:spPr/>
+        <p:txBody>
+          <a:bodyPr/>
+          <a:lstStyle/>
+          <a:p>
+            <a:fld id="{D22732EB-17FA-4F1E-8B0F-B0087D5BE81C}" type="slidenum">
+              <a:rPr lang="en-US" smtClean="0"/>
+              <a:t>49</a:t>
+            </a:fld>
+            <a:endParaRPr lang="en-US"/>
           </a:p>
         </p:txBody>
       </p:sp>
@@ -13991,7 +15858,12 @@
             <p:ph type="title"/>
           </p:nvPr>
         </p:nvSpPr>
-        <p:spPr/>
+        <p:spPr>
+          <a:xfrm>
+            <a:off x="838200" y="365125"/>
+            <a:ext cx="10515600" cy="826861"/>
+          </a:xfrm>
+        </p:spPr>
         <p:txBody>
           <a:bodyPr>
             <a:normAutofit/>
@@ -14024,7 +15896,7 @@
         <p:spPr/>
         <p:txBody>
           <a:bodyPr>
-            <a:normAutofit fontScale="92500" lnSpcReduction="10000"/>
+            <a:normAutofit lnSpcReduction="10000"/>
           </a:bodyPr>
           <a:lstStyle/>
           <a:p>
@@ -14102,31 +15974,7 @@
             <a:pPr lvl="1"/>
             <a:r>
               <a:rPr lang="en-US" dirty="0"/>
-              <a:t>Cost scales as N</a:t>
-            </a:r>
-            <a:r>
-              <a:rPr lang="en-US" baseline="-25000" dirty="0"/>
-              <a:t>ast</a:t>
-            </a:r>
-            <a:r>
-              <a:rPr lang="en-US" dirty="0"/>
-              <a:t> N</a:t>
-            </a:r>
-            <a:r>
-              <a:rPr lang="en-US" baseline="-25000" dirty="0"/>
-              <a:t>obs</a:t>
-            </a:r>
-            <a:r>
-              <a:rPr lang="en-US" dirty="0"/>
-              <a:t> rather than N</a:t>
-            </a:r>
-            <a:r>
-              <a:rPr lang="en-US" baseline="-25000" dirty="0"/>
-              <a:t>ast </a:t>
-            </a:r>
-            <a:r>
-              <a:rPr lang="en-US" baseline="30000" dirty="0"/>
-              <a:t>r</a:t>
+              <a:t>Cost scales as </a:t>
             </a:r>
           </a:p>
           <a:p>
@@ -14135,6 +15983,75 @@
               <a:rPr lang="en-US" dirty="0"/>
               <a:t>But can we make it  work?</a:t>
             </a:r>
+          </a:p>
+        </p:txBody>
+      </p:sp>
+      <p:pic>
+        <p:nvPicPr>
+          <p:cNvPr id="5" name="Picture 4">
+            <a:extLst>
+              <a:ext uri="{FF2B5EF4-FFF2-40B4-BE49-F238E27FC236}">
+                <a16:creationId xmlns:a16="http://schemas.microsoft.com/office/drawing/2014/main" id="{B0432E3C-5756-4670-89DA-462C9B566903}"/>
+              </a:ext>
+            </a:extLst>
+          </p:cNvPr>
+          <p:cNvPicPr>
+            <a:picLocks noChangeAspect="1"/>
+          </p:cNvPicPr>
+          <p:nvPr>
+            <p:custDataLst>
+              <p:tags r:id="rId1"/>
+            </p:custDataLst>
+          </p:nvPr>
+        </p:nvPicPr>
+        <p:blipFill>
+          <a:blip r:embed="rId3">
+            <a:extLst>
+              <a:ext uri="{28A0092B-C50C-407E-A947-70E740481C1C}">
+                <a14:useLocalDpi xmlns:a14="http://schemas.microsoft.com/office/drawing/2010/main" val="0"/>
+              </a:ext>
+            </a:extLst>
+          </a:blip>
+          <a:stretch>
+            <a:fillRect/>
+          </a:stretch>
+        </p:blipFill>
+        <p:spPr>
+          <a:xfrm>
+            <a:off x="3380921" y="5491390"/>
+            <a:ext cx="3389257" cy="271543"/>
+          </a:xfrm>
+          <a:prstGeom prst="rect">
+            <a:avLst/>
+          </a:prstGeom>
+        </p:spPr>
+      </p:pic>
+      <p:sp>
+        <p:nvSpPr>
+          <p:cNvPr id="6" name="Slide Number Placeholder 5">
+            <a:extLst>
+              <a:ext uri="{FF2B5EF4-FFF2-40B4-BE49-F238E27FC236}">
+                <a16:creationId xmlns:a16="http://schemas.microsoft.com/office/drawing/2014/main" id="{DD62977B-13DD-4F09-968E-68039B09D3C3}"/>
+              </a:ext>
+            </a:extLst>
+          </p:cNvPr>
+          <p:cNvSpPr>
+            <a:spLocks noGrp="1"/>
+          </p:cNvSpPr>
+          <p:nvPr>
+            <p:ph type="sldNum" sz="quarter" idx="12"/>
+          </p:nvPr>
+        </p:nvSpPr>
+        <p:spPr/>
+        <p:txBody>
+          <a:bodyPr/>
+          <a:lstStyle/>
+          <a:p>
+            <a:fld id="{D22732EB-17FA-4F1E-8B0F-B0087D5BE81C}" type="slidenum">
+              <a:rPr lang="en-US" smtClean="0"/>
+              <a:t>5</a:t>
+            </a:fld>
+            <a:endParaRPr lang="en-US"/>
           </a:p>
         </p:txBody>
       </p:sp>
@@ -14184,7 +16101,12 @@
             <p:ph type="title"/>
           </p:nvPr>
         </p:nvSpPr>
-        <p:spPr/>
+        <p:spPr>
+          <a:xfrm>
+            <a:off x="838200" y="365125"/>
+            <a:ext cx="10515600" cy="835025"/>
+          </a:xfrm>
+        </p:spPr>
         <p:txBody>
           <a:bodyPr/>
           <a:lstStyle/>
@@ -14257,7 +16179,14 @@
             <a:pPr lvl="1"/>
             <a:r>
               <a:rPr lang="en-US" dirty="0"/>
-              <a:t>Build least squares fit for candidate element; modify </a:t>
+              <a:t>Build least squares fit for candidate element</a:t>
+            </a:r>
+          </a:p>
+          <a:p>
+            <a:pPr lvl="1"/>
+            <a:r>
+              <a:rPr lang="en-US" dirty="0"/>
+              <a:t>Code mostly there now; modify </a:t>
             </a:r>
             <a:r>
               <a:rPr lang="en-US" dirty="0" err="1"/>
@@ -14319,6 +16248,35 @@
           <a:p>
             <a:pPr lvl="1"/>
             <a:endParaRPr lang="en-US" dirty="0"/>
+          </a:p>
+        </p:txBody>
+      </p:sp>
+      <p:sp>
+        <p:nvSpPr>
+          <p:cNvPr id="4" name="Slide Number Placeholder 3">
+            <a:extLst>
+              <a:ext uri="{FF2B5EF4-FFF2-40B4-BE49-F238E27FC236}">
+                <a16:creationId xmlns:a16="http://schemas.microsoft.com/office/drawing/2014/main" id="{14C5071D-69FD-4514-B6C2-C1C4599160AF}"/>
+              </a:ext>
+            </a:extLst>
+          </p:cNvPr>
+          <p:cNvSpPr>
+            <a:spLocks noGrp="1"/>
+          </p:cNvSpPr>
+          <p:nvPr>
+            <p:ph type="sldNum" sz="quarter" idx="12"/>
+          </p:nvPr>
+        </p:nvSpPr>
+        <p:spPr/>
+        <p:txBody>
+          <a:bodyPr/>
+          <a:lstStyle/>
+          <a:p>
+            <a:fld id="{D22732EB-17FA-4F1E-8B0F-B0087D5BE81C}" type="slidenum">
+              <a:rPr lang="en-US" smtClean="0"/>
+              <a:t>50</a:t>
+            </a:fld>
+            <a:endParaRPr lang="en-US"/>
           </a:p>
         </p:txBody>
       </p:sp>
@@ -14368,7 +16326,12 @@
             <p:ph type="title"/>
           </p:nvPr>
         </p:nvSpPr>
-        <p:spPr/>
+        <p:spPr>
+          <a:xfrm>
+            <a:off x="838200" y="365126"/>
+            <a:ext cx="10515600" cy="720724"/>
+          </a:xfrm>
+        </p:spPr>
         <p:txBody>
           <a:bodyPr>
             <a:normAutofit/>
@@ -14401,7 +16364,7 @@
         <p:spPr/>
         <p:txBody>
           <a:bodyPr>
-            <a:normAutofit lnSpcReduction="10000"/>
+            <a:normAutofit/>
           </a:bodyPr>
           <a:lstStyle/>
           <a:p>
@@ -14469,8 +16432,37 @@
             <a:pPr lvl="1"/>
             <a:r>
               <a:rPr lang="en-US" dirty="0"/>
-              <a:t>is also an automated process that can provisionally classify new asteroids for the MPC</a:t>
-            </a:r>
+              <a:t>…is also an automated process that can provisionally classify new asteroids!</a:t>
+            </a:r>
+          </a:p>
+        </p:txBody>
+      </p:sp>
+      <p:sp>
+        <p:nvSpPr>
+          <p:cNvPr id="4" name="Slide Number Placeholder 3">
+            <a:extLst>
+              <a:ext uri="{FF2B5EF4-FFF2-40B4-BE49-F238E27FC236}">
+                <a16:creationId xmlns:a16="http://schemas.microsoft.com/office/drawing/2014/main" id="{4410C8DA-60E2-4946-B5A7-65C326606E22}"/>
+              </a:ext>
+            </a:extLst>
+          </p:cNvPr>
+          <p:cNvSpPr>
+            <a:spLocks noGrp="1"/>
+          </p:cNvSpPr>
+          <p:nvPr>
+            <p:ph type="sldNum" sz="quarter" idx="12"/>
+          </p:nvPr>
+        </p:nvSpPr>
+        <p:spPr/>
+        <p:txBody>
+          <a:bodyPr/>
+          <a:lstStyle/>
+          <a:p>
+            <a:fld id="{D22732EB-17FA-4F1E-8B0F-B0087D5BE81C}" type="slidenum">
+              <a:rPr lang="en-US" smtClean="0"/>
+              <a:t>51</a:t>
+            </a:fld>
+            <a:endParaRPr lang="en-US"/>
           </a:p>
         </p:txBody>
       </p:sp>
@@ -14520,7 +16512,12 @@
             <p:ph type="title"/>
           </p:nvPr>
         </p:nvSpPr>
-        <p:spPr/>
+        <p:spPr>
+          <a:xfrm>
+            <a:off x="838200" y="365125"/>
+            <a:ext cx="10515600" cy="777875"/>
+          </a:xfrm>
+        </p:spPr>
         <p:txBody>
           <a:bodyPr/>
           <a:lstStyle/>
@@ -14535,7 +16532,7 @@
             </a:r>
             <a:r>
               <a:rPr lang="en-US" dirty="0"/>
-              <a:t>: Thank you for Your Attention</a:t>
+              <a:t>: Thank you for Your Attention!</a:t>
             </a:r>
           </a:p>
         </p:txBody>
@@ -14571,7 +16568,7 @@
           </a:p>
           <a:p>
             <a:r>
-              <a:rPr lang="en-US"/>
+              <a:rPr lang="en-US" dirty="0"/>
               <a:t>Comments?</a:t>
             </a:r>
           </a:p>
@@ -14583,6 +16580,35 @@
               <a:rPr lang="en-US" dirty="0"/>
               <a:t>Suggestions?</a:t>
             </a:r>
+          </a:p>
+        </p:txBody>
+      </p:sp>
+      <p:sp>
+        <p:nvSpPr>
+          <p:cNvPr id="4" name="Slide Number Placeholder 3">
+            <a:extLst>
+              <a:ext uri="{FF2B5EF4-FFF2-40B4-BE49-F238E27FC236}">
+                <a16:creationId xmlns:a16="http://schemas.microsoft.com/office/drawing/2014/main" id="{918F9E15-FB4C-4CE6-98E3-6796A286A5EB}"/>
+              </a:ext>
+            </a:extLst>
+          </p:cNvPr>
+          <p:cNvSpPr>
+            <a:spLocks noGrp="1"/>
+          </p:cNvSpPr>
+          <p:nvPr>
+            <p:ph type="sldNum" sz="quarter" idx="12"/>
+          </p:nvPr>
+        </p:nvSpPr>
+        <p:spPr/>
+        <p:txBody>
+          <a:bodyPr/>
+          <a:lstStyle/>
+          <a:p>
+            <a:fld id="{D22732EB-17FA-4F1E-8B0F-B0087D5BE81C}" type="slidenum">
+              <a:rPr lang="en-US" smtClean="0"/>
+              <a:t>52</a:t>
+            </a:fld>
+            <a:endParaRPr lang="en-US"/>
           </a:p>
         </p:txBody>
       </p:sp>
@@ -14669,6 +16695,35 @@
           </a:p>
         </p:txBody>
       </p:sp>
+      <p:sp>
+        <p:nvSpPr>
+          <p:cNvPr id="4" name="Slide Number Placeholder 3">
+            <a:extLst>
+              <a:ext uri="{FF2B5EF4-FFF2-40B4-BE49-F238E27FC236}">
+                <a16:creationId xmlns:a16="http://schemas.microsoft.com/office/drawing/2014/main" id="{B65A91C6-0982-4153-A9AE-7548B6B61539}"/>
+              </a:ext>
+            </a:extLst>
+          </p:cNvPr>
+          <p:cNvSpPr>
+            <a:spLocks noGrp="1"/>
+          </p:cNvSpPr>
+          <p:nvPr>
+            <p:ph type="sldNum" sz="quarter" idx="12"/>
+          </p:nvPr>
+        </p:nvSpPr>
+        <p:spPr/>
+        <p:txBody>
+          <a:bodyPr/>
+          <a:lstStyle/>
+          <a:p>
+            <a:fld id="{D22732EB-17FA-4F1E-8B0F-B0087D5BE81C}" type="slidenum">
+              <a:rPr lang="en-US" smtClean="0"/>
+              <a:t>6</a:t>
+            </a:fld>
+            <a:endParaRPr lang="en-US"/>
+          </a:p>
+        </p:txBody>
+      </p:sp>
     </p:spTree>
     <p:extLst>
       <p:ext uri="{BB962C8B-B14F-4D97-AF65-F5344CB8AC3E}">
@@ -14715,7 +16770,12 @@
             <p:ph type="title"/>
           </p:nvPr>
         </p:nvSpPr>
-        <p:spPr/>
+        <p:spPr>
+          <a:xfrm>
+            <a:off x="838200" y="365126"/>
+            <a:ext cx="10515600" cy="818696"/>
+          </a:xfrm>
+        </p:spPr>
         <p:txBody>
           <a:bodyPr/>
           <a:lstStyle/>
@@ -14799,6 +16859,35 @@
               <a:rPr lang="en-US" dirty="0"/>
               <a:t>Horizons: API provided by NASA JPL to obtain state vectors (position and velocity) of objects in the Solar System</a:t>
             </a:r>
+          </a:p>
+        </p:txBody>
+      </p:sp>
+      <p:sp>
+        <p:nvSpPr>
+          <p:cNvPr id="4" name="Slide Number Placeholder 3">
+            <a:extLst>
+              <a:ext uri="{FF2B5EF4-FFF2-40B4-BE49-F238E27FC236}">
+                <a16:creationId xmlns:a16="http://schemas.microsoft.com/office/drawing/2014/main" id="{51AB07B8-8EC3-4787-A990-69CE66C0971D}"/>
+              </a:ext>
+            </a:extLst>
+          </p:cNvPr>
+          <p:cNvSpPr>
+            <a:spLocks noGrp="1"/>
+          </p:cNvSpPr>
+          <p:nvPr>
+            <p:ph type="sldNum" sz="quarter" idx="12"/>
+          </p:nvPr>
+        </p:nvSpPr>
+        <p:spPr/>
+        <p:txBody>
+          <a:bodyPr/>
+          <a:lstStyle/>
+          <a:p>
+            <a:fld id="{D22732EB-17FA-4F1E-8B0F-B0087D5BE81C}" type="slidenum">
+              <a:rPr lang="en-US" smtClean="0"/>
+              <a:t>7</a:t>
+            </a:fld>
+            <a:endParaRPr lang="en-US"/>
           </a:p>
         </p:txBody>
       </p:sp>
@@ -14848,7 +16937,12 @@
             <p:ph type="title"/>
           </p:nvPr>
         </p:nvSpPr>
-        <p:spPr/>
+        <p:spPr>
+          <a:xfrm>
+            <a:off x="838200" y="365126"/>
+            <a:ext cx="10515600" cy="712560"/>
+          </a:xfrm>
+        </p:spPr>
         <p:txBody>
           <a:bodyPr/>
           <a:lstStyle/>
@@ -15052,6 +17146,35 @@
               <a:t> is location of the body on its orbital ellipse</a:t>
             </a:r>
             <a:endParaRPr lang="en-US" dirty="0"/>
+          </a:p>
+        </p:txBody>
+      </p:sp>
+      <p:sp>
+        <p:nvSpPr>
+          <p:cNvPr id="3" name="Slide Number Placeholder 2">
+            <a:extLst>
+              <a:ext uri="{FF2B5EF4-FFF2-40B4-BE49-F238E27FC236}">
+                <a16:creationId xmlns:a16="http://schemas.microsoft.com/office/drawing/2014/main" id="{44C0FA63-2AFD-422E-BEAF-0E09478BCCD1}"/>
+              </a:ext>
+            </a:extLst>
+          </p:cNvPr>
+          <p:cNvSpPr>
+            <a:spLocks noGrp="1"/>
+          </p:cNvSpPr>
+          <p:nvPr>
+            <p:ph type="sldNum" sz="quarter" idx="12"/>
+          </p:nvPr>
+        </p:nvSpPr>
+        <p:spPr/>
+        <p:txBody>
+          <a:bodyPr/>
+          <a:lstStyle/>
+          <a:p>
+            <a:fld id="{D22732EB-17FA-4F1E-8B0F-B0087D5BE81C}" type="slidenum">
+              <a:rPr lang="en-US" smtClean="0"/>
+              <a:t>8</a:t>
+            </a:fld>
+            <a:endParaRPr lang="en-US"/>
           </a:p>
         </p:txBody>
       </p:sp>
@@ -15101,9 +17224,16 @@
             <p:ph type="title"/>
           </p:nvPr>
         </p:nvSpPr>
-        <p:spPr/>
-        <p:txBody>
-          <a:bodyPr/>
+        <p:spPr>
+          <a:xfrm>
+            <a:off x="838200" y="365126"/>
+            <a:ext cx="10515600" cy="692150"/>
+          </a:xfrm>
+        </p:spPr>
+        <p:txBody>
+          <a:bodyPr>
+            <a:normAutofit fontScale="90000"/>
+          </a:bodyPr>
           <a:lstStyle/>
           <a:p>
             <a:r>
@@ -15269,7 +17399,7 @@
                 <a:latin typeface="Times New Roman" panose="02020603050405020304" pitchFamily="18" charset="0"/>
                 <a:cs typeface="Times New Roman" panose="02020603050405020304" pitchFamily="18" charset="0"/>
               </a:rPr>
-              <a:t>Accuracy is Excellent!</a:t>
+              <a:t>Accuracy is excellent!</a:t>
             </a:r>
           </a:p>
           <a:p>
@@ -15298,6 +17428,35 @@
               <a:t>Angle error from asteroids to planets 0.8 arc seconds</a:t>
             </a:r>
             <a:endParaRPr lang="en-US" dirty="0"/>
+          </a:p>
+        </p:txBody>
+      </p:sp>
+      <p:sp>
+        <p:nvSpPr>
+          <p:cNvPr id="3" name="Slide Number Placeholder 2">
+            <a:extLst>
+              <a:ext uri="{FF2B5EF4-FFF2-40B4-BE49-F238E27FC236}">
+                <a16:creationId xmlns:a16="http://schemas.microsoft.com/office/drawing/2014/main" id="{762A268D-A664-4940-A894-104DB53238AB}"/>
+              </a:ext>
+            </a:extLst>
+          </p:cNvPr>
+          <p:cNvSpPr>
+            <a:spLocks noGrp="1"/>
+          </p:cNvSpPr>
+          <p:nvPr>
+            <p:ph type="sldNum" sz="quarter" idx="12"/>
+          </p:nvPr>
+        </p:nvSpPr>
+        <p:spPr/>
+        <p:txBody>
+          <a:bodyPr/>
+          <a:lstStyle/>
+          <a:p>
+            <a:fld id="{D22732EB-17FA-4F1E-8B0F-B0087D5BE81C}" type="slidenum">
+              <a:rPr lang="en-US" smtClean="0"/>
+              <a:t>9</a:t>
+            </a:fld>
+            <a:endParaRPr lang="en-US"/>
           </a:p>
         </p:txBody>
       </p:sp>
@@ -15315,6 +17474,215 @@
 </file>
 
 <file path=ppt/tags/tag1.xml><?xml version="1.0" encoding="utf-8"?>
+<p:tagLst xmlns:a="http://schemas.openxmlformats.org/drawingml/2006/main" xmlns:r="http://schemas.openxmlformats.org/officeDocument/2006/relationships" xmlns:p="http://schemas.openxmlformats.org/presentationml/2006/main">
+  <p:tag name="OUTPUTDPI" val="1200"/>
+  <p:tag name="ORIGINALHEIGHT" val="121.4848"/>
+  <p:tag name="ORIGINALWIDTH" val="1516.311"/>
+  <p:tag name="LATEXADDIN" val="\documentclass{article}&#10;\usepackage{amsmath}&#10;\pagestyle{empty}&#10;\begin{document}&#10;&#10;&#10;$$ N_{\mathrm{ast}} \cdot N_{\mathrm{obs}} &#10;\textnormal{ rather than }&#10;N_{\mathrm{obs}}^{r}$$&#10;&#10;\end{document}"/>
+  <p:tag name="IGUANATEXSIZE" val="22"/>
+  <p:tag name="IGUANATEXCURSOR" val="173"/>
+  <p:tag name="TRANSPARENCY" val="True"/>
+  <p:tag name="FILENAME" val=""/>
+  <p:tag name="LATEXENGINEID" val="0"/>
+  <p:tag name="TEMPFOLDER" val="c:\temp\"/>
+  <p:tag name="LATEXFORMHEIGHT" val="312"/>
+  <p:tag name="LATEXFORMWIDTH" val="384"/>
+  <p:tag name="LATEXFORMWRAP" val="True"/>
+  <p:tag name="BITMAPVECTOR" val="0"/>
+</p:tagLst>
+</file>
+
+<file path=ppt/tags/tag10.xml><?xml version="1.0" encoding="utf-8"?>
+<p:tagLst xmlns:a="http://schemas.openxmlformats.org/drawingml/2006/main" xmlns:r="http://schemas.openxmlformats.org/officeDocument/2006/relationships" xmlns:p="http://schemas.openxmlformats.org/presentationml/2006/main">
+  <p:tag name="OUTPUTDPI" val="1200"/>
+  <p:tag name="ORIGINALHEIGHT" val="140.9824"/>
+  <p:tag name="ORIGINALWIDTH" val="1213.348"/>
+  <p:tag name="LATEXADDIN" val="\documentclass{article}&#10;\usepackage{amsmath}&#10;\pagestyle{empty}&#10;\begin{document}&#10;&#10;$$ S^2| S \le \tau \sim \textrm{Unif}(0, \tau^2) $$&#10;&#10;\end{document}"/>
+  <p:tag name="IGUANATEXSIZE" val="28"/>
+  <p:tag name="IGUANATEXCURSOR" val="128"/>
+  <p:tag name="TRANSPARENCY" val="True"/>
+  <p:tag name="FILENAME" val=""/>
+  <p:tag name="LATEXENGINEID" val="0"/>
+  <p:tag name="TEMPFOLDER" val="c:\temp\"/>
+  <p:tag name="LATEXFORMHEIGHT" val="312"/>
+  <p:tag name="LATEXFORMWIDTH" val="384"/>
+  <p:tag name="LATEXFORMWRAP" val="True"/>
+  <p:tag name="BITMAPVECTOR" val="0"/>
+</p:tagLst>
+</file>
+
+<file path=ppt/tags/tag11.xml><?xml version="1.0" encoding="utf-8"?>
+<p:tagLst xmlns:a="http://schemas.openxmlformats.org/drawingml/2006/main" xmlns:r="http://schemas.openxmlformats.org/officeDocument/2006/relationships" xmlns:p="http://schemas.openxmlformats.org/presentationml/2006/main">
+  <p:tag name="OUTPUTDPI" val="1200"/>
+  <p:tag name="ORIGINALHEIGHT" val="123.7346"/>
+  <p:tag name="ORIGINALWIDTH" val="848.8939"/>
+  <p:tag name="LATEXADDIN" val="\documentclass{article}&#10;\usepackage{amsmath}&#10;\pagestyle{empty}&#10;\begin{document}&#10;&#10;$$ Z \sim \textrm{Unif}(-1, 1) $$&#10;&#10;\end{document}"/>
+  <p:tag name="IGUANATEXSIZE" val="28"/>
+  <p:tag name="IGUANATEXCURSOR" val="114"/>
+  <p:tag name="TRANSPARENCY" val="True"/>
+  <p:tag name="FILENAME" val=""/>
+  <p:tag name="LATEXENGINEID" val="0"/>
+  <p:tag name="TEMPFOLDER" val="c:\temp\"/>
+  <p:tag name="LATEXFORMHEIGHT" val="312"/>
+  <p:tag name="LATEXFORMWIDTH" val="384"/>
+  <p:tag name="LATEXFORMWRAP" val="True"/>
+  <p:tag name="BITMAPVECTOR" val="0"/>
+</p:tagLst>
+</file>
+
+<file path=ppt/tags/tag12.xml><?xml version="1.0" encoding="utf-8"?>
+<p:tagLst xmlns:a="http://schemas.openxmlformats.org/drawingml/2006/main" xmlns:r="http://schemas.openxmlformats.org/officeDocument/2006/relationships" xmlns:p="http://schemas.openxmlformats.org/presentationml/2006/main">
+  <p:tag name="OUTPUTDPI" val="1200"/>
+  <p:tag name="ORIGINALHEIGHT" val="140.9824"/>
+  <p:tag name="ORIGINALWIDTH" val="798.6501"/>
+  <p:tag name="LATEXADDIN" val="\documentclass{article}&#10;\usepackage{amsmath}&#10;\pagestyle{empty}&#10;\begin{document}&#10;&#10;$$ S^2 \sim \textrm{Unif}(0, 4) $$&#10;&#10;\end{document}"/>
+  <p:tag name="IGUANATEXSIZE" val="28"/>
+  <p:tag name="IGUANATEXCURSOR" val="111"/>
+  <p:tag name="TRANSPARENCY" val="True"/>
+  <p:tag name="FILENAME" val=""/>
+  <p:tag name="LATEXENGINEID" val="0"/>
+  <p:tag name="TEMPFOLDER" val="c:\temp\"/>
+  <p:tag name="LATEXFORMHEIGHT" val="312"/>
+  <p:tag name="LATEXFORMWIDTH" val="384"/>
+  <p:tag name="LATEXFORMWRAP" val="True"/>
+  <p:tag name="BITMAPVECTOR" val="0"/>
+</p:tagLst>
+</file>
+
+<file path=ppt/tags/tag13.xml><?xml version="1.0" encoding="utf-8"?>
+<p:tagLst xmlns:a="http://schemas.openxmlformats.org/drawingml/2006/main" xmlns:r="http://schemas.openxmlformats.org/officeDocument/2006/relationships" xmlns:p="http://schemas.openxmlformats.org/presentationml/2006/main">
+  <p:tag name="OUTPUTDPI" val="1200"/>
+  <p:tag name="ORIGINALHEIGHT" val="140.9824"/>
+  <p:tag name="ORIGINALWIDTH" val="608.174"/>
+  <p:tag name="LATEXADDIN" val="\documentclass{article}&#10;\usepackage{amsmath}&#10;\pagestyle{empty}&#10;\begin{document}&#10;&#10;$$ V = (S/\tau)^2$$&#10;&#10;\end{document}"/>
+  <p:tag name="IGUANATEXSIZE" val="28"/>
+  <p:tag name="IGUANATEXCURSOR" val="100"/>
+  <p:tag name="TRANSPARENCY" val="True"/>
+  <p:tag name="FILENAME" val=""/>
+  <p:tag name="LATEXENGINEID" val="0"/>
+  <p:tag name="TEMPFOLDER" val="c:\temp\"/>
+  <p:tag name="LATEXFORMHEIGHT" val="312"/>
+  <p:tag name="LATEXFORMWIDTH" val="384"/>
+  <p:tag name="LATEXFORMWRAP" val="True"/>
+  <p:tag name="BITMAPVECTOR" val="0"/>
+</p:tagLst>
+</file>
+
+<file path=ppt/tags/tag14.xml><?xml version="1.0" encoding="utf-8"?>
+<p:tagLst xmlns:a="http://schemas.openxmlformats.org/drawingml/2006/main" xmlns:r="http://schemas.openxmlformats.org/officeDocument/2006/relationships" xmlns:p="http://schemas.openxmlformats.org/presentationml/2006/main">
+  <p:tag name="OUTPUTDPI" val="1200"/>
+  <p:tag name="ORIGINALHEIGHT" val="123.7346"/>
+  <p:tag name="ORIGINALWIDTH" val="758.9051"/>
+  <p:tag name="LATEXADDIN" val="\documentclass{article}&#10;\usepackage{amsmath}&#10;\pagestyle{empty}&#10;\begin{document}&#10;&#10;$$ V \sim \textrm{Unif}(0, 1)$$&#10;&#10;\end{document}"/>
+  <p:tag name="IGUANATEXSIZE" val="28"/>
+  <p:tag name="IGUANATEXCURSOR" val="110"/>
+  <p:tag name="TRANSPARENCY" val="True"/>
+  <p:tag name="FILENAME" val=""/>
+  <p:tag name="LATEXENGINEID" val="0"/>
+  <p:tag name="TEMPFOLDER" val="c:\temp\"/>
+  <p:tag name="LATEXFORMHEIGHT" val="312"/>
+  <p:tag name="LATEXFORMWIDTH" val="384"/>
+  <p:tag name="LATEXFORMWRAP" val="True"/>
+  <p:tag name="BITMAPVECTOR" val="0"/>
+</p:tagLst>
+</file>
+
+<file path=ppt/tags/tag15.xml><?xml version="1.0" encoding="utf-8"?>
+<p:tagLst xmlns:a="http://schemas.openxmlformats.org/drawingml/2006/main" xmlns:r="http://schemas.openxmlformats.org/officeDocument/2006/relationships" xmlns:p="http://schemas.openxmlformats.org/presentationml/2006/main">
+  <p:tag name="OUTPUTDPI" val="1200"/>
+  <p:tag name="ORIGINALHEIGHT" val="161.2298"/>
+  <p:tag name="ORIGINALWIDTH" val="1262.842"/>
+  <p:tag name="LATEXADDIN" val="\documentclass{article}&#10;\usepackage{amsmath}&#10;\pagestyle{empty}&#10;\begin{document}&#10;&#10;$$ V_1, \ldots V_n \overset{i.i.d.}{\sim} \textrm{Unif}(0, 1)$$&#10;&#10;\end{document}"/>
+  <p:tag name="IGUANATEXSIZE" val="28"/>
+  <p:tag name="IGUANATEXCURSOR" val="115"/>
+  <p:tag name="TRANSPARENCY" val="True"/>
+  <p:tag name="FILENAME" val=""/>
+  <p:tag name="LATEXENGINEID" val="0"/>
+  <p:tag name="TEMPFOLDER" val="c:\temp\"/>
+  <p:tag name="LATEXFORMHEIGHT" val="312"/>
+  <p:tag name="LATEXFORMWIDTH" val="384"/>
+  <p:tag name="LATEXFORMWRAP" val="True"/>
+  <p:tag name="BITMAPVECTOR" val="0"/>
+</p:tagLst>
+</file>
+
+<file path=ppt/tags/tag16.xml><?xml version="1.0" encoding="utf-8"?>
+<p:tagLst xmlns:a="http://schemas.openxmlformats.org/drawingml/2006/main" xmlns:r="http://schemas.openxmlformats.org/officeDocument/2006/relationships" xmlns:p="http://schemas.openxmlformats.org/presentationml/2006/main">
+  <p:tag name="OUTPUTDPI" val="1200"/>
+  <p:tag name="ORIGINALHEIGHT" val="137.2328"/>
+  <p:tag name="ORIGINALWIDTH" val="907.3865"/>
+  <p:tag name="LATEXADDIN" val="\documentclass{article}&#10;\usepackage{amsmath}&#10;\pagestyle{empty}&#10;\begin{document}&#10;&#10;$$ U_{(1)}\sim \textrm{Beta}(1, n)$$&#10;&#10;\end{document}"/>
+  <p:tag name="IGUANATEXSIZE" val="28"/>
+  <p:tag name="IGUANATEXCURSOR" val="114"/>
+  <p:tag name="TRANSPARENCY" val="True"/>
+  <p:tag name="FILENAME" val=""/>
+  <p:tag name="LATEXENGINEID" val="0"/>
+  <p:tag name="TEMPFOLDER" val="c:\temp\"/>
+  <p:tag name="LATEXFORMHEIGHT" val="312"/>
+  <p:tag name="LATEXFORMWIDTH" val="384"/>
+  <p:tag name="LATEXFORMWRAP" val="True"/>
+  <p:tag name="BITMAPVECTOR" val="0"/>
+</p:tagLst>
+</file>
+
+<file path=ppt/tags/tag17.xml><?xml version="1.0" encoding="utf-8"?>
+<p:tagLst xmlns:a="http://schemas.openxmlformats.org/drawingml/2006/main" xmlns:r="http://schemas.openxmlformats.org/officeDocument/2006/relationships" xmlns:p="http://schemas.openxmlformats.org/presentationml/2006/main">
+  <p:tag name="OUTPUTDPI" val="1200"/>
+  <p:tag name="ORIGINALHEIGHT" val="124.4844"/>
+  <p:tag name="ORIGINALWIDTH" val="913.3858"/>
+  <p:tag name="LATEXADDIN" val="\documentclass{article}&#10;\usepackage{amsmath}&#10;\pagestyle{empty}&#10;\begin{document}&#10;&#10;&#10;$$ V | \textrm{Hit} \sim \textrm{Expo}(\lambda)$$&#10;&#10;\end{document}"/>
+  <p:tag name="IGUANATEXSIZE" val="28"/>
+  <p:tag name="IGUANATEXCURSOR" val="82"/>
+  <p:tag name="TRANSPARENCY" val="True"/>
+  <p:tag name="FILENAME" val=""/>
+  <p:tag name="LATEXENGINEID" val="0"/>
+  <p:tag name="TEMPFOLDER" val="c:\temp\"/>
+  <p:tag name="LATEXFORMHEIGHT" val="312"/>
+  <p:tag name="LATEXFORMWIDTH" val="384"/>
+  <p:tag name="LATEXFORMWRAP" val="True"/>
+  <p:tag name="BITMAPVECTOR" val="0"/>
+</p:tagLst>
+</file>
+
+<file path=ppt/tags/tag18.xml><?xml version="1.0" encoding="utf-8"?>
+<p:tagLst xmlns:a="http://schemas.openxmlformats.org/drawingml/2006/main" xmlns:r="http://schemas.openxmlformats.org/officeDocument/2006/relationships" xmlns:p="http://schemas.openxmlformats.org/presentationml/2006/main">
+  <p:tag name="OUTPUTDPI" val="1200"/>
+  <p:tag name="ORIGINALHEIGHT" val="124.4844"/>
+  <p:tag name="ORIGINALWIDTH" val="1040.87"/>
+  <p:tag name="LATEXADDIN" val="\documentclass{article}&#10;\usepackage{amsmath}&#10;\pagestyle{empty}&#10;\begin{document}&#10;&#10;&#10;$$ V | \textrm{Miss} \sim \textrm{Unif}(0, 1)$$&#10;&#10;\end{document}"/>
+  <p:tag name="IGUANATEXSIZE" val="28"/>
+  <p:tag name="IGUANATEXCURSOR" val="126"/>
+  <p:tag name="TRANSPARENCY" val="True"/>
+  <p:tag name="FILENAME" val=""/>
+  <p:tag name="LATEXENGINEID" val="0"/>
+  <p:tag name="TEMPFOLDER" val="c:\temp\"/>
+  <p:tag name="LATEXFORMHEIGHT" val="312"/>
+  <p:tag name="LATEXFORMWIDTH" val="384"/>
+  <p:tag name="LATEXFORMWRAP" val="True"/>
+  <p:tag name="BITMAPVECTOR" val="0"/>
+</p:tagLst>
+</file>
+
+<file path=ppt/tags/tag19.xml><?xml version="1.0" encoding="utf-8"?>
+<p:tagLst xmlns:a="http://schemas.openxmlformats.org/drawingml/2006/main" xmlns:r="http://schemas.openxmlformats.org/officeDocument/2006/relationships" xmlns:p="http://schemas.openxmlformats.org/presentationml/2006/main">
+  <p:tag name="OUTPUTDPI" val="1200"/>
+  <p:tag name="ORIGINALHEIGHT" val="161.2298"/>
+  <p:tag name="ORIGINALWIDTH" val="1250.094"/>
+  <p:tag name="LATEXADDIN" val="\documentclass{article}&#10;\usepackage{amsmath}&#10;\pagestyle{empty}&#10;\begin{document}&#10;&#10;&#10;$$ f(v) \propto e^{-\lambda v} = e^{-\lambda s^2/ \tau^2}$$&#10;&#10;\end{document}"/>
+  <p:tag name="IGUANATEXSIZE" val="28"/>
+  <p:tag name="IGUANATEXCURSOR" val="130"/>
+  <p:tag name="TRANSPARENCY" val="True"/>
+  <p:tag name="FILENAME" val=""/>
+  <p:tag name="LATEXENGINEID" val="0"/>
+  <p:tag name="TEMPFOLDER" val="c:\temp\"/>
+  <p:tag name="LATEXFORMHEIGHT" val="312"/>
+  <p:tag name="LATEXFORMWIDTH" val="513"/>
+  <p:tag name="LATEXFORMWRAP" val="True"/>
+  <p:tag name="BITMAPVECTOR" val="0"/>
+</p:tagLst>
+</file>
+
+<file path=ppt/tags/tag2.xml><?xml version="1.0" encoding="utf-8"?>
 <p:tagLst xmlns:a="http://schemas.openxmlformats.org/drawingml/2006/main" xmlns:r="http://schemas.openxmlformats.org/officeDocument/2006/relationships" xmlns:p="http://schemas.openxmlformats.org/presentationml/2006/main">
   <p:tag name="OUTPUTDPI" val="1200"/>
   <p:tag name="ORIGINALHEIGHT" val="304.462"/>
@@ -15333,178 +17701,7 @@
 </p:tagLst>
 </file>
 
-<file path=ppt/tags/tag10.xml><?xml version="1.0" encoding="utf-8"?>
-<p:tagLst xmlns:a="http://schemas.openxmlformats.org/drawingml/2006/main" xmlns:r="http://schemas.openxmlformats.org/officeDocument/2006/relationships" xmlns:p="http://schemas.openxmlformats.org/presentationml/2006/main">
-  <p:tag name="OUTPUTDPI" val="1200"/>
-  <p:tag name="ORIGINALHEIGHT" val="123.7346"/>
-  <p:tag name="ORIGINALWIDTH" val="848.8939"/>
-  <p:tag name="LATEXADDIN" val="\documentclass{article}&#10;\usepackage{amsmath}&#10;\pagestyle{empty}&#10;\begin{document}&#10;&#10;$$ Z \sim \textrm{Unif}(-1, 1) $$&#10;&#10;\end{document}"/>
-  <p:tag name="IGUANATEXSIZE" val="28"/>
-  <p:tag name="IGUANATEXCURSOR" val="114"/>
-  <p:tag name="TRANSPARENCY" val="True"/>
-  <p:tag name="FILENAME" val=""/>
-  <p:tag name="LATEXENGINEID" val="0"/>
-  <p:tag name="TEMPFOLDER" val="c:\temp\"/>
-  <p:tag name="LATEXFORMHEIGHT" val="312"/>
-  <p:tag name="LATEXFORMWIDTH" val="384"/>
-  <p:tag name="LATEXFORMWRAP" val="True"/>
-  <p:tag name="BITMAPVECTOR" val="0"/>
-</p:tagLst>
-</file>
-
-<file path=ppt/tags/tag11.xml><?xml version="1.0" encoding="utf-8"?>
-<p:tagLst xmlns:a="http://schemas.openxmlformats.org/drawingml/2006/main" xmlns:r="http://schemas.openxmlformats.org/officeDocument/2006/relationships" xmlns:p="http://schemas.openxmlformats.org/presentationml/2006/main">
-  <p:tag name="OUTPUTDPI" val="1200"/>
-  <p:tag name="ORIGINALHEIGHT" val="140.9824"/>
-  <p:tag name="ORIGINALWIDTH" val="798.6501"/>
-  <p:tag name="LATEXADDIN" val="\documentclass{article}&#10;\usepackage{amsmath}&#10;\pagestyle{empty}&#10;\begin{document}&#10;&#10;$$ S^2 \sim \textrm{Unif}(0, 4) $$&#10;&#10;\end{document}"/>
-  <p:tag name="IGUANATEXSIZE" val="28"/>
-  <p:tag name="IGUANATEXCURSOR" val="111"/>
-  <p:tag name="TRANSPARENCY" val="True"/>
-  <p:tag name="FILENAME" val=""/>
-  <p:tag name="LATEXENGINEID" val="0"/>
-  <p:tag name="TEMPFOLDER" val="c:\temp\"/>
-  <p:tag name="LATEXFORMHEIGHT" val="312"/>
-  <p:tag name="LATEXFORMWIDTH" val="384"/>
-  <p:tag name="LATEXFORMWRAP" val="True"/>
-  <p:tag name="BITMAPVECTOR" val="0"/>
-</p:tagLst>
-</file>
-
-<file path=ppt/tags/tag12.xml><?xml version="1.0" encoding="utf-8"?>
-<p:tagLst xmlns:a="http://schemas.openxmlformats.org/drawingml/2006/main" xmlns:r="http://schemas.openxmlformats.org/officeDocument/2006/relationships" xmlns:p="http://schemas.openxmlformats.org/presentationml/2006/main">
-  <p:tag name="OUTPUTDPI" val="1200"/>
-  <p:tag name="ORIGINALHEIGHT" val="140.9824"/>
-  <p:tag name="ORIGINALWIDTH" val="608.174"/>
-  <p:tag name="LATEXADDIN" val="\documentclass{article}&#10;\usepackage{amsmath}&#10;\pagestyle{empty}&#10;\begin{document}&#10;&#10;$$ V = (S/\tau)^2$$&#10;&#10;\end{document}"/>
-  <p:tag name="IGUANATEXSIZE" val="28"/>
-  <p:tag name="IGUANATEXCURSOR" val="100"/>
-  <p:tag name="TRANSPARENCY" val="True"/>
-  <p:tag name="FILENAME" val=""/>
-  <p:tag name="LATEXENGINEID" val="0"/>
-  <p:tag name="TEMPFOLDER" val="c:\temp\"/>
-  <p:tag name="LATEXFORMHEIGHT" val="312"/>
-  <p:tag name="LATEXFORMWIDTH" val="384"/>
-  <p:tag name="LATEXFORMWRAP" val="True"/>
-  <p:tag name="BITMAPVECTOR" val="0"/>
-</p:tagLst>
-</file>
-
-<file path=ppt/tags/tag13.xml><?xml version="1.0" encoding="utf-8"?>
-<p:tagLst xmlns:a="http://schemas.openxmlformats.org/drawingml/2006/main" xmlns:r="http://schemas.openxmlformats.org/officeDocument/2006/relationships" xmlns:p="http://schemas.openxmlformats.org/presentationml/2006/main">
-  <p:tag name="OUTPUTDPI" val="1200"/>
-  <p:tag name="ORIGINALHEIGHT" val="123.7346"/>
-  <p:tag name="ORIGINALWIDTH" val="758.9051"/>
-  <p:tag name="LATEXADDIN" val="\documentclass{article}&#10;\usepackage{amsmath}&#10;\pagestyle{empty}&#10;\begin{document}&#10;&#10;$$ V \sim \textrm{Unif}(0, 1)$$&#10;&#10;\end{document}"/>
-  <p:tag name="IGUANATEXSIZE" val="28"/>
-  <p:tag name="IGUANATEXCURSOR" val="110"/>
-  <p:tag name="TRANSPARENCY" val="True"/>
-  <p:tag name="FILENAME" val=""/>
-  <p:tag name="LATEXENGINEID" val="0"/>
-  <p:tag name="TEMPFOLDER" val="c:\temp\"/>
-  <p:tag name="LATEXFORMHEIGHT" val="312"/>
-  <p:tag name="LATEXFORMWIDTH" val="384"/>
-  <p:tag name="LATEXFORMWRAP" val="True"/>
-  <p:tag name="BITMAPVECTOR" val="0"/>
-</p:tagLst>
-</file>
-
-<file path=ppt/tags/tag14.xml><?xml version="1.0" encoding="utf-8"?>
-<p:tagLst xmlns:a="http://schemas.openxmlformats.org/drawingml/2006/main" xmlns:r="http://schemas.openxmlformats.org/officeDocument/2006/relationships" xmlns:p="http://schemas.openxmlformats.org/presentationml/2006/main">
-  <p:tag name="OUTPUTDPI" val="1200"/>
-  <p:tag name="ORIGINALHEIGHT" val="161.2298"/>
-  <p:tag name="ORIGINALWIDTH" val="1262.842"/>
-  <p:tag name="LATEXADDIN" val="\documentclass{article}&#10;\usepackage{amsmath}&#10;\pagestyle{empty}&#10;\begin{document}&#10;&#10;$$ V_1, \ldots V_n \overset{i.i.d.}{\sim} \textrm{Unif}(0, 1)$$&#10;&#10;\end{document}"/>
-  <p:tag name="IGUANATEXSIZE" val="28"/>
-  <p:tag name="IGUANATEXCURSOR" val="115"/>
-  <p:tag name="TRANSPARENCY" val="True"/>
-  <p:tag name="FILENAME" val=""/>
-  <p:tag name="LATEXENGINEID" val="0"/>
-  <p:tag name="TEMPFOLDER" val="c:\temp\"/>
-  <p:tag name="LATEXFORMHEIGHT" val="312"/>
-  <p:tag name="LATEXFORMWIDTH" val="384"/>
-  <p:tag name="LATEXFORMWRAP" val="True"/>
-  <p:tag name="BITMAPVECTOR" val="0"/>
-</p:tagLst>
-</file>
-
-<file path=ppt/tags/tag15.xml><?xml version="1.0" encoding="utf-8"?>
-<p:tagLst xmlns:a="http://schemas.openxmlformats.org/drawingml/2006/main" xmlns:r="http://schemas.openxmlformats.org/officeDocument/2006/relationships" xmlns:p="http://schemas.openxmlformats.org/presentationml/2006/main">
-  <p:tag name="OUTPUTDPI" val="1200"/>
-  <p:tag name="ORIGINALHEIGHT" val="137.2328"/>
-  <p:tag name="ORIGINALWIDTH" val="907.3865"/>
-  <p:tag name="LATEXADDIN" val="\documentclass{article}&#10;\usepackage{amsmath}&#10;\pagestyle{empty}&#10;\begin{document}&#10;&#10;$$ U_{(1)}\sim \textrm{Beta}(1, n)$$&#10;&#10;\end{document}"/>
-  <p:tag name="IGUANATEXSIZE" val="28"/>
-  <p:tag name="IGUANATEXCURSOR" val="114"/>
-  <p:tag name="TRANSPARENCY" val="True"/>
-  <p:tag name="FILENAME" val=""/>
-  <p:tag name="LATEXENGINEID" val="0"/>
-  <p:tag name="TEMPFOLDER" val="c:\temp\"/>
-  <p:tag name="LATEXFORMHEIGHT" val="312"/>
-  <p:tag name="LATEXFORMWIDTH" val="384"/>
-  <p:tag name="LATEXFORMWRAP" val="True"/>
-  <p:tag name="BITMAPVECTOR" val="0"/>
-</p:tagLst>
-</file>
-
-<file path=ppt/tags/tag16.xml><?xml version="1.0" encoding="utf-8"?>
-<p:tagLst xmlns:a="http://schemas.openxmlformats.org/drawingml/2006/main" xmlns:r="http://schemas.openxmlformats.org/officeDocument/2006/relationships" xmlns:p="http://schemas.openxmlformats.org/presentationml/2006/main">
-  <p:tag name="OUTPUTDPI" val="1200"/>
-  <p:tag name="ORIGINALHEIGHT" val="124.4844"/>
-  <p:tag name="ORIGINALWIDTH" val="913.3858"/>
-  <p:tag name="LATEXADDIN" val="\documentclass{article}&#10;\usepackage{amsmath}&#10;\pagestyle{empty}&#10;\begin{document}&#10;&#10;&#10;$$ V | \textrm{Hit} \sim \textrm{Expo}(\lambda)$$&#10;&#10;\end{document}"/>
-  <p:tag name="IGUANATEXSIZE" val="28"/>
-  <p:tag name="IGUANATEXCURSOR" val="82"/>
-  <p:tag name="TRANSPARENCY" val="True"/>
-  <p:tag name="FILENAME" val=""/>
-  <p:tag name="LATEXENGINEID" val="0"/>
-  <p:tag name="TEMPFOLDER" val="c:\temp\"/>
-  <p:tag name="LATEXFORMHEIGHT" val="312"/>
-  <p:tag name="LATEXFORMWIDTH" val="384"/>
-  <p:tag name="LATEXFORMWRAP" val="True"/>
-  <p:tag name="BITMAPVECTOR" val="0"/>
-</p:tagLst>
-</file>
-
-<file path=ppt/tags/tag17.xml><?xml version="1.0" encoding="utf-8"?>
-<p:tagLst xmlns:a="http://schemas.openxmlformats.org/drawingml/2006/main" xmlns:r="http://schemas.openxmlformats.org/officeDocument/2006/relationships" xmlns:p="http://schemas.openxmlformats.org/presentationml/2006/main">
-  <p:tag name="OUTPUTDPI" val="1200"/>
-  <p:tag name="ORIGINALHEIGHT" val="124.4844"/>
-  <p:tag name="ORIGINALWIDTH" val="1040.87"/>
-  <p:tag name="LATEXADDIN" val="\documentclass{article}&#10;\usepackage{amsmath}&#10;\pagestyle{empty}&#10;\begin{document}&#10;&#10;&#10;$$ V | \textrm{Miss} \sim \textrm{Unif}(0, 1)$$&#10;&#10;\end{document}"/>
-  <p:tag name="IGUANATEXSIZE" val="28"/>
-  <p:tag name="IGUANATEXCURSOR" val="126"/>
-  <p:tag name="TRANSPARENCY" val="True"/>
-  <p:tag name="FILENAME" val=""/>
-  <p:tag name="LATEXENGINEID" val="0"/>
-  <p:tag name="TEMPFOLDER" val="c:\temp\"/>
-  <p:tag name="LATEXFORMHEIGHT" val="312"/>
-  <p:tag name="LATEXFORMWIDTH" val="384"/>
-  <p:tag name="LATEXFORMWRAP" val="True"/>
-  <p:tag name="BITMAPVECTOR" val="0"/>
-</p:tagLst>
-</file>
-
-<file path=ppt/tags/tag18.xml><?xml version="1.0" encoding="utf-8"?>
-<p:tagLst xmlns:a="http://schemas.openxmlformats.org/drawingml/2006/main" xmlns:r="http://schemas.openxmlformats.org/officeDocument/2006/relationships" xmlns:p="http://schemas.openxmlformats.org/presentationml/2006/main">
-  <p:tag name="OUTPUTDPI" val="1200"/>
-  <p:tag name="ORIGINALHEIGHT" val="161.2298"/>
-  <p:tag name="ORIGINALWIDTH" val="1250.094"/>
-  <p:tag name="LATEXADDIN" val="\documentclass{article}&#10;\usepackage{amsmath}&#10;\pagestyle{empty}&#10;\begin{document}&#10;&#10;&#10;$$ f(v) \propto e^{-\lambda v} = e^{-\lambda s^2/ \tau^2}$$&#10;&#10;\end{document}"/>
-  <p:tag name="IGUANATEXSIZE" val="28"/>
-  <p:tag name="IGUANATEXCURSOR" val="130"/>
-  <p:tag name="TRANSPARENCY" val="True"/>
-  <p:tag name="FILENAME" val=""/>
-  <p:tag name="LATEXENGINEID" val="0"/>
-  <p:tag name="TEMPFOLDER" val="c:\temp\"/>
-  <p:tag name="LATEXFORMHEIGHT" val="312"/>
-  <p:tag name="LATEXFORMWIDTH" val="513"/>
-  <p:tag name="LATEXFORMWRAP" val="True"/>
-  <p:tag name="BITMAPVECTOR" val="0"/>
-</p:tagLst>
-</file>
-
-<file path=ppt/tags/tag19.xml><?xml version="1.0" encoding="utf-8"?>
+<file path=ppt/tags/tag20.xml><?xml version="1.0" encoding="utf-8"?>
 <p:tagLst xmlns:a="http://schemas.openxmlformats.org/drawingml/2006/main" xmlns:r="http://schemas.openxmlformats.org/officeDocument/2006/relationships" xmlns:p="http://schemas.openxmlformats.org/presentationml/2006/main">
   <p:tag name="OUTPUTDPI" val="1200"/>
   <p:tag name="ORIGINALHEIGHT" val="161.2298"/>
@@ -15523,26 +17720,7 @@
 </p:tagLst>
 </file>
 
-<file path=ppt/tags/tag2.xml><?xml version="1.0" encoding="utf-8"?>
-<p:tagLst xmlns:a="http://schemas.openxmlformats.org/drawingml/2006/main" xmlns:r="http://schemas.openxmlformats.org/officeDocument/2006/relationships" xmlns:p="http://schemas.openxmlformats.org/presentationml/2006/main">
-  <p:tag name="OUTPUTDPI" val="1200"/>
-  <p:tag name="ORIGINALHEIGHT" val="506.1867"/>
-  <p:tag name="ORIGINALWIDTH" val="3203.599"/>
-  <p:tag name="LATEXADDIN" val="\documentclass{article}&#10;\usepackage{amsmath}&#10;\pagestyle{empty}&#10;\begin{document}&#10;&#10;\begin{align*}&#10;M &amp;= E - e \sin(E) &amp; \textrm{Kepler's Equation} \\&#10;\tan \left(\frac{f}{2} \right) &amp;= \sqrt{\frac{1+e}{1-e}} \cdot \tan \left( \frac{E}{2} \right) &amp;\textrm{true to eccentric}&#10;\end{align*}&#10;&#10;\end{document}"/>
-  <p:tag name="IGUANATEXSIZE" val="20"/>
-  <p:tag name="IGUANATEXCURSOR" val="282"/>
-  <p:tag name="TRANSPARENCY" val="True"/>
-  <p:tag name="FILENAME" val=""/>
-  <p:tag name="LATEXENGINEID" val="0"/>
-  <p:tag name="TEMPFOLDER" val="c:\temp\"/>
-  <p:tag name="LATEXFORMHEIGHT" val="312"/>
-  <p:tag name="LATEXFORMWIDTH" val="384"/>
-  <p:tag name="LATEXFORMWRAP" val="True"/>
-  <p:tag name="BITMAPVECTOR" val="0"/>
-</p:tagLst>
-</file>
-
-<file path=ppt/tags/tag20.xml><?xml version="1.0" encoding="utf-8"?>
+<file path=ppt/tags/tag21.xml><?xml version="1.0" encoding="utf-8"?>
 <p:tagLst xmlns:a="http://schemas.openxmlformats.org/drawingml/2006/main" xmlns:r="http://schemas.openxmlformats.org/officeDocument/2006/relationships" xmlns:p="http://schemas.openxmlformats.org/presentationml/2006/main">
   <p:tag name="OUTPUTDPI" val="1200"/>
   <p:tag name="ORIGINALHEIGHT" val="276.7154"/>
@@ -15561,7 +17739,7 @@
 </p:tagLst>
 </file>
 
-<file path=ppt/tags/tag21.xml><?xml version="1.0" encoding="utf-8"?>
+<file path=ppt/tags/tag22.xml><?xml version="1.0" encoding="utf-8"?>
 <p:tagLst xmlns:a="http://schemas.openxmlformats.org/drawingml/2006/main" xmlns:r="http://schemas.openxmlformats.org/officeDocument/2006/relationships" xmlns:p="http://schemas.openxmlformats.org/presentationml/2006/main">
   <p:tag name="OUTPUTDPI" val="1200"/>
   <p:tag name="ORIGINALHEIGHT" val="257.2179"/>
@@ -15580,14 +17758,14 @@
 </p:tagLst>
 </file>
 
-<file path=ppt/tags/tag22.xml><?xml version="1.0" encoding="utf-8"?>
+<file path=ppt/tags/tag23.xml><?xml version="1.0" encoding="utf-8"?>
 <p:tagLst xmlns:a="http://schemas.openxmlformats.org/drawingml/2006/main" xmlns:r="http://schemas.openxmlformats.org/officeDocument/2006/relationships" xmlns:p="http://schemas.openxmlformats.org/presentationml/2006/main">
   <p:tag name="OUTPUTDPI" val="1200"/>
   <p:tag name="ORIGINALHEIGHT" val="358.4552"/>
-  <p:tag name="ORIGINALWIDTH" val="2262.467"/>
-  <p:tag name="LATEXADDIN" val="\documentclass{article}&#10;\usepackage{amsmath}&#10;\pagestyle{empty}&#10;\begin{document}&#10;&#10;$$ \mathcal{L}(\mathbf{v}, h, \lambda) = \sum_{j=1}^{n} \log \left( h \cdot \frac{\lambda v_j}{1 - e^{-\lambda}} + 1 - h \right)$$&#10;&#10;&#10;\end{document}"/>
+  <p:tag name="ORIGINALWIDTH" val="2413.198"/>
+  <p:tag name="LATEXADDIN" val="\documentclass{article}&#10;\usepackage{amsmath}&#10;\pagestyle{empty}&#10;\begin{document}&#10;&#10;$$ \mathcal{L}(\mathbf{v}, h, \lambda) = \sum_{j=1}^{n} \log \left( h_j \cdot \frac{\lambda v_j}{1 - e^{-\lambda_j}} + 1 - h_j \right)$$&#10;&#10;&#10;\end{document}"/>
   <p:tag name="IGUANATEXSIZE" val="28"/>
-  <p:tag name="IGUANATEXCURSOR" val="106"/>
+  <p:tag name="IGUANATEXCURSOR" val="152"/>
   <p:tag name="TRANSPARENCY" val="True"/>
   <p:tag name="FILENAME" val=""/>
   <p:tag name="LATEXENGINEID" val="0"/>
@@ -15599,7 +17777,7 @@
 </p:tagLst>
 </file>
 
-<file path=ppt/tags/tag23.xml><?xml version="1.0" encoding="utf-8"?>
+<file path=ppt/tags/tag24.xml><?xml version="1.0" encoding="utf-8"?>
 <p:tagLst xmlns:a="http://schemas.openxmlformats.org/drawingml/2006/main" xmlns:r="http://schemas.openxmlformats.org/officeDocument/2006/relationships" xmlns:p="http://schemas.openxmlformats.org/presentationml/2006/main">
   <p:tag name="OUTPUTDPI" val="1200"/>
   <p:tag name="ORIGINALHEIGHT" val="362.9547"/>
@@ -15618,7 +17796,7 @@
 </p:tagLst>
 </file>
 
-<file path=ppt/tags/tag24.xml><?xml version="1.0" encoding="utf-8"?>
+<file path=ppt/tags/tag25.xml><?xml version="1.0" encoding="utf-8"?>
 <p:tagLst xmlns:a="http://schemas.openxmlformats.org/drawingml/2006/main" xmlns:r="http://schemas.openxmlformats.org/officeDocument/2006/relationships" xmlns:p="http://schemas.openxmlformats.org/presentationml/2006/main">
   <p:tag name="OUTPUTDPI" val="1200"/>
   <p:tag name="ORIGINALHEIGHT" val="362.9547"/>
@@ -15637,7 +17815,7 @@
 </p:tagLst>
 </file>
 
-<file path=ppt/tags/tag25.xml><?xml version="1.0" encoding="utf-8"?>
+<file path=ppt/tags/tag26.xml><?xml version="1.0" encoding="utf-8"?>
 <p:tagLst xmlns:a="http://schemas.openxmlformats.org/drawingml/2006/main" xmlns:r="http://schemas.openxmlformats.org/officeDocument/2006/relationships" xmlns:p="http://schemas.openxmlformats.org/presentationml/2006/main">
   <p:tag name="OUTPUTDPI" val="1200"/>
   <p:tag name="ORIGINALHEIGHT" val="450.6936"/>
@@ -15656,7 +17834,7 @@
 </p:tagLst>
 </file>
 
-<file path=ppt/tags/tag26.xml><?xml version="1.0" encoding="utf-8"?>
+<file path=ppt/tags/tag27.xml><?xml version="1.0" encoding="utf-8"?>
 <p:tagLst xmlns:a="http://schemas.openxmlformats.org/drawingml/2006/main" xmlns:r="http://schemas.openxmlformats.org/officeDocument/2006/relationships" xmlns:p="http://schemas.openxmlformats.org/presentationml/2006/main">
   <p:tag name="OUTPUTDPI" val="1200"/>
   <p:tag name="ORIGINALHEIGHT" val="125.2343"/>
@@ -15678,6 +17856,25 @@
 <file path=ppt/tags/tag3.xml><?xml version="1.0" encoding="utf-8"?>
 <p:tagLst xmlns:a="http://schemas.openxmlformats.org/drawingml/2006/main" xmlns:r="http://schemas.openxmlformats.org/officeDocument/2006/relationships" xmlns:p="http://schemas.openxmlformats.org/presentationml/2006/main">
   <p:tag name="OUTPUTDPI" val="1200"/>
+  <p:tag name="ORIGINALHEIGHT" val="506.1867"/>
+  <p:tag name="ORIGINALWIDTH" val="3203.599"/>
+  <p:tag name="LATEXADDIN" val="\documentclass{article}&#10;\usepackage{amsmath}&#10;\pagestyle{empty}&#10;\begin{document}&#10;&#10;\begin{align*}&#10;M &amp;= E - e \sin(E) &amp; \textrm{Kepler's Equation} \\&#10;\tan \left(\frac{f}{2} \right) &amp;= \sqrt{\frac{1+e}{1-e}} \cdot \tan \left( \frac{E}{2} \right) &amp;\textrm{true to eccentric}&#10;\end{align*}&#10;&#10;\end{document}"/>
+  <p:tag name="IGUANATEXSIZE" val="20"/>
+  <p:tag name="IGUANATEXCURSOR" val="282"/>
+  <p:tag name="TRANSPARENCY" val="True"/>
+  <p:tag name="FILENAME" val=""/>
+  <p:tag name="LATEXENGINEID" val="0"/>
+  <p:tag name="TEMPFOLDER" val="c:\temp\"/>
+  <p:tag name="LATEXFORMHEIGHT" val="312"/>
+  <p:tag name="LATEXFORMWIDTH" val="384"/>
+  <p:tag name="LATEXFORMWRAP" val="True"/>
+  <p:tag name="BITMAPVECTOR" val="0"/>
+</p:tagLst>
+</file>
+
+<file path=ppt/tags/tag4.xml><?xml version="1.0" encoding="utf-8"?>
+<p:tagLst xmlns:a="http://schemas.openxmlformats.org/drawingml/2006/main" xmlns:r="http://schemas.openxmlformats.org/officeDocument/2006/relationships" xmlns:p="http://schemas.openxmlformats.org/presentationml/2006/main">
+  <p:tag name="OUTPUTDPI" val="1200"/>
   <p:tag name="ORIGINALHEIGHT" val="123.7346"/>
   <p:tag name="ORIGINALWIDTH" val="1352.081"/>
   <p:tag name="LATEXADDIN" val="\documentclass{article}&#10;\usepackage{amsmath}&#10;\pagestyle{empty}&#10;\begin{document}&#10;&#10;$M(t) = M_0 + N \cdot (t - t_0) $&#10;&#10;&#10;\end{document}"/>
@@ -15694,7 +17891,7 @@
 </p:tagLst>
 </file>
 
-<file path=ppt/tags/tag4.xml><?xml version="1.0" encoding="utf-8"?>
+<file path=ppt/tags/tag5.xml><?xml version="1.0" encoding="utf-8"?>
 <p:tagLst xmlns:a="http://schemas.openxmlformats.org/drawingml/2006/main" xmlns:r="http://schemas.openxmlformats.org/officeDocument/2006/relationships" xmlns:p="http://schemas.openxmlformats.org/presentationml/2006/main">
   <p:tag name="OUTPUTDPI" val="1200"/>
   <p:tag name="ORIGINALHEIGHT" val="834.6457"/>
@@ -15713,7 +17910,7 @@
 </p:tagLst>
 </file>
 
-<file path=ppt/tags/tag5.xml><?xml version="1.0" encoding="utf-8"?>
+<file path=ppt/tags/tag6.xml><?xml version="1.0" encoding="utf-8"?>
 <p:tagLst xmlns:a="http://schemas.openxmlformats.org/drawingml/2006/main" xmlns:r="http://schemas.openxmlformats.org/officeDocument/2006/relationships" xmlns:p="http://schemas.openxmlformats.org/presentationml/2006/main">
   <p:tag name="OUTPUTDPI" val="1200"/>
   <p:tag name="ORIGINALHEIGHT" val="123.7346"/>
@@ -15732,7 +17929,7 @@
 </p:tagLst>
 </file>
 
-<file path=ppt/tags/tag6.xml><?xml version="1.0" encoding="utf-8"?>
+<file path=ppt/tags/tag7.xml><?xml version="1.0" encoding="utf-8"?>
 <p:tagLst xmlns:a="http://schemas.openxmlformats.org/drawingml/2006/main" xmlns:r="http://schemas.openxmlformats.org/officeDocument/2006/relationships" xmlns:p="http://schemas.openxmlformats.org/presentationml/2006/main">
   <p:tag name="OUTPUTDPI" val="1200"/>
   <p:tag name="ORIGINALHEIGHT" val="140.9824"/>
@@ -15751,7 +17948,7 @@
 </p:tagLst>
 </file>
 
-<file path=ppt/tags/tag7.xml><?xml version="1.0" encoding="utf-8"?>
+<file path=ppt/tags/tag8.xml><?xml version="1.0" encoding="utf-8"?>
 <p:tagLst xmlns:a="http://schemas.openxmlformats.org/drawingml/2006/main" xmlns:r="http://schemas.openxmlformats.org/officeDocument/2006/relationships" xmlns:p="http://schemas.openxmlformats.org/presentationml/2006/main">
   <p:tag name="OUTPUTDPI" val="1200"/>
   <p:tag name="ORIGINALHEIGHT" val="140.9824"/>
@@ -15770,7 +17967,7 @@
 </p:tagLst>
 </file>
 
-<file path=ppt/tags/tag8.xml><?xml version="1.0" encoding="utf-8"?>
+<file path=ppt/tags/tag9.xml><?xml version="1.0" encoding="utf-8"?>
 <p:tagLst xmlns:a="http://schemas.openxmlformats.org/drawingml/2006/main" xmlns:r="http://schemas.openxmlformats.org/officeDocument/2006/relationships" xmlns:p="http://schemas.openxmlformats.org/presentationml/2006/main">
   <p:tag name="OUTPUTDPI" val="1200"/>
   <p:tag name="ORIGINALHEIGHT" val="113.2358"/>
@@ -15778,25 +17975,6 @@
   <p:tag name="LATEXADDIN" val="\documentclass{article}&#10;\usepackage{amsmath}&#10;\pagestyle{empty}&#10;\begin{document}&#10;&#10;$$ d\Omega = dz \cdot d\phi $$&#10;&#10;\end{document}"/>
   <p:tag name="IGUANATEXSIZE" val="28"/>
   <p:tag name="IGUANATEXCURSOR" val="85"/>
-  <p:tag name="TRANSPARENCY" val="True"/>
-  <p:tag name="FILENAME" val=""/>
-  <p:tag name="LATEXENGINEID" val="0"/>
-  <p:tag name="TEMPFOLDER" val="c:\temp\"/>
-  <p:tag name="LATEXFORMHEIGHT" val="312"/>
-  <p:tag name="LATEXFORMWIDTH" val="384"/>
-  <p:tag name="LATEXFORMWRAP" val="True"/>
-  <p:tag name="BITMAPVECTOR" val="0"/>
-</p:tagLst>
-</file>
-
-<file path=ppt/tags/tag9.xml><?xml version="1.0" encoding="utf-8"?>
-<p:tagLst xmlns:a="http://schemas.openxmlformats.org/drawingml/2006/main" xmlns:r="http://schemas.openxmlformats.org/officeDocument/2006/relationships" xmlns:p="http://schemas.openxmlformats.org/presentationml/2006/main">
-  <p:tag name="OUTPUTDPI" val="1200"/>
-  <p:tag name="ORIGINALHEIGHT" val="140.9824"/>
-  <p:tag name="ORIGINALWIDTH" val="1213.348"/>
-  <p:tag name="LATEXADDIN" val="\documentclass{article}&#10;\usepackage{amsmath}&#10;\pagestyle{empty}&#10;\begin{document}&#10;&#10;$$ S^2| S \le \tau \sim \textrm{Unif}(0, \tau^2) $$&#10;&#10;\end{document}"/>
-  <p:tag name="IGUANATEXSIZE" val="28"/>
-  <p:tag name="IGUANATEXCURSOR" val="128"/>
   <p:tag name="TRANSPARENCY" val="True"/>
   <p:tag name="FILENAME" val=""/>
   <p:tag name="LATEXENGINEID" val="0"/>
@@ -16101,4 +18279,299 @@
     </a:ext>
   </a:extLst>
 </a:theme>
+</file>
+
+<file path=ppt/theme/theme2.xml><?xml version="1.0" encoding="utf-8"?>
+<a:theme xmlns:a="http://schemas.openxmlformats.org/drawingml/2006/main" name="Office Theme">
+  <a:themeElements>
+    <a:clrScheme name="Office">
+      <a:dk1>
+        <a:sysClr val="windowText" lastClr="000000"/>
+      </a:dk1>
+      <a:lt1>
+        <a:sysClr val="window" lastClr="FFFFFF"/>
+      </a:lt1>
+      <a:dk2>
+        <a:srgbClr val="44546A"/>
+      </a:dk2>
+      <a:lt2>
+        <a:srgbClr val="E7E6E6"/>
+      </a:lt2>
+      <a:accent1>
+        <a:srgbClr val="4472C4"/>
+      </a:accent1>
+      <a:accent2>
+        <a:srgbClr val="ED7D31"/>
+      </a:accent2>
+      <a:accent3>
+        <a:srgbClr val="A5A5A5"/>
+      </a:accent3>
+      <a:accent4>
+        <a:srgbClr val="FFC000"/>
+      </a:accent4>
+      <a:accent5>
+        <a:srgbClr val="5B9BD5"/>
+      </a:accent5>
+      <a:accent6>
+        <a:srgbClr val="70AD47"/>
+      </a:accent6>
+      <a:hlink>
+        <a:srgbClr val="0563C1"/>
+      </a:hlink>
+      <a:folHlink>
+        <a:srgbClr val="954F72"/>
+      </a:folHlink>
+    </a:clrScheme>
+    <a:fontScheme name="Office">
+      <a:majorFont>
+        <a:latin typeface="Calibri Light" panose="020F0302020204030204"/>
+        <a:ea typeface=""/>
+        <a:cs typeface=""/>
+        <a:font script="Jpan" typeface="游ゴシック Light"/>
+        <a:font script="Hang" typeface="맑은 고딕"/>
+        <a:font script="Hans" typeface="等线 Light"/>
+        <a:font script="Hant" typeface="新細明體"/>
+        <a:font script="Arab" typeface="Times New Roman"/>
+        <a:font script="Hebr" typeface="Times New Roman"/>
+        <a:font script="Thai" typeface="Angsana New"/>
+        <a:font script="Ethi" typeface="Nyala"/>
+        <a:font script="Beng" typeface="Vrinda"/>
+        <a:font script="Gujr" typeface="Shruti"/>
+        <a:font script="Khmr" typeface="MoolBoran"/>
+        <a:font script="Knda" typeface="Tunga"/>
+        <a:font script="Guru" typeface="Raavi"/>
+        <a:font script="Cans" typeface="Euphemia"/>
+        <a:font script="Cher" typeface="Plantagenet Cherokee"/>
+        <a:font script="Yiii" typeface="Microsoft Yi Baiti"/>
+        <a:font script="Tibt" typeface="Microsoft Himalaya"/>
+        <a:font script="Thaa" typeface="MV Boli"/>
+        <a:font script="Deva" typeface="Mangal"/>
+        <a:font script="Telu" typeface="Gautami"/>
+        <a:font script="Taml" typeface="Latha"/>
+        <a:font script="Syrc" typeface="Estrangelo Edessa"/>
+        <a:font script="Orya" typeface="Kalinga"/>
+        <a:font script="Mlym" typeface="Kartika"/>
+        <a:font script="Laoo" typeface="DokChampa"/>
+        <a:font script="Sinh" typeface="Iskoola Pota"/>
+        <a:font script="Mong" typeface="Mongolian Baiti"/>
+        <a:font script="Viet" typeface="Times New Roman"/>
+        <a:font script="Uigh" typeface="Microsoft Uighur"/>
+        <a:font script="Geor" typeface="Sylfaen"/>
+        <a:font script="Armn" typeface="Arial"/>
+        <a:font script="Bugi" typeface="Leelawadee UI"/>
+        <a:font script="Bopo" typeface="Microsoft JhengHei"/>
+        <a:font script="Java" typeface="Javanese Text"/>
+        <a:font script="Lisu" typeface="Segoe UI"/>
+        <a:font script="Mymr" typeface="Myanmar Text"/>
+        <a:font script="Nkoo" typeface="Ebrima"/>
+        <a:font script="Olck" typeface="Nirmala UI"/>
+        <a:font script="Osma" typeface="Ebrima"/>
+        <a:font script="Phag" typeface="Phagspa"/>
+        <a:font script="Syrn" typeface="Estrangelo Edessa"/>
+        <a:font script="Syrj" typeface="Estrangelo Edessa"/>
+        <a:font script="Syre" typeface="Estrangelo Edessa"/>
+        <a:font script="Sora" typeface="Nirmala UI"/>
+        <a:font script="Tale" typeface="Microsoft Tai Le"/>
+        <a:font script="Talu" typeface="Microsoft New Tai Lue"/>
+        <a:font script="Tfng" typeface="Ebrima"/>
+      </a:majorFont>
+      <a:minorFont>
+        <a:latin typeface="Calibri" panose="020F0502020204030204"/>
+        <a:ea typeface=""/>
+        <a:cs typeface=""/>
+        <a:font script="Jpan" typeface="游ゴシック"/>
+        <a:font script="Hang" typeface="맑은 고딕"/>
+        <a:font script="Hans" typeface="等线"/>
+        <a:font script="Hant" typeface="新細明體"/>
+        <a:font script="Arab" typeface="Arial"/>
+        <a:font script="Hebr" typeface="Arial"/>
+        <a:font script="Thai" typeface="Cordia New"/>
+        <a:font script="Ethi" typeface="Nyala"/>
+        <a:font script="Beng" typeface="Vrinda"/>
+        <a:font script="Gujr" typeface="Shruti"/>
+        <a:font script="Khmr" typeface="DaunPenh"/>
+        <a:font script="Knda" typeface="Tunga"/>
+        <a:font script="Guru" typeface="Raavi"/>
+        <a:font script="Cans" typeface="Euphemia"/>
+        <a:font script="Cher" typeface="Plantagenet Cherokee"/>
+        <a:font script="Yiii" typeface="Microsoft Yi Baiti"/>
+        <a:font script="Tibt" typeface="Microsoft Himalaya"/>
+        <a:font script="Thaa" typeface="MV Boli"/>
+        <a:font script="Deva" typeface="Mangal"/>
+        <a:font script="Telu" typeface="Gautami"/>
+        <a:font script="Taml" typeface="Latha"/>
+        <a:font script="Syrc" typeface="Estrangelo Edessa"/>
+        <a:font script="Orya" typeface="Kalinga"/>
+        <a:font script="Mlym" typeface="Kartika"/>
+        <a:font script="Laoo" typeface="DokChampa"/>
+        <a:font script="Sinh" typeface="Iskoola Pota"/>
+        <a:font script="Mong" typeface="Mongolian Baiti"/>
+        <a:font script="Viet" typeface="Arial"/>
+        <a:font script="Uigh" typeface="Microsoft Uighur"/>
+        <a:font script="Geor" typeface="Sylfaen"/>
+        <a:font script="Armn" typeface="Arial"/>
+        <a:font script="Bugi" typeface="Leelawadee UI"/>
+        <a:font script="Bopo" typeface="Microsoft JhengHei"/>
+        <a:font script="Java" typeface="Javanese Text"/>
+        <a:font script="Lisu" typeface="Segoe UI"/>
+        <a:font script="Mymr" typeface="Myanmar Text"/>
+        <a:font script="Nkoo" typeface="Ebrima"/>
+        <a:font script="Olck" typeface="Nirmala UI"/>
+        <a:font script="Osma" typeface="Ebrima"/>
+        <a:font script="Phag" typeface="Phagspa"/>
+        <a:font script="Syrn" typeface="Estrangelo Edessa"/>
+        <a:font script="Syrj" typeface="Estrangelo Edessa"/>
+        <a:font script="Syre" typeface="Estrangelo Edessa"/>
+        <a:font script="Sora" typeface="Nirmala UI"/>
+        <a:font script="Tale" typeface="Microsoft Tai Le"/>
+        <a:font script="Talu" typeface="Microsoft New Tai Lue"/>
+        <a:font script="Tfng" typeface="Ebrima"/>
+      </a:minorFont>
+    </a:fontScheme>
+    <a:fmtScheme name="Office">
+      <a:fillStyleLst>
+        <a:solidFill>
+          <a:schemeClr val="phClr"/>
+        </a:solidFill>
+        <a:gradFill rotWithShape="1">
+          <a:gsLst>
+            <a:gs pos="0">
+              <a:schemeClr val="phClr">
+                <a:lumMod val="110000"/>
+                <a:satMod val="105000"/>
+                <a:tint val="67000"/>
+              </a:schemeClr>
+            </a:gs>
+            <a:gs pos="50000">
+              <a:schemeClr val="phClr">
+                <a:lumMod val="105000"/>
+                <a:satMod val="103000"/>
+                <a:tint val="73000"/>
+              </a:schemeClr>
+            </a:gs>
+            <a:gs pos="100000">
+              <a:schemeClr val="phClr">
+                <a:lumMod val="105000"/>
+                <a:satMod val="109000"/>
+                <a:tint val="81000"/>
+              </a:schemeClr>
+            </a:gs>
+          </a:gsLst>
+          <a:lin ang="5400000" scaled="0"/>
+        </a:gradFill>
+        <a:gradFill rotWithShape="1">
+          <a:gsLst>
+            <a:gs pos="0">
+              <a:schemeClr val="phClr">
+                <a:satMod val="103000"/>
+                <a:lumMod val="102000"/>
+                <a:tint val="94000"/>
+              </a:schemeClr>
+            </a:gs>
+            <a:gs pos="50000">
+              <a:schemeClr val="phClr">
+                <a:satMod val="110000"/>
+                <a:lumMod val="100000"/>
+                <a:shade val="100000"/>
+              </a:schemeClr>
+            </a:gs>
+            <a:gs pos="100000">
+              <a:schemeClr val="phClr">
+                <a:lumMod val="99000"/>
+                <a:satMod val="120000"/>
+                <a:shade val="78000"/>
+              </a:schemeClr>
+            </a:gs>
+          </a:gsLst>
+          <a:lin ang="5400000" scaled="0"/>
+        </a:gradFill>
+      </a:fillStyleLst>
+      <a:lnStyleLst>
+        <a:ln w="6350" cap="flat" cmpd="sng" algn="ctr">
+          <a:solidFill>
+            <a:schemeClr val="phClr"/>
+          </a:solidFill>
+          <a:prstDash val="solid"/>
+          <a:miter lim="800000"/>
+        </a:ln>
+        <a:ln w="12700" cap="flat" cmpd="sng" algn="ctr">
+          <a:solidFill>
+            <a:schemeClr val="phClr"/>
+          </a:solidFill>
+          <a:prstDash val="solid"/>
+          <a:miter lim="800000"/>
+        </a:ln>
+        <a:ln w="19050" cap="flat" cmpd="sng" algn="ctr">
+          <a:solidFill>
+            <a:schemeClr val="phClr"/>
+          </a:solidFill>
+          <a:prstDash val="solid"/>
+          <a:miter lim="800000"/>
+        </a:ln>
+      </a:lnStyleLst>
+      <a:effectStyleLst>
+        <a:effectStyle>
+          <a:effectLst/>
+        </a:effectStyle>
+        <a:effectStyle>
+          <a:effectLst/>
+        </a:effectStyle>
+        <a:effectStyle>
+          <a:effectLst>
+            <a:outerShdw blurRad="57150" dist="19050" dir="5400000" algn="ctr" rotWithShape="0">
+              <a:srgbClr val="000000">
+                <a:alpha val="63000"/>
+              </a:srgbClr>
+            </a:outerShdw>
+          </a:effectLst>
+        </a:effectStyle>
+      </a:effectStyleLst>
+      <a:bgFillStyleLst>
+        <a:solidFill>
+          <a:schemeClr val="phClr"/>
+        </a:solidFill>
+        <a:solidFill>
+          <a:schemeClr val="phClr">
+            <a:tint val="95000"/>
+            <a:satMod val="170000"/>
+          </a:schemeClr>
+        </a:solidFill>
+        <a:gradFill rotWithShape="1">
+          <a:gsLst>
+            <a:gs pos="0">
+              <a:schemeClr val="phClr">
+                <a:tint val="93000"/>
+                <a:satMod val="150000"/>
+                <a:shade val="98000"/>
+                <a:lumMod val="102000"/>
+              </a:schemeClr>
+            </a:gs>
+            <a:gs pos="50000">
+              <a:schemeClr val="phClr">
+                <a:tint val="98000"/>
+                <a:satMod val="130000"/>
+                <a:shade val="90000"/>
+                <a:lumMod val="103000"/>
+              </a:schemeClr>
+            </a:gs>
+            <a:gs pos="100000">
+              <a:schemeClr val="phClr">
+                <a:shade val="63000"/>
+                <a:satMod val="120000"/>
+              </a:schemeClr>
+            </a:gs>
+          </a:gsLst>
+          <a:lin ang="5400000" scaled="0"/>
+        </a:gradFill>
+      </a:bgFillStyleLst>
+    </a:fmtScheme>
+  </a:themeElements>
+  <a:objectDefaults/>
+  <a:extraClrSchemeLst/>
+  <a:extLst>
+    <a:ext uri="{05A4C25C-085E-4340-85A3-A5531E510DB2}">
+      <thm15:themeFamily xmlns:thm15="http://schemas.microsoft.com/office/thememl/2012/main" name="Office Theme" id="{62F939B6-93AF-4DB8-9C6B-D6C7DFDC589F}" vid="{4A3C46E8-61CC-4603-A589-7422A47A8E4A}"/>
+    </a:ext>
+  </a:extLst>
+</a:theme>
 </file>
</xml_diff>